<commit_message>
edit Requirements compare APP with other APPs
</commit_message>
<xml_diff>
--- a/2021_Summer/jp.hong/Project_BnC_jph.pptx
+++ b/2021_Summer/jp.hong/Project_BnC_jph.pptx
@@ -2,7 +2,7 @@
 <file path=ppt/presentation.xml><?xml version="1.0" encoding="utf-8"?>
 <p:presentation xmlns:r="http://schemas.openxmlformats.org/officeDocument/2006/relationships" xmlns:c="http://schemas.openxmlformats.org/drawingml/2006/chart" xmlns:a="http://schemas.openxmlformats.org/drawingml/2006/main" xmlns:dgm="http://schemas.openxmlformats.org/drawingml/2006/diagram" xmlns:dsp="http://schemas.microsoft.com/office/drawing/2008/diagram" xmlns:p="http://schemas.openxmlformats.org/presentationml/2006/main">
   <p:sldMasterIdLst>
-    <p:sldMasterId id="2147483675" r:id="rId1"/>
+    <p:sldMasterId id="2147483662" r:id="rId1"/>
   </p:sldMasterIdLst>
   <p:sldIdLst>
     <p:sldId id="261" r:id="rId2"/>
@@ -22,20 +22,18 @@
     <p:sldId id="323" r:id="rId16"/>
     <p:sldId id="324" r:id="rId17"/>
     <p:sldId id="325" r:id="rId18"/>
-    <p:sldId id="296" r:id="rId19"/>
-    <p:sldId id="316" r:id="rId20"/>
-    <p:sldId id="289" r:id="rId21"/>
-    <p:sldId id="297" r:id="rId22"/>
-    <p:sldId id="290" r:id="rId23"/>
-    <p:sldId id="298" r:id="rId24"/>
-    <p:sldId id="291" r:id="rId25"/>
-    <p:sldId id="299" r:id="rId26"/>
-    <p:sldId id="292" r:id="rId27"/>
-    <p:sldId id="300" r:id="rId28"/>
-    <p:sldId id="306" r:id="rId29"/>
-    <p:sldId id="307" r:id="rId30"/>
-    <p:sldId id="294" r:id="rId31"/>
-    <p:sldId id="302" r:id="rId32"/>
+    <p:sldId id="289" r:id="rId19"/>
+    <p:sldId id="297" r:id="rId20"/>
+    <p:sldId id="290" r:id="rId21"/>
+    <p:sldId id="298" r:id="rId22"/>
+    <p:sldId id="291" r:id="rId23"/>
+    <p:sldId id="299" r:id="rId24"/>
+    <p:sldId id="292" r:id="rId25"/>
+    <p:sldId id="300" r:id="rId26"/>
+    <p:sldId id="306" r:id="rId27"/>
+    <p:sldId id="307" r:id="rId28"/>
+    <p:sldId id="294" r:id="rId29"/>
+    <p:sldId id="302" r:id="rId30"/>
   </p:sldIdLst>
   <p:sldSz cx="12192000" cy="6858000"/>
   <p:notesSz cx="7104063" cy="10234613"/>
@@ -7156,6 +7154,124 @@
               </a:rPr>
               <a:t>.</a:t>
             </a:r>
+            <a:endParaRPr lang="en-US" altLang="ko-KR" sz="2000">
+              <a:solidFill>
+                <a:schemeClr val="dk1"/>
+              </a:solidFill>
+            </a:endParaRPr>
+          </a:p>
+          <a:p>
+            <a:pPr>
+              <a:defRPr/>
+            </a:pPr>
+            <a:r>
+              <a:rPr lang="ko-KR" altLang="en-US" sz="2000">
+                <a:solidFill>
+                  <a:schemeClr val="dk1"/>
+                </a:solidFill>
+              </a:rPr>
+              <a:t>  └ 중복되는 아이디는 가입이 되어선 안된다</a:t>
+            </a:r>
+            <a:r>
+              <a:rPr lang="en-US" altLang="ko-KR" sz="2000">
+                <a:solidFill>
+                  <a:schemeClr val="dk1"/>
+                </a:solidFill>
+              </a:rPr>
+              <a:t>.</a:t>
+            </a:r>
+            <a:endParaRPr lang="en-US" altLang="ko-KR" sz="2000">
+              <a:solidFill>
+                <a:schemeClr val="dk1"/>
+              </a:solidFill>
+            </a:endParaRPr>
+          </a:p>
+          <a:p>
+            <a:pPr>
+              <a:defRPr/>
+            </a:pPr>
+            <a:r>
+              <a:rPr lang="ko-KR" altLang="en-US" sz="2000">
+                <a:solidFill>
+                  <a:schemeClr val="dk1"/>
+                </a:solidFill>
+              </a:rPr>
+              <a:t>  └ 중복되는 아이디로 가입시도시 아이디 입력 오류 메세지가 출력되어야 한다</a:t>
+            </a:r>
+            <a:r>
+              <a:rPr lang="en-US" altLang="ko-KR" sz="2000">
+                <a:solidFill>
+                  <a:schemeClr val="dk1"/>
+                </a:solidFill>
+              </a:rPr>
+              <a:t>.</a:t>
+            </a:r>
+            <a:endParaRPr lang="en-US" altLang="ko-KR" sz="2000">
+              <a:solidFill>
+                <a:schemeClr val="dk1"/>
+              </a:solidFill>
+            </a:endParaRPr>
+          </a:p>
+          <a:p>
+            <a:pPr>
+              <a:defRPr/>
+            </a:pPr>
+            <a:r>
+              <a:rPr lang="ko-KR" altLang="en-US" sz="2000">
+                <a:solidFill>
+                  <a:schemeClr val="dk1"/>
+                </a:solidFill>
+              </a:rPr>
+              <a:t>  └ 비밀번호는 특수문자 포함 </a:t>
+            </a:r>
+            <a:r>
+              <a:rPr lang="en-US" altLang="ko-KR" sz="2000">
+                <a:solidFill>
+                  <a:schemeClr val="dk1"/>
+                </a:solidFill>
+              </a:rPr>
+              <a:t>8</a:t>
+            </a:r>
+            <a:r>
+              <a:rPr lang="ko-KR" altLang="en-US" sz="2000">
+                <a:solidFill>
+                  <a:schemeClr val="dk1"/>
+                </a:solidFill>
+              </a:rPr>
+              <a:t>자리 이상 </a:t>
+            </a:r>
+            <a:r>
+              <a:rPr lang="en-US" altLang="ko-KR" sz="2000">
+                <a:solidFill>
+                  <a:schemeClr val="dk1"/>
+                </a:solidFill>
+              </a:rPr>
+              <a:t>12</a:t>
+            </a:r>
+            <a:r>
+              <a:rPr lang="ko-KR" altLang="en-US" sz="2000">
+                <a:solidFill>
+                  <a:schemeClr val="dk1"/>
+                </a:solidFill>
+              </a:rPr>
+              <a:t>자리 이하 이어야 한다</a:t>
+            </a:r>
+            <a:r>
+              <a:rPr lang="en-US" altLang="ko-KR" sz="2000">
+                <a:solidFill>
+                  <a:schemeClr val="dk1"/>
+                </a:solidFill>
+              </a:rPr>
+              <a:t>.</a:t>
+            </a:r>
+            <a:r>
+              <a:rPr lang="ko-KR" altLang="en-US" sz="2000">
+                <a:solidFill>
+                  <a:schemeClr val="dk1"/>
+                </a:solidFill>
+              </a:rPr>
+              <a:t> </a:t>
+            </a:r>
             <a:endParaRPr lang="ko-KR" altLang="en-US" sz="2000">
               <a:solidFill>
                 <a:schemeClr val="dk1"/>
@@ -7172,7 +7288,7 @@
                   <a:schemeClr val="dk1"/>
                 </a:solidFill>
               </a:rPr>
-              <a:t>  └ 중복되는 아이디는 가입이 되어선 안된다</a:t>
+              <a:t>  └ 회원가입을 위해 시도한 비밀번호가 </a:t>
             </a:r>
             <a:r>
               <a:rPr lang="en-US" altLang="ko-KR" sz="2000">
@@ -7180,25 +7296,15 @@
                   <a:schemeClr val="dk1"/>
                 </a:solidFill>
               </a:rPr>
-              <a:t>.</a:t>
-            </a:r>
-            <a:endParaRPr lang="en-US" altLang="ko-KR" sz="2000">
-              <a:solidFill>
-                <a:schemeClr val="dk1"/>
-              </a:solidFill>
-            </a:endParaRPr>
-          </a:p>
-          <a:p>
-            <a:pPr>
-              <a:defRPr/>
-            </a:pPr>
+              <a:t>7</a:t>
+            </a:r>
             <a:r>
               <a:rPr lang="ko-KR" altLang="en-US" sz="2000">
                 <a:solidFill>
                   <a:schemeClr val="dk1"/>
                 </a:solidFill>
               </a:rPr>
-              <a:t>  └ 중복되는 아이디로 가입시도시 아이디 입력 오류 메세지가 출력되어야 한다</a:t>
+              <a:t>자리 이하이거나 </a:t>
             </a:r>
             <a:r>
               <a:rPr lang="en-US" altLang="ko-KR" sz="2000">
@@ -7206,123 +7312,15 @@
                   <a:schemeClr val="dk1"/>
                 </a:solidFill>
               </a:rPr>
-              <a:t>.</a:t>
-            </a:r>
-            <a:endParaRPr lang="en-US" altLang="ko-KR" sz="2000">
-              <a:solidFill>
-                <a:schemeClr val="dk1"/>
-              </a:solidFill>
-            </a:endParaRPr>
-          </a:p>
-          <a:p>
-            <a:pPr>
-              <a:defRPr/>
-            </a:pPr>
+              <a:t>13</a:t>
+            </a:r>
             <a:r>
               <a:rPr lang="ko-KR" altLang="en-US" sz="2000">
                 <a:solidFill>
                   <a:schemeClr val="dk1"/>
                 </a:solidFill>
               </a:rPr>
-              <a:t>  └ 비밀번호는 특수문자 포함 </a:t>
-            </a:r>
-            <a:r>
-              <a:rPr lang="en-US" altLang="ko-KR" sz="2000">
-                <a:solidFill>
-                  <a:schemeClr val="dk1"/>
-                </a:solidFill>
-              </a:rPr>
-              <a:t>8</a:t>
-            </a:r>
-            <a:r>
-              <a:rPr lang="ko-KR" altLang="en-US" sz="2000">
-                <a:solidFill>
-                  <a:schemeClr val="dk1"/>
-                </a:solidFill>
-              </a:rPr>
-              <a:t>자리 이상 </a:t>
-            </a:r>
-            <a:r>
-              <a:rPr lang="en-US" altLang="ko-KR" sz="2000">
-                <a:solidFill>
-                  <a:schemeClr val="dk1"/>
-                </a:solidFill>
-              </a:rPr>
-              <a:t>12</a:t>
-            </a:r>
-            <a:r>
-              <a:rPr lang="ko-KR" altLang="en-US" sz="2000">
-                <a:solidFill>
-                  <a:schemeClr val="dk1"/>
-                </a:solidFill>
-              </a:rPr>
-              <a:t>자리 이하 이어야 한다</a:t>
-            </a:r>
-            <a:r>
-              <a:rPr lang="en-US" altLang="ko-KR" sz="2000">
-                <a:solidFill>
-                  <a:schemeClr val="dk1"/>
-                </a:solidFill>
-              </a:rPr>
-              <a:t>.</a:t>
-            </a:r>
-            <a:r>
-              <a:rPr lang="ko-KR" altLang="en-US" sz="2000">
-                <a:solidFill>
-                  <a:schemeClr val="dk1"/>
-                </a:solidFill>
-              </a:rPr>
-              <a:t> </a:t>
-            </a:r>
-            <a:endParaRPr lang="ko-KR" altLang="en-US" sz="2000">
-              <a:solidFill>
-                <a:schemeClr val="dk1"/>
-              </a:solidFill>
-            </a:endParaRPr>
-          </a:p>
-          <a:p>
-            <a:pPr>
-              <a:defRPr/>
-            </a:pPr>
-            <a:r>
-              <a:rPr lang="ko-KR" altLang="en-US" sz="2000">
-                <a:solidFill>
-                  <a:schemeClr val="dk1"/>
-                </a:solidFill>
-              </a:rPr>
-              <a:t>  └ 회원가입을 위해 시도한 비밀번호가 </a:t>
-            </a:r>
-            <a:r>
-              <a:rPr lang="en-US" altLang="ko-KR" sz="2000">
-                <a:solidFill>
-                  <a:schemeClr val="dk1"/>
-                </a:solidFill>
-              </a:rPr>
-              <a:t>7</a:t>
-            </a:r>
-            <a:r>
-              <a:rPr lang="ko-KR" altLang="en-US" sz="2000">
-                <a:solidFill>
-                  <a:schemeClr val="dk1"/>
-                </a:solidFill>
-              </a:rPr>
-              <a:t>자리 이하이거나 </a:t>
-            </a:r>
-            <a:r>
-              <a:rPr lang="en-US" altLang="ko-KR" sz="2000">
-                <a:solidFill>
-                  <a:schemeClr val="dk1"/>
-                </a:solidFill>
-              </a:rPr>
-              <a:t>13</a:t>
-            </a:r>
-            <a:r>
-              <a:rPr lang="ko-KR" altLang="en-US" sz="2000">
-                <a:solidFill>
-                  <a:schemeClr val="dk1"/>
-                </a:solidFill>
-              </a:rPr>
-              <a:t>자리 이상일 경우 입력 오류 메세지가 출력되어야 한다</a:t>
+              <a:t>자리 이상일 경우 비밀번호 입력 오류 메세지가 출력되어야 한다</a:t>
             </a:r>
             <a:endParaRPr lang="ko-KR" altLang="en-US" sz="2000">
               <a:solidFill>
@@ -7478,7 +7476,49 @@
                   <a:schemeClr val="dk1"/>
                 </a:solidFill>
               </a:rPr>
-              <a:t> 무결성</a:t>
+              <a:t> 로그인</a:t>
+            </a:r>
+            <a:endParaRPr lang="en-US" altLang="ko-KR" sz="2000">
+              <a:solidFill>
+                <a:schemeClr val="dk1"/>
+              </a:solidFill>
+            </a:endParaRPr>
+          </a:p>
+          <a:p>
+            <a:pPr>
+              <a:defRPr/>
+            </a:pPr>
+            <a:r>
+              <a:rPr lang="ko-KR" altLang="en-US" sz="2000">
+                <a:solidFill>
+                  <a:schemeClr val="dk1"/>
+                </a:solidFill>
+              </a:rPr>
+              <a:t>  └ 알맞은 </a:t>
+            </a:r>
+            <a:r>
+              <a:rPr lang="en-US" altLang="ko-KR" sz="2000">
+                <a:solidFill>
+                  <a:schemeClr val="dk1"/>
+                </a:solidFill>
+              </a:rPr>
+              <a:t>ID</a:t>
+            </a:r>
+            <a:r>
+              <a:rPr lang="ko-KR" altLang="en-US" sz="2000">
+                <a:solidFill>
+                  <a:schemeClr val="dk1"/>
+                </a:solidFill>
+              </a:rPr>
+              <a:t>값과 패스워드 값이 입력 될 경우 그에 맞는 회원 정보가 로그인 되어야 한다</a:t>
+            </a:r>
+            <a:r>
+              <a:rPr lang="en-US" altLang="ko-KR" sz="2000">
+                <a:solidFill>
+                  <a:schemeClr val="dk1"/>
+                </a:solidFill>
+              </a:rPr>
+              <a:t>.</a:t>
             </a:r>
             <a:endParaRPr lang="ko-KR" altLang="en-US" sz="2000">
               <a:solidFill>
@@ -7496,7 +7536,7 @@
                   <a:schemeClr val="dk1"/>
                 </a:solidFill>
               </a:rPr>
-              <a:t>  └ </a:t>
+              <a:t>  └ 로그인 실패시 로그인 오류 메세지를 출력해야 한다</a:t>
             </a:r>
             <a:r>
               <a:rPr lang="en-US" altLang="ko-KR" sz="2000">
@@ -7504,43 +7544,9 @@
                   <a:schemeClr val="dk1"/>
                 </a:solidFill>
               </a:rPr>
-              <a:t>APP</a:t>
-            </a:r>
-            <a:r>
-              <a:rPr lang="ko-KR" altLang="en-US" sz="2000">
-                <a:solidFill>
-                  <a:schemeClr val="dk1"/>
-                </a:solidFill>
-              </a:rPr>
-              <a:t> 종료시 입력된 데이터는 변조가 없어야 한다</a:t>
-            </a:r>
-            <a:r>
-              <a:rPr lang="en-US" altLang="ko-KR" sz="2000">
-                <a:solidFill>
-                  <a:schemeClr val="dk1"/>
-                </a:solidFill>
-              </a:rPr>
               <a:t>.</a:t>
             </a:r>
             <a:endParaRPr lang="en-US" altLang="ko-KR" sz="2000">
-              <a:solidFill>
-                <a:schemeClr val="dk1"/>
-              </a:solidFill>
-            </a:endParaRPr>
-          </a:p>
-          <a:p>
-            <a:pPr>
-              <a:defRPr/>
-            </a:pPr>
-            <a:r>
-              <a:rPr lang="ko-KR" altLang="en-US" sz="2000">
-                <a:solidFill>
-                  <a:schemeClr val="dk1"/>
-                </a:solidFill>
-              </a:rPr>
-              <a:t>  └ </a:t>
-            </a:r>
-            <a:endParaRPr lang="ko-KR" altLang="en-US" sz="2000">
               <a:solidFill>
                 <a:schemeClr val="dk1"/>
               </a:solidFill>
@@ -7622,13 +7628,99 @@
             <a:pPr>
               <a:defRPr/>
             </a:pPr>
+            <a:endParaRPr lang="en-US" altLang="ko-KR" sz="2000">
+              <a:solidFill>
+                <a:schemeClr val="dk1"/>
+              </a:solidFill>
+            </a:endParaRPr>
+          </a:p>
+          <a:p>
+            <a:pPr>
+              <a:defRPr/>
+            </a:pPr>
             <a:r>
               <a:rPr lang="ko-KR" altLang="en-US" sz="2000">
                 <a:solidFill>
                   <a:schemeClr val="dk1"/>
                 </a:solidFill>
               </a:rPr>
-              <a:t>요구 분석 명세서에는 시스템의 기능이 무엇인지(what)에만 초점을 두어 정리하고 어떻게(how) 구현할지는 기술하지 않는다</a:t>
+              <a:t> </a:t>
+            </a:r>
+            <a:r>
+              <a:rPr lang="en-US" altLang="ko-KR" sz="2000">
+                <a:solidFill>
+                  <a:schemeClr val="dk1"/>
+                </a:solidFill>
+              </a:rPr>
+              <a:t>-</a:t>
+            </a:r>
+            <a:r>
+              <a:rPr lang="ko-KR" altLang="en-US" sz="2000">
+                <a:solidFill>
+                  <a:schemeClr val="dk1"/>
+                </a:solidFill>
+              </a:rPr>
+              <a:t> 무결성</a:t>
+            </a:r>
+            <a:endParaRPr lang="ko-KR" altLang="en-US" sz="2000">
+              <a:solidFill>
+                <a:schemeClr val="dk1"/>
+              </a:solidFill>
+            </a:endParaRPr>
+          </a:p>
+          <a:p>
+            <a:pPr>
+              <a:defRPr/>
+            </a:pPr>
+            <a:r>
+              <a:rPr lang="ko-KR" altLang="en-US" sz="2000">
+                <a:solidFill>
+                  <a:schemeClr val="dk1"/>
+                </a:solidFill>
+              </a:rPr>
+              <a:t>  └ </a:t>
+            </a:r>
+            <a:r>
+              <a:rPr lang="en-US" altLang="ko-KR" sz="2000">
+                <a:solidFill>
+                  <a:schemeClr val="dk1"/>
+                </a:solidFill>
+              </a:rPr>
+              <a:t>APP</a:t>
+            </a:r>
+            <a:r>
+              <a:rPr lang="ko-KR" altLang="en-US" sz="2000">
+                <a:solidFill>
+                  <a:schemeClr val="dk1"/>
+                </a:solidFill>
+              </a:rPr>
+              <a:t> 종료시 입력된 데이터는 변조가 없어야 한다</a:t>
+            </a:r>
+            <a:r>
+              <a:rPr lang="en-US" altLang="ko-KR" sz="2000">
+                <a:solidFill>
+                  <a:schemeClr val="dk1"/>
+                </a:solidFill>
+              </a:rPr>
+              <a:t>.</a:t>
+            </a:r>
+            <a:endParaRPr lang="en-US" altLang="ko-KR" sz="2000">
+              <a:solidFill>
+                <a:schemeClr val="dk1"/>
+              </a:solidFill>
+            </a:endParaRPr>
+          </a:p>
+          <a:p>
+            <a:pPr>
+              <a:defRPr/>
+            </a:pPr>
+            <a:r>
+              <a:rPr lang="ko-KR" altLang="en-US" sz="2000">
+                <a:solidFill>
+                  <a:schemeClr val="dk1"/>
+                </a:solidFill>
+              </a:rPr>
+              <a:t>  └ </a:t>
             </a:r>
             <a:endParaRPr lang="ko-KR" altLang="en-US" sz="2000">
               <a:solidFill>
@@ -7778,7 +7870,7 @@
               </a:rPr>
               <a:t>  └ </a:t>
             </a:r>
-            <a:endParaRPr lang="en-US" altLang="ko-KR" sz="2000">
+            <a:endParaRPr lang="ko-KR" altLang="en-US" sz="2000">
               <a:solidFill>
                 <a:schemeClr val="dk1"/>
               </a:solidFill>
@@ -7905,7 +7997,7 @@
 </file>
 
 <file path=ppt/slides/slide18.xml><?xml version="1.0" encoding="utf-8"?>
-<p:sld xmlns:r="http://schemas.openxmlformats.org/officeDocument/2006/relationships" xmlns:c="http://schemas.openxmlformats.org/drawingml/2006/chart" xmlns:a="http://schemas.openxmlformats.org/drawingml/2006/main" xmlns:dgm="http://schemas.openxmlformats.org/drawingml/2006/diagram" xmlns:dsp="http://schemas.microsoft.com/office/drawing/2008/diagram" xmlns:p="http://schemas.openxmlformats.org/presentationml/2006/main">
+<p:sld xmlns:a="http://schemas.openxmlformats.org/drawingml/2006/main" xmlns:r="http://schemas.openxmlformats.org/officeDocument/2006/relationships" xmlns:p="http://schemas.openxmlformats.org/presentationml/2006/main">
   <p:cSld>
     <p:spTree>
       <p:nvGrpSpPr>
@@ -7923,550 +8015,262 @@
       </p:grpSpPr>
       <p:sp>
         <p:nvSpPr>
-          <p:cNvPr id="2" name="제목 1"/>
-          <p:cNvSpPr>
-            <a:spLocks noGrp="1"/>
-          </p:cNvSpPr>
-          <p:nvPr>
-            <p:ph type="title" idx="0"/>
-          </p:nvPr>
+          <p:cNvPr id="10" name="직사각형 9"/>
+          <p:cNvSpPr/>
+          <p:nvPr/>
         </p:nvSpPr>
         <p:spPr>
           <a:xfrm>
-            <a:off x="0" y="0"/>
-            <a:ext cx="11061700" cy="1325563"/>
+            <a:off x="-1" y="2398426"/>
+            <a:ext cx="12192001" cy="1338109"/>
           </a:xfrm>
+          <a:prstGeom prst="rect">
+            <a:avLst/>
+          </a:prstGeom>
           <a:solidFill>
-            <a:schemeClr val="lt1"/>
+            <a:schemeClr val="accent1">
+              <a:lumMod val="75000"/>
+            </a:schemeClr>
           </a:solidFill>
           <a:ln>
-            <a:solidFill>
-              <a:schemeClr val="lt1"/>
-            </a:solidFill>
+            <a:noFill/>
           </a:ln>
         </p:spPr>
+        <p:style>
+          <a:lnRef idx="2">
+            <a:schemeClr val="accent1">
+              <a:shade val="50000"/>
+            </a:schemeClr>
+          </a:lnRef>
+          <a:fillRef idx="1">
+            <a:schemeClr val="accent1"/>
+          </a:fillRef>
+          <a:effectRef idx="0">
+            <a:schemeClr val="accent1"/>
+          </a:effectRef>
+          <a:fontRef idx="minor">
+            <a:schemeClr val="lt1"/>
+          </a:fontRef>
+        </p:style>
         <p:txBody>
-          <a:bodyPr/>
+          <a:bodyPr rtlCol="0" anchor="ctr"/>
           <a:lstStyle/>
           <a:p>
-            <a:pPr lvl="0">
-              <a:defRPr/>
-            </a:pPr>
-            <a:r>
-              <a:rPr lang="ko-KR" altLang="en-US" sz="4000"/>
-              <a:t>요구사항 수집 및 분석</a:t>
-            </a:r>
-            <a:endParaRPr lang="ko-KR" altLang="en-US" sz="4000"/>
+            <a:pPr algn="ctr"/>
+            <a:endParaRPr kumimoji="1" lang="ko-KR" altLang="en-US" dirty="0"/>
           </a:p>
         </p:txBody>
       </p:sp>
       <p:sp>
         <p:nvSpPr>
-          <p:cNvPr id="3" name="내용 개체 틀 2"/>
-          <p:cNvSpPr>
-            <a:spLocks noGrp="1"/>
+          <p:cNvPr id="12" name="부제목 2"/>
+          <p:cNvSpPr txBox="1">
+            <a:spLocks/>
           </p:cNvSpPr>
-          <p:nvPr>
-            <p:ph idx="1"/>
-          </p:nvPr>
+          <p:nvPr/>
         </p:nvSpPr>
         <p:spPr>
           <a:xfrm>
-            <a:off x="0" y="1622425"/>
-            <a:ext cx="12192000" cy="5235575"/>
+            <a:off x="1" y="2608234"/>
+            <a:ext cx="12192000" cy="754314"/>
           </a:xfrm>
+          <a:prstGeom prst="rect">
+            <a:avLst/>
+          </a:prstGeom>
         </p:spPr>
         <p:txBody>
-          <a:bodyPr/>
-          <a:lstStyle/>
-          <a:p>
-            <a:pPr lvl="0">
-              <a:defRPr/>
-            </a:pPr>
-            <a:r>
-              <a:rPr lang="ko-KR" altLang="en-US" sz="2000"/>
-              <a:t>회원 정보를 담은 </a:t>
-            </a:r>
-            <a:r>
-              <a:rPr lang="en-US" altLang="ko-KR" sz="2000"/>
-              <a:t>DB</a:t>
-            </a:r>
-            <a:endParaRPr lang="en-US" altLang="ko-KR" sz="2000"/>
-          </a:p>
-          <a:p>
-            <a:pPr marL="0" lvl="0" indent="0">
-              <a:buNone/>
-              <a:defRPr/>
-            </a:pPr>
-            <a:r>
-              <a:rPr lang="ko-KR" altLang="en-US" sz="2000">
-                <a:solidFill>
-                  <a:srgbClr val="ff843a"/>
-                </a:solidFill>
-              </a:rPr>
-              <a:t> </a:t>
-            </a:r>
-            <a:r>
-              <a:rPr lang="en-US" altLang="ko-KR" sz="2000">
-                <a:solidFill>
-                  <a:srgbClr val="ff843a"/>
-                </a:solidFill>
-              </a:rPr>
-              <a:t>-</a:t>
-            </a:r>
-            <a:r>
-              <a:rPr lang="ko-KR" altLang="en-US" sz="2000">
-                <a:solidFill>
-                  <a:srgbClr val="ff843a"/>
-                </a:solidFill>
-              </a:rPr>
-              <a:t> 회원가입을 하게 되면 회원의 차종</a:t>
-            </a:r>
-            <a:r>
-              <a:rPr lang="en-US" altLang="ko-KR" sz="2000">
-                <a:solidFill>
-                  <a:srgbClr val="ff843a"/>
-                </a:solidFill>
-              </a:rPr>
-              <a:t>,</a:t>
-            </a:r>
-            <a:r>
-              <a:rPr lang="ko-KR" altLang="en-US" sz="2000">
-                <a:solidFill>
-                  <a:srgbClr val="ff843a"/>
-                </a:solidFill>
-              </a:rPr>
-              <a:t> 각각의 차량에 대한 정보</a:t>
-            </a:r>
-            <a:r>
-              <a:rPr lang="en-US" altLang="ko-KR" sz="2000">
-                <a:solidFill>
-                  <a:srgbClr val="ff843a"/>
-                </a:solidFill>
-              </a:rPr>
-              <a:t>(</a:t>
-            </a:r>
-            <a:r>
-              <a:rPr lang="ko-KR" altLang="en-US" sz="2000">
-                <a:solidFill>
-                  <a:srgbClr val="ff843a"/>
-                </a:solidFill>
-              </a:rPr>
-              <a:t>주행거리</a:t>
-            </a:r>
-            <a:r>
-              <a:rPr lang="en-US" altLang="ko-KR" sz="2000">
-                <a:solidFill>
-                  <a:srgbClr val="ff843a"/>
-                </a:solidFill>
-              </a:rPr>
-              <a:t>,</a:t>
-            </a:r>
-            <a:r>
-              <a:rPr lang="ko-KR" altLang="en-US" sz="2000">
-                <a:solidFill>
-                  <a:srgbClr val="ff843a"/>
-                </a:solidFill>
-              </a:rPr>
-              <a:t> 연식 등</a:t>
-            </a:r>
-            <a:r>
-              <a:rPr lang="en-US" altLang="ko-KR" sz="2000">
-                <a:solidFill>
-                  <a:srgbClr val="ff843a"/>
-                </a:solidFill>
-              </a:rPr>
-              <a:t>)</a:t>
-            </a:r>
-            <a:r>
-              <a:rPr lang="ko-KR" altLang="en-US" sz="2000">
-                <a:solidFill>
-                  <a:srgbClr val="ff843a"/>
-                </a:solidFill>
-              </a:rPr>
-              <a:t>가 저장되어야 함</a:t>
-            </a:r>
-            <a:endParaRPr lang="ko-KR" altLang="en-US" sz="2000">
-              <a:solidFill>
-                <a:srgbClr val="ff843a"/>
-              </a:solidFill>
-            </a:endParaRPr>
-          </a:p>
-          <a:p>
-            <a:pPr marL="0" lvl="0" indent="0">
-              <a:buNone/>
-              <a:defRPr/>
-            </a:pPr>
-            <a:r>
-              <a:rPr lang="ko-KR" altLang="en-US" sz="2000">
-                <a:solidFill>
-                  <a:srgbClr val="ff843a"/>
-                </a:solidFill>
-              </a:rPr>
-              <a:t> </a:t>
-            </a:r>
-            <a:r>
-              <a:rPr lang="en-US" altLang="ko-KR" sz="2000">
-                <a:solidFill>
-                  <a:srgbClr val="ff843a"/>
-                </a:solidFill>
-              </a:rPr>
-              <a:t>-</a:t>
-            </a:r>
-            <a:r>
-              <a:rPr lang="ko-KR" altLang="en-US" sz="2000">
-                <a:solidFill>
-                  <a:srgbClr val="ff843a"/>
-                </a:solidFill>
-              </a:rPr>
-              <a:t> 회원 가입시 필요한 정보 </a:t>
-            </a:r>
-            <a:r>
-              <a:rPr lang="en-US" altLang="ko-KR" sz="2000">
-                <a:solidFill>
-                  <a:srgbClr val="ff843a"/>
-                </a:solidFill>
-              </a:rPr>
-              <a:t>(</a:t>
-            </a:r>
-            <a:r>
-              <a:rPr lang="ko-KR" altLang="en-US" sz="2000">
-                <a:solidFill>
-                  <a:srgbClr val="ff843a"/>
-                </a:solidFill>
-              </a:rPr>
-              <a:t>아이디</a:t>
-            </a:r>
-            <a:r>
-              <a:rPr lang="en-US" altLang="ko-KR" sz="2000">
-                <a:solidFill>
-                  <a:srgbClr val="ff843a"/>
-                </a:solidFill>
-              </a:rPr>
-              <a:t>,</a:t>
-            </a:r>
-            <a:r>
-              <a:rPr lang="ko-KR" altLang="en-US" sz="2000">
-                <a:solidFill>
-                  <a:srgbClr val="ff843a"/>
-                </a:solidFill>
-              </a:rPr>
-              <a:t> 비밀번호</a:t>
-            </a:r>
-            <a:r>
-              <a:rPr lang="en-US" altLang="ko-KR" sz="2000">
-                <a:solidFill>
-                  <a:srgbClr val="ff843a"/>
-                </a:solidFill>
-              </a:rPr>
-              <a:t>,</a:t>
-            </a:r>
-            <a:r>
-              <a:rPr lang="ko-KR" altLang="en-US" sz="2000">
-                <a:solidFill>
-                  <a:srgbClr val="ff843a"/>
-                </a:solidFill>
-              </a:rPr>
-              <a:t> 이름</a:t>
-            </a:r>
-            <a:r>
-              <a:rPr lang="en-US" altLang="ko-KR" sz="2000">
-                <a:solidFill>
-                  <a:srgbClr val="ff843a"/>
-                </a:solidFill>
-              </a:rPr>
-              <a:t>,</a:t>
-            </a:r>
-            <a:r>
-              <a:rPr lang="ko-KR" altLang="en-US" sz="2000">
-                <a:solidFill>
-                  <a:srgbClr val="ff843a"/>
-                </a:solidFill>
-              </a:rPr>
-              <a:t> 생년월일</a:t>
-            </a:r>
-            <a:r>
-              <a:rPr lang="en-US" altLang="ko-KR" sz="2000">
-                <a:solidFill>
-                  <a:srgbClr val="ff843a"/>
-                </a:solidFill>
-              </a:rPr>
-              <a:t>,</a:t>
-            </a:r>
-            <a:r>
-              <a:rPr lang="ko-KR" altLang="en-US" sz="2000">
-                <a:solidFill>
-                  <a:srgbClr val="ff843a"/>
-                </a:solidFill>
-              </a:rPr>
-              <a:t> 전화번호</a:t>
-            </a:r>
-            <a:r>
-              <a:rPr lang="en-US" altLang="ko-KR" sz="2000">
-                <a:solidFill>
-                  <a:srgbClr val="ff843a"/>
-                </a:solidFill>
-              </a:rPr>
-              <a:t>,</a:t>
-            </a:r>
-            <a:r>
-              <a:rPr lang="ko-KR" altLang="en-US" sz="2000">
-                <a:solidFill>
-                  <a:srgbClr val="ff843a"/>
-                </a:solidFill>
-              </a:rPr>
-              <a:t> 차량에 대한 정보</a:t>
-            </a:r>
-            <a:r>
-              <a:rPr lang="en-US" altLang="ko-KR" sz="2000">
-                <a:solidFill>
-                  <a:srgbClr val="ff843a"/>
-                </a:solidFill>
-              </a:rPr>
-              <a:t>)</a:t>
-            </a:r>
-            <a:r>
-              <a:rPr lang="ko-KR" altLang="en-US" sz="2000">
-                <a:solidFill>
-                  <a:srgbClr val="ff843a"/>
-                </a:solidFill>
-              </a:rPr>
-              <a:t>를 포함해야 함</a:t>
-            </a:r>
-            <a:endParaRPr lang="ko-KR" altLang="en-US" sz="2000">
-              <a:solidFill>
-                <a:srgbClr val="ff843a"/>
-              </a:solidFill>
-            </a:endParaRPr>
-          </a:p>
-          <a:p>
-            <a:pPr lvl="0">
-              <a:defRPr/>
-            </a:pPr>
-            <a:r>
-              <a:rPr lang="ko-KR" altLang="en-US" sz="2000"/>
-              <a:t>차종 별 다른 데이터 제공</a:t>
-            </a:r>
-            <a:endParaRPr lang="ko-KR" altLang="en-US" sz="2000"/>
-          </a:p>
-          <a:p>
-            <a:pPr marL="0" lvl="0" indent="0">
-              <a:buNone/>
-              <a:defRPr/>
-            </a:pPr>
-            <a:r>
-              <a:rPr lang="ko-KR" altLang="en-US" sz="2000">
-                <a:solidFill>
-                  <a:srgbClr val="ff843a"/>
-                </a:solidFill>
-              </a:rPr>
-              <a:t> </a:t>
-            </a:r>
-            <a:r>
-              <a:rPr lang="en-US" altLang="ko-KR" sz="2000">
-                <a:solidFill>
-                  <a:srgbClr val="ff843a"/>
-                </a:solidFill>
-              </a:rPr>
-              <a:t>-</a:t>
-            </a:r>
-            <a:r>
-              <a:rPr lang="ko-KR" altLang="en-US" sz="2000">
-                <a:solidFill>
-                  <a:srgbClr val="ff843a"/>
-                </a:solidFill>
-              </a:rPr>
-              <a:t> </a:t>
-            </a:r>
-            <a:r>
-              <a:rPr lang="en-US" altLang="ko-KR" sz="2000">
-                <a:solidFill>
-                  <a:srgbClr val="ff843a"/>
-                </a:solidFill>
-              </a:rPr>
-              <a:t>SUV, </a:t>
-            </a:r>
-            <a:r>
-              <a:rPr lang="ko-KR" altLang="en-US" sz="2000">
-                <a:solidFill>
-                  <a:srgbClr val="ff843a"/>
-                </a:solidFill>
-              </a:rPr>
-              <a:t>승용차 등등 각 차종의 부품의 가격</a:t>
-            </a:r>
-            <a:r>
-              <a:rPr lang="en-US" altLang="ko-KR" sz="2000">
-                <a:solidFill>
-                  <a:srgbClr val="ff843a"/>
-                </a:solidFill>
-              </a:rPr>
-              <a:t>,</a:t>
-            </a:r>
-            <a:r>
-              <a:rPr lang="ko-KR" altLang="en-US" sz="2000">
-                <a:solidFill>
-                  <a:srgbClr val="ff843a"/>
-                </a:solidFill>
-              </a:rPr>
-              <a:t> 종류 다름</a:t>
-            </a:r>
-            <a:endParaRPr lang="ko-KR" altLang="en-US" sz="2000">
-              <a:solidFill>
-                <a:srgbClr val="ff843a"/>
-              </a:solidFill>
-            </a:endParaRPr>
-          </a:p>
-          <a:p>
-            <a:pPr marL="0" lvl="0" indent="0">
-              <a:buNone/>
-              <a:defRPr/>
-            </a:pPr>
-            <a:r>
-              <a:rPr lang="ko-KR" altLang="en-US" sz="2000">
-                <a:solidFill>
-                  <a:srgbClr val="ff843a"/>
-                </a:solidFill>
-              </a:rPr>
-              <a:t> </a:t>
-            </a:r>
-            <a:r>
-              <a:rPr lang="en-US" altLang="ko-KR" sz="2000">
-                <a:solidFill>
-                  <a:srgbClr val="ff843a"/>
-                </a:solidFill>
-              </a:rPr>
-              <a:t>-</a:t>
-            </a:r>
-            <a:r>
-              <a:rPr lang="ko-KR" altLang="en-US" sz="2000">
-                <a:solidFill>
-                  <a:srgbClr val="ff843a"/>
-                </a:solidFill>
-              </a:rPr>
-              <a:t> </a:t>
-            </a:r>
-            <a:endParaRPr lang="ko-KR" altLang="en-US" sz="2000">
-              <a:solidFill>
-                <a:srgbClr val="ff843a"/>
-              </a:solidFill>
-            </a:endParaRPr>
-          </a:p>
-          <a:p>
-            <a:pPr lvl="0">
-              <a:defRPr/>
-            </a:pPr>
-            <a:endParaRPr lang="ko-KR" altLang="en-US" sz="2000"/>
-          </a:p>
-          <a:p>
-            <a:pPr lvl="0">
-              <a:defRPr/>
-            </a:pPr>
-            <a:r>
-              <a:rPr lang="ko-KR" altLang="en-US" sz="2000"/>
-              <a:t>가까운 정비소 지도 자료 제공</a:t>
-            </a:r>
-            <a:endParaRPr lang="ko-KR" altLang="en-US" sz="2000"/>
-          </a:p>
-          <a:p>
-            <a:pPr marL="0" lvl="0" indent="0">
-              <a:buNone/>
-              <a:defRPr/>
-            </a:pPr>
-            <a:r>
-              <a:rPr lang="ko-KR" altLang="en-US" sz="2000">
-                <a:solidFill>
-                  <a:srgbClr val="ff843a"/>
-                </a:solidFill>
-              </a:rPr>
-              <a:t> </a:t>
-            </a:r>
-            <a:r>
-              <a:rPr lang="en-US" altLang="ko-KR" sz="2000">
-                <a:solidFill>
-                  <a:srgbClr val="ff843a"/>
-                </a:solidFill>
-              </a:rPr>
-              <a:t>-</a:t>
-            </a:r>
-            <a:r>
-              <a:rPr lang="ko-KR" altLang="en-US" sz="2000">
-                <a:solidFill>
-                  <a:srgbClr val="ff843a"/>
-                </a:solidFill>
-              </a:rPr>
-              <a:t> 정비소 위치에 대한 데이터 아직 못 찾음</a:t>
-            </a:r>
-            <a:endParaRPr lang="ko-KR" altLang="en-US" sz="2000">
-              <a:solidFill>
-                <a:srgbClr val="ff843a"/>
-              </a:solidFill>
-            </a:endParaRPr>
-          </a:p>
-          <a:p>
-            <a:pPr marL="0" lvl="0" indent="0">
-              <a:buNone/>
-              <a:defRPr/>
-            </a:pPr>
-            <a:r>
-              <a:rPr lang="ko-KR" altLang="en-US" sz="2000">
-                <a:solidFill>
-                  <a:srgbClr val="ff843a"/>
-                </a:solidFill>
-              </a:rPr>
-              <a:t>  └ </a:t>
-            </a:r>
-            <a:r>
-              <a:rPr lang="en-US" altLang="ko-KR" sz="2000">
-                <a:solidFill>
-                  <a:srgbClr val="ff843a"/>
-                </a:solidFill>
-              </a:rPr>
-              <a:t>Google map</a:t>
-            </a:r>
-            <a:r>
-              <a:rPr lang="ko-KR" altLang="en-US" sz="2000">
-                <a:solidFill>
-                  <a:srgbClr val="ff843a"/>
-                </a:solidFill>
-              </a:rPr>
-              <a:t>을 이용해서 연동 가능한지</a:t>
-            </a:r>
-            <a:r>
-              <a:rPr lang="en-US" altLang="ko-KR" sz="2000">
-                <a:solidFill>
-                  <a:srgbClr val="ff843a"/>
-                </a:solidFill>
-              </a:rPr>
-              <a:t>?</a:t>
-            </a:r>
-            <a:endParaRPr lang="en-US" altLang="ko-KR" sz="2000">
-              <a:solidFill>
-                <a:srgbClr val="ff843a"/>
-              </a:solidFill>
-            </a:endParaRPr>
-          </a:p>
-          <a:p>
-            <a:pPr marL="0" lvl="0" indent="0">
-              <a:buNone/>
-              <a:defRPr/>
-            </a:pPr>
-            <a:endParaRPr lang="en-US" altLang="ko-KR" sz="2000"/>
+          <a:bodyPr vert="horz" lIns="91440" tIns="45720" rIns="91440" bIns="45720" rtlCol="0" anchor="ctr">
+            <a:noAutofit/>
+          </a:bodyPr>
+          <a:lstStyle>
+            <a:lvl1pPr marL="0" indent="0" algn="ctr" defTabSz="914423" rtl="0" eaLnBrk="1" latinLnBrk="1" hangingPunct="1">
+              <a:lnSpc>
+                <a:spcPct val="90000"/>
+              </a:lnSpc>
+              <a:spcBef>
+                <a:spcPts val="1001"/>
+              </a:spcBef>
+              <a:buFont typeface="Arial"/>
+              <a:buNone/>
+              <a:defRPr sz="2400" kern="1200">
+                <a:solidFill>
+                  <a:schemeClr val="tx1"/>
+                </a:solidFill>
+                <a:latin typeface="+mn-lt"/>
+                <a:ea typeface="+mn-ea"/>
+                <a:cs typeface="+mn-cs"/>
+              </a:defRPr>
+            </a:lvl1pPr>
+            <a:lvl2pPr marL="457211" indent="0" algn="ctr" defTabSz="914423" rtl="0" eaLnBrk="1" latinLnBrk="1" hangingPunct="1">
+              <a:lnSpc>
+                <a:spcPct val="90000"/>
+              </a:lnSpc>
+              <a:spcBef>
+                <a:spcPts val="500"/>
+              </a:spcBef>
+              <a:buFont typeface="Arial"/>
+              <a:buNone/>
+              <a:defRPr sz="2000" kern="1200">
+                <a:solidFill>
+                  <a:schemeClr val="tx1"/>
+                </a:solidFill>
+                <a:latin typeface="+mn-lt"/>
+                <a:ea typeface="+mn-ea"/>
+                <a:cs typeface="+mn-cs"/>
+              </a:defRPr>
+            </a:lvl2pPr>
+            <a:lvl3pPr marL="914423" indent="0" algn="ctr" defTabSz="914423" rtl="0" eaLnBrk="1" latinLnBrk="1" hangingPunct="1">
+              <a:lnSpc>
+                <a:spcPct val="90000"/>
+              </a:lnSpc>
+              <a:spcBef>
+                <a:spcPts val="500"/>
+              </a:spcBef>
+              <a:buFont typeface="Arial"/>
+              <a:buNone/>
+              <a:defRPr sz="1801" kern="1200">
+                <a:solidFill>
+                  <a:schemeClr val="tx1"/>
+                </a:solidFill>
+                <a:latin typeface="+mn-lt"/>
+                <a:ea typeface="+mn-ea"/>
+                <a:cs typeface="+mn-cs"/>
+              </a:defRPr>
+            </a:lvl3pPr>
+            <a:lvl4pPr marL="1371634" indent="0" algn="ctr" defTabSz="914423" rtl="0" eaLnBrk="1" latinLnBrk="1" hangingPunct="1">
+              <a:lnSpc>
+                <a:spcPct val="90000"/>
+              </a:lnSpc>
+              <a:spcBef>
+                <a:spcPts val="500"/>
+              </a:spcBef>
+              <a:buFont typeface="Arial"/>
+              <a:buNone/>
+              <a:defRPr sz="1600" kern="1200">
+                <a:solidFill>
+                  <a:schemeClr val="tx1"/>
+                </a:solidFill>
+                <a:latin typeface="+mn-lt"/>
+                <a:ea typeface="+mn-ea"/>
+                <a:cs typeface="+mn-cs"/>
+              </a:defRPr>
+            </a:lvl4pPr>
+            <a:lvl5pPr marL="1828846" indent="0" algn="ctr" defTabSz="914423" rtl="0" eaLnBrk="1" latinLnBrk="1" hangingPunct="1">
+              <a:lnSpc>
+                <a:spcPct val="90000"/>
+              </a:lnSpc>
+              <a:spcBef>
+                <a:spcPts val="500"/>
+              </a:spcBef>
+              <a:buFont typeface="Arial"/>
+              <a:buNone/>
+              <a:defRPr sz="1600" kern="1200">
+                <a:solidFill>
+                  <a:schemeClr val="tx1"/>
+                </a:solidFill>
+                <a:latin typeface="+mn-lt"/>
+                <a:ea typeface="+mn-ea"/>
+                <a:cs typeface="+mn-cs"/>
+              </a:defRPr>
+            </a:lvl5pPr>
+            <a:lvl6pPr marL="2286057" indent="0" algn="ctr" defTabSz="914423" rtl="0" eaLnBrk="1" latinLnBrk="1" hangingPunct="1">
+              <a:lnSpc>
+                <a:spcPct val="90000"/>
+              </a:lnSpc>
+              <a:spcBef>
+                <a:spcPts val="500"/>
+              </a:spcBef>
+              <a:buFont typeface="Arial"/>
+              <a:buNone/>
+              <a:defRPr sz="1600" kern="1200">
+                <a:solidFill>
+                  <a:schemeClr val="tx1"/>
+                </a:solidFill>
+                <a:latin typeface="+mn-lt"/>
+                <a:ea typeface="+mn-ea"/>
+                <a:cs typeface="+mn-cs"/>
+              </a:defRPr>
+            </a:lvl6pPr>
+            <a:lvl7pPr marL="2743269" indent="0" algn="ctr" defTabSz="914423" rtl="0" eaLnBrk="1" latinLnBrk="1" hangingPunct="1">
+              <a:lnSpc>
+                <a:spcPct val="90000"/>
+              </a:lnSpc>
+              <a:spcBef>
+                <a:spcPts val="500"/>
+              </a:spcBef>
+              <a:buFont typeface="Arial"/>
+              <a:buNone/>
+              <a:defRPr sz="1600" kern="1200">
+                <a:solidFill>
+                  <a:schemeClr val="tx1"/>
+                </a:solidFill>
+                <a:latin typeface="+mn-lt"/>
+                <a:ea typeface="+mn-ea"/>
+                <a:cs typeface="+mn-cs"/>
+              </a:defRPr>
+            </a:lvl7pPr>
+            <a:lvl8pPr marL="3200480" indent="0" algn="ctr" defTabSz="914423" rtl="0" eaLnBrk="1" latinLnBrk="1" hangingPunct="1">
+              <a:lnSpc>
+                <a:spcPct val="90000"/>
+              </a:lnSpc>
+              <a:spcBef>
+                <a:spcPts val="500"/>
+              </a:spcBef>
+              <a:buFont typeface="Arial"/>
+              <a:buNone/>
+              <a:defRPr sz="1600" kern="1200">
+                <a:solidFill>
+                  <a:schemeClr val="tx1"/>
+                </a:solidFill>
+                <a:latin typeface="+mn-lt"/>
+                <a:ea typeface="+mn-ea"/>
+                <a:cs typeface="+mn-cs"/>
+              </a:defRPr>
+            </a:lvl8pPr>
+            <a:lvl9pPr marL="3657691" indent="0" algn="ctr" defTabSz="914423" rtl="0" eaLnBrk="1" latinLnBrk="1" hangingPunct="1">
+              <a:lnSpc>
+                <a:spcPct val="90000"/>
+              </a:lnSpc>
+              <a:spcBef>
+                <a:spcPts val="500"/>
+              </a:spcBef>
+              <a:buFont typeface="Arial"/>
+              <a:buNone/>
+              <a:defRPr sz="1600" kern="1200">
+                <a:solidFill>
+                  <a:schemeClr val="tx1"/>
+                </a:solidFill>
+                <a:latin typeface="+mn-lt"/>
+                <a:ea typeface="+mn-ea"/>
+                <a:cs typeface="+mn-cs"/>
+              </a:defRPr>
+            </a:lvl9pPr>
+          </a:lstStyle>
+          <a:p>
+            <a:r>
+              <a:rPr lang="ko-KR" altLang="en-US" sz="4800" dirty="0">
+                <a:solidFill>
+                  <a:schemeClr val="bg1"/>
+                </a:solidFill>
+                <a:latin typeface="+mj-lt"/>
+                <a:ea typeface="맑은 고딕" charset="-127"/>
+                <a:cs typeface="맑은 고딕" charset="-127"/>
+              </a:rPr>
+              <a:t>계획 및 일정 수립</a:t>
+            </a:r>
           </a:p>
         </p:txBody>
       </p:sp>
     </p:spTree>
+    <p:extLst>
+      <p:ext uri="{BB962C8B-B14F-4D97-AF65-F5344CB8AC3E}">
+        <p14:creationId xmlns:p14="http://schemas.microsoft.com/office/powerpoint/2010/main" val="641642769"/>
+      </p:ext>
+    </p:extLst>
   </p:cSld>
   <p:clrMapOvr>
     <a:masterClrMapping/>
   </p:clrMapOvr>
-  <mc:AlternateContent xmlns:mc="http://schemas.openxmlformats.org/markup-compatibility/2006">
-    <mc:Choice xmlns:p14="http://schemas.microsoft.com/office/powerpoint/2010/main" Requires="p14">
-      <p:transition xmlns:mc="http://schemas.openxmlformats.org/markup-compatibility/2006" xmlns:p14="http://schemas.microsoft.com/office/powerpoint/2010/main" mc:Ignorable="p14" p14:dur="500"/>
-    </mc:Choice>
-    <mc:Fallback>
-      <p:transition/>
-    </mc:Fallback>
-  </mc:AlternateContent>
 </p:sld>
 </file>
 
@@ -8487,158 +8291,6 @@
           <a:chExt cx="0" cy="0"/>
         </a:xfrm>
       </p:grpSpPr>
-      <p:sp>
-        <p:nvSpPr>
-          <p:cNvPr id="2" name="제목 1"/>
-          <p:cNvSpPr>
-            <a:spLocks noGrp="1"/>
-          </p:cNvSpPr>
-          <p:nvPr>
-            <p:ph type="title" idx="0"/>
-          </p:nvPr>
-        </p:nvSpPr>
-        <p:spPr>
-          <a:xfrm>
-            <a:off x="0" y="0"/>
-            <a:ext cx="11061700" cy="1325563"/>
-          </a:xfrm>
-          <a:solidFill>
-            <a:schemeClr val="lt1"/>
-          </a:solidFill>
-          <a:ln>
-            <a:solidFill>
-              <a:schemeClr val="lt1"/>
-            </a:solidFill>
-          </a:ln>
-        </p:spPr>
-        <p:txBody>
-          <a:bodyPr/>
-          <a:lstStyle/>
-          <a:p>
-            <a:pPr lvl="0">
-              <a:defRPr/>
-            </a:pPr>
-            <a:r>
-              <a:rPr lang="ko-KR" altLang="en-US" sz="4000"/>
-              <a:t>요구사항 수집 및 분석</a:t>
-            </a:r>
-            <a:endParaRPr lang="ko-KR" altLang="en-US" sz="4000"/>
-          </a:p>
-        </p:txBody>
-      </p:sp>
-      <p:sp>
-        <p:nvSpPr>
-          <p:cNvPr id="3" name="내용 개체 틀 2"/>
-          <p:cNvSpPr>
-            <a:spLocks noGrp="1"/>
-          </p:cNvSpPr>
-          <p:nvPr>
-            <p:ph idx="1"/>
-          </p:nvPr>
-        </p:nvSpPr>
-        <p:spPr>
-          <a:xfrm>
-            <a:off x="0" y="1622425"/>
-            <a:ext cx="12192000" cy="5235575"/>
-          </a:xfrm>
-        </p:spPr>
-        <p:txBody>
-          <a:bodyPr/>
-          <a:lstStyle/>
-          <a:p>
-            <a:pPr lvl="0">
-              <a:defRPr/>
-            </a:pPr>
-            <a:r>
-              <a:rPr lang="ko-KR" altLang="en-US" sz="2000"/>
-              <a:t>지속적 피드백</a:t>
-            </a:r>
-            <a:endParaRPr lang="ko-KR" altLang="en-US" sz="2000"/>
-          </a:p>
-          <a:p>
-            <a:pPr marL="0" lvl="0" indent="0">
-              <a:buNone/>
-              <a:defRPr/>
-            </a:pPr>
-            <a:r>
-              <a:rPr lang="ko-KR" altLang="en-US" sz="2000">
-                <a:solidFill>
-                  <a:srgbClr val="ff843a"/>
-                </a:solidFill>
-              </a:rPr>
-              <a:t> </a:t>
-            </a:r>
-            <a:r>
-              <a:rPr lang="en-US" altLang="ko-KR" sz="2000">
-                <a:solidFill>
-                  <a:srgbClr val="ff843a"/>
-                </a:solidFill>
-              </a:rPr>
-              <a:t>-</a:t>
-            </a:r>
-            <a:r>
-              <a:rPr lang="ko-KR" altLang="en-US" sz="2000">
-                <a:solidFill>
-                  <a:srgbClr val="ff843a"/>
-                </a:solidFill>
-              </a:rPr>
-              <a:t> </a:t>
-            </a:r>
-            <a:r>
-              <a:rPr lang="en-US" altLang="ko-KR" sz="2000">
-                <a:solidFill>
-                  <a:srgbClr val="ff843a"/>
-                </a:solidFill>
-              </a:rPr>
-              <a:t>Google Playstore</a:t>
-            </a:r>
-            <a:r>
-              <a:rPr lang="ko-KR" altLang="en-US" sz="2000">
-                <a:solidFill>
-                  <a:srgbClr val="ff843a"/>
-                </a:solidFill>
-              </a:rPr>
-              <a:t>의 댓글 이용</a:t>
-            </a:r>
-            <a:endParaRPr lang="ko-KR" altLang="en-US" sz="2000">
-              <a:solidFill>
-                <a:srgbClr val="ff843a"/>
-              </a:solidFill>
-            </a:endParaRPr>
-          </a:p>
-          <a:p>
-            <a:pPr marL="0" lvl="0" indent="0">
-              <a:buNone/>
-              <a:defRPr/>
-            </a:pPr>
-            <a:r>
-              <a:rPr lang="ko-KR" altLang="en-US" sz="2000">
-                <a:solidFill>
-                  <a:srgbClr val="ff843a"/>
-                </a:solidFill>
-              </a:rPr>
-              <a:t> </a:t>
-            </a:r>
-            <a:r>
-              <a:rPr lang="en-US" altLang="ko-KR" sz="2000">
-                <a:solidFill>
-                  <a:srgbClr val="ff843a"/>
-                </a:solidFill>
-              </a:rPr>
-              <a:t>-</a:t>
-            </a:r>
-            <a:r>
-              <a:rPr lang="ko-KR" altLang="en-US" sz="2000">
-                <a:solidFill>
-                  <a:srgbClr val="ff843a"/>
-                </a:solidFill>
-              </a:rPr>
-              <a:t> </a:t>
-            </a:r>
-            <a:endParaRPr lang="en-US" altLang="ko-KR" sz="2000"/>
-          </a:p>
-        </p:txBody>
-      </p:sp>
     </p:spTree>
   </p:cSld>
   <p:clrMapOvr>
@@ -11275,7 +10927,7 @@
                 <a:ea typeface="맑은 고딕" charset="-127"/>
                 <a:cs typeface="맑은 고딕" charset="-127"/>
               </a:rPr>
-              <a:t>계획 및 일정 수립</a:t>
+              <a:t>기능 모듈 설계</a:t>
             </a:r>
           </a:p>
         </p:txBody>
@@ -11283,7 +10935,7 @@
     </p:spTree>
     <p:extLst>
       <p:ext uri="{BB962C8B-B14F-4D97-AF65-F5344CB8AC3E}">
-        <p14:creationId xmlns:p14="http://schemas.microsoft.com/office/powerpoint/2010/main" val="641642769"/>
+        <p14:creationId xmlns:p14="http://schemas.microsoft.com/office/powerpoint/2010/main" val="3636615241"/>
       </p:ext>
     </p:extLst>
   </p:cSld>
@@ -11294,7 +10946,7 @@
 </file>
 
 <file path=ppt/slides/slide21.xml><?xml version="1.0" encoding="utf-8"?>
-<p:sld xmlns:r="http://schemas.openxmlformats.org/officeDocument/2006/relationships" xmlns:c="http://schemas.openxmlformats.org/drawingml/2006/chart" xmlns:a="http://schemas.openxmlformats.org/drawingml/2006/main" xmlns:dgm="http://schemas.openxmlformats.org/drawingml/2006/diagram" xmlns:dsp="http://schemas.microsoft.com/office/drawing/2008/diagram" xmlns:p="http://schemas.openxmlformats.org/presentationml/2006/main">
+<p:sld xmlns:a="http://schemas.openxmlformats.org/drawingml/2006/main" xmlns:r="http://schemas.openxmlformats.org/officeDocument/2006/relationships" xmlns:p="http://schemas.openxmlformats.org/presentationml/2006/main">
   <p:cSld>
     <p:spTree>
       <p:nvGrpSpPr>
@@ -11310,19 +10962,89 @@
           <a:chExt cx="0" cy="0"/>
         </a:xfrm>
       </p:grpSpPr>
+      <p:sp>
+        <p:nvSpPr>
+          <p:cNvPr id="2" name="제목 1">
+            <a:extLst>
+              <a:ext uri="{FF2B5EF4-FFF2-40B4-BE49-F238E27FC236}">
+                <a16:creationId xmlns:a16="http://schemas.microsoft.com/office/drawing/2014/main" id="{9A1A2E3C-2FD9-439C-87BD-8AE3B27F8C97}"/>
+              </a:ext>
+            </a:extLst>
+          </p:cNvPr>
+          <p:cNvSpPr>
+            <a:spLocks noGrp="1"/>
+          </p:cNvSpPr>
+          <p:nvPr>
+            <p:ph type="title"/>
+          </p:nvPr>
+        </p:nvSpPr>
+        <p:spPr/>
+        <p:txBody>
+          <a:bodyPr/>
+          <a:lstStyle/>
+          <a:p>
+            <a:endParaRPr lang="ko-KR" altLang="en-US"/>
+          </a:p>
+        </p:txBody>
+      </p:sp>
+      <p:sp>
+        <p:nvSpPr>
+          <p:cNvPr id="3" name="내용 개체 틀 2">
+            <a:extLst>
+              <a:ext uri="{FF2B5EF4-FFF2-40B4-BE49-F238E27FC236}">
+                <a16:creationId xmlns:a16="http://schemas.microsoft.com/office/drawing/2014/main" id="{58DC695E-BF5C-4F1A-860C-8BD272E977AA}"/>
+              </a:ext>
+            </a:extLst>
+          </p:cNvPr>
+          <p:cNvSpPr>
+            <a:spLocks noGrp="1"/>
+          </p:cNvSpPr>
+          <p:nvPr>
+            <p:ph idx="1"/>
+          </p:nvPr>
+        </p:nvSpPr>
+        <p:spPr/>
+        <p:txBody>
+          <a:bodyPr/>
+          <a:lstStyle/>
+          <a:p>
+            <a:r>
+              <a:rPr lang="ko-KR" altLang="en-US" dirty="0"/>
+              <a:t>기능정의를 한다</a:t>
+            </a:r>
+            <a:endParaRPr lang="en-US" altLang="ko-KR" dirty="0"/>
+          </a:p>
+          <a:p>
+            <a:r>
+              <a:rPr lang="ko-KR" altLang="en-US" dirty="0"/>
+              <a:t>정의 한 기능에 대해 </a:t>
+            </a:r>
+            <a:r>
+              <a:rPr lang="en-US" altLang="ko-KR" dirty="0"/>
+              <a:t>Flow</a:t>
+            </a:r>
+            <a:r>
+              <a:rPr lang="ko-KR" altLang="en-US" dirty="0"/>
+              <a:t>를 작성한다</a:t>
+            </a:r>
+            <a:r>
+              <a:rPr lang="en-US" altLang="ko-KR" dirty="0"/>
+              <a:t>.</a:t>
+            </a:r>
+            <a:endParaRPr lang="ko-KR" altLang="en-US" dirty="0"/>
+          </a:p>
+        </p:txBody>
+      </p:sp>
     </p:spTree>
+    <p:extLst>
+      <p:ext uri="{BB962C8B-B14F-4D97-AF65-F5344CB8AC3E}">
+        <p14:creationId xmlns:p14="http://schemas.microsoft.com/office/powerpoint/2010/main" val="3772914977"/>
+      </p:ext>
+    </p:extLst>
   </p:cSld>
   <p:clrMapOvr>
     <a:masterClrMapping/>
   </p:clrMapOvr>
-  <mc:AlternateContent xmlns:mc="http://schemas.openxmlformats.org/markup-compatibility/2006">
-    <mc:Choice xmlns:p14="http://schemas.microsoft.com/office/powerpoint/2010/main" Requires="p14">
-      <p:transition xmlns:mc="http://schemas.openxmlformats.org/markup-compatibility/2006" xmlns:p14="http://schemas.microsoft.com/office/powerpoint/2010/main" mc:Ignorable="p14" p14:dur="500"/>
-    </mc:Choice>
-    <mc:Fallback>
-      <p:transition/>
-    </mc:Fallback>
-  </mc:AlternateContent>
 </p:sld>
 </file>
 
@@ -11586,15 +11308,56 @@
                 <a:ea typeface="맑은 고딕" charset="-127"/>
                 <a:cs typeface="맑은 고딕" charset="-127"/>
               </a:rPr>
-              <a:t>기능 모듈 설계</a:t>
-            </a:r>
+              <a:t>기능 검토 </a:t>
+            </a:r>
+            <a:r>
+              <a:rPr lang="en-US" altLang="ko-KR" sz="4800" dirty="0">
+                <a:solidFill>
+                  <a:schemeClr val="bg1"/>
+                </a:solidFill>
+                <a:latin typeface="+mj-lt"/>
+                <a:ea typeface="맑은 고딕" charset="-127"/>
+                <a:cs typeface="맑은 고딕" charset="-127"/>
+              </a:rPr>
+              <a:t>(</a:t>
+            </a:r>
+            <a:r>
+              <a:rPr lang="ko-KR" altLang="en-US" sz="4800" dirty="0">
+                <a:solidFill>
+                  <a:schemeClr val="bg1"/>
+                </a:solidFill>
+                <a:latin typeface="+mj-lt"/>
+                <a:ea typeface="맑은 고딕" charset="-127"/>
+                <a:cs typeface="맑은 고딕" charset="-127"/>
+              </a:rPr>
+              <a:t>근거자료 및 샘플코드</a:t>
+            </a:r>
+            <a:r>
+              <a:rPr lang="en-US" altLang="ko-KR" sz="4800" dirty="0">
+                <a:solidFill>
+                  <a:schemeClr val="bg1"/>
+                </a:solidFill>
+                <a:latin typeface="+mj-lt"/>
+                <a:ea typeface="맑은 고딕" charset="-127"/>
+                <a:cs typeface="맑은 고딕" charset="-127"/>
+              </a:rPr>
+              <a:t>)</a:t>
+            </a:r>
+            <a:endParaRPr lang="ko-KR" altLang="en-US" sz="4800" dirty="0">
+              <a:solidFill>
+                <a:schemeClr val="bg1"/>
+              </a:solidFill>
+              <a:latin typeface="+mj-lt"/>
+              <a:ea typeface="맑은 고딕" charset="-127"/>
+              <a:cs typeface="맑은 고딕" charset="-127"/>
+            </a:endParaRPr>
           </a:p>
         </p:txBody>
       </p:sp>
     </p:spTree>
     <p:extLst>
       <p:ext uri="{BB962C8B-B14F-4D97-AF65-F5344CB8AC3E}">
-        <p14:creationId xmlns:p14="http://schemas.microsoft.com/office/powerpoint/2010/main" val="3636615241"/>
+        <p14:creationId xmlns:p14="http://schemas.microsoft.com/office/powerpoint/2010/main" val="2800779971"/>
       </p:ext>
     </p:extLst>
   </p:cSld>
@@ -11626,7 +11389,7 @@
           <p:cNvPr id="2" name="제목 1">
             <a:extLst>
               <a:ext uri="{FF2B5EF4-FFF2-40B4-BE49-F238E27FC236}">
-                <a16:creationId xmlns:a16="http://schemas.microsoft.com/office/drawing/2014/main" id="{9A1A2E3C-2FD9-439C-87BD-8AE3B27F8C97}"/>
+                <a16:creationId xmlns:a16="http://schemas.microsoft.com/office/drawing/2014/main" id="{CD32A4A8-C5FD-473F-A41F-A660400BC448}"/>
               </a:ext>
             </a:extLst>
           </p:cNvPr>
@@ -11651,7 +11414,7 @@
           <p:cNvPr id="3" name="내용 개체 틀 2">
             <a:extLst>
               <a:ext uri="{FF2B5EF4-FFF2-40B4-BE49-F238E27FC236}">
-                <a16:creationId xmlns:a16="http://schemas.microsoft.com/office/drawing/2014/main" id="{58DC695E-BF5C-4F1A-860C-8BD272E977AA}"/>
+                <a16:creationId xmlns:a16="http://schemas.microsoft.com/office/drawing/2014/main" id="{FC688E77-0112-474B-BD84-18F7FC4240C7}"/>
               </a:ext>
             </a:extLst>
           </p:cNvPr>
@@ -11669,22 +11432,17 @@
           <a:p>
             <a:r>
               <a:rPr lang="ko-KR" altLang="en-US" dirty="0"/>
-              <a:t>기능정의를 한다</a:t>
+              <a:t>기능 구현에 필요한 기술을 알아본다</a:t>
             </a:r>
             <a:endParaRPr lang="en-US" altLang="ko-KR" dirty="0"/>
           </a:p>
           <a:p>
+            <a:endParaRPr lang="en-US" altLang="ko-KR" dirty="0"/>
+          </a:p>
+          <a:p>
             <a:r>
               <a:rPr lang="ko-KR" altLang="en-US" dirty="0"/>
-              <a:t>정의 한 기능에 대해 </a:t>
-            </a:r>
-            <a:r>
-              <a:rPr lang="en-US" altLang="ko-KR" dirty="0"/>
-              <a:t>Flow</a:t>
-            </a:r>
-            <a:r>
-              <a:rPr lang="ko-KR" altLang="en-US" dirty="0"/>
-              <a:t>를 작성한다</a:t>
+              <a:t>샘플 코드를 수집한다</a:t>
             </a:r>
             <a:r>
               <a:rPr lang="en-US" altLang="ko-KR" dirty="0"/>
@@ -11697,7 +11455,7 @@
     </p:spTree>
     <p:extLst>
       <p:ext uri="{BB962C8B-B14F-4D97-AF65-F5344CB8AC3E}">
-        <p14:creationId xmlns:p14="http://schemas.microsoft.com/office/powerpoint/2010/main" val="3772914977"/>
+        <p14:creationId xmlns:p14="http://schemas.microsoft.com/office/powerpoint/2010/main" val="414149680"/>
       </p:ext>
     </p:extLst>
   </p:cSld>
@@ -11967,56 +11725,15 @@
                 <a:ea typeface="맑은 고딕" charset="-127"/>
                 <a:cs typeface="맑은 고딕" charset="-127"/>
               </a:rPr>
-              <a:t>기능 검토 </a:t>
-            </a:r>
-            <a:r>
-              <a:rPr lang="en-US" altLang="ko-KR" sz="4800" dirty="0">
-                <a:solidFill>
-                  <a:schemeClr val="bg1"/>
-                </a:solidFill>
-                <a:latin typeface="+mj-lt"/>
-                <a:ea typeface="맑은 고딕" charset="-127"/>
-                <a:cs typeface="맑은 고딕" charset="-127"/>
-              </a:rPr>
-              <a:t>(</a:t>
-            </a:r>
-            <a:r>
-              <a:rPr lang="ko-KR" altLang="en-US" sz="4800" dirty="0">
-                <a:solidFill>
-                  <a:schemeClr val="bg1"/>
-                </a:solidFill>
-                <a:latin typeface="+mj-lt"/>
-                <a:ea typeface="맑은 고딕" charset="-127"/>
-                <a:cs typeface="맑은 고딕" charset="-127"/>
-              </a:rPr>
-              <a:t>근거자료 및 샘플코드</a:t>
-            </a:r>
-            <a:r>
-              <a:rPr lang="en-US" altLang="ko-KR" sz="4800" dirty="0">
-                <a:solidFill>
-                  <a:schemeClr val="bg1"/>
-                </a:solidFill>
-                <a:latin typeface="+mj-lt"/>
-                <a:ea typeface="맑은 고딕" charset="-127"/>
-                <a:cs typeface="맑은 고딕" charset="-127"/>
-              </a:rPr>
-              <a:t>)</a:t>
-            </a:r>
-            <a:endParaRPr lang="ko-KR" altLang="en-US" sz="4800" dirty="0">
-              <a:solidFill>
-                <a:schemeClr val="bg1"/>
-              </a:solidFill>
-              <a:latin typeface="+mj-lt"/>
-              <a:ea typeface="맑은 고딕" charset="-127"/>
-              <a:cs typeface="맑은 고딕" charset="-127"/>
-            </a:endParaRPr>
+              <a:t>스토리보드 제작</a:t>
+            </a:r>
           </a:p>
         </p:txBody>
       </p:sp>
     </p:spTree>
     <p:extLst>
       <p:ext uri="{BB962C8B-B14F-4D97-AF65-F5344CB8AC3E}">
-        <p14:creationId xmlns:p14="http://schemas.microsoft.com/office/powerpoint/2010/main" val="2800779971"/>
+        <p14:creationId xmlns:p14="http://schemas.microsoft.com/office/powerpoint/2010/main" val="4131486605"/>
       </p:ext>
     </p:extLst>
   </p:cSld>
@@ -12048,7 +11765,7 @@
           <p:cNvPr id="2" name="제목 1">
             <a:extLst>
               <a:ext uri="{FF2B5EF4-FFF2-40B4-BE49-F238E27FC236}">
-                <a16:creationId xmlns:a16="http://schemas.microsoft.com/office/drawing/2014/main" id="{CD32A4A8-C5FD-473F-A41F-A660400BC448}"/>
+                <a16:creationId xmlns:a16="http://schemas.microsoft.com/office/drawing/2014/main" id="{FEF97B69-9031-4A28-901F-246C46549083}"/>
               </a:ext>
             </a:extLst>
           </p:cNvPr>
@@ -12073,7 +11790,7 @@
           <p:cNvPr id="3" name="내용 개체 틀 2">
             <a:extLst>
               <a:ext uri="{FF2B5EF4-FFF2-40B4-BE49-F238E27FC236}">
-                <a16:creationId xmlns:a16="http://schemas.microsoft.com/office/drawing/2014/main" id="{FC688E77-0112-474B-BD84-18F7FC4240C7}"/>
+                <a16:creationId xmlns:a16="http://schemas.microsoft.com/office/drawing/2014/main" id="{7B537D8F-5982-4653-B96A-BB8B9CAB7064}"/>
               </a:ext>
             </a:extLst>
           </p:cNvPr>
@@ -12091,7 +11808,7 @@
           <a:p>
             <a:r>
               <a:rPr lang="ko-KR" altLang="en-US" dirty="0"/>
-              <a:t>기능 구현에 필요한 기술을 알아본다</a:t>
+              <a:t>기능 구현에 대한 디자인 구상</a:t>
             </a:r>
             <a:endParaRPr lang="en-US" altLang="ko-KR" dirty="0"/>
           </a:p>
@@ -12101,7 +11818,7 @@
           <a:p>
             <a:r>
               <a:rPr lang="ko-KR" altLang="en-US" dirty="0"/>
-              <a:t>샘플 코드를 수집한다</a:t>
+              <a:t>디자인에 따른 동작을 기술하고 연계 한다</a:t>
             </a:r>
             <a:r>
               <a:rPr lang="en-US" altLang="ko-KR" dirty="0"/>
@@ -12114,7 +11831,7 @@
     </p:spTree>
     <p:extLst>
       <p:ext uri="{BB962C8B-B14F-4D97-AF65-F5344CB8AC3E}">
-        <p14:creationId xmlns:p14="http://schemas.microsoft.com/office/powerpoint/2010/main" val="414149680"/>
+        <p14:creationId xmlns:p14="http://schemas.microsoft.com/office/powerpoint/2010/main" val="1723942396"/>
       </p:ext>
     </p:extLst>
   </p:cSld>
@@ -12384,7 +12101,7 @@
                 <a:ea typeface="맑은 고딕" charset="-127"/>
                 <a:cs typeface="맑은 고딕" charset="-127"/>
               </a:rPr>
-              <a:t>스토리보드 제작</a:t>
+              <a:t>구현</a:t>
             </a:r>
           </a:p>
         </p:txBody>
@@ -12392,7 +12109,7 @@
     </p:spTree>
     <p:extLst>
       <p:ext uri="{BB962C8B-B14F-4D97-AF65-F5344CB8AC3E}">
-        <p14:creationId xmlns:p14="http://schemas.microsoft.com/office/powerpoint/2010/main" val="4131486605"/>
+        <p14:creationId xmlns:p14="http://schemas.microsoft.com/office/powerpoint/2010/main" val="1697315730"/>
       </p:ext>
     </p:extLst>
   </p:cSld>
@@ -12424,7 +12141,7 @@
           <p:cNvPr id="2" name="제목 1">
             <a:extLst>
               <a:ext uri="{FF2B5EF4-FFF2-40B4-BE49-F238E27FC236}">
-                <a16:creationId xmlns:a16="http://schemas.microsoft.com/office/drawing/2014/main" id="{FEF97B69-9031-4A28-901F-246C46549083}"/>
+                <a16:creationId xmlns:a16="http://schemas.microsoft.com/office/drawing/2014/main" id="{2135F92A-65F5-4C7A-8C04-BF5F199039F2}"/>
               </a:ext>
             </a:extLst>
           </p:cNvPr>
@@ -12449,7 +12166,7 @@
           <p:cNvPr id="3" name="내용 개체 틀 2">
             <a:extLst>
               <a:ext uri="{FF2B5EF4-FFF2-40B4-BE49-F238E27FC236}">
-                <a16:creationId xmlns:a16="http://schemas.microsoft.com/office/drawing/2014/main" id="{7B537D8F-5982-4653-B96A-BB8B9CAB7064}"/>
+                <a16:creationId xmlns:a16="http://schemas.microsoft.com/office/drawing/2014/main" id="{FB21A4AE-E1C2-4042-9B9E-43F419C42235}"/>
               </a:ext>
             </a:extLst>
           </p:cNvPr>
@@ -12467,17 +12184,7 @@
           <a:p>
             <a:r>
               <a:rPr lang="ko-KR" altLang="en-US" dirty="0"/>
-              <a:t>기능 구현에 대한 디자인 구상</a:t>
-            </a:r>
-            <a:endParaRPr lang="en-US" altLang="ko-KR" dirty="0"/>
-          </a:p>
-          <a:p>
-            <a:endParaRPr lang="en-US" altLang="ko-KR" dirty="0"/>
-          </a:p>
-          <a:p>
-            <a:r>
-              <a:rPr lang="ko-KR" altLang="en-US" dirty="0"/>
-              <a:t>디자인에 따른 동작을 기술하고 연계 한다</a:t>
+              <a:t>코드를 작성하고 버그를 수정한다</a:t>
             </a:r>
             <a:r>
               <a:rPr lang="en-US" altLang="ko-KR" dirty="0"/>
@@ -12490,7 +12197,7 @@
     </p:spTree>
     <p:extLst>
       <p:ext uri="{BB962C8B-B14F-4D97-AF65-F5344CB8AC3E}">
-        <p14:creationId xmlns:p14="http://schemas.microsoft.com/office/powerpoint/2010/main" val="1723942396"/>
+        <p14:creationId xmlns:p14="http://schemas.microsoft.com/office/powerpoint/2010/main" val="1303733429"/>
       </p:ext>
     </p:extLst>
   </p:cSld>
@@ -12760,15 +12467,34 @@
                 <a:ea typeface="맑은 고딕" charset="-127"/>
                 <a:cs typeface="맑은 고딕" charset="-127"/>
               </a:rPr>
-              <a:t>구현</a:t>
-            </a:r>
+              <a:t>제품 </a:t>
+            </a:r>
+            <a:r>
+              <a:rPr lang="en-US" altLang="ko-KR" sz="4800" dirty="0">
+                <a:solidFill>
+                  <a:schemeClr val="bg1"/>
+                </a:solidFill>
+                <a:latin typeface="+mj-lt"/>
+                <a:ea typeface="맑은 고딕" charset="-127"/>
+                <a:cs typeface="맑은 고딕" charset="-127"/>
+              </a:rPr>
+              <a:t>Review</a:t>
+            </a:r>
+            <a:endParaRPr lang="ko-KR" altLang="en-US" sz="4800" dirty="0">
+              <a:solidFill>
+                <a:schemeClr val="bg1"/>
+              </a:solidFill>
+              <a:latin typeface="+mj-lt"/>
+              <a:ea typeface="맑은 고딕" charset="-127"/>
+              <a:cs typeface="맑은 고딕" charset="-127"/>
+            </a:endParaRPr>
           </a:p>
         </p:txBody>
       </p:sp>
     </p:spTree>
     <p:extLst>
       <p:ext uri="{BB962C8B-B14F-4D97-AF65-F5344CB8AC3E}">
-        <p14:creationId xmlns:p14="http://schemas.microsoft.com/office/powerpoint/2010/main" val="1697315730"/>
+        <p14:creationId xmlns:p14="http://schemas.microsoft.com/office/powerpoint/2010/main" val="3953577241"/>
       </p:ext>
     </p:extLst>
   </p:cSld>
@@ -12843,20 +12569,15 @@
           <a:p>
             <a:r>
               <a:rPr lang="ko-KR" altLang="en-US" dirty="0"/>
-              <a:t>코드를 작성하고 버그를 수정한다</a:t>
-            </a:r>
-            <a:r>
-              <a:rPr lang="en-US" altLang="ko-KR" dirty="0"/>
-              <a:t>.</a:t>
-            </a:r>
-            <a:endParaRPr lang="ko-KR" altLang="en-US" dirty="0"/>
+              <a:t>목표한 제품이 맞는 검증한다</a:t>
+            </a:r>
           </a:p>
         </p:txBody>
       </p:sp>
     </p:spTree>
     <p:extLst>
       <p:ext uri="{BB962C8B-B14F-4D97-AF65-F5344CB8AC3E}">
-        <p14:creationId xmlns:p14="http://schemas.microsoft.com/office/powerpoint/2010/main" val="1303733429"/>
+        <p14:creationId xmlns:p14="http://schemas.microsoft.com/office/powerpoint/2010/main" val="539587114"/>
       </p:ext>
     </p:extLst>
   </p:cSld>
@@ -13135,386 +12856,6 @@
     <p:extLst>
       <p:ext uri="{BB962C8B-B14F-4D97-AF65-F5344CB8AC3E}">
         <p14:creationId xmlns:p14="http://schemas.microsoft.com/office/powerpoint/2010/main" val="2800463732"/>
-      </p:ext>
-    </p:extLst>
-  </p:cSld>
-  <p:clrMapOvr>
-    <a:masterClrMapping/>
-  </p:clrMapOvr>
-</p:sld>
-</file>
-
-<file path=ppt/slides/slide30.xml><?xml version="1.0" encoding="utf-8"?>
-<p:sld xmlns:a="http://schemas.openxmlformats.org/drawingml/2006/main" xmlns:r="http://schemas.openxmlformats.org/officeDocument/2006/relationships" xmlns:p="http://schemas.openxmlformats.org/presentationml/2006/main">
-  <p:cSld>
-    <p:spTree>
-      <p:nvGrpSpPr>
-        <p:cNvPr id="1" name=""/>
-        <p:cNvGrpSpPr/>
-        <p:nvPr/>
-      </p:nvGrpSpPr>
-      <p:grpSpPr>
-        <a:xfrm>
-          <a:off x="0" y="0"/>
-          <a:ext cx="0" cy="0"/>
-          <a:chOff x="0" y="0"/>
-          <a:chExt cx="0" cy="0"/>
-        </a:xfrm>
-      </p:grpSpPr>
-      <p:sp>
-        <p:nvSpPr>
-          <p:cNvPr id="10" name="직사각형 9"/>
-          <p:cNvSpPr/>
-          <p:nvPr/>
-        </p:nvSpPr>
-        <p:spPr>
-          <a:xfrm>
-            <a:off x="-1" y="2398426"/>
-            <a:ext cx="12192001" cy="1338109"/>
-          </a:xfrm>
-          <a:prstGeom prst="rect">
-            <a:avLst/>
-          </a:prstGeom>
-          <a:solidFill>
-            <a:schemeClr val="accent1">
-              <a:lumMod val="75000"/>
-            </a:schemeClr>
-          </a:solidFill>
-          <a:ln>
-            <a:noFill/>
-          </a:ln>
-        </p:spPr>
-        <p:style>
-          <a:lnRef idx="2">
-            <a:schemeClr val="accent1">
-              <a:shade val="50000"/>
-            </a:schemeClr>
-          </a:lnRef>
-          <a:fillRef idx="1">
-            <a:schemeClr val="accent1"/>
-          </a:fillRef>
-          <a:effectRef idx="0">
-            <a:schemeClr val="accent1"/>
-          </a:effectRef>
-          <a:fontRef idx="minor">
-            <a:schemeClr val="lt1"/>
-          </a:fontRef>
-        </p:style>
-        <p:txBody>
-          <a:bodyPr rtlCol="0" anchor="ctr"/>
-          <a:lstStyle/>
-          <a:p>
-            <a:pPr algn="ctr"/>
-            <a:endParaRPr kumimoji="1" lang="ko-KR" altLang="en-US" dirty="0"/>
-          </a:p>
-        </p:txBody>
-      </p:sp>
-      <p:sp>
-        <p:nvSpPr>
-          <p:cNvPr id="12" name="부제목 2"/>
-          <p:cNvSpPr txBox="1">
-            <a:spLocks/>
-          </p:cNvSpPr>
-          <p:nvPr/>
-        </p:nvSpPr>
-        <p:spPr>
-          <a:xfrm>
-            <a:off x="1" y="2608234"/>
-            <a:ext cx="12192000" cy="754314"/>
-          </a:xfrm>
-          <a:prstGeom prst="rect">
-            <a:avLst/>
-          </a:prstGeom>
-        </p:spPr>
-        <p:txBody>
-          <a:bodyPr vert="horz" lIns="91440" tIns="45720" rIns="91440" bIns="45720" rtlCol="0" anchor="ctr">
-            <a:noAutofit/>
-          </a:bodyPr>
-          <a:lstStyle>
-            <a:lvl1pPr marL="0" indent="0" algn="ctr" defTabSz="914423" rtl="0" eaLnBrk="1" latinLnBrk="1" hangingPunct="1">
-              <a:lnSpc>
-                <a:spcPct val="90000"/>
-              </a:lnSpc>
-              <a:spcBef>
-                <a:spcPts val="1001"/>
-              </a:spcBef>
-              <a:buFont typeface="Arial"/>
-              <a:buNone/>
-              <a:defRPr sz="2400" kern="1200">
-                <a:solidFill>
-                  <a:schemeClr val="tx1"/>
-                </a:solidFill>
-                <a:latin typeface="+mn-lt"/>
-                <a:ea typeface="+mn-ea"/>
-                <a:cs typeface="+mn-cs"/>
-              </a:defRPr>
-            </a:lvl1pPr>
-            <a:lvl2pPr marL="457211" indent="0" algn="ctr" defTabSz="914423" rtl="0" eaLnBrk="1" latinLnBrk="1" hangingPunct="1">
-              <a:lnSpc>
-                <a:spcPct val="90000"/>
-              </a:lnSpc>
-              <a:spcBef>
-                <a:spcPts val="500"/>
-              </a:spcBef>
-              <a:buFont typeface="Arial"/>
-              <a:buNone/>
-              <a:defRPr sz="2000" kern="1200">
-                <a:solidFill>
-                  <a:schemeClr val="tx1"/>
-                </a:solidFill>
-                <a:latin typeface="+mn-lt"/>
-                <a:ea typeface="+mn-ea"/>
-                <a:cs typeface="+mn-cs"/>
-              </a:defRPr>
-            </a:lvl2pPr>
-            <a:lvl3pPr marL="914423" indent="0" algn="ctr" defTabSz="914423" rtl="0" eaLnBrk="1" latinLnBrk="1" hangingPunct="1">
-              <a:lnSpc>
-                <a:spcPct val="90000"/>
-              </a:lnSpc>
-              <a:spcBef>
-                <a:spcPts val="500"/>
-              </a:spcBef>
-              <a:buFont typeface="Arial"/>
-              <a:buNone/>
-              <a:defRPr sz="1801" kern="1200">
-                <a:solidFill>
-                  <a:schemeClr val="tx1"/>
-                </a:solidFill>
-                <a:latin typeface="+mn-lt"/>
-                <a:ea typeface="+mn-ea"/>
-                <a:cs typeface="+mn-cs"/>
-              </a:defRPr>
-            </a:lvl3pPr>
-            <a:lvl4pPr marL="1371634" indent="0" algn="ctr" defTabSz="914423" rtl="0" eaLnBrk="1" latinLnBrk="1" hangingPunct="1">
-              <a:lnSpc>
-                <a:spcPct val="90000"/>
-              </a:lnSpc>
-              <a:spcBef>
-                <a:spcPts val="500"/>
-              </a:spcBef>
-              <a:buFont typeface="Arial"/>
-              <a:buNone/>
-              <a:defRPr sz="1600" kern="1200">
-                <a:solidFill>
-                  <a:schemeClr val="tx1"/>
-                </a:solidFill>
-                <a:latin typeface="+mn-lt"/>
-                <a:ea typeface="+mn-ea"/>
-                <a:cs typeface="+mn-cs"/>
-              </a:defRPr>
-            </a:lvl4pPr>
-            <a:lvl5pPr marL="1828846" indent="0" algn="ctr" defTabSz="914423" rtl="0" eaLnBrk="1" latinLnBrk="1" hangingPunct="1">
-              <a:lnSpc>
-                <a:spcPct val="90000"/>
-              </a:lnSpc>
-              <a:spcBef>
-                <a:spcPts val="500"/>
-              </a:spcBef>
-              <a:buFont typeface="Arial"/>
-              <a:buNone/>
-              <a:defRPr sz="1600" kern="1200">
-                <a:solidFill>
-                  <a:schemeClr val="tx1"/>
-                </a:solidFill>
-                <a:latin typeface="+mn-lt"/>
-                <a:ea typeface="+mn-ea"/>
-                <a:cs typeface="+mn-cs"/>
-              </a:defRPr>
-            </a:lvl5pPr>
-            <a:lvl6pPr marL="2286057" indent="0" algn="ctr" defTabSz="914423" rtl="0" eaLnBrk="1" latinLnBrk="1" hangingPunct="1">
-              <a:lnSpc>
-                <a:spcPct val="90000"/>
-              </a:lnSpc>
-              <a:spcBef>
-                <a:spcPts val="500"/>
-              </a:spcBef>
-              <a:buFont typeface="Arial"/>
-              <a:buNone/>
-              <a:defRPr sz="1600" kern="1200">
-                <a:solidFill>
-                  <a:schemeClr val="tx1"/>
-                </a:solidFill>
-                <a:latin typeface="+mn-lt"/>
-                <a:ea typeface="+mn-ea"/>
-                <a:cs typeface="+mn-cs"/>
-              </a:defRPr>
-            </a:lvl6pPr>
-            <a:lvl7pPr marL="2743269" indent="0" algn="ctr" defTabSz="914423" rtl="0" eaLnBrk="1" latinLnBrk="1" hangingPunct="1">
-              <a:lnSpc>
-                <a:spcPct val="90000"/>
-              </a:lnSpc>
-              <a:spcBef>
-                <a:spcPts val="500"/>
-              </a:spcBef>
-              <a:buFont typeface="Arial"/>
-              <a:buNone/>
-              <a:defRPr sz="1600" kern="1200">
-                <a:solidFill>
-                  <a:schemeClr val="tx1"/>
-                </a:solidFill>
-                <a:latin typeface="+mn-lt"/>
-                <a:ea typeface="+mn-ea"/>
-                <a:cs typeface="+mn-cs"/>
-              </a:defRPr>
-            </a:lvl7pPr>
-            <a:lvl8pPr marL="3200480" indent="0" algn="ctr" defTabSz="914423" rtl="0" eaLnBrk="1" latinLnBrk="1" hangingPunct="1">
-              <a:lnSpc>
-                <a:spcPct val="90000"/>
-              </a:lnSpc>
-              <a:spcBef>
-                <a:spcPts val="500"/>
-              </a:spcBef>
-              <a:buFont typeface="Arial"/>
-              <a:buNone/>
-              <a:defRPr sz="1600" kern="1200">
-                <a:solidFill>
-                  <a:schemeClr val="tx1"/>
-                </a:solidFill>
-                <a:latin typeface="+mn-lt"/>
-                <a:ea typeface="+mn-ea"/>
-                <a:cs typeface="+mn-cs"/>
-              </a:defRPr>
-            </a:lvl8pPr>
-            <a:lvl9pPr marL="3657691" indent="0" algn="ctr" defTabSz="914423" rtl="0" eaLnBrk="1" latinLnBrk="1" hangingPunct="1">
-              <a:lnSpc>
-                <a:spcPct val="90000"/>
-              </a:lnSpc>
-              <a:spcBef>
-                <a:spcPts val="500"/>
-              </a:spcBef>
-              <a:buFont typeface="Arial"/>
-              <a:buNone/>
-              <a:defRPr sz="1600" kern="1200">
-                <a:solidFill>
-                  <a:schemeClr val="tx1"/>
-                </a:solidFill>
-                <a:latin typeface="+mn-lt"/>
-                <a:ea typeface="+mn-ea"/>
-                <a:cs typeface="+mn-cs"/>
-              </a:defRPr>
-            </a:lvl9pPr>
-          </a:lstStyle>
-          <a:p>
-            <a:r>
-              <a:rPr lang="ko-KR" altLang="en-US" sz="4800" dirty="0">
-                <a:solidFill>
-                  <a:schemeClr val="bg1"/>
-                </a:solidFill>
-                <a:latin typeface="+mj-lt"/>
-                <a:ea typeface="맑은 고딕" charset="-127"/>
-                <a:cs typeface="맑은 고딕" charset="-127"/>
-              </a:rPr>
-              <a:t>제품 </a:t>
-            </a:r>
-            <a:r>
-              <a:rPr lang="en-US" altLang="ko-KR" sz="4800" dirty="0">
-                <a:solidFill>
-                  <a:schemeClr val="bg1"/>
-                </a:solidFill>
-                <a:latin typeface="+mj-lt"/>
-                <a:ea typeface="맑은 고딕" charset="-127"/>
-                <a:cs typeface="맑은 고딕" charset="-127"/>
-              </a:rPr>
-              <a:t>Review</a:t>
-            </a:r>
-            <a:endParaRPr lang="ko-KR" altLang="en-US" sz="4800" dirty="0">
-              <a:solidFill>
-                <a:schemeClr val="bg1"/>
-              </a:solidFill>
-              <a:latin typeface="+mj-lt"/>
-              <a:ea typeface="맑은 고딕" charset="-127"/>
-              <a:cs typeface="맑은 고딕" charset="-127"/>
-            </a:endParaRPr>
-          </a:p>
-        </p:txBody>
-      </p:sp>
-    </p:spTree>
-    <p:extLst>
-      <p:ext uri="{BB962C8B-B14F-4D97-AF65-F5344CB8AC3E}">
-        <p14:creationId xmlns:p14="http://schemas.microsoft.com/office/powerpoint/2010/main" val="3953577241"/>
-      </p:ext>
-    </p:extLst>
-  </p:cSld>
-  <p:clrMapOvr>
-    <a:masterClrMapping/>
-  </p:clrMapOvr>
-</p:sld>
-</file>
-
-<file path=ppt/slides/slide31.xml><?xml version="1.0" encoding="utf-8"?>
-<p:sld xmlns:a="http://schemas.openxmlformats.org/drawingml/2006/main" xmlns:r="http://schemas.openxmlformats.org/officeDocument/2006/relationships" xmlns:p="http://schemas.openxmlformats.org/presentationml/2006/main">
-  <p:cSld>
-    <p:spTree>
-      <p:nvGrpSpPr>
-        <p:cNvPr id="1" name=""/>
-        <p:cNvGrpSpPr/>
-        <p:nvPr/>
-      </p:nvGrpSpPr>
-      <p:grpSpPr>
-        <a:xfrm>
-          <a:off x="0" y="0"/>
-          <a:ext cx="0" cy="0"/>
-          <a:chOff x="0" y="0"/>
-          <a:chExt cx="0" cy="0"/>
-        </a:xfrm>
-      </p:grpSpPr>
-      <p:sp>
-        <p:nvSpPr>
-          <p:cNvPr id="2" name="제목 1">
-            <a:extLst>
-              <a:ext uri="{FF2B5EF4-FFF2-40B4-BE49-F238E27FC236}">
-                <a16:creationId xmlns:a16="http://schemas.microsoft.com/office/drawing/2014/main" id="{2135F92A-65F5-4C7A-8C04-BF5F199039F2}"/>
-              </a:ext>
-            </a:extLst>
-          </p:cNvPr>
-          <p:cNvSpPr>
-            <a:spLocks noGrp="1"/>
-          </p:cNvSpPr>
-          <p:nvPr>
-            <p:ph type="title"/>
-          </p:nvPr>
-        </p:nvSpPr>
-        <p:spPr/>
-        <p:txBody>
-          <a:bodyPr/>
-          <a:lstStyle/>
-          <a:p>
-            <a:endParaRPr lang="ko-KR" altLang="en-US"/>
-          </a:p>
-        </p:txBody>
-      </p:sp>
-      <p:sp>
-        <p:nvSpPr>
-          <p:cNvPr id="3" name="내용 개체 틀 2">
-            <a:extLst>
-              <a:ext uri="{FF2B5EF4-FFF2-40B4-BE49-F238E27FC236}">
-                <a16:creationId xmlns:a16="http://schemas.microsoft.com/office/drawing/2014/main" id="{FB21A4AE-E1C2-4042-9B9E-43F419C42235}"/>
-              </a:ext>
-            </a:extLst>
-          </p:cNvPr>
-          <p:cNvSpPr>
-            <a:spLocks noGrp="1"/>
-          </p:cNvSpPr>
-          <p:nvPr>
-            <p:ph idx="1"/>
-          </p:nvPr>
-        </p:nvSpPr>
-        <p:spPr/>
-        <p:txBody>
-          <a:bodyPr/>
-          <a:lstStyle/>
-          <a:p>
-            <a:r>
-              <a:rPr lang="ko-KR" altLang="en-US" dirty="0"/>
-              <a:t>목표한 제품이 맞는 검증한다</a:t>
-            </a:r>
-          </a:p>
-        </p:txBody>
-      </p:sp>
-    </p:spTree>
-    <p:extLst>
-      <p:ext uri="{BB962C8B-B14F-4D97-AF65-F5344CB8AC3E}">
-        <p14:creationId xmlns:p14="http://schemas.microsoft.com/office/powerpoint/2010/main" val="539587114"/>
       </p:ext>
     </p:extLst>
   </p:cSld>

</xml_diff>

<commit_message>
add DataFlowDiagram add ProjectPlanner
</commit_message>
<xml_diff>
--- a/2021_Summer/jp.hong/Project_BnC_jph.pptx
+++ b/2021_Summer/jp.hong/Project_BnC_jph.pptx
@@ -2,7 +2,7 @@
 <file path=ppt/presentation.xml><?xml version="1.0" encoding="utf-8"?>
 <p:presentation xmlns:r="http://schemas.openxmlformats.org/officeDocument/2006/relationships" xmlns:c="http://schemas.openxmlformats.org/drawingml/2006/chart" xmlns:a="http://schemas.openxmlformats.org/drawingml/2006/main" xmlns:dgm="http://schemas.openxmlformats.org/drawingml/2006/diagram" xmlns:dsp="http://schemas.microsoft.com/office/drawing/2008/diagram" xmlns:p="http://schemas.openxmlformats.org/presentationml/2006/main">
   <p:sldMasterIdLst>
-    <p:sldMasterId id="2147483662" r:id="rId1"/>
+    <p:sldMasterId id="2147483668" r:id="rId1"/>
   </p:sldMasterIdLst>
   <p:sldIdLst>
     <p:sldId id="261" r:id="rId2"/>
@@ -8173,7 +8173,7 @@
             <a:pPr>
               <a:defRPr/>
             </a:pPr>
-            <a:endParaRPr lang="ko-KR" altLang="en-US" sz="2000">
+            <a:endParaRPr lang="ko-KR" altLang="en-US">
               <a:solidFill>
                 <a:schemeClr val="dk1"/>
               </a:solidFill>
@@ -8184,7 +8184,7 @@
               <a:defRPr/>
             </a:pPr>
             <a:r>
-              <a:rPr lang="ko-KR" altLang="en-US" sz="2000">
+              <a:rPr lang="ko-KR" altLang="en-US">
                 <a:solidFill>
                   <a:schemeClr val="dk1"/>
                 </a:solidFill>
@@ -8192,14 +8192,14 @@
               <a:t>기능적 요구사항</a:t>
             </a:r>
             <a:r>
-              <a:rPr lang="en-US" altLang="ko-KR" sz="2000">
+              <a:rPr lang="en-US" altLang="ko-KR">
                 <a:solidFill>
                   <a:schemeClr val="dk1"/>
                 </a:solidFill>
               </a:rPr>
               <a:t>(Functional Requirement)</a:t>
             </a:r>
-            <a:endParaRPr lang="en-US" altLang="ko-KR" sz="2000">
+            <a:endParaRPr lang="en-US" altLang="ko-KR">
               <a:solidFill>
                 <a:schemeClr val="dk1"/>
               </a:solidFill>
@@ -8209,7 +8209,7 @@
             <a:pPr>
               <a:defRPr/>
             </a:pPr>
-            <a:endParaRPr lang="en-US" altLang="ko-KR" sz="2000">
+            <a:endParaRPr lang="en-US" altLang="ko-KR">
               <a:solidFill>
                 <a:schemeClr val="dk1"/>
               </a:solidFill>
@@ -8220,7 +8220,7 @@
               <a:defRPr/>
             </a:pPr>
             <a:r>
-              <a:rPr lang="ko-KR" altLang="en-US" sz="2000">
+              <a:rPr lang="ko-KR" altLang="en-US">
                 <a:solidFill>
                   <a:schemeClr val="dk1"/>
                 </a:solidFill>
@@ -8228,7 +8228,7 @@
               <a:t> </a:t>
             </a:r>
             <a:r>
-              <a:rPr lang="en-US" altLang="ko-KR" sz="2000">
+              <a:rPr lang="en-US" altLang="ko-KR">
                 <a:solidFill>
                   <a:schemeClr val="dk1"/>
                 </a:solidFill>
@@ -8236,14 +8236,14 @@
               <a:t>-</a:t>
             </a:r>
             <a:r>
-              <a:rPr lang="ko-KR" altLang="en-US" sz="2000">
+              <a:rPr lang="ko-KR" altLang="en-US">
                 <a:solidFill>
                   <a:schemeClr val="dk1"/>
                 </a:solidFill>
               </a:rPr>
               <a:t> 회원가입</a:t>
             </a:r>
-            <a:endParaRPr lang="ko-KR" altLang="en-US" sz="2000">
+            <a:endParaRPr lang="ko-KR" altLang="en-US">
               <a:solidFill>
                 <a:schemeClr val="dk1"/>
               </a:solidFill>
@@ -8254,7 +8254,7 @@
               <a:defRPr/>
             </a:pPr>
             <a:r>
-              <a:rPr lang="ko-KR" altLang="en-US" sz="2000">
+              <a:rPr lang="ko-KR" altLang="en-US">
                 <a:solidFill>
                   <a:schemeClr val="dk1"/>
                 </a:solidFill>
@@ -8262,7 +8262,7 @@
               <a:t>  └ 회원가입시 아이디</a:t>
             </a:r>
             <a:r>
-              <a:rPr lang="en-US" altLang="ko-KR" sz="2000">
+              <a:rPr lang="en-US" altLang="ko-KR">
                 <a:solidFill>
                   <a:schemeClr val="dk1"/>
                 </a:solidFill>
@@ -8270,7 +8270,7 @@
               <a:t>,</a:t>
             </a:r>
             <a:r>
-              <a:rPr lang="ko-KR" altLang="en-US" sz="2000">
+              <a:rPr lang="ko-KR" altLang="en-US">
                 <a:solidFill>
                   <a:schemeClr val="dk1"/>
                 </a:solidFill>
@@ -8278,7 +8278,7 @@
               <a:t> 비밀번호</a:t>
             </a:r>
             <a:r>
-              <a:rPr lang="en-US" altLang="ko-KR" sz="2000">
+              <a:rPr lang="en-US" altLang="ko-KR">
                 <a:solidFill>
                   <a:schemeClr val="dk1"/>
                 </a:solidFill>
@@ -8286,7 +8286,7 @@
               <a:t>,</a:t>
             </a:r>
             <a:r>
-              <a:rPr lang="ko-KR" altLang="en-US" sz="2000">
+              <a:rPr lang="ko-KR" altLang="en-US">
                 <a:solidFill>
                   <a:schemeClr val="dk1"/>
                 </a:solidFill>
@@ -8294,7 +8294,7 @@
               <a:t> 이름</a:t>
             </a:r>
             <a:r>
-              <a:rPr lang="en-US" altLang="ko-KR" sz="2000">
+              <a:rPr lang="en-US" altLang="ko-KR">
                 <a:solidFill>
                   <a:schemeClr val="dk1"/>
                 </a:solidFill>
@@ -8302,7 +8302,7 @@
               <a:t>,</a:t>
             </a:r>
             <a:r>
-              <a:rPr lang="ko-KR" altLang="en-US" sz="2000">
+              <a:rPr lang="ko-KR" altLang="en-US">
                 <a:solidFill>
                   <a:schemeClr val="dk1"/>
                 </a:solidFill>
@@ -8310,7 +8310,7 @@
               <a:t> 전화번호</a:t>
             </a:r>
             <a:r>
-              <a:rPr lang="en-US" altLang="ko-KR" sz="2000">
+              <a:rPr lang="en-US" altLang="ko-KR">
                 <a:solidFill>
                   <a:schemeClr val="dk1"/>
                 </a:solidFill>
@@ -8318,7 +8318,7 @@
               <a:t>,</a:t>
             </a:r>
             <a:r>
-              <a:rPr lang="ko-KR" altLang="en-US" sz="2000">
+              <a:rPr lang="ko-KR" altLang="en-US">
                 <a:solidFill>
                   <a:schemeClr val="dk1"/>
                 </a:solidFill>
@@ -8326,7 +8326,7 @@
               <a:t> 생년월일</a:t>
             </a:r>
             <a:r>
-              <a:rPr lang="en-US" altLang="ko-KR" sz="2000">
+              <a:rPr lang="en-US" altLang="ko-KR">
                 <a:solidFill>
                   <a:schemeClr val="dk1"/>
                 </a:solidFill>
@@ -8334,7 +8334,7 @@
               <a:t>,</a:t>
             </a:r>
             <a:r>
-              <a:rPr lang="ko-KR" altLang="en-US" sz="2000">
+              <a:rPr lang="ko-KR" altLang="en-US">
                 <a:solidFill>
                   <a:schemeClr val="dk1"/>
                 </a:solidFill>
@@ -8342,14 +8342,14 @@
               <a:t> 차종의 정보를 받아야 한다</a:t>
             </a:r>
             <a:r>
-              <a:rPr lang="en-US" altLang="ko-KR" sz="2000">
+              <a:rPr lang="en-US" altLang="ko-KR">
                 <a:solidFill>
                   <a:schemeClr val="dk1"/>
                 </a:solidFill>
               </a:rPr>
               <a:t>.</a:t>
             </a:r>
-            <a:endParaRPr lang="en-US" altLang="ko-KR" sz="2000">
+            <a:endParaRPr lang="en-US" altLang="ko-KR">
               <a:solidFill>
                 <a:schemeClr val="dk1"/>
               </a:solidFill>
@@ -8360,7 +8360,7 @@
               <a:defRPr/>
             </a:pPr>
             <a:r>
-              <a:rPr lang="ko-KR" altLang="en-US" sz="2000">
+              <a:rPr lang="ko-KR" altLang="en-US">
                 <a:solidFill>
                   <a:schemeClr val="dk1"/>
                 </a:solidFill>
@@ -8368,14 +8368,14 @@
               <a:t>  └ 중복되는 아이디는 가입이 되어선 안된다</a:t>
             </a:r>
             <a:r>
-              <a:rPr lang="en-US" altLang="ko-KR" sz="2000">
+              <a:rPr lang="en-US" altLang="ko-KR">
                 <a:solidFill>
                   <a:schemeClr val="dk1"/>
                 </a:solidFill>
               </a:rPr>
               <a:t>.</a:t>
             </a:r>
-            <a:endParaRPr lang="en-US" altLang="ko-KR" sz="2000">
+            <a:endParaRPr lang="en-US" altLang="ko-KR">
               <a:solidFill>
                 <a:schemeClr val="dk1"/>
               </a:solidFill>
@@ -8386,7 +8386,7 @@
               <a:defRPr/>
             </a:pPr>
             <a:r>
-              <a:rPr lang="ko-KR" altLang="en-US" sz="2000">
+              <a:rPr lang="ko-KR" altLang="en-US">
                 <a:solidFill>
                   <a:schemeClr val="dk1"/>
                 </a:solidFill>
@@ -8394,14 +8394,14 @@
               <a:t>  └ 중복되는 아이디로 가입시도시 아이디 입력 오류 메세지가 출력되어야 한다</a:t>
             </a:r>
             <a:r>
-              <a:rPr lang="en-US" altLang="ko-KR" sz="2000">
+              <a:rPr lang="en-US" altLang="ko-KR">
                 <a:solidFill>
                   <a:schemeClr val="dk1"/>
                 </a:solidFill>
               </a:rPr>
               <a:t>.</a:t>
             </a:r>
-            <a:endParaRPr lang="en-US" altLang="ko-KR" sz="2000">
+            <a:endParaRPr lang="en-US" altLang="ko-KR">
               <a:solidFill>
                 <a:schemeClr val="dk1"/>
               </a:solidFill>
@@ -8412,7 +8412,7 @@
               <a:defRPr/>
             </a:pPr>
             <a:r>
-              <a:rPr lang="ko-KR" altLang="en-US" sz="2000">
+              <a:rPr lang="ko-KR" altLang="en-US">
                 <a:solidFill>
                   <a:schemeClr val="dk1"/>
                 </a:solidFill>
@@ -8420,7 +8420,7 @@
               <a:t>  └ 비밀번호는 특수문자 포함 </a:t>
             </a:r>
             <a:r>
-              <a:rPr lang="en-US" altLang="ko-KR" sz="2000">
+              <a:rPr lang="en-US" altLang="ko-KR">
                 <a:solidFill>
                   <a:schemeClr val="dk1"/>
                 </a:solidFill>
@@ -8428,7 +8428,7 @@
               <a:t>8</a:t>
             </a:r>
             <a:r>
-              <a:rPr lang="ko-KR" altLang="en-US" sz="2000">
+              <a:rPr lang="ko-KR" altLang="en-US">
                 <a:solidFill>
                   <a:schemeClr val="dk1"/>
                 </a:solidFill>
@@ -8436,7 +8436,7 @@
               <a:t>자리 이상 </a:t>
             </a:r>
             <a:r>
-              <a:rPr lang="en-US" altLang="ko-KR" sz="2000">
+              <a:rPr lang="en-US" altLang="ko-KR">
                 <a:solidFill>
                   <a:schemeClr val="dk1"/>
                 </a:solidFill>
@@ -8444,7 +8444,7 @@
               <a:t>12</a:t>
             </a:r>
             <a:r>
-              <a:rPr lang="ko-KR" altLang="en-US" sz="2000">
+              <a:rPr lang="ko-KR" altLang="en-US">
                 <a:solidFill>
                   <a:schemeClr val="dk1"/>
                 </a:solidFill>
@@ -8452,7 +8452,7 @@
               <a:t>자리 이하 이어야 한다</a:t>
             </a:r>
             <a:r>
-              <a:rPr lang="en-US" altLang="ko-KR" sz="2000">
+              <a:rPr lang="en-US" altLang="ko-KR">
                 <a:solidFill>
                   <a:schemeClr val="dk1"/>
                 </a:solidFill>
@@ -8460,14 +8460,14 @@
               <a:t>.</a:t>
             </a:r>
             <a:r>
-              <a:rPr lang="ko-KR" altLang="en-US" sz="2000">
+              <a:rPr lang="ko-KR" altLang="en-US">
                 <a:solidFill>
                   <a:schemeClr val="dk1"/>
                 </a:solidFill>
               </a:rPr>
               <a:t> </a:t>
             </a:r>
-            <a:endParaRPr lang="ko-KR" altLang="en-US" sz="2000">
+            <a:endParaRPr lang="ko-KR" altLang="en-US">
               <a:solidFill>
                 <a:schemeClr val="dk1"/>
               </a:solidFill>
@@ -8478,7 +8478,7 @@
               <a:defRPr/>
             </a:pPr>
             <a:r>
-              <a:rPr lang="ko-KR" altLang="en-US" sz="2000">
+              <a:rPr lang="ko-KR" altLang="en-US">
                 <a:solidFill>
                   <a:schemeClr val="dk1"/>
                 </a:solidFill>
@@ -8486,7 +8486,7 @@
               <a:t>  └ 회원가입을 위해 시도한 비밀번호가 </a:t>
             </a:r>
             <a:r>
-              <a:rPr lang="en-US" altLang="ko-KR" sz="2000">
+              <a:rPr lang="en-US" altLang="ko-KR">
                 <a:solidFill>
                   <a:schemeClr val="dk1"/>
                 </a:solidFill>
@@ -8494,7 +8494,7 @@
               <a:t>7</a:t>
             </a:r>
             <a:r>
-              <a:rPr lang="ko-KR" altLang="en-US" sz="2000">
+              <a:rPr lang="ko-KR" altLang="en-US">
                 <a:solidFill>
                   <a:schemeClr val="dk1"/>
                 </a:solidFill>
@@ -8502,7 +8502,7 @@
               <a:t>자리 이하이거나 </a:t>
             </a:r>
             <a:r>
-              <a:rPr lang="en-US" altLang="ko-KR" sz="2000">
+              <a:rPr lang="en-US" altLang="ko-KR">
                 <a:solidFill>
                   <a:schemeClr val="dk1"/>
                 </a:solidFill>
@@ -8510,14 +8510,14 @@
               <a:t>13</a:t>
             </a:r>
             <a:r>
-              <a:rPr lang="ko-KR" altLang="en-US" sz="2000">
+              <a:rPr lang="ko-KR" altLang="en-US">
                 <a:solidFill>
                   <a:schemeClr val="dk1"/>
                 </a:solidFill>
               </a:rPr>
               <a:t>자리 이상일 경우 비밀번호 입력 오류 메세지가 출력되어야 한다</a:t>
             </a:r>
-            <a:endParaRPr lang="ko-KR" altLang="en-US" sz="2000">
+            <a:endParaRPr lang="ko-KR" altLang="en-US">
               <a:solidFill>
                 <a:schemeClr val="dk1"/>
               </a:solidFill>
@@ -8527,7 +8527,7 @@
             <a:pPr>
               <a:defRPr/>
             </a:pPr>
-            <a:endParaRPr lang="ko-KR" altLang="en-US" sz="2000">
+            <a:endParaRPr lang="ko-KR" altLang="en-US">
               <a:solidFill>
                 <a:schemeClr val="dk1"/>
               </a:solidFill>
@@ -8538,7 +8538,7 @@
               <a:defRPr/>
             </a:pPr>
             <a:r>
-              <a:rPr lang="ko-KR" altLang="en-US" sz="2000">
+              <a:rPr lang="ko-KR" altLang="en-US">
                 <a:solidFill>
                   <a:schemeClr val="dk1"/>
                 </a:solidFill>
@@ -8546,7 +8546,7 @@
               <a:t> </a:t>
             </a:r>
             <a:r>
-              <a:rPr lang="en-US" altLang="ko-KR" sz="2000">
+              <a:rPr lang="en-US" altLang="ko-KR">
                 <a:solidFill>
                   <a:schemeClr val="dk1"/>
                 </a:solidFill>
@@ -8554,7 +8554,7 @@
               <a:t>-</a:t>
             </a:r>
             <a:r>
-              <a:rPr lang="ko-KR" altLang="en-US" sz="2000">
+              <a:rPr lang="ko-KR" altLang="en-US">
                 <a:solidFill>
                   <a:schemeClr val="dk1"/>
                 </a:solidFill>
@@ -8562,7 +8562,7 @@
               <a:t> 사용자 정보를 관리할 </a:t>
             </a:r>
             <a:r>
-              <a:rPr lang="en-US" altLang="ko-KR" sz="2000">
+              <a:rPr lang="en-US" altLang="ko-KR">
                 <a:solidFill>
                   <a:schemeClr val="dk1"/>
                 </a:solidFill>
@@ -8570,14 +8570,14 @@
               <a:t>DB</a:t>
             </a:r>
             <a:r>
-              <a:rPr lang="ko-KR" altLang="en-US" sz="2000">
+              <a:rPr lang="ko-KR" altLang="en-US">
                 <a:solidFill>
                   <a:schemeClr val="dk1"/>
                 </a:solidFill>
               </a:rPr>
               <a:t>의 필요</a:t>
             </a:r>
-            <a:endParaRPr lang="ko-KR" altLang="en-US" sz="2000">
+            <a:endParaRPr lang="ko-KR" altLang="en-US">
               <a:solidFill>
                 <a:schemeClr val="dk1"/>
               </a:solidFill>
@@ -8588,7 +8588,7 @@
               <a:defRPr/>
             </a:pPr>
             <a:r>
-              <a:rPr lang="ko-KR" altLang="en-US" sz="2000">
+              <a:rPr lang="ko-KR" altLang="en-US">
                 <a:solidFill>
                   <a:schemeClr val="dk1"/>
                 </a:solidFill>
@@ -8596,14 +8596,14 @@
               <a:t>  └ 회원가입시 필요한 정보 및 소유한 차량의 정보를 포함해야 한다</a:t>
             </a:r>
             <a:r>
-              <a:rPr lang="en-US" altLang="ko-KR" sz="2000">
+              <a:rPr lang="en-US" altLang="ko-KR">
                 <a:solidFill>
                   <a:schemeClr val="dk1"/>
                 </a:solidFill>
               </a:rPr>
               <a:t>.</a:t>
             </a:r>
-            <a:endParaRPr lang="en-US" altLang="ko-KR" sz="2000">
+            <a:endParaRPr lang="en-US" altLang="ko-KR">
               <a:solidFill>
                 <a:schemeClr val="dk1"/>
               </a:solidFill>
@@ -8614,7 +8614,7 @@
               <a:defRPr/>
             </a:pPr>
             <a:r>
-              <a:rPr lang="ko-KR" altLang="en-US" sz="2000">
+              <a:rPr lang="ko-KR" altLang="en-US">
                 <a:solidFill>
                   <a:schemeClr val="dk1"/>
                 </a:solidFill>
@@ -8622,14 +8622,14 @@
               <a:t>  └ 소유한 차량이 여러 대의 경우 차량의 정보를 추가할 수 있어야 한다</a:t>
             </a:r>
             <a:r>
-              <a:rPr lang="en-US" altLang="ko-KR" sz="2000">
+              <a:rPr lang="en-US" altLang="ko-KR">
                 <a:solidFill>
                   <a:schemeClr val="dk1"/>
                 </a:solidFill>
               </a:rPr>
               <a:t>.</a:t>
             </a:r>
-            <a:endParaRPr lang="en-US" altLang="ko-KR" sz="2000">
+            <a:endParaRPr lang="en-US" altLang="ko-KR">
               <a:solidFill>
                 <a:schemeClr val="dk1"/>
               </a:solidFill>
@@ -8639,7 +8639,7 @@
             <a:pPr>
               <a:defRPr/>
             </a:pPr>
-            <a:endParaRPr lang="en-US" altLang="ko-KR" sz="2000">
+            <a:endParaRPr lang="en-US" altLang="ko-KR">
               <a:solidFill>
                 <a:schemeClr val="dk1"/>
               </a:solidFill>
@@ -8650,7 +8650,7 @@
               <a:defRPr/>
             </a:pPr>
             <a:r>
-              <a:rPr lang="ko-KR" altLang="en-US" sz="2000">
+              <a:rPr lang="ko-KR" altLang="en-US">
                 <a:solidFill>
                   <a:schemeClr val="dk1"/>
                 </a:solidFill>
@@ -8658,7 +8658,7 @@
               <a:t> </a:t>
             </a:r>
             <a:r>
-              <a:rPr lang="en-US" altLang="ko-KR" sz="2000">
+              <a:rPr lang="en-US" altLang="ko-KR">
                 <a:solidFill>
                   <a:schemeClr val="dk1"/>
                 </a:solidFill>
@@ -8666,14 +8666,14 @@
               <a:t>-</a:t>
             </a:r>
             <a:r>
-              <a:rPr lang="ko-KR" altLang="en-US" sz="2000">
+              <a:rPr lang="ko-KR" altLang="en-US">
                 <a:solidFill>
                   <a:schemeClr val="dk1"/>
                 </a:solidFill>
               </a:rPr>
               <a:t> 로그인</a:t>
             </a:r>
-            <a:endParaRPr lang="ko-KR" altLang="en-US" sz="2000">
+            <a:endParaRPr lang="ko-KR" altLang="en-US">
               <a:solidFill>
                 <a:schemeClr val="dk1"/>
               </a:solidFill>
@@ -8684,7 +8684,7 @@
               <a:defRPr/>
             </a:pPr>
             <a:r>
-              <a:rPr lang="ko-KR" altLang="en-US" sz="2000">
+              <a:rPr lang="ko-KR" altLang="en-US">
                 <a:solidFill>
                   <a:schemeClr val="dk1"/>
                 </a:solidFill>
@@ -8692,7 +8692,7 @@
               <a:t>  └ 알맞은 </a:t>
             </a:r>
             <a:r>
-              <a:rPr lang="en-US" altLang="ko-KR" sz="2000">
+              <a:rPr lang="en-US" altLang="ko-KR">
                 <a:solidFill>
                   <a:schemeClr val="dk1"/>
                 </a:solidFill>
@@ -8700,7 +8700,7 @@
               <a:t>ID</a:t>
             </a:r>
             <a:r>
-              <a:rPr lang="ko-KR" altLang="en-US" sz="2000">
+              <a:rPr lang="ko-KR" altLang="en-US">
                 <a:solidFill>
                   <a:schemeClr val="dk1"/>
                 </a:solidFill>
@@ -8708,14 +8708,14 @@
               <a:t>값과 패스워드 값이 입력 될 경우 그에 맞는 회원 정보가 로그인 되어야 한다</a:t>
             </a:r>
             <a:r>
-              <a:rPr lang="en-US" altLang="ko-KR" sz="2000">
+              <a:rPr lang="en-US" altLang="ko-KR">
                 <a:solidFill>
                   <a:schemeClr val="dk1"/>
                 </a:solidFill>
               </a:rPr>
               <a:t>.</a:t>
             </a:r>
-            <a:endParaRPr lang="en-US" altLang="ko-KR" sz="2000">
+            <a:endParaRPr lang="en-US" altLang="ko-KR">
               <a:solidFill>
                 <a:schemeClr val="dk1"/>
               </a:solidFill>
@@ -8726,7 +8726,7 @@
               <a:defRPr/>
             </a:pPr>
             <a:r>
-              <a:rPr lang="ko-KR" altLang="en-US" sz="2000">
+              <a:rPr lang="ko-KR" altLang="en-US">
                 <a:solidFill>
                   <a:schemeClr val="dk1"/>
                 </a:solidFill>
@@ -8734,14 +8734,14 @@
               <a:t>  └ 로그인 실패시 로그인 오류 메세지를 출력해야 한다</a:t>
             </a:r>
             <a:r>
-              <a:rPr lang="en-US" altLang="ko-KR" sz="2000">
+              <a:rPr lang="en-US" altLang="ko-KR">
                 <a:solidFill>
                   <a:schemeClr val="dk1"/>
                 </a:solidFill>
               </a:rPr>
               <a:t>.</a:t>
             </a:r>
-            <a:endParaRPr lang="en-US" altLang="ko-KR" sz="2000">
+            <a:endParaRPr lang="en-US" altLang="ko-KR">
               <a:solidFill>
                 <a:schemeClr val="dk1"/>
               </a:solidFill>
@@ -8752,7 +8752,7 @@
               <a:defRPr/>
             </a:pPr>
             <a:r>
-              <a:rPr lang="ko-KR" altLang="en-US" sz="2000">
+              <a:rPr lang="ko-KR" altLang="en-US">
                 <a:solidFill>
                   <a:schemeClr val="dk1"/>
                 </a:solidFill>
@@ -8760,14 +8760,14 @@
               <a:t>  └ 로그인에 성공했다면 로그인 버튼이 아닌 로그 아웃버튼을 보여주어야 한다</a:t>
             </a:r>
             <a:r>
-              <a:rPr lang="en-US" altLang="ko-KR" sz="2000">
+              <a:rPr lang="en-US" altLang="ko-KR">
                 <a:solidFill>
                   <a:schemeClr val="dk1"/>
                 </a:solidFill>
               </a:rPr>
               <a:t>.</a:t>
             </a:r>
-            <a:endParaRPr lang="en-US" altLang="ko-KR" sz="2000">
+            <a:endParaRPr lang="en-US" altLang="ko-KR">
               <a:solidFill>
                 <a:schemeClr val="dk1"/>
               </a:solidFill>
@@ -11790,7 +11790,7 @@
         </p:nvSpPr>
         <p:spPr>
           <a:xfrm>
-            <a:off x="0" y="1367936"/>
+            <a:off x="0" y="1650158"/>
             <a:ext cx="12192000" cy="5480538"/>
           </a:xfrm>
           <a:prstGeom prst="rect">
@@ -12355,6 +12355,16 @@
               </a:rPr>
               <a:t>.</a:t>
             </a:r>
+            <a:endParaRPr lang="en-US" altLang="ko-KR" sz="2000">
+              <a:solidFill>
+                <a:schemeClr val="dk1"/>
+              </a:solidFill>
+            </a:endParaRPr>
+          </a:p>
+          <a:p>
+            <a:pPr>
+              <a:defRPr/>
+            </a:pPr>
             <a:endParaRPr lang="en-US" altLang="ko-KR" sz="2000">
               <a:solidFill>
                 <a:schemeClr val="dk1"/>
@@ -13679,6 +13689,9 @@
           <a:lstStyle/>
           <a:p>
             <a:pPr>
+              <a:tabLst>
+                <a:tab pos="4850694" algn="l"/>
+              </a:tabLst>
               <a:defRPr/>
             </a:pPr>
             <a:r>
@@ -13687,7 +13700,23 @@
             </a:r>
             <a:r>
               <a:rPr kumimoji="1" lang="ko-KR" altLang="en-US" sz="4800"/>
-              <a:t> 요구사항 분석</a:t>
+              <a:t> 데이터 흐름도 </a:t>
+            </a:r>
+            <a:r>
+              <a:rPr kumimoji="1" lang="en-US" altLang="ko-KR" sz="4800"/>
+              <a:t>(</a:t>
+            </a:r>
+            <a:r>
+              <a:rPr kumimoji="1" lang="ko-KR" altLang="en-US" sz="4800"/>
+              <a:t>구상</a:t>
+            </a:r>
+            <a:r>
+              <a:rPr kumimoji="1" lang="en-US" altLang="ko-KR" sz="4800"/>
+              <a:t>)</a:t>
+            </a:r>
+            <a:r>
+              <a:rPr kumimoji="1" lang="ko-KR" altLang="en-US" sz="4800"/>
+              <a:t> 미완</a:t>
             </a:r>
             <a:endParaRPr kumimoji="1" lang="ko-KR" altLang="en-US" sz="4800"/>
           </a:p>
@@ -13743,6 +13772,30 @@
           </a:p>
         </p:txBody>
       </p:sp>
+      <p:pic>
+        <p:nvPicPr>
+          <p:cNvPr id="7" name=""/>
+          <p:cNvPicPr>
+            <a:picLocks noChangeAspect="1"/>
+          </p:cNvPicPr>
+          <p:nvPr/>
+        </p:nvPicPr>
+        <p:blipFill rotWithShape="1">
+          <a:blip r:embed="rId2"/>
+          <a:stretch>
+            <a:fillRect/>
+          </a:stretch>
+        </p:blipFill>
+        <p:spPr>
+          <a:xfrm>
+            <a:off x="2709022" y="1345917"/>
+            <a:ext cx="6773954" cy="5512083"/>
+          </a:xfrm>
+          <a:prstGeom prst="rect">
+            <a:avLst/>
+          </a:prstGeom>
+        </p:spPr>
+      </p:pic>
     </p:spTree>
   </p:cSld>
   <p:clrMapOvr>
@@ -14054,2334 +14107,98 @@
           <a:chExt cx="0" cy="0"/>
         </a:xfrm>
       </p:grpSpPr>
-      <p:graphicFrame>
-        <p:nvGraphicFramePr>
-          <p:cNvPr id="2" name="표 3"/>
-          <p:cNvGraphicFramePr>
-            <a:graphicFrameLocks noGrp="1"/>
-          </p:cNvGraphicFramePr>
+      <p:sp>
+        <p:nvSpPr>
+          <p:cNvPr id="3" name="직사각형 9"/>
+          <p:cNvSpPr/>
           <p:nvPr/>
-        </p:nvGraphicFramePr>
-        <p:xfrm>
-          <a:off x="503364" y="957263"/>
-          <a:ext cx="11083799" cy="4605660"/>
-        </p:xfrm>
-        <a:graphic>
-          <a:graphicData uri="http://schemas.openxmlformats.org/drawingml/2006/table">
-            <a:tbl>
-              <a:tblPr firstRow="1" bandRow="1"/>
-              <a:tblGrid>
-                <a:gridCol w="1291114"/>
-                <a:gridCol w="1191610"/>
-                <a:gridCol w="3386137"/>
-                <a:gridCol w="5214938"/>
-              </a:tblGrid>
-              <a:tr h="511740">
-                <a:tc rowSpan="9">
-                  <a:txBody>
-                    <a:bodyPr vert="horz" lIns="91440" tIns="45720" rIns="91440" bIns="45720" anchor="ctr" anchorCtr="0"/>
-                    <a:p>
-                      <a:pPr marL="0" marR="0" indent="0" algn="ctr" latinLnBrk="0">
-                        <a:lnSpc>
-                          <a:spcPct val="130000"/>
-                        </a:lnSpc>
-                        <a:spcBef>
-                          <a:spcPts val="0"/>
-                        </a:spcBef>
-                        <a:spcAft>
-                          <a:spcPts val="0"/>
-                        </a:spcAft>
-                        <a:defRPr/>
-                      </a:pPr>
-                      <a:r>
-                        <a:rPr lang="ko-KR" altLang="en-US" sz="1800" b="0" kern="0" spc="-60">
-                          <a:solidFill>
-                            <a:srgbClr val="000000"/>
-                          </a:solidFill>
-                          <a:effectLst/>
-                          <a:latin typeface="+mj-lt"/>
-                          <a:ea typeface="함초롬바탕"/>
-                        </a:rPr>
-                        <a:t>실습내용</a:t>
-                      </a:r>
-                      <a:endParaRPr lang="ko-KR" altLang="en-US" sz="1800" b="0" kern="0" spc="-60">
-                        <a:solidFill>
-                          <a:srgbClr val="000000"/>
-                        </a:solidFill>
-                        <a:effectLst/>
-                        <a:latin typeface="+mj-lt"/>
-                        <a:ea typeface="함초롬바탕"/>
-                      </a:endParaRPr>
-                    </a:p>
-                    <a:p>
-                      <a:pPr marL="0" marR="0" indent="0" algn="ctr" latinLnBrk="0">
-                        <a:lnSpc>
-                          <a:spcPct val="130000"/>
-                        </a:lnSpc>
-                        <a:spcBef>
-                          <a:spcPts val="0"/>
-                        </a:spcBef>
-                        <a:spcAft>
-                          <a:spcPts val="0"/>
-                        </a:spcAft>
-                        <a:defRPr/>
-                      </a:pPr>
-                      <a:r>
-                        <a:rPr lang="en-US" altLang="ko-KR" sz="1800" b="0" kern="0" spc="-60">
-                          <a:solidFill>
-                            <a:srgbClr val="0000ff"/>
-                          </a:solidFill>
-                          <a:effectLst/>
-                          <a:latin typeface="+mj-lt"/>
-                          <a:ea typeface="함초롬바탕"/>
-                        </a:rPr>
-                        <a:t>(</a:t>
-                      </a:r>
-                      <a:r>
-                        <a:rPr lang="ko-KR" altLang="en-US" sz="1800" b="0" kern="0" spc="-60">
-                          <a:solidFill>
-                            <a:srgbClr val="0000ff"/>
-                          </a:solidFill>
-                          <a:effectLst/>
-                          <a:latin typeface="+mj-lt"/>
-                          <a:ea typeface="함초롬바탕"/>
-                        </a:rPr>
-                        <a:t>실습분야</a:t>
-                      </a:r>
-                      <a:r>
-                        <a:rPr lang="en-US" altLang="ko-KR" sz="1800" b="0" kern="0" spc="-60">
-                          <a:solidFill>
-                            <a:srgbClr val="0000ff"/>
-                          </a:solidFill>
-                          <a:effectLst/>
-                          <a:latin typeface="+mj-lt"/>
-                          <a:ea typeface="함초롬바탕"/>
-                        </a:rPr>
-                        <a:t>)</a:t>
-                      </a:r>
-                      <a:endParaRPr lang="ko-KR" altLang="en-US" sz="1800" b="0" kern="0" spc="-60">
-                        <a:solidFill>
-                          <a:srgbClr val="000000"/>
-                        </a:solidFill>
-                        <a:effectLst/>
-                        <a:latin typeface="+mj-lt"/>
-                      </a:endParaRPr>
-                    </a:p>
-                  </a:txBody>
-                  <a:tcPr marL="91440" marR="91440" anchor="ctr">
-                    <a:lnL w="3556" cap="flat" cmpd="sng" algn="ctr">
-                      <a:solidFill>
-                        <a:srgbClr val="000000"/>
-                      </a:solidFill>
-                      <a:prstDash val="solid"/>
-                      <a:round/>
-                      <a:headEnd w="med" len="med"/>
-                      <a:tailEnd w="med" len="med"/>
-                    </a:lnL>
-                    <a:lnR w="3556" cap="flat" cmpd="sng" algn="ctr">
-                      <a:solidFill>
-                        <a:srgbClr val="000000"/>
-                      </a:solidFill>
-                      <a:prstDash val="solid"/>
-                      <a:round/>
-                      <a:headEnd w="med" len="med"/>
-                      <a:tailEnd w="med" len="med"/>
-                    </a:lnR>
-                    <a:lnT w="3556" cap="flat" cmpd="sng" algn="ctr">
-                      <a:solidFill>
-                        <a:srgbClr val="000000"/>
-                      </a:solidFill>
-                      <a:prstDash val="solid"/>
-                      <a:round/>
-                      <a:headEnd w="med" len="med"/>
-                      <a:tailEnd w="med" len="med"/>
-                    </a:lnT>
-                    <a:lnB w="3556" cap="flat" cmpd="sng" algn="ctr">
-                      <a:solidFill>
-                        <a:srgbClr val="000000"/>
-                      </a:solidFill>
-                      <a:prstDash val="solid"/>
-                      <a:round/>
-                      <a:headEnd w="med" len="med"/>
-                      <a:tailEnd w="med" len="med"/>
-                    </a:lnB>
-                    <a:solidFill>
-                      <a:srgbClr val="dddddd"/>
-                    </a:solidFill>
-                  </a:tcPr>
-                </a:tc>
-                <a:tc>
-                  <a:txBody>
-                    <a:bodyPr vert="horz" lIns="91440" tIns="45720" rIns="91440" bIns="45720" anchor="ctr" anchorCtr="0"/>
-                    <a:p>
-                      <a:pPr marL="0" marR="0" indent="0" algn="ctr" latinLnBrk="0">
-                        <a:lnSpc>
-                          <a:spcPct val="130000"/>
-                        </a:lnSpc>
-                        <a:spcBef>
-                          <a:spcPts val="0"/>
-                        </a:spcBef>
-                        <a:spcAft>
-                          <a:spcPts val="0"/>
-                        </a:spcAft>
-                        <a:defRPr/>
-                      </a:pPr>
-                      <a:r>
-                        <a:rPr lang="ko-KR" altLang="en-US" sz="1800" b="0" kern="0" spc="-60">
-                          <a:solidFill>
-                            <a:srgbClr val="000000"/>
-                          </a:solidFill>
-                          <a:effectLst/>
-                          <a:latin typeface="+mj-lt"/>
-                          <a:ea typeface="함초롬바탕"/>
-                        </a:rPr>
-                        <a:t>주 차</a:t>
-                      </a:r>
-                      <a:endParaRPr lang="ko-KR" altLang="en-US" sz="1800" b="0" kern="0" spc="-60">
-                        <a:solidFill>
-                          <a:srgbClr val="000000"/>
-                        </a:solidFill>
-                        <a:effectLst/>
-                        <a:latin typeface="+mj-lt"/>
-                      </a:endParaRPr>
-                    </a:p>
-                  </a:txBody>
-                  <a:tcPr marL="91440" marR="91440" anchor="ctr">
-                    <a:lnL w="3556" cap="flat" cmpd="sng" algn="ctr">
-                      <a:solidFill>
-                        <a:srgbClr val="000000"/>
-                      </a:solidFill>
-                      <a:prstDash val="solid"/>
-                      <a:round/>
-                      <a:headEnd w="med" len="med"/>
-                      <a:tailEnd w="med" len="med"/>
-                    </a:lnL>
-                    <a:lnR w="3556" cap="flat" cmpd="sng" algn="ctr">
-                      <a:solidFill>
-                        <a:srgbClr val="000000"/>
-                      </a:solidFill>
-                      <a:prstDash val="solid"/>
-                      <a:round/>
-                      <a:headEnd w="med" len="med"/>
-                      <a:tailEnd w="med" len="med"/>
-                    </a:lnR>
-                    <a:lnT w="3556" cap="flat" cmpd="sng" algn="ctr">
-                      <a:solidFill>
-                        <a:srgbClr val="000000"/>
-                      </a:solidFill>
-                      <a:prstDash val="solid"/>
-                      <a:round/>
-                      <a:headEnd w="med" len="med"/>
-                      <a:tailEnd w="med" len="med"/>
-                    </a:lnT>
-                    <a:lnB w="3556" cap="flat" cmpd="sng" algn="ctr">
-                      <a:solidFill>
-                        <a:srgbClr val="000000"/>
-                      </a:solidFill>
-                      <a:prstDash val="solid"/>
-                      <a:round/>
-                      <a:headEnd w="med" len="med"/>
-                      <a:tailEnd w="med" len="med"/>
-                    </a:lnB>
-                  </a:tcPr>
-                </a:tc>
-                <a:tc>
-                  <a:txBody>
-                    <a:bodyPr vert="horz" lIns="91440" tIns="45720" rIns="91440" bIns="45720" anchor="ctr" anchorCtr="0"/>
-                    <a:p>
-                      <a:pPr marL="0" marR="0" indent="0" algn="ctr" latinLnBrk="0">
-                        <a:lnSpc>
-                          <a:spcPct val="130000"/>
-                        </a:lnSpc>
-                        <a:spcBef>
-                          <a:spcPts val="0"/>
-                        </a:spcBef>
-                        <a:spcAft>
-                          <a:spcPts val="0"/>
-                        </a:spcAft>
-                        <a:defRPr/>
-                      </a:pPr>
-                      <a:r>
-                        <a:rPr lang="ko-KR" altLang="en-US" sz="1800" b="0" kern="0" spc="-60">
-                          <a:solidFill>
-                            <a:srgbClr val="000000"/>
-                          </a:solidFill>
-                          <a:effectLst/>
-                          <a:latin typeface="+mj-lt"/>
-                          <a:ea typeface="함초롬바탕"/>
-                        </a:rPr>
-                        <a:t>내 용</a:t>
-                      </a:r>
-                      <a:endParaRPr lang="ko-KR" altLang="en-US" sz="1800" b="0" kern="0" spc="-60">
-                        <a:solidFill>
-                          <a:srgbClr val="000000"/>
-                        </a:solidFill>
-                        <a:effectLst/>
-                        <a:latin typeface="+mj-lt"/>
-                      </a:endParaRPr>
-                    </a:p>
-                  </a:txBody>
-                  <a:tcPr marL="91440" marR="91440" anchor="ctr">
-                    <a:lnL w="3556" cap="flat" cmpd="sng" algn="ctr">
-                      <a:solidFill>
-                        <a:srgbClr val="000000"/>
-                      </a:solidFill>
-                      <a:prstDash val="solid"/>
-                      <a:round/>
-                      <a:headEnd w="med" len="med"/>
-                      <a:tailEnd w="med" len="med"/>
-                    </a:lnL>
-                    <a:lnR w="3556" cap="flat" cmpd="sng" algn="ctr">
-                      <a:solidFill>
-                        <a:srgbClr val="000000"/>
-                      </a:solidFill>
-                      <a:prstDash val="solid"/>
-                      <a:round/>
-                      <a:headEnd w="med" len="med"/>
-                      <a:tailEnd w="med" len="med"/>
-                    </a:lnR>
-                    <a:lnT w="3556" cap="flat" cmpd="sng" algn="ctr">
-                      <a:solidFill>
-                        <a:srgbClr val="000000"/>
-                      </a:solidFill>
-                      <a:prstDash val="solid"/>
-                      <a:round/>
-                      <a:headEnd w="med" len="med"/>
-                      <a:tailEnd w="med" len="med"/>
-                    </a:lnT>
-                    <a:lnB w="3556" cap="flat" cmpd="sng" algn="ctr">
-                      <a:solidFill>
-                        <a:srgbClr val="000000"/>
-                      </a:solidFill>
-                      <a:prstDash val="solid"/>
-                      <a:round/>
-                      <a:headEnd w="med" len="med"/>
-                      <a:tailEnd w="med" len="med"/>
-                    </a:lnB>
-                  </a:tcPr>
-                </a:tc>
-                <a:tc>
-                  <a:txBody>
-                    <a:bodyPr vert="horz" lIns="91440" tIns="45720" rIns="91440" bIns="45720" anchor="ctr" anchorCtr="0"/>
-                    <a:p>
-                      <a:pPr marL="0" marR="0" indent="0" algn="ctr" latinLnBrk="0">
-                        <a:lnSpc>
-                          <a:spcPct val="130000"/>
-                        </a:lnSpc>
-                        <a:spcBef>
-                          <a:spcPts val="0"/>
-                        </a:spcBef>
-                        <a:spcAft>
-                          <a:spcPts val="0"/>
-                        </a:spcAft>
-                        <a:defRPr/>
-                      </a:pPr>
-                      <a:r>
-                        <a:rPr lang="ko-KR" altLang="en-US" sz="1800" b="0" kern="0" spc="-60">
-                          <a:solidFill>
-                            <a:srgbClr val="000000"/>
-                          </a:solidFill>
-                          <a:effectLst/>
-                          <a:latin typeface="+mj-lt"/>
-                          <a:ea typeface="함초롬바탕"/>
-                        </a:rPr>
-                        <a:t>비 고</a:t>
-                      </a:r>
-                      <a:endParaRPr lang="ko-KR" altLang="en-US" sz="1800" b="0" kern="0" spc="-60">
-                        <a:solidFill>
-                          <a:srgbClr val="000000"/>
-                        </a:solidFill>
-                        <a:effectLst/>
-                        <a:latin typeface="+mj-lt"/>
-                      </a:endParaRPr>
-                    </a:p>
-                  </a:txBody>
-                  <a:tcPr marL="91440" marR="91440" anchor="ctr">
-                    <a:lnL w="3556" cap="flat" cmpd="sng" algn="ctr">
-                      <a:solidFill>
-                        <a:srgbClr val="000000"/>
-                      </a:solidFill>
-                      <a:prstDash val="solid"/>
-                      <a:round/>
-                      <a:headEnd w="med" len="med"/>
-                      <a:tailEnd w="med" len="med"/>
-                    </a:lnL>
-                    <a:lnR w="3556" cap="flat" cmpd="sng" algn="ctr">
-                      <a:solidFill>
-                        <a:srgbClr val="000000"/>
-                      </a:solidFill>
-                      <a:prstDash val="solid"/>
-                      <a:round/>
-                      <a:headEnd w="med" len="med"/>
-                      <a:tailEnd w="med" len="med"/>
-                    </a:lnR>
-                    <a:lnT w="3556" cap="flat" cmpd="sng" algn="ctr">
-                      <a:solidFill>
-                        <a:srgbClr val="000000"/>
-                      </a:solidFill>
-                      <a:prstDash val="solid"/>
-                      <a:round/>
-                      <a:headEnd w="med" len="med"/>
-                      <a:tailEnd w="med" len="med"/>
-                    </a:lnT>
-                    <a:lnB w="3556" cap="flat" cmpd="sng" algn="ctr">
-                      <a:solidFill>
-                        <a:srgbClr val="000000"/>
-                      </a:solidFill>
-                      <a:prstDash val="solid"/>
-                      <a:round/>
-                      <a:headEnd w="med" len="med"/>
-                      <a:tailEnd w="med" len="med"/>
-                    </a:lnB>
-                  </a:tcPr>
-                </a:tc>
-              </a:tr>
-              <a:tr h="511740">
-                <a:tc vMerge="1">
-                  <a:txBody>
-                    <a:bodyPr/>
-                    <a:p>
-                      <a:pPr latinLnBrk="1">
-                        <a:defRPr/>
-                      </a:pPr>
-                      <a:endParaRPr lang="ko-KR" altLang="en-US"/>
-                    </a:p>
-                  </a:txBody>
-                  <a:tcPr marL="91440" marR="91440"/>
-                </a:tc>
-                <a:tc>
-                  <a:txBody>
-                    <a:bodyPr vert="horz" lIns="91440" tIns="45720" rIns="91440" bIns="45720" anchor="ctr" anchorCtr="0"/>
-                    <a:p>
-                      <a:pPr marL="0" marR="0" indent="0" algn="ctr" latinLnBrk="0">
-                        <a:lnSpc>
-                          <a:spcPct val="130000"/>
-                        </a:lnSpc>
-                        <a:spcBef>
-                          <a:spcPts val="0"/>
-                        </a:spcBef>
-                        <a:spcAft>
-                          <a:spcPts val="0"/>
-                        </a:spcAft>
-                        <a:defRPr/>
-                      </a:pPr>
-                      <a:r>
-                        <a:rPr lang="en-US" altLang="ko-KR" sz="1800" b="0" kern="0" spc="-60">
-                          <a:solidFill>
-                            <a:srgbClr val="000000"/>
-                          </a:solidFill>
-                          <a:effectLst/>
-                          <a:latin typeface="+mj-lt"/>
-                          <a:ea typeface="함초롬바탕"/>
-                        </a:rPr>
-                        <a:t>1</a:t>
-                      </a:r>
-                      <a:r>
-                        <a:rPr lang="ko-KR" altLang="en-US" sz="1800" b="0" kern="0" spc="-60">
-                          <a:solidFill>
-                            <a:srgbClr val="000000"/>
-                          </a:solidFill>
-                          <a:effectLst/>
-                          <a:latin typeface="+mj-lt"/>
-                          <a:ea typeface="함초롬바탕"/>
-                        </a:rPr>
-                        <a:t>주차</a:t>
-                      </a:r>
-                      <a:endParaRPr lang="ko-KR" altLang="en-US" sz="1800" b="0" kern="0" spc="-60">
-                        <a:solidFill>
-                          <a:srgbClr val="000000"/>
-                        </a:solidFill>
-                        <a:effectLst/>
-                        <a:latin typeface="+mj-lt"/>
-                      </a:endParaRPr>
-                    </a:p>
-                  </a:txBody>
-                  <a:tcPr marL="91440" marR="91440" anchor="ctr">
-                    <a:lnL w="3556" cap="flat" cmpd="sng" algn="ctr">
-                      <a:solidFill>
-                        <a:srgbClr val="000000"/>
-                      </a:solidFill>
-                      <a:prstDash val="solid"/>
-                      <a:round/>
-                      <a:headEnd w="med" len="med"/>
-                      <a:tailEnd w="med" len="med"/>
-                    </a:lnL>
-                    <a:lnR w="3556" cap="flat" cmpd="sng" algn="ctr">
-                      <a:solidFill>
-                        <a:srgbClr val="000000"/>
-                      </a:solidFill>
-                      <a:prstDash val="solid"/>
-                      <a:round/>
-                      <a:headEnd w="med" len="med"/>
-                      <a:tailEnd w="med" len="med"/>
-                    </a:lnR>
-                    <a:lnT w="3556" cap="flat" cmpd="sng" algn="ctr">
-                      <a:solidFill>
-                        <a:srgbClr val="000000"/>
-                      </a:solidFill>
-                      <a:prstDash val="solid"/>
-                      <a:round/>
-                      <a:headEnd w="med" len="med"/>
-                      <a:tailEnd w="med" len="med"/>
-                    </a:lnT>
-                    <a:lnB w="3556" cap="flat" cmpd="sng" algn="ctr">
-                      <a:solidFill>
-                        <a:srgbClr val="000000"/>
-                      </a:solidFill>
-                      <a:prstDash val="solid"/>
-                      <a:round/>
-                      <a:headEnd w="med" len="med"/>
-                      <a:tailEnd w="med" len="med"/>
-                    </a:lnB>
-                  </a:tcPr>
-                </a:tc>
-                <a:tc>
-                  <a:txBody>
-                    <a:bodyPr vert="horz" lIns="91440" tIns="45720" rIns="91440" bIns="45720" anchor="ctr" anchorCtr="0"/>
-                    <a:p>
-                      <a:pPr marL="0" marR="0" indent="0" algn="ctr" latinLnBrk="0">
-                        <a:lnSpc>
-                          <a:spcPct val="130000"/>
-                        </a:lnSpc>
-                        <a:spcBef>
-                          <a:spcPts val="0"/>
-                        </a:spcBef>
-                        <a:spcAft>
-                          <a:spcPts val="0"/>
-                        </a:spcAft>
-                        <a:defRPr/>
-                      </a:pPr>
-                      <a:r>
-                        <a:rPr lang="ko-KR" altLang="en-US" sz="1800" b="0" kern="0" spc="-60">
-                          <a:solidFill>
-                            <a:srgbClr val="000000"/>
-                          </a:solidFill>
-                          <a:effectLst/>
-                          <a:latin typeface="+mj-lt"/>
-                          <a:ea typeface="함초롬바탕"/>
-                        </a:rPr>
-                        <a:t>오리엔테이션 및 제품 아이디어</a:t>
-                      </a:r>
-                      <a:endParaRPr lang="ko-KR" altLang="en-US" sz="1800" b="0" kern="0" spc="-60">
-                        <a:solidFill>
-                          <a:srgbClr val="000000"/>
-                        </a:solidFill>
-                        <a:effectLst/>
-                        <a:latin typeface="+mj-lt"/>
-                      </a:endParaRPr>
-                    </a:p>
-                  </a:txBody>
-                  <a:tcPr marL="91440" marR="91440" anchor="ctr">
-                    <a:lnL w="3556" cap="flat" cmpd="sng" algn="ctr">
-                      <a:solidFill>
-                        <a:srgbClr val="000000"/>
-                      </a:solidFill>
-                      <a:prstDash val="solid"/>
-                      <a:round/>
-                      <a:headEnd w="med" len="med"/>
-                      <a:tailEnd w="med" len="med"/>
-                    </a:lnL>
-                    <a:lnR w="3556" cap="flat" cmpd="sng" algn="ctr">
-                      <a:solidFill>
-                        <a:srgbClr val="000000"/>
-                      </a:solidFill>
-                      <a:prstDash val="solid"/>
-                      <a:round/>
-                      <a:headEnd w="med" len="med"/>
-                      <a:tailEnd w="med" len="med"/>
-                    </a:lnR>
-                    <a:lnT w="3556" cap="flat" cmpd="sng" algn="ctr">
-                      <a:solidFill>
-                        <a:srgbClr val="000000"/>
-                      </a:solidFill>
-                      <a:prstDash val="solid"/>
-                      <a:round/>
-                      <a:headEnd w="med" len="med"/>
-                      <a:tailEnd w="med" len="med"/>
-                    </a:lnT>
-                    <a:lnB w="3556" cap="flat" cmpd="sng" algn="ctr">
-                      <a:solidFill>
-                        <a:srgbClr val="000000"/>
-                      </a:solidFill>
-                      <a:prstDash val="solid"/>
-                      <a:round/>
-                      <a:headEnd w="med" len="med"/>
-                      <a:tailEnd w="med" len="med"/>
-                    </a:lnB>
-                  </a:tcPr>
-                </a:tc>
-                <a:tc>
-                  <a:txBody>
-                    <a:bodyPr vert="horz" lIns="91440" tIns="45720" rIns="91440" bIns="45720" anchor="ctr" anchorCtr="0"/>
-                    <a:p>
-                      <a:pPr marL="0" marR="0" indent="0" algn="ctr" latinLnBrk="0">
-                        <a:lnSpc>
-                          <a:spcPct val="130000"/>
-                        </a:lnSpc>
-                        <a:spcBef>
-                          <a:spcPts val="0"/>
-                        </a:spcBef>
-                        <a:spcAft>
-                          <a:spcPts val="0"/>
-                        </a:spcAft>
-                        <a:defRPr/>
-                      </a:pPr>
-                      <a:r>
-                        <a:rPr lang="ko-KR" altLang="en-US" sz="1800" b="0" kern="0" spc="-60">
-                          <a:solidFill>
-                            <a:srgbClr val="000000"/>
-                          </a:solidFill>
-                          <a:effectLst/>
-                          <a:latin typeface="+mj-lt"/>
-                        </a:rPr>
-                        <a:t>차량 관리 </a:t>
-                      </a:r>
-                      <a:r>
-                        <a:rPr lang="en-US" altLang="ko-KR" sz="1800" b="0" kern="0" spc="-60">
-                          <a:solidFill>
-                            <a:srgbClr val="000000"/>
-                          </a:solidFill>
-                          <a:effectLst/>
-                          <a:latin typeface="+mj-lt"/>
-                        </a:rPr>
-                        <a:t>APP</a:t>
-                      </a:r>
-                      <a:endParaRPr lang="en-US" altLang="ko-KR" sz="1800" b="0" kern="0" spc="-60">
-                        <a:solidFill>
-                          <a:srgbClr val="000000"/>
-                        </a:solidFill>
-                        <a:effectLst/>
-                        <a:latin typeface="+mj-lt"/>
-                      </a:endParaRPr>
-                    </a:p>
-                  </a:txBody>
-                  <a:tcPr marL="91440" marR="91440" anchor="ctr">
-                    <a:lnL w="3556" cap="flat" cmpd="sng" algn="ctr">
-                      <a:solidFill>
-                        <a:srgbClr val="000000"/>
-                      </a:solidFill>
-                      <a:prstDash val="solid"/>
-                      <a:round/>
-                      <a:headEnd w="med" len="med"/>
-                      <a:tailEnd w="med" len="med"/>
-                    </a:lnL>
-                    <a:lnR w="3556" cap="flat" cmpd="sng" algn="ctr">
-                      <a:solidFill>
-                        <a:srgbClr val="000000"/>
-                      </a:solidFill>
-                      <a:prstDash val="solid"/>
-                      <a:round/>
-                      <a:headEnd w="med" len="med"/>
-                      <a:tailEnd w="med" len="med"/>
-                    </a:lnR>
-                    <a:lnT w="3556" cap="flat" cmpd="sng" algn="ctr">
-                      <a:solidFill>
-                        <a:srgbClr val="000000"/>
-                      </a:solidFill>
-                      <a:prstDash val="solid"/>
-                      <a:round/>
-                      <a:headEnd w="med" len="med"/>
-                      <a:tailEnd w="med" len="med"/>
-                    </a:lnT>
-                    <a:lnB w="3556" cap="flat" cmpd="sng" algn="ctr">
-                      <a:solidFill>
-                        <a:srgbClr val="000000"/>
-                      </a:solidFill>
-                      <a:prstDash val="solid"/>
-                      <a:round/>
-                      <a:headEnd w="med" len="med"/>
-                      <a:tailEnd w="med" len="med"/>
-                    </a:lnB>
-                  </a:tcPr>
-                </a:tc>
-              </a:tr>
-              <a:tr h="511740">
-                <a:tc vMerge="1">
-                  <a:txBody>
-                    <a:bodyPr/>
-                    <a:p>
-                      <a:pPr latinLnBrk="1">
-                        <a:defRPr/>
-                      </a:pPr>
-                      <a:endParaRPr lang="ko-KR" altLang="en-US"/>
-                    </a:p>
-                  </a:txBody>
-                  <a:tcPr marL="91440" marR="91440"/>
-                </a:tc>
-                <a:tc>
-                  <a:txBody>
-                    <a:bodyPr vert="horz" lIns="91440" tIns="45720" rIns="91440" bIns="45720" anchor="ctr" anchorCtr="0"/>
-                    <a:p>
-                      <a:pPr marL="0" marR="0" indent="0" algn="ctr" latinLnBrk="0">
-                        <a:lnSpc>
-                          <a:spcPct val="130000"/>
-                        </a:lnSpc>
-                        <a:spcBef>
-                          <a:spcPts val="0"/>
-                        </a:spcBef>
-                        <a:spcAft>
-                          <a:spcPts val="0"/>
-                        </a:spcAft>
-                        <a:defRPr/>
-                      </a:pPr>
-                      <a:r>
-                        <a:rPr lang="en-US" altLang="ko-KR" sz="1800" b="0" kern="0" spc="-60">
-                          <a:solidFill>
-                            <a:srgbClr val="000000"/>
-                          </a:solidFill>
-                          <a:effectLst/>
-                          <a:latin typeface="+mj-lt"/>
-                          <a:ea typeface="함초롬바탕"/>
-                        </a:rPr>
-                        <a:t>2</a:t>
-                      </a:r>
-                      <a:r>
-                        <a:rPr lang="ko-KR" altLang="en-US" sz="1800" b="0" kern="0" spc="-60">
-                          <a:solidFill>
-                            <a:srgbClr val="000000"/>
-                          </a:solidFill>
-                          <a:effectLst/>
-                          <a:latin typeface="+mj-lt"/>
-                          <a:ea typeface="함초롬바탕"/>
-                        </a:rPr>
-                        <a:t>주차</a:t>
-                      </a:r>
-                      <a:endParaRPr lang="ko-KR" altLang="en-US" sz="1800" b="0" kern="0" spc="-60">
-                        <a:solidFill>
-                          <a:srgbClr val="000000"/>
-                        </a:solidFill>
-                        <a:effectLst/>
-                        <a:latin typeface="+mj-lt"/>
-                      </a:endParaRPr>
-                    </a:p>
-                  </a:txBody>
-                  <a:tcPr marL="91440" marR="91440" anchor="ctr">
-                    <a:lnL w="3556" cap="flat" cmpd="sng" algn="ctr">
-                      <a:solidFill>
-                        <a:srgbClr val="000000"/>
-                      </a:solidFill>
-                      <a:prstDash val="solid"/>
-                      <a:round/>
-                      <a:headEnd w="med" len="med"/>
-                      <a:tailEnd w="med" len="med"/>
-                    </a:lnL>
-                    <a:lnR w="3556" cap="flat" cmpd="sng" algn="ctr">
-                      <a:solidFill>
-                        <a:srgbClr val="000000"/>
-                      </a:solidFill>
-                      <a:prstDash val="solid"/>
-                      <a:round/>
-                      <a:headEnd w="med" len="med"/>
-                      <a:tailEnd w="med" len="med"/>
-                    </a:lnR>
-                    <a:lnT w="3556" cap="flat" cmpd="sng" algn="ctr">
-                      <a:solidFill>
-                        <a:srgbClr val="000000"/>
-                      </a:solidFill>
-                      <a:prstDash val="solid"/>
-                      <a:round/>
-                      <a:headEnd w="med" len="med"/>
-                      <a:tailEnd w="med" len="med"/>
-                    </a:lnT>
-                    <a:lnB w="3556" cap="flat" cmpd="sng" algn="ctr">
-                      <a:solidFill>
-                        <a:srgbClr val="000000"/>
-                      </a:solidFill>
-                      <a:prstDash val="solid"/>
-                      <a:round/>
-                      <a:headEnd w="med" len="med"/>
-                      <a:tailEnd w="med" len="med"/>
-                    </a:lnB>
-                  </a:tcPr>
-                </a:tc>
-                <a:tc>
-                  <a:txBody>
-                    <a:bodyPr vert="horz" lIns="91440" tIns="45720" rIns="91440" bIns="45720" anchor="ctr" anchorCtr="0"/>
-                    <a:p>
-                      <a:pPr marL="0" marR="0" indent="0" algn="ctr" latinLnBrk="0">
-                        <a:lnSpc>
-                          <a:spcPct val="130000"/>
-                        </a:lnSpc>
-                        <a:spcBef>
-                          <a:spcPts val="0"/>
-                        </a:spcBef>
-                        <a:spcAft>
-                          <a:spcPts val="0"/>
-                        </a:spcAft>
-                        <a:defRPr/>
-                      </a:pPr>
-                      <a:r>
-                        <a:rPr lang="ko-KR" altLang="en-US" sz="1800" b="0" kern="0" spc="-60">
-                          <a:solidFill>
-                            <a:srgbClr val="000000"/>
-                          </a:solidFill>
-                          <a:effectLst/>
-                          <a:latin typeface="+mj-lt"/>
-                          <a:ea typeface="함초롬바탕"/>
-                        </a:rPr>
-                        <a:t>계획 및 일정 수립</a:t>
-                      </a:r>
-                      <a:endParaRPr lang="ko-KR" altLang="en-US" sz="1800" b="0" kern="0" spc="-60">
-                        <a:solidFill>
-                          <a:srgbClr val="000000"/>
-                        </a:solidFill>
-                        <a:effectLst/>
-                        <a:latin typeface="+mj-lt"/>
-                      </a:endParaRPr>
-                    </a:p>
-                  </a:txBody>
-                  <a:tcPr marL="91440" marR="91440" anchor="ctr">
-                    <a:lnL w="3556" cap="flat" cmpd="sng" algn="ctr">
-                      <a:solidFill>
-                        <a:srgbClr val="000000"/>
-                      </a:solidFill>
-                      <a:prstDash val="solid"/>
-                      <a:round/>
-                      <a:headEnd w="med" len="med"/>
-                      <a:tailEnd w="med" len="med"/>
-                    </a:lnL>
-                    <a:lnR w="3556" cap="flat" cmpd="sng" algn="ctr">
-                      <a:solidFill>
-                        <a:srgbClr val="000000"/>
-                      </a:solidFill>
-                      <a:prstDash val="solid"/>
-                      <a:round/>
-                      <a:headEnd w="med" len="med"/>
-                      <a:tailEnd w="med" len="med"/>
-                    </a:lnR>
-                    <a:lnT w="3556" cap="flat" cmpd="sng" algn="ctr">
-                      <a:solidFill>
-                        <a:srgbClr val="000000"/>
-                      </a:solidFill>
-                      <a:prstDash val="solid"/>
-                      <a:round/>
-                      <a:headEnd w="med" len="med"/>
-                      <a:tailEnd w="med" len="med"/>
-                    </a:lnT>
-                    <a:lnB w="3556" cap="flat" cmpd="sng" algn="ctr">
-                      <a:solidFill>
-                        <a:srgbClr val="000000"/>
-                      </a:solidFill>
-                      <a:prstDash val="solid"/>
-                      <a:round/>
-                      <a:headEnd w="med" len="med"/>
-                      <a:tailEnd w="med" len="med"/>
-                    </a:lnB>
-                  </a:tcPr>
-                </a:tc>
-                <a:tc>
-                  <a:txBody>
-                    <a:bodyPr vert="horz" lIns="91440" tIns="45720" rIns="91440" bIns="45720" anchor="ctr" anchorCtr="0"/>
-                    <a:p>
-                      <a:pPr marL="0" marR="0" indent="0" algn="ctr" latinLnBrk="0">
-                        <a:lnSpc>
-                          <a:spcPct val="130000"/>
-                        </a:lnSpc>
-                        <a:spcBef>
-                          <a:spcPts val="0"/>
-                        </a:spcBef>
-                        <a:spcAft>
-                          <a:spcPts val="0"/>
-                        </a:spcAft>
-                        <a:defRPr/>
-                      </a:pPr>
-                      <a:r>
-                        <a:rPr lang="ko-KR" altLang="en-US" sz="1800" b="0" kern="0" spc="-60">
-                          <a:solidFill>
-                            <a:srgbClr val="000000"/>
-                          </a:solidFill>
-                          <a:effectLst/>
-                          <a:latin typeface="+mj-lt"/>
-                        </a:rPr>
-                        <a:t>요구사항 정의 및 문서화</a:t>
-                      </a:r>
-                      <a:endParaRPr lang="ko-KR" altLang="en-US" sz="1800" b="0" kern="0" spc="-60">
-                        <a:solidFill>
-                          <a:srgbClr val="000000"/>
-                        </a:solidFill>
-                        <a:effectLst/>
-                        <a:latin typeface="+mj-lt"/>
-                      </a:endParaRPr>
-                    </a:p>
-                  </a:txBody>
-                  <a:tcPr marL="91440" marR="91440" anchor="ctr">
-                    <a:lnL w="3556" cap="flat" cmpd="sng" algn="ctr">
-                      <a:solidFill>
-                        <a:srgbClr val="000000"/>
-                      </a:solidFill>
-                      <a:prstDash val="solid"/>
-                      <a:round/>
-                      <a:headEnd w="med" len="med"/>
-                      <a:tailEnd w="med" len="med"/>
-                    </a:lnL>
-                    <a:lnR w="3556" cap="flat" cmpd="sng" algn="ctr">
-                      <a:solidFill>
-                        <a:srgbClr val="000000"/>
-                      </a:solidFill>
-                      <a:prstDash val="solid"/>
-                      <a:round/>
-                      <a:headEnd w="med" len="med"/>
-                      <a:tailEnd w="med" len="med"/>
-                    </a:lnR>
-                    <a:lnT w="3556" cap="flat" cmpd="sng" algn="ctr">
-                      <a:solidFill>
-                        <a:srgbClr val="000000"/>
-                      </a:solidFill>
-                      <a:prstDash val="solid"/>
-                      <a:round/>
-                      <a:headEnd w="med" len="med"/>
-                      <a:tailEnd w="med" len="med"/>
-                    </a:lnT>
-                    <a:lnB w="3556" cap="flat" cmpd="sng" algn="ctr">
-                      <a:solidFill>
-                        <a:srgbClr val="000000"/>
-                      </a:solidFill>
-                      <a:prstDash val="solid"/>
-                      <a:round/>
-                      <a:headEnd w="med" len="med"/>
-                      <a:tailEnd w="med" len="med"/>
-                    </a:lnB>
-                  </a:tcPr>
-                </a:tc>
-              </a:tr>
-              <a:tr h="511740">
-                <a:tc vMerge="1">
-                  <a:txBody>
-                    <a:bodyPr/>
-                    <a:p>
-                      <a:pPr latinLnBrk="1">
-                        <a:defRPr/>
-                      </a:pPr>
-                      <a:endParaRPr lang="ko-KR" altLang="en-US"/>
-                    </a:p>
-                  </a:txBody>
-                  <a:tcPr marL="91440" marR="91440"/>
-                </a:tc>
-                <a:tc>
-                  <a:txBody>
-                    <a:bodyPr vert="horz" lIns="91440" tIns="45720" rIns="91440" bIns="45720" anchor="ctr" anchorCtr="0"/>
-                    <a:p>
-                      <a:pPr marL="0" marR="0" indent="0" algn="ctr" latinLnBrk="0">
-                        <a:lnSpc>
-                          <a:spcPct val="130000"/>
-                        </a:lnSpc>
-                        <a:spcBef>
-                          <a:spcPts val="0"/>
-                        </a:spcBef>
-                        <a:spcAft>
-                          <a:spcPts val="0"/>
-                        </a:spcAft>
-                        <a:defRPr/>
-                      </a:pPr>
-                      <a:r>
-                        <a:rPr lang="en-US" altLang="ko-KR" sz="1800" b="0" kern="0" spc="-60">
-                          <a:solidFill>
-                            <a:srgbClr val="000000"/>
-                          </a:solidFill>
-                          <a:effectLst/>
-                          <a:latin typeface="+mj-lt"/>
-                          <a:ea typeface="함초롬바탕"/>
-                        </a:rPr>
-                        <a:t>3</a:t>
-                      </a:r>
-                      <a:r>
-                        <a:rPr lang="ko-KR" altLang="en-US" sz="1800" b="0" kern="0" spc="-60">
-                          <a:solidFill>
-                            <a:srgbClr val="000000"/>
-                          </a:solidFill>
-                          <a:effectLst/>
-                          <a:latin typeface="+mj-lt"/>
-                          <a:ea typeface="함초롬바탕"/>
-                        </a:rPr>
-                        <a:t>주차</a:t>
-                      </a:r>
-                      <a:endParaRPr lang="ko-KR" altLang="en-US" sz="1800" b="0" kern="0" spc="-60">
-                        <a:solidFill>
-                          <a:srgbClr val="000000"/>
-                        </a:solidFill>
-                        <a:effectLst/>
-                        <a:latin typeface="+mj-lt"/>
-                      </a:endParaRPr>
-                    </a:p>
-                  </a:txBody>
-                  <a:tcPr marL="91440" marR="91440" anchor="ctr">
-                    <a:lnL w="3556" cap="flat" cmpd="sng" algn="ctr">
-                      <a:solidFill>
-                        <a:srgbClr val="000000"/>
-                      </a:solidFill>
-                      <a:prstDash val="solid"/>
-                      <a:round/>
-                      <a:headEnd w="med" len="med"/>
-                      <a:tailEnd w="med" len="med"/>
-                    </a:lnL>
-                    <a:lnR w="3556" cap="flat" cmpd="sng" algn="ctr">
-                      <a:solidFill>
-                        <a:srgbClr val="000000"/>
-                      </a:solidFill>
-                      <a:prstDash val="solid"/>
-                      <a:round/>
-                      <a:headEnd w="med" len="med"/>
-                      <a:tailEnd w="med" len="med"/>
-                    </a:lnR>
-                    <a:lnT w="3556" cap="flat" cmpd="sng" algn="ctr">
-                      <a:solidFill>
-                        <a:srgbClr val="000000"/>
-                      </a:solidFill>
-                      <a:prstDash val="solid"/>
-                      <a:round/>
-                      <a:headEnd w="med" len="med"/>
-                      <a:tailEnd w="med" len="med"/>
-                    </a:lnT>
-                    <a:lnB w="3556" cap="flat" cmpd="sng" algn="ctr">
-                      <a:solidFill>
-                        <a:srgbClr val="000000"/>
-                      </a:solidFill>
-                      <a:prstDash val="solid"/>
-                      <a:round/>
-                      <a:headEnd w="med" len="med"/>
-                      <a:tailEnd w="med" len="med"/>
-                    </a:lnB>
-                  </a:tcPr>
-                </a:tc>
-                <a:tc>
-                  <a:txBody>
-                    <a:bodyPr vert="horz" lIns="91440" tIns="45720" rIns="91440" bIns="45720" anchor="ctr" anchorCtr="0"/>
-                    <a:p>
-                      <a:pPr marL="0" marR="0" indent="0" algn="ctr" latinLnBrk="0">
-                        <a:lnSpc>
-                          <a:spcPct val="130000"/>
-                        </a:lnSpc>
-                        <a:spcBef>
-                          <a:spcPts val="0"/>
-                        </a:spcBef>
-                        <a:spcAft>
-                          <a:spcPts val="0"/>
-                        </a:spcAft>
-                        <a:defRPr/>
-                      </a:pPr>
-                      <a:r>
-                        <a:rPr lang="ko-KR" altLang="en-US" sz="1800" b="0" kern="0" spc="-60">
-                          <a:solidFill>
-                            <a:srgbClr val="000000"/>
-                          </a:solidFill>
-                          <a:effectLst/>
-                          <a:latin typeface="+mj-lt"/>
-                          <a:ea typeface="함초롬바탕"/>
-                        </a:rPr>
-                        <a:t>제품 기획</a:t>
-                      </a:r>
-                      <a:endParaRPr lang="ko-KR" altLang="en-US" sz="1800" b="0" kern="0" spc="-60">
-                        <a:solidFill>
-                          <a:srgbClr val="000000"/>
-                        </a:solidFill>
-                        <a:effectLst/>
-                        <a:latin typeface="+mj-lt"/>
-                      </a:endParaRPr>
-                    </a:p>
-                  </a:txBody>
-                  <a:tcPr marL="91440" marR="91440" anchor="ctr">
-                    <a:lnL w="3556" cap="flat" cmpd="sng" algn="ctr">
-                      <a:solidFill>
-                        <a:srgbClr val="000000"/>
-                      </a:solidFill>
-                      <a:prstDash val="solid"/>
-                      <a:round/>
-                      <a:headEnd w="med" len="med"/>
-                      <a:tailEnd w="med" len="med"/>
-                    </a:lnL>
-                    <a:lnR w="3556" cap="flat" cmpd="sng" algn="ctr">
-                      <a:solidFill>
-                        <a:srgbClr val="000000"/>
-                      </a:solidFill>
-                      <a:prstDash val="solid"/>
-                      <a:round/>
-                      <a:headEnd w="med" len="med"/>
-                      <a:tailEnd w="med" len="med"/>
-                    </a:lnR>
-                    <a:lnT w="3556" cap="flat" cmpd="sng" algn="ctr">
-                      <a:solidFill>
-                        <a:srgbClr val="000000"/>
-                      </a:solidFill>
-                      <a:prstDash val="solid"/>
-                      <a:round/>
-                      <a:headEnd w="med" len="med"/>
-                      <a:tailEnd w="med" len="med"/>
-                    </a:lnT>
-                    <a:lnB w="3556" cap="flat" cmpd="sng" algn="ctr">
-                      <a:solidFill>
-                        <a:srgbClr val="000000"/>
-                      </a:solidFill>
-                      <a:prstDash val="solid"/>
-                      <a:round/>
-                      <a:headEnd w="med" len="med"/>
-                      <a:tailEnd w="med" len="med"/>
-                    </a:lnB>
-                  </a:tcPr>
-                </a:tc>
-                <a:tc>
-                  <a:txBody>
-                    <a:bodyPr vert="horz" lIns="91440" tIns="45720" rIns="91440" bIns="45720" anchor="ctr" anchorCtr="0"/>
-                    <a:p>
-                      <a:pPr marL="0" marR="0" indent="0" algn="ctr" latinLnBrk="0">
-                        <a:lnSpc>
-                          <a:spcPct val="130000"/>
-                        </a:lnSpc>
-                        <a:spcBef>
-                          <a:spcPts val="0"/>
-                        </a:spcBef>
-                        <a:spcAft>
-                          <a:spcPts val="0"/>
-                        </a:spcAft>
-                        <a:defRPr/>
-                      </a:pPr>
-                      <a:endParaRPr lang="ko-KR" altLang="en-US" sz="1800" b="0" kern="0" spc="-60">
-                        <a:solidFill>
-                          <a:srgbClr val="000000"/>
-                        </a:solidFill>
-                        <a:effectLst/>
-                        <a:latin typeface="+mj-lt"/>
-                      </a:endParaRPr>
-                    </a:p>
-                  </a:txBody>
-                  <a:tcPr marL="91440" marR="91440" anchor="ctr">
-                    <a:lnL w="3556" cap="flat" cmpd="sng" algn="ctr">
-                      <a:solidFill>
-                        <a:srgbClr val="000000"/>
-                      </a:solidFill>
-                      <a:prstDash val="solid"/>
-                      <a:round/>
-                      <a:headEnd w="med" len="med"/>
-                      <a:tailEnd w="med" len="med"/>
-                    </a:lnL>
-                    <a:lnR w="3556" cap="flat" cmpd="sng" algn="ctr">
-                      <a:solidFill>
-                        <a:srgbClr val="000000"/>
-                      </a:solidFill>
-                      <a:prstDash val="solid"/>
-                      <a:round/>
-                      <a:headEnd w="med" len="med"/>
-                      <a:tailEnd w="med" len="med"/>
-                    </a:lnR>
-                    <a:lnT w="3556" cap="flat" cmpd="sng" algn="ctr">
-                      <a:solidFill>
-                        <a:srgbClr val="000000"/>
-                      </a:solidFill>
-                      <a:prstDash val="solid"/>
-                      <a:round/>
-                      <a:headEnd w="med" len="med"/>
-                      <a:tailEnd w="med" len="med"/>
-                    </a:lnT>
-                    <a:lnB w="3556" cap="flat" cmpd="sng" algn="ctr">
-                      <a:solidFill>
-                        <a:srgbClr val="000000"/>
-                      </a:solidFill>
-                      <a:prstDash val="solid"/>
-                      <a:round/>
-                      <a:headEnd w="med" len="med"/>
-                      <a:tailEnd w="med" len="med"/>
-                    </a:lnB>
-                  </a:tcPr>
-                </a:tc>
-              </a:tr>
-              <a:tr h="511740">
-                <a:tc vMerge="1">
-                  <a:txBody>
-                    <a:bodyPr/>
-                    <a:p>
-                      <a:pPr latinLnBrk="1">
-                        <a:defRPr/>
-                      </a:pPr>
-                      <a:endParaRPr lang="ko-KR" altLang="en-US"/>
-                    </a:p>
-                  </a:txBody>
-                  <a:tcPr marL="91440" marR="91440"/>
-                </a:tc>
-                <a:tc>
-                  <a:txBody>
-                    <a:bodyPr vert="horz" lIns="91440" tIns="45720" rIns="91440" bIns="45720" anchor="ctr" anchorCtr="0"/>
-                    <a:p>
-                      <a:pPr marL="0" marR="0" indent="0" algn="ctr" latinLnBrk="0">
-                        <a:lnSpc>
-                          <a:spcPct val="130000"/>
-                        </a:lnSpc>
-                        <a:spcBef>
-                          <a:spcPts val="0"/>
-                        </a:spcBef>
-                        <a:spcAft>
-                          <a:spcPts val="0"/>
-                        </a:spcAft>
-                        <a:defRPr/>
-                      </a:pPr>
-                      <a:r>
-                        <a:rPr lang="en-US" altLang="ko-KR" sz="1800" b="0" kern="0" spc="-60">
-                          <a:solidFill>
-                            <a:srgbClr val="000000"/>
-                          </a:solidFill>
-                          <a:effectLst/>
-                          <a:latin typeface="+mj-lt"/>
-                          <a:ea typeface="함초롬바탕"/>
-                        </a:rPr>
-                        <a:t>4</a:t>
-                      </a:r>
-                      <a:r>
-                        <a:rPr lang="ko-KR" altLang="en-US" sz="1800" b="0" kern="0" spc="-60">
-                          <a:solidFill>
-                            <a:srgbClr val="000000"/>
-                          </a:solidFill>
-                          <a:effectLst/>
-                          <a:latin typeface="+mj-lt"/>
-                          <a:ea typeface="함초롬바탕"/>
-                        </a:rPr>
-                        <a:t>주차</a:t>
-                      </a:r>
-                      <a:endParaRPr lang="ko-KR" altLang="en-US" sz="1800" b="0" kern="0" spc="-60">
-                        <a:solidFill>
-                          <a:srgbClr val="000000"/>
-                        </a:solidFill>
-                        <a:effectLst/>
-                        <a:latin typeface="+mj-lt"/>
-                      </a:endParaRPr>
-                    </a:p>
-                  </a:txBody>
-                  <a:tcPr marL="91440" marR="91440" anchor="ctr">
-                    <a:lnL w="3556" cap="flat" cmpd="sng" algn="ctr">
-                      <a:solidFill>
-                        <a:srgbClr val="000000"/>
-                      </a:solidFill>
-                      <a:prstDash val="solid"/>
-                      <a:round/>
-                      <a:headEnd w="med" len="med"/>
-                      <a:tailEnd w="med" len="med"/>
-                    </a:lnL>
-                    <a:lnR w="3556" cap="flat" cmpd="sng" algn="ctr">
-                      <a:solidFill>
-                        <a:srgbClr val="000000"/>
-                      </a:solidFill>
-                      <a:prstDash val="solid"/>
-                      <a:round/>
-                      <a:headEnd w="med" len="med"/>
-                      <a:tailEnd w="med" len="med"/>
-                    </a:lnR>
-                    <a:lnT w="3556" cap="flat" cmpd="sng" algn="ctr">
-                      <a:solidFill>
-                        <a:srgbClr val="000000"/>
-                      </a:solidFill>
-                      <a:prstDash val="solid"/>
-                      <a:round/>
-                      <a:headEnd w="med" len="med"/>
-                      <a:tailEnd w="med" len="med"/>
-                    </a:lnT>
-                    <a:lnB w="3556" cap="flat" cmpd="sng" algn="ctr">
-                      <a:solidFill>
-                        <a:srgbClr val="000000"/>
-                      </a:solidFill>
-                      <a:prstDash val="solid"/>
-                      <a:round/>
-                      <a:headEnd w="med" len="med"/>
-                      <a:tailEnd w="med" len="med"/>
-                    </a:lnB>
-                  </a:tcPr>
-                </a:tc>
-                <a:tc>
-                  <a:txBody>
-                    <a:bodyPr vert="horz" lIns="91440" tIns="45720" rIns="91440" bIns="45720" anchor="ctr" anchorCtr="0"/>
-                    <a:p>
-                      <a:pPr marL="0" marR="0" indent="0" algn="ctr" latinLnBrk="0">
-                        <a:lnSpc>
-                          <a:spcPct val="130000"/>
-                        </a:lnSpc>
-                        <a:spcBef>
-                          <a:spcPts val="0"/>
-                        </a:spcBef>
-                        <a:spcAft>
-                          <a:spcPts val="0"/>
-                        </a:spcAft>
-                        <a:defRPr/>
-                      </a:pPr>
-                      <a:r>
-                        <a:rPr lang="ko-KR" altLang="en-US" sz="1800" b="0" kern="0" spc="-60">
-                          <a:solidFill>
-                            <a:srgbClr val="000000"/>
-                          </a:solidFill>
-                          <a:effectLst/>
-                          <a:latin typeface="+mj-lt"/>
-                          <a:ea typeface="함초롬바탕"/>
-                        </a:rPr>
-                        <a:t>제품 개발 기획</a:t>
-                      </a:r>
-                      <a:endParaRPr lang="ko-KR" altLang="en-US" sz="1800" b="0" kern="0" spc="-60">
-                        <a:solidFill>
-                          <a:srgbClr val="000000"/>
-                        </a:solidFill>
-                        <a:effectLst/>
-                        <a:latin typeface="+mj-lt"/>
-                      </a:endParaRPr>
-                    </a:p>
-                  </a:txBody>
-                  <a:tcPr marL="91440" marR="91440" anchor="ctr">
-                    <a:lnL w="3556" cap="flat" cmpd="sng" algn="ctr">
-                      <a:solidFill>
-                        <a:srgbClr val="000000"/>
-                      </a:solidFill>
-                      <a:prstDash val="solid"/>
-                      <a:round/>
-                      <a:headEnd w="med" len="med"/>
-                      <a:tailEnd w="med" len="med"/>
-                    </a:lnL>
-                    <a:lnR w="3556" cap="flat" cmpd="sng" algn="ctr">
-                      <a:solidFill>
-                        <a:srgbClr val="000000"/>
-                      </a:solidFill>
-                      <a:prstDash val="solid"/>
-                      <a:round/>
-                      <a:headEnd w="med" len="med"/>
-                      <a:tailEnd w="med" len="med"/>
-                    </a:lnR>
-                    <a:lnT w="3556" cap="flat" cmpd="sng" algn="ctr">
-                      <a:solidFill>
-                        <a:srgbClr val="000000"/>
-                      </a:solidFill>
-                      <a:prstDash val="solid"/>
-                      <a:round/>
-                      <a:headEnd w="med" len="med"/>
-                      <a:tailEnd w="med" len="med"/>
-                    </a:lnT>
-                    <a:lnB w="3556" cap="flat" cmpd="sng" algn="ctr">
-                      <a:solidFill>
-                        <a:srgbClr val="000000"/>
-                      </a:solidFill>
-                      <a:prstDash val="solid"/>
-                      <a:round/>
-                      <a:headEnd w="med" len="med"/>
-                      <a:tailEnd w="med" len="med"/>
-                    </a:lnB>
-                  </a:tcPr>
-                </a:tc>
-                <a:tc>
-                  <a:txBody>
-                    <a:bodyPr vert="horz" lIns="91440" tIns="45720" rIns="91440" bIns="45720" anchor="ctr" anchorCtr="0"/>
-                    <a:p>
-                      <a:pPr marL="0" marR="0" indent="0" algn="ctr" latinLnBrk="0">
-                        <a:lnSpc>
-                          <a:spcPct val="130000"/>
-                        </a:lnSpc>
-                        <a:spcBef>
-                          <a:spcPts val="0"/>
-                        </a:spcBef>
-                        <a:spcAft>
-                          <a:spcPts val="0"/>
-                        </a:spcAft>
-                        <a:defRPr/>
-                      </a:pPr>
-                      <a:endParaRPr lang="ko-KR" altLang="en-US" sz="1800" b="0" kern="0" spc="-60">
-                        <a:solidFill>
-                          <a:srgbClr val="000000"/>
-                        </a:solidFill>
-                        <a:effectLst/>
-                        <a:latin typeface="+mj-lt"/>
-                      </a:endParaRPr>
-                    </a:p>
-                  </a:txBody>
-                  <a:tcPr marL="91440" marR="91440" anchor="ctr">
-                    <a:lnL w="3556" cap="flat" cmpd="sng" algn="ctr">
-                      <a:solidFill>
-                        <a:srgbClr val="000000"/>
-                      </a:solidFill>
-                      <a:prstDash val="solid"/>
-                      <a:round/>
-                      <a:headEnd w="med" len="med"/>
-                      <a:tailEnd w="med" len="med"/>
-                    </a:lnL>
-                    <a:lnR w="3556" cap="flat" cmpd="sng" algn="ctr">
-                      <a:solidFill>
-                        <a:srgbClr val="000000"/>
-                      </a:solidFill>
-                      <a:prstDash val="solid"/>
-                      <a:round/>
-                      <a:headEnd w="med" len="med"/>
-                      <a:tailEnd w="med" len="med"/>
-                    </a:lnR>
-                    <a:lnT w="3556" cap="flat" cmpd="sng" algn="ctr">
-                      <a:solidFill>
-                        <a:srgbClr val="000000"/>
-                      </a:solidFill>
-                      <a:prstDash val="solid"/>
-                      <a:round/>
-                      <a:headEnd w="med" len="med"/>
-                      <a:tailEnd w="med" len="med"/>
-                    </a:lnT>
-                    <a:lnB w="3556" cap="flat" cmpd="sng" algn="ctr">
-                      <a:solidFill>
-                        <a:srgbClr val="000000"/>
-                      </a:solidFill>
-                      <a:prstDash val="solid"/>
-                      <a:round/>
-                      <a:headEnd w="med" len="med"/>
-                      <a:tailEnd w="med" len="med"/>
-                    </a:lnB>
-                  </a:tcPr>
-                </a:tc>
-              </a:tr>
-              <a:tr h="511740">
-                <a:tc vMerge="1">
-                  <a:txBody>
-                    <a:bodyPr/>
-                    <a:p>
-                      <a:pPr latinLnBrk="1">
-                        <a:defRPr/>
-                      </a:pPr>
-                      <a:endParaRPr lang="ko-KR" altLang="en-US"/>
-                    </a:p>
-                  </a:txBody>
-                  <a:tcPr marL="91440" marR="91440"/>
-                </a:tc>
-                <a:tc>
-                  <a:txBody>
-                    <a:bodyPr vert="horz" lIns="91440" tIns="45720" rIns="91440" bIns="45720" anchor="ctr" anchorCtr="0"/>
-                    <a:p>
-                      <a:pPr marL="0" marR="0" indent="0" algn="ctr" latinLnBrk="0">
-                        <a:lnSpc>
-                          <a:spcPct val="130000"/>
-                        </a:lnSpc>
-                        <a:spcBef>
-                          <a:spcPts val="0"/>
-                        </a:spcBef>
-                        <a:spcAft>
-                          <a:spcPts val="0"/>
-                        </a:spcAft>
-                        <a:defRPr/>
-                      </a:pPr>
-                      <a:r>
-                        <a:rPr lang="en-US" altLang="ko-KR" sz="1800" b="0" kern="0" spc="-60">
-                          <a:solidFill>
-                            <a:srgbClr val="000000"/>
-                          </a:solidFill>
-                          <a:effectLst/>
-                          <a:latin typeface="+mj-lt"/>
-                          <a:ea typeface="함초롬바탕"/>
-                        </a:rPr>
-                        <a:t>5</a:t>
-                      </a:r>
-                      <a:r>
-                        <a:rPr lang="ko-KR" altLang="en-US" sz="1800" b="0" kern="0" spc="-60">
-                          <a:solidFill>
-                            <a:srgbClr val="000000"/>
-                          </a:solidFill>
-                          <a:effectLst/>
-                          <a:latin typeface="+mj-lt"/>
-                          <a:ea typeface="함초롬바탕"/>
-                        </a:rPr>
-                        <a:t>주차</a:t>
-                      </a:r>
-                      <a:endParaRPr lang="ko-KR" altLang="en-US" sz="1800" b="0" kern="0" spc="-60">
-                        <a:solidFill>
-                          <a:srgbClr val="000000"/>
-                        </a:solidFill>
-                        <a:effectLst/>
-                        <a:latin typeface="+mj-lt"/>
-                      </a:endParaRPr>
-                    </a:p>
-                  </a:txBody>
-                  <a:tcPr marL="91440" marR="91440" anchor="ctr">
-                    <a:lnL w="3556" cap="flat" cmpd="sng" algn="ctr">
-                      <a:solidFill>
-                        <a:srgbClr val="000000"/>
-                      </a:solidFill>
-                      <a:prstDash val="solid"/>
-                      <a:round/>
-                      <a:headEnd w="med" len="med"/>
-                      <a:tailEnd w="med" len="med"/>
-                    </a:lnL>
-                    <a:lnR w="3556" cap="flat" cmpd="sng" algn="ctr">
-                      <a:solidFill>
-                        <a:srgbClr val="000000"/>
-                      </a:solidFill>
-                      <a:prstDash val="solid"/>
-                      <a:round/>
-                      <a:headEnd w="med" len="med"/>
-                      <a:tailEnd w="med" len="med"/>
-                    </a:lnR>
-                    <a:lnT w="3556" cap="flat" cmpd="sng" algn="ctr">
-                      <a:solidFill>
-                        <a:srgbClr val="000000"/>
-                      </a:solidFill>
-                      <a:prstDash val="solid"/>
-                      <a:round/>
-                      <a:headEnd w="med" len="med"/>
-                      <a:tailEnd w="med" len="med"/>
-                    </a:lnT>
-                    <a:lnB w="3556" cap="flat" cmpd="sng" algn="ctr">
-                      <a:solidFill>
-                        <a:srgbClr val="000000"/>
-                      </a:solidFill>
-                      <a:prstDash val="solid"/>
-                      <a:round/>
-                      <a:headEnd w="med" len="med"/>
-                      <a:tailEnd w="med" len="med"/>
-                    </a:lnB>
-                  </a:tcPr>
-                </a:tc>
-                <a:tc>
-                  <a:txBody>
-                    <a:bodyPr vert="horz" lIns="91440" tIns="45720" rIns="91440" bIns="45720" anchor="ctr" anchorCtr="0"/>
-                    <a:p>
-                      <a:pPr marL="0" marR="0" indent="0" algn="ctr" latinLnBrk="0">
-                        <a:lnSpc>
-                          <a:spcPct val="130000"/>
-                        </a:lnSpc>
-                        <a:spcBef>
-                          <a:spcPts val="0"/>
-                        </a:spcBef>
-                        <a:spcAft>
-                          <a:spcPts val="0"/>
-                        </a:spcAft>
-                        <a:defRPr/>
-                      </a:pPr>
-                      <a:r>
-                        <a:rPr lang="ko-KR" altLang="en-US" sz="1800" b="0" kern="0" spc="-60">
-                          <a:solidFill>
-                            <a:srgbClr val="000000"/>
-                          </a:solidFill>
-                          <a:effectLst/>
-                          <a:latin typeface="+mj-lt"/>
-                          <a:ea typeface="함초롬바탕"/>
-                        </a:rPr>
-                        <a:t>제품 개발 설계</a:t>
-                      </a:r>
-                      <a:endParaRPr lang="ko-KR" altLang="en-US" sz="1800" b="0" kern="0" spc="-60">
-                        <a:solidFill>
-                          <a:srgbClr val="000000"/>
-                        </a:solidFill>
-                        <a:effectLst/>
-                        <a:latin typeface="+mj-lt"/>
-                      </a:endParaRPr>
-                    </a:p>
-                  </a:txBody>
-                  <a:tcPr marL="91440" marR="91440" anchor="ctr">
-                    <a:lnL w="3556" cap="flat" cmpd="sng" algn="ctr">
-                      <a:solidFill>
-                        <a:srgbClr val="000000"/>
-                      </a:solidFill>
-                      <a:prstDash val="solid"/>
-                      <a:round/>
-                      <a:headEnd w="med" len="med"/>
-                      <a:tailEnd w="med" len="med"/>
-                    </a:lnL>
-                    <a:lnR w="3556" cap="flat" cmpd="sng" algn="ctr">
-                      <a:solidFill>
-                        <a:srgbClr val="000000"/>
-                      </a:solidFill>
-                      <a:prstDash val="solid"/>
-                      <a:round/>
-                      <a:headEnd w="med" len="med"/>
-                      <a:tailEnd w="med" len="med"/>
-                    </a:lnR>
-                    <a:lnT w="3556" cap="flat" cmpd="sng" algn="ctr">
-                      <a:solidFill>
-                        <a:srgbClr val="000000"/>
-                      </a:solidFill>
-                      <a:prstDash val="solid"/>
-                      <a:round/>
-                      <a:headEnd w="med" len="med"/>
-                      <a:tailEnd w="med" len="med"/>
-                    </a:lnT>
-                    <a:lnB w="3556" cap="flat" cmpd="sng" algn="ctr">
-                      <a:solidFill>
-                        <a:srgbClr val="000000"/>
-                      </a:solidFill>
-                      <a:prstDash val="solid"/>
-                      <a:round/>
-                      <a:headEnd w="med" len="med"/>
-                      <a:tailEnd w="med" len="med"/>
-                    </a:lnB>
-                  </a:tcPr>
-                </a:tc>
-                <a:tc>
-                  <a:txBody>
-                    <a:bodyPr vert="horz" lIns="91440" tIns="45720" rIns="91440" bIns="45720" anchor="ctr" anchorCtr="0"/>
-                    <a:p>
-                      <a:pPr marL="0" marR="0" indent="0" algn="ctr" latinLnBrk="0">
-                        <a:lnSpc>
-                          <a:spcPct val="130000"/>
-                        </a:lnSpc>
-                        <a:spcBef>
-                          <a:spcPts val="0"/>
-                        </a:spcBef>
-                        <a:spcAft>
-                          <a:spcPts val="0"/>
-                        </a:spcAft>
-                        <a:defRPr/>
-                      </a:pPr>
-                      <a:endParaRPr lang="ko-KR" altLang="en-US" sz="1800" b="0" kern="0" spc="-60">
-                        <a:solidFill>
-                          <a:srgbClr val="000000"/>
-                        </a:solidFill>
-                        <a:effectLst/>
-                        <a:latin typeface="+mj-lt"/>
-                      </a:endParaRPr>
-                    </a:p>
-                  </a:txBody>
-                  <a:tcPr marL="91440" marR="91440" anchor="ctr">
-                    <a:lnL w="3556" cap="flat" cmpd="sng" algn="ctr">
-                      <a:solidFill>
-                        <a:srgbClr val="000000"/>
-                      </a:solidFill>
-                      <a:prstDash val="solid"/>
-                      <a:round/>
-                      <a:headEnd w="med" len="med"/>
-                      <a:tailEnd w="med" len="med"/>
-                    </a:lnL>
-                    <a:lnR w="3556" cap="flat" cmpd="sng" algn="ctr">
-                      <a:solidFill>
-                        <a:srgbClr val="000000"/>
-                      </a:solidFill>
-                      <a:prstDash val="solid"/>
-                      <a:round/>
-                      <a:headEnd w="med" len="med"/>
-                      <a:tailEnd w="med" len="med"/>
-                    </a:lnR>
-                    <a:lnT w="3556" cap="flat" cmpd="sng" algn="ctr">
-                      <a:solidFill>
-                        <a:srgbClr val="000000"/>
-                      </a:solidFill>
-                      <a:prstDash val="solid"/>
-                      <a:round/>
-                      <a:headEnd w="med" len="med"/>
-                      <a:tailEnd w="med" len="med"/>
-                    </a:lnT>
-                    <a:lnB w="3556" cap="flat" cmpd="sng" algn="ctr">
-                      <a:solidFill>
-                        <a:srgbClr val="000000"/>
-                      </a:solidFill>
-                      <a:prstDash val="solid"/>
-                      <a:round/>
-                      <a:headEnd w="med" len="med"/>
-                      <a:tailEnd w="med" len="med"/>
-                    </a:lnB>
-                  </a:tcPr>
-                </a:tc>
-              </a:tr>
-              <a:tr h="511740">
-                <a:tc vMerge="1">
-                  <a:txBody>
-                    <a:bodyPr/>
-                    <a:p>
-                      <a:pPr latinLnBrk="1">
-                        <a:defRPr/>
-                      </a:pPr>
-                      <a:endParaRPr lang="ko-KR" altLang="en-US"/>
-                    </a:p>
-                  </a:txBody>
-                  <a:tcPr marL="91440" marR="91440"/>
-                </a:tc>
-                <a:tc>
-                  <a:txBody>
-                    <a:bodyPr vert="horz" lIns="91440" tIns="45720" rIns="91440" bIns="45720" anchor="ctr" anchorCtr="0"/>
-                    <a:p>
-                      <a:pPr marL="0" marR="0" indent="0" algn="ctr" latinLnBrk="0">
-                        <a:lnSpc>
-                          <a:spcPct val="130000"/>
-                        </a:lnSpc>
-                        <a:spcBef>
-                          <a:spcPts val="0"/>
-                        </a:spcBef>
-                        <a:spcAft>
-                          <a:spcPts val="0"/>
-                        </a:spcAft>
-                        <a:defRPr/>
-                      </a:pPr>
-                      <a:r>
-                        <a:rPr lang="en-US" altLang="ko-KR" sz="1800" b="0" kern="0" spc="-60">
-                          <a:solidFill>
-                            <a:srgbClr val="000000"/>
-                          </a:solidFill>
-                          <a:effectLst/>
-                          <a:latin typeface="+mj-lt"/>
-                          <a:ea typeface="함초롬바탕"/>
-                        </a:rPr>
-                        <a:t>6</a:t>
-                      </a:r>
-                      <a:r>
-                        <a:rPr lang="ko-KR" altLang="en-US" sz="1800" b="0" kern="0" spc="-60">
-                          <a:solidFill>
-                            <a:srgbClr val="000000"/>
-                          </a:solidFill>
-                          <a:effectLst/>
-                          <a:latin typeface="+mj-lt"/>
-                          <a:ea typeface="함초롬바탕"/>
-                        </a:rPr>
-                        <a:t>주차</a:t>
-                      </a:r>
-                      <a:endParaRPr lang="ko-KR" altLang="en-US" sz="1800" b="0" kern="0" spc="-60">
-                        <a:solidFill>
-                          <a:srgbClr val="000000"/>
-                        </a:solidFill>
-                        <a:effectLst/>
-                        <a:latin typeface="+mj-lt"/>
-                      </a:endParaRPr>
-                    </a:p>
-                  </a:txBody>
-                  <a:tcPr marL="91440" marR="91440" anchor="ctr">
-                    <a:lnL w="3556" cap="flat" cmpd="sng" algn="ctr">
-                      <a:solidFill>
-                        <a:srgbClr val="000000"/>
-                      </a:solidFill>
-                      <a:prstDash val="solid"/>
-                      <a:round/>
-                      <a:headEnd w="med" len="med"/>
-                      <a:tailEnd w="med" len="med"/>
-                    </a:lnL>
-                    <a:lnR w="3556" cap="flat" cmpd="sng" algn="ctr">
-                      <a:solidFill>
-                        <a:srgbClr val="000000"/>
-                      </a:solidFill>
-                      <a:prstDash val="solid"/>
-                      <a:round/>
-                      <a:headEnd w="med" len="med"/>
-                      <a:tailEnd w="med" len="med"/>
-                    </a:lnR>
-                    <a:lnT w="3556" cap="flat" cmpd="sng" algn="ctr">
-                      <a:solidFill>
-                        <a:srgbClr val="000000"/>
-                      </a:solidFill>
-                      <a:prstDash val="solid"/>
-                      <a:round/>
-                      <a:headEnd w="med" len="med"/>
-                      <a:tailEnd w="med" len="med"/>
-                    </a:lnT>
-                    <a:lnB w="3556" cap="flat" cmpd="sng" algn="ctr">
-                      <a:solidFill>
-                        <a:srgbClr val="000000"/>
-                      </a:solidFill>
-                      <a:prstDash val="solid"/>
-                      <a:round/>
-                      <a:headEnd w="med" len="med"/>
-                      <a:tailEnd w="med" len="med"/>
-                    </a:lnB>
-                  </a:tcPr>
-                </a:tc>
-                <a:tc>
-                  <a:txBody>
-                    <a:bodyPr vert="horz" lIns="91440" tIns="45720" rIns="91440" bIns="45720" anchor="ctr" anchorCtr="0"/>
-                    <a:p>
-                      <a:pPr marL="0" marR="0" indent="0" algn="ctr" latinLnBrk="0">
-                        <a:lnSpc>
-                          <a:spcPct val="130000"/>
-                        </a:lnSpc>
-                        <a:spcBef>
-                          <a:spcPts val="0"/>
-                        </a:spcBef>
-                        <a:spcAft>
-                          <a:spcPts val="0"/>
-                        </a:spcAft>
-                        <a:defRPr/>
-                      </a:pPr>
-                      <a:r>
-                        <a:rPr lang="ko-KR" altLang="en-US" sz="1800" b="0" kern="0" spc="-60">
-                          <a:solidFill>
-                            <a:srgbClr val="000000"/>
-                          </a:solidFill>
-                          <a:effectLst/>
-                          <a:latin typeface="+mj-lt"/>
-                          <a:ea typeface="함초롬바탕"/>
-                        </a:rPr>
-                        <a:t>제품 개발 프로그래밍</a:t>
-                      </a:r>
-                      <a:endParaRPr lang="ko-KR" altLang="en-US" sz="1800" b="0" kern="0" spc="-60">
-                        <a:solidFill>
-                          <a:srgbClr val="000000"/>
-                        </a:solidFill>
-                        <a:effectLst/>
-                        <a:latin typeface="+mj-lt"/>
-                      </a:endParaRPr>
-                    </a:p>
-                  </a:txBody>
-                  <a:tcPr marL="91440" marR="91440" anchor="ctr">
-                    <a:lnL w="3556" cap="flat" cmpd="sng" algn="ctr">
-                      <a:solidFill>
-                        <a:srgbClr val="000000"/>
-                      </a:solidFill>
-                      <a:prstDash val="solid"/>
-                      <a:round/>
-                      <a:headEnd w="med" len="med"/>
-                      <a:tailEnd w="med" len="med"/>
-                    </a:lnL>
-                    <a:lnR w="3556" cap="flat" cmpd="sng" algn="ctr">
-                      <a:solidFill>
-                        <a:srgbClr val="000000"/>
-                      </a:solidFill>
-                      <a:prstDash val="solid"/>
-                      <a:round/>
-                      <a:headEnd w="med" len="med"/>
-                      <a:tailEnd w="med" len="med"/>
-                    </a:lnR>
-                    <a:lnT w="3556" cap="flat" cmpd="sng" algn="ctr">
-                      <a:solidFill>
-                        <a:srgbClr val="000000"/>
-                      </a:solidFill>
-                      <a:prstDash val="solid"/>
-                      <a:round/>
-                      <a:headEnd w="med" len="med"/>
-                      <a:tailEnd w="med" len="med"/>
-                    </a:lnT>
-                    <a:lnB w="3556" cap="flat" cmpd="sng" algn="ctr">
-                      <a:solidFill>
-                        <a:srgbClr val="000000"/>
-                      </a:solidFill>
-                      <a:prstDash val="solid"/>
-                      <a:round/>
-                      <a:headEnd w="med" len="med"/>
-                      <a:tailEnd w="med" len="med"/>
-                    </a:lnB>
-                  </a:tcPr>
-                </a:tc>
-                <a:tc>
-                  <a:txBody>
-                    <a:bodyPr vert="horz" lIns="91440" tIns="45720" rIns="91440" bIns="45720" anchor="ctr" anchorCtr="0"/>
-                    <a:p>
-                      <a:pPr marL="0" marR="0" indent="0" algn="ctr" latinLnBrk="0">
-                        <a:lnSpc>
-                          <a:spcPct val="130000"/>
-                        </a:lnSpc>
-                        <a:spcBef>
-                          <a:spcPts val="0"/>
-                        </a:spcBef>
-                        <a:spcAft>
-                          <a:spcPts val="0"/>
-                        </a:spcAft>
-                        <a:defRPr/>
-                      </a:pPr>
-                      <a:endParaRPr lang="ko-KR" altLang="en-US" sz="1800" b="0" kern="0" spc="-60">
-                        <a:solidFill>
-                          <a:srgbClr val="000000"/>
-                        </a:solidFill>
-                        <a:effectLst/>
-                        <a:latin typeface="+mj-lt"/>
-                      </a:endParaRPr>
-                    </a:p>
-                  </a:txBody>
-                  <a:tcPr marL="91440" marR="91440" anchor="ctr">
-                    <a:lnL w="3556" cap="flat" cmpd="sng" algn="ctr">
-                      <a:solidFill>
-                        <a:srgbClr val="000000"/>
-                      </a:solidFill>
-                      <a:prstDash val="solid"/>
-                      <a:round/>
-                      <a:headEnd w="med" len="med"/>
-                      <a:tailEnd w="med" len="med"/>
-                    </a:lnL>
-                    <a:lnR w="3556" cap="flat" cmpd="sng" algn="ctr">
-                      <a:solidFill>
-                        <a:srgbClr val="000000"/>
-                      </a:solidFill>
-                      <a:prstDash val="solid"/>
-                      <a:round/>
-                      <a:headEnd w="med" len="med"/>
-                      <a:tailEnd w="med" len="med"/>
-                    </a:lnR>
-                    <a:lnT w="3556" cap="flat" cmpd="sng" algn="ctr">
-                      <a:solidFill>
-                        <a:srgbClr val="000000"/>
-                      </a:solidFill>
-                      <a:prstDash val="solid"/>
-                      <a:round/>
-                      <a:headEnd w="med" len="med"/>
-                      <a:tailEnd w="med" len="med"/>
-                    </a:lnT>
-                    <a:lnB w="3556" cap="flat" cmpd="sng" algn="ctr">
-                      <a:solidFill>
-                        <a:srgbClr val="000000"/>
-                      </a:solidFill>
-                      <a:prstDash val="solid"/>
-                      <a:round/>
-                      <a:headEnd w="med" len="med"/>
-                      <a:tailEnd w="med" len="med"/>
-                    </a:lnB>
-                  </a:tcPr>
-                </a:tc>
-              </a:tr>
-              <a:tr h="511740">
-                <a:tc vMerge="1">
-                  <a:txBody>
-                    <a:bodyPr/>
-                    <a:p>
-                      <a:pPr latinLnBrk="1">
-                        <a:defRPr/>
-                      </a:pPr>
-                      <a:endParaRPr lang="ko-KR" altLang="en-US"/>
-                    </a:p>
-                  </a:txBody>
-                  <a:tcPr marL="91440" marR="91440"/>
-                </a:tc>
-                <a:tc>
-                  <a:txBody>
-                    <a:bodyPr vert="horz" lIns="91440" tIns="45720" rIns="91440" bIns="45720" anchor="ctr" anchorCtr="0"/>
-                    <a:p>
-                      <a:pPr marL="0" marR="0" indent="0" algn="ctr" latinLnBrk="0">
-                        <a:lnSpc>
-                          <a:spcPct val="130000"/>
-                        </a:lnSpc>
-                        <a:spcBef>
-                          <a:spcPts val="0"/>
-                        </a:spcBef>
-                        <a:spcAft>
-                          <a:spcPts val="0"/>
-                        </a:spcAft>
-                        <a:defRPr/>
-                      </a:pPr>
-                      <a:r>
-                        <a:rPr lang="en-US" altLang="ko-KR" sz="1800" b="0" kern="0" spc="-60">
-                          <a:solidFill>
-                            <a:srgbClr val="000000"/>
-                          </a:solidFill>
-                          <a:effectLst/>
-                          <a:latin typeface="+mj-lt"/>
-                          <a:ea typeface="함초롬바탕"/>
-                        </a:rPr>
-                        <a:t>7</a:t>
-                      </a:r>
-                      <a:r>
-                        <a:rPr lang="ko-KR" altLang="en-US" sz="1800" b="0" kern="0" spc="-60">
-                          <a:solidFill>
-                            <a:srgbClr val="000000"/>
-                          </a:solidFill>
-                          <a:effectLst/>
-                          <a:latin typeface="+mj-lt"/>
-                          <a:ea typeface="함초롬바탕"/>
-                        </a:rPr>
-                        <a:t>주차</a:t>
-                      </a:r>
-                      <a:endParaRPr lang="ko-KR" altLang="en-US" sz="1800" b="0" kern="0" spc="-60">
-                        <a:solidFill>
-                          <a:srgbClr val="000000"/>
-                        </a:solidFill>
-                        <a:effectLst/>
-                        <a:latin typeface="+mj-lt"/>
-                      </a:endParaRPr>
-                    </a:p>
-                  </a:txBody>
-                  <a:tcPr marL="91440" marR="91440" anchor="ctr">
-                    <a:lnL w="3556" cap="flat" cmpd="sng" algn="ctr">
-                      <a:solidFill>
-                        <a:srgbClr val="000000"/>
-                      </a:solidFill>
-                      <a:prstDash val="solid"/>
-                      <a:round/>
-                      <a:headEnd w="med" len="med"/>
-                      <a:tailEnd w="med" len="med"/>
-                    </a:lnL>
-                    <a:lnR w="3556" cap="flat" cmpd="sng" algn="ctr">
-                      <a:solidFill>
-                        <a:srgbClr val="000000"/>
-                      </a:solidFill>
-                      <a:prstDash val="solid"/>
-                      <a:round/>
-                      <a:headEnd w="med" len="med"/>
-                      <a:tailEnd w="med" len="med"/>
-                    </a:lnR>
-                    <a:lnT w="3556" cap="flat" cmpd="sng" algn="ctr">
-                      <a:solidFill>
-                        <a:srgbClr val="000000"/>
-                      </a:solidFill>
-                      <a:prstDash val="solid"/>
-                      <a:round/>
-                      <a:headEnd w="med" len="med"/>
-                      <a:tailEnd w="med" len="med"/>
-                    </a:lnT>
-                    <a:lnB w="3556" cap="flat" cmpd="sng" algn="ctr">
-                      <a:solidFill>
-                        <a:srgbClr val="000000"/>
-                      </a:solidFill>
-                      <a:prstDash val="solid"/>
-                      <a:round/>
-                      <a:headEnd w="med" len="med"/>
-                      <a:tailEnd w="med" len="med"/>
-                    </a:lnB>
-                  </a:tcPr>
-                </a:tc>
-                <a:tc>
-                  <a:txBody>
-                    <a:bodyPr vert="horz" lIns="91440" tIns="45720" rIns="91440" bIns="45720" anchor="ctr" anchorCtr="0"/>
-                    <a:p>
-                      <a:pPr marL="0" marR="0" indent="0" algn="ctr" latinLnBrk="0">
-                        <a:lnSpc>
-                          <a:spcPct val="130000"/>
-                        </a:lnSpc>
-                        <a:spcBef>
-                          <a:spcPts val="0"/>
-                        </a:spcBef>
-                        <a:spcAft>
-                          <a:spcPts val="0"/>
-                        </a:spcAft>
-                        <a:defRPr/>
-                      </a:pPr>
-                      <a:r>
-                        <a:rPr lang="ko-KR" altLang="en-US" sz="1800" b="0" kern="0" spc="-60">
-                          <a:solidFill>
-                            <a:srgbClr val="000000"/>
-                          </a:solidFill>
-                          <a:effectLst/>
-                          <a:latin typeface="+mj-lt"/>
-                          <a:ea typeface="함초롬바탕"/>
-                        </a:rPr>
-                        <a:t>검증 및 토의</a:t>
-                      </a:r>
-                      <a:endParaRPr lang="ko-KR" altLang="en-US" sz="1800" b="0" kern="0" spc="-60">
-                        <a:solidFill>
-                          <a:srgbClr val="000000"/>
-                        </a:solidFill>
-                        <a:effectLst/>
-                        <a:latin typeface="+mj-lt"/>
-                      </a:endParaRPr>
-                    </a:p>
-                  </a:txBody>
-                  <a:tcPr marL="91440" marR="91440" anchor="ctr">
-                    <a:lnL w="3556" cap="flat" cmpd="sng" algn="ctr">
-                      <a:solidFill>
-                        <a:srgbClr val="000000"/>
-                      </a:solidFill>
-                      <a:prstDash val="solid"/>
-                      <a:round/>
-                      <a:headEnd w="med" len="med"/>
-                      <a:tailEnd w="med" len="med"/>
-                    </a:lnL>
-                    <a:lnR w="3556" cap="flat" cmpd="sng" algn="ctr">
-                      <a:solidFill>
-                        <a:srgbClr val="000000"/>
-                      </a:solidFill>
-                      <a:prstDash val="solid"/>
-                      <a:round/>
-                      <a:headEnd w="med" len="med"/>
-                      <a:tailEnd w="med" len="med"/>
-                    </a:lnR>
-                    <a:lnT w="3556" cap="flat" cmpd="sng" algn="ctr">
-                      <a:solidFill>
-                        <a:srgbClr val="000000"/>
-                      </a:solidFill>
-                      <a:prstDash val="solid"/>
-                      <a:round/>
-                      <a:headEnd w="med" len="med"/>
-                      <a:tailEnd w="med" len="med"/>
-                    </a:lnT>
-                    <a:lnB w="3556" cap="flat" cmpd="sng" algn="ctr">
-                      <a:solidFill>
-                        <a:srgbClr val="000000"/>
-                      </a:solidFill>
-                      <a:prstDash val="solid"/>
-                      <a:round/>
-                      <a:headEnd w="med" len="med"/>
-                      <a:tailEnd w="med" len="med"/>
-                    </a:lnB>
-                  </a:tcPr>
-                </a:tc>
-                <a:tc>
-                  <a:txBody>
-                    <a:bodyPr vert="horz" lIns="91440" tIns="45720" rIns="91440" bIns="45720" anchor="ctr" anchorCtr="0"/>
-                    <a:p>
-                      <a:pPr marL="0" marR="0" indent="0" algn="ctr" latinLnBrk="0">
-                        <a:lnSpc>
-                          <a:spcPct val="130000"/>
-                        </a:lnSpc>
-                        <a:spcBef>
-                          <a:spcPts val="0"/>
-                        </a:spcBef>
-                        <a:spcAft>
-                          <a:spcPts val="0"/>
-                        </a:spcAft>
-                        <a:defRPr/>
-                      </a:pPr>
-                      <a:endParaRPr lang="ko-KR" altLang="en-US" sz="1800" b="0" kern="0" spc="-60">
-                        <a:solidFill>
-                          <a:srgbClr val="000000"/>
-                        </a:solidFill>
-                        <a:effectLst/>
-                        <a:latin typeface="+mj-lt"/>
-                      </a:endParaRPr>
-                    </a:p>
-                  </a:txBody>
-                  <a:tcPr marL="91440" marR="91440" anchor="ctr">
-                    <a:lnL w="3556" cap="flat" cmpd="sng" algn="ctr">
-                      <a:solidFill>
-                        <a:srgbClr val="000000"/>
-                      </a:solidFill>
-                      <a:prstDash val="solid"/>
-                      <a:round/>
-                      <a:headEnd w="med" len="med"/>
-                      <a:tailEnd w="med" len="med"/>
-                    </a:lnL>
-                    <a:lnR w="3556" cap="flat" cmpd="sng" algn="ctr">
-                      <a:solidFill>
-                        <a:srgbClr val="000000"/>
-                      </a:solidFill>
-                      <a:prstDash val="solid"/>
-                      <a:round/>
-                      <a:headEnd w="med" len="med"/>
-                      <a:tailEnd w="med" len="med"/>
-                    </a:lnR>
-                    <a:lnT w="3556" cap="flat" cmpd="sng" algn="ctr">
-                      <a:solidFill>
-                        <a:srgbClr val="000000"/>
-                      </a:solidFill>
-                      <a:prstDash val="solid"/>
-                      <a:round/>
-                      <a:headEnd w="med" len="med"/>
-                      <a:tailEnd w="med" len="med"/>
-                    </a:lnT>
-                    <a:lnB w="3556" cap="flat" cmpd="sng" algn="ctr">
-                      <a:solidFill>
-                        <a:srgbClr val="000000"/>
-                      </a:solidFill>
-                      <a:prstDash val="solid"/>
-                      <a:round/>
-                      <a:headEnd w="med" len="med"/>
-                      <a:tailEnd w="med" len="med"/>
-                    </a:lnB>
-                  </a:tcPr>
-                </a:tc>
-              </a:tr>
-              <a:tr h="511740">
-                <a:tc vMerge="1">
-                  <a:txBody>
-                    <a:bodyPr/>
-                    <a:p>
-                      <a:pPr latinLnBrk="1">
-                        <a:defRPr/>
-                      </a:pPr>
-                      <a:endParaRPr lang="ko-KR" altLang="en-US"/>
-                    </a:p>
-                  </a:txBody>
-                  <a:tcPr marL="91440" marR="91440"/>
-                </a:tc>
-                <a:tc>
-                  <a:txBody>
-                    <a:bodyPr vert="horz" lIns="91440" tIns="45720" rIns="91440" bIns="45720" anchor="ctr" anchorCtr="0"/>
-                    <a:p>
-                      <a:pPr marL="0" marR="0" indent="0" algn="ctr" latinLnBrk="0">
-                        <a:lnSpc>
-                          <a:spcPct val="130000"/>
-                        </a:lnSpc>
-                        <a:spcBef>
-                          <a:spcPts val="0"/>
-                        </a:spcBef>
-                        <a:spcAft>
-                          <a:spcPts val="0"/>
-                        </a:spcAft>
-                        <a:defRPr/>
-                      </a:pPr>
-                      <a:r>
-                        <a:rPr lang="en-US" altLang="ko-KR" sz="1800" b="0" kern="0" spc="-60">
-                          <a:solidFill>
-                            <a:srgbClr val="000000"/>
-                          </a:solidFill>
-                          <a:effectLst/>
-                          <a:latin typeface="+mj-lt"/>
-                          <a:ea typeface="함초롬바탕"/>
-                        </a:rPr>
-                        <a:t>8</a:t>
-                      </a:r>
-                      <a:r>
-                        <a:rPr lang="ko-KR" altLang="en-US" sz="1800" b="0" kern="0" spc="-60">
-                          <a:solidFill>
-                            <a:srgbClr val="000000"/>
-                          </a:solidFill>
-                          <a:effectLst/>
-                          <a:latin typeface="+mj-lt"/>
-                          <a:ea typeface="함초롬바탕"/>
-                        </a:rPr>
-                        <a:t>주차</a:t>
-                      </a:r>
-                      <a:endParaRPr lang="ko-KR" altLang="en-US" sz="1800" b="0" kern="0" spc="-60">
-                        <a:solidFill>
-                          <a:srgbClr val="000000"/>
-                        </a:solidFill>
-                        <a:effectLst/>
-                        <a:latin typeface="+mj-lt"/>
-                      </a:endParaRPr>
-                    </a:p>
-                  </a:txBody>
-                  <a:tcPr marL="91440" marR="91440" anchor="ctr">
-                    <a:lnL w="3556" cap="flat" cmpd="sng" algn="ctr">
-                      <a:solidFill>
-                        <a:srgbClr val="000000"/>
-                      </a:solidFill>
-                      <a:prstDash val="solid"/>
-                      <a:round/>
-                      <a:headEnd w="med" len="med"/>
-                      <a:tailEnd w="med" len="med"/>
-                    </a:lnL>
-                    <a:lnR w="3556" cap="flat" cmpd="sng" algn="ctr">
-                      <a:solidFill>
-                        <a:srgbClr val="000000"/>
-                      </a:solidFill>
-                      <a:prstDash val="solid"/>
-                      <a:round/>
-                      <a:headEnd w="med" len="med"/>
-                      <a:tailEnd w="med" len="med"/>
-                    </a:lnR>
-                    <a:lnT w="3556" cap="flat" cmpd="sng" algn="ctr">
-                      <a:solidFill>
-                        <a:srgbClr val="000000"/>
-                      </a:solidFill>
-                      <a:prstDash val="solid"/>
-                      <a:round/>
-                      <a:headEnd w="med" len="med"/>
-                      <a:tailEnd w="med" len="med"/>
-                    </a:lnT>
-                    <a:lnB w="3556" cap="flat" cmpd="sng" algn="ctr">
-                      <a:solidFill>
-                        <a:srgbClr val="000000"/>
-                      </a:solidFill>
-                      <a:prstDash val="solid"/>
-                      <a:round/>
-                      <a:headEnd w="med" len="med"/>
-                      <a:tailEnd w="med" len="med"/>
-                    </a:lnB>
-                  </a:tcPr>
-                </a:tc>
-                <a:tc>
-                  <a:txBody>
-                    <a:bodyPr vert="horz" lIns="91440" tIns="45720" rIns="91440" bIns="45720" anchor="ctr" anchorCtr="0"/>
-                    <a:p>
-                      <a:pPr marL="0" marR="0" indent="0" algn="ctr" latinLnBrk="0">
-                        <a:lnSpc>
-                          <a:spcPct val="130000"/>
-                        </a:lnSpc>
-                        <a:spcBef>
-                          <a:spcPts val="0"/>
-                        </a:spcBef>
-                        <a:spcAft>
-                          <a:spcPts val="0"/>
-                        </a:spcAft>
-                        <a:defRPr/>
-                      </a:pPr>
-                      <a:r>
-                        <a:rPr lang="ko-KR" altLang="en-US" sz="1800" b="0" kern="0" spc="-60">
-                          <a:solidFill>
-                            <a:srgbClr val="000000"/>
-                          </a:solidFill>
-                          <a:effectLst/>
-                          <a:latin typeface="+mj-lt"/>
-                          <a:ea typeface="함초롬바탕"/>
-                        </a:rPr>
-                        <a:t>실습 결과서 작성 및 토의</a:t>
-                      </a:r>
-                      <a:endParaRPr lang="ko-KR" altLang="en-US" sz="1800" b="0" kern="0" spc="-60">
-                        <a:solidFill>
-                          <a:srgbClr val="000000"/>
-                        </a:solidFill>
-                        <a:effectLst/>
-                        <a:latin typeface="+mj-lt"/>
-                      </a:endParaRPr>
-                    </a:p>
-                  </a:txBody>
-                  <a:tcPr marL="91440" marR="91440" anchor="ctr">
-                    <a:lnL w="3556" cap="flat" cmpd="sng" algn="ctr">
-                      <a:solidFill>
-                        <a:srgbClr val="000000"/>
-                      </a:solidFill>
-                      <a:prstDash val="solid"/>
-                      <a:round/>
-                      <a:headEnd w="med" len="med"/>
-                      <a:tailEnd w="med" len="med"/>
-                    </a:lnL>
-                    <a:lnR w="3556" cap="flat" cmpd="sng" algn="ctr">
-                      <a:solidFill>
-                        <a:srgbClr val="000000"/>
-                      </a:solidFill>
-                      <a:prstDash val="solid"/>
-                      <a:round/>
-                      <a:headEnd w="med" len="med"/>
-                      <a:tailEnd w="med" len="med"/>
-                    </a:lnR>
-                    <a:lnT w="3556" cap="flat" cmpd="sng" algn="ctr">
-                      <a:solidFill>
-                        <a:srgbClr val="000000"/>
-                      </a:solidFill>
-                      <a:prstDash val="solid"/>
-                      <a:round/>
-                      <a:headEnd w="med" len="med"/>
-                      <a:tailEnd w="med" len="med"/>
-                    </a:lnT>
-                    <a:lnB w="3556" cap="flat" cmpd="sng" algn="ctr">
-                      <a:solidFill>
-                        <a:srgbClr val="000000"/>
-                      </a:solidFill>
-                      <a:prstDash val="solid"/>
-                      <a:round/>
-                      <a:headEnd w="med" len="med"/>
-                      <a:tailEnd w="med" len="med"/>
-                    </a:lnB>
-                  </a:tcPr>
-                </a:tc>
-                <a:tc>
-                  <a:txBody>
-                    <a:bodyPr vert="horz" lIns="91440" tIns="45720" rIns="91440" bIns="45720" anchor="ctr" anchorCtr="0"/>
-                    <a:p>
-                      <a:pPr marL="0" marR="0" indent="0" algn="ctr" latinLnBrk="0">
-                        <a:lnSpc>
-                          <a:spcPct val="130000"/>
-                        </a:lnSpc>
-                        <a:spcBef>
-                          <a:spcPts val="0"/>
-                        </a:spcBef>
-                        <a:spcAft>
-                          <a:spcPts val="0"/>
-                        </a:spcAft>
-                        <a:defRPr/>
-                      </a:pPr>
-                      <a:endParaRPr lang="ko-KR" altLang="en-US" sz="1800" b="0" kern="0" spc="-60">
-                        <a:solidFill>
-                          <a:srgbClr val="000000"/>
-                        </a:solidFill>
-                        <a:effectLst/>
-                        <a:latin typeface="+mj-lt"/>
-                      </a:endParaRPr>
-                    </a:p>
-                  </a:txBody>
-                  <a:tcPr marL="91440" marR="91440" anchor="ctr">
-                    <a:lnL w="3556" cap="flat" cmpd="sng" algn="ctr">
-                      <a:solidFill>
-                        <a:srgbClr val="000000"/>
-                      </a:solidFill>
-                      <a:prstDash val="solid"/>
-                      <a:round/>
-                      <a:headEnd w="med" len="med"/>
-                      <a:tailEnd w="med" len="med"/>
-                    </a:lnL>
-                    <a:lnR w="3556" cap="flat" cmpd="sng" algn="ctr">
-                      <a:solidFill>
-                        <a:srgbClr val="000000"/>
-                      </a:solidFill>
-                      <a:prstDash val="solid"/>
-                      <a:round/>
-                      <a:headEnd w="med" len="med"/>
-                      <a:tailEnd w="med" len="med"/>
-                    </a:lnR>
-                    <a:lnT w="3556" cap="flat" cmpd="sng" algn="ctr">
-                      <a:solidFill>
-                        <a:srgbClr val="000000"/>
-                      </a:solidFill>
-                      <a:prstDash val="solid"/>
-                      <a:round/>
-                      <a:headEnd w="med" len="med"/>
-                      <a:tailEnd w="med" len="med"/>
-                    </a:lnT>
-                    <a:lnB w="3556" cap="flat" cmpd="sng" algn="ctr">
-                      <a:solidFill>
-                        <a:srgbClr val="000000"/>
-                      </a:solidFill>
-                      <a:prstDash val="solid"/>
-                      <a:round/>
-                      <a:headEnd w="med" len="med"/>
-                      <a:tailEnd w="med" len="med"/>
-                    </a:lnB>
-                  </a:tcPr>
-                </a:tc>
-              </a:tr>
-            </a:tbl>
-          </a:graphicData>
-        </a:graphic>
-      </p:graphicFrame>
+        </p:nvSpPr>
+        <p:spPr>
+          <a:xfrm>
+            <a:off x="0" y="0"/>
+            <a:ext cx="12192001" cy="1338109"/>
+          </a:xfrm>
+          <a:prstGeom prst="rect">
+            <a:avLst/>
+          </a:prstGeom>
+          <a:solidFill>
+            <a:schemeClr val="accent1"/>
+          </a:solidFill>
+          <a:ln>
+            <a:noFill/>
+          </a:ln>
+        </p:spPr>
+        <p:style>
+          <a:lnRef idx="2">
+            <a:schemeClr val="accent1">
+              <a:shade val="50000"/>
+            </a:schemeClr>
+          </a:lnRef>
+          <a:fillRef idx="1">
+            <a:schemeClr val="accent1"/>
+          </a:fillRef>
+          <a:effectRef idx="0">
+            <a:schemeClr val="accent1"/>
+          </a:effectRef>
+          <a:fontRef idx="minor">
+            <a:schemeClr val="lt1"/>
+          </a:fontRef>
+        </p:style>
+        <p:txBody>
+          <a:bodyPr anchor="ctr"/>
+          <a:lstStyle/>
+          <a:p>
+            <a:pPr>
+              <a:defRPr/>
+            </a:pPr>
+            <a:r>
+              <a:rPr kumimoji="1" lang="en-US" altLang="ko-KR" sz="4800"/>
+              <a:t>3.1</a:t>
+            </a:r>
+            <a:r>
+              <a:rPr kumimoji="1" lang="ko-KR" altLang="en-US" sz="4800"/>
+              <a:t> 계획 예상 일정 </a:t>
+            </a:r>
+            <a:r>
+              <a:rPr kumimoji="1" lang="en-US" altLang="ko-KR" sz="4800"/>
+              <a:t>(</a:t>
+            </a:r>
+            <a:r>
+              <a:rPr kumimoji="1" lang="ko-KR" altLang="en-US" sz="4800"/>
+              <a:t>미완</a:t>
+            </a:r>
+            <a:r>
+              <a:rPr kumimoji="1" lang="en-US" altLang="ko-KR" sz="4800"/>
+              <a:t>)</a:t>
+            </a:r>
+            <a:endParaRPr kumimoji="1" lang="en-US" altLang="ko-KR" sz="4800"/>
+          </a:p>
+        </p:txBody>
+      </p:sp>
+      <p:pic>
+        <p:nvPicPr>
+          <p:cNvPr id="4" name=""/>
+          <p:cNvPicPr>
+            <a:picLocks noChangeAspect="1"/>
+          </p:cNvPicPr>
+          <p:nvPr/>
+        </p:nvPicPr>
+        <p:blipFill rotWithShape="1">
+          <a:blip r:embed="rId2"/>
+          <a:stretch>
+            <a:fillRect/>
+          </a:stretch>
+        </p:blipFill>
+        <p:spPr>
+          <a:xfrm>
+            <a:off x="2076449" y="1352990"/>
+            <a:ext cx="8039100" cy="5303520"/>
+          </a:xfrm>
+          <a:prstGeom prst="rect">
+            <a:avLst/>
+          </a:prstGeom>
+        </p:spPr>
+      </p:pic>
     </p:spTree>
   </p:cSld>
   <p:clrMapOvr>

</xml_diff>

<commit_message>
add Requirement add Def_function
</commit_message>
<xml_diff>
--- a/2021_Summer/jp.hong/Project_BnC_jph.pptx
+++ b/2021_Summer/jp.hong/Project_BnC_jph.pptx
@@ -2,7 +2,7 @@
 <file path=ppt/presentation.xml><?xml version="1.0" encoding="utf-8"?>
 <p:presentation xmlns:r="http://schemas.openxmlformats.org/officeDocument/2006/relationships" xmlns:c="http://schemas.openxmlformats.org/drawingml/2006/chart" xmlns:a="http://schemas.openxmlformats.org/drawingml/2006/main" xmlns:dgm="http://schemas.openxmlformats.org/drawingml/2006/diagram" xmlns:dsp="http://schemas.microsoft.com/office/drawing/2008/diagram" xmlns:p="http://schemas.openxmlformats.org/presentationml/2006/main">
   <p:sldMasterIdLst>
-    <p:sldMasterId id="2147483674" r:id="rId1"/>
+    <p:sldMasterId id="2147483690" r:id="rId1"/>
   </p:sldMasterIdLst>
   <p:sldIdLst>
     <p:sldId id="261" r:id="rId2"/>
@@ -22,8 +22,8 @@
     <p:sldId id="330" r:id="rId16"/>
     <p:sldId id="331" r:id="rId17"/>
     <p:sldId id="338" r:id="rId18"/>
-    <p:sldId id="339" r:id="rId19"/>
-    <p:sldId id="323" r:id="rId20"/>
+    <p:sldId id="323" r:id="rId19"/>
+    <p:sldId id="340" r:id="rId20"/>
     <p:sldId id="324" r:id="rId21"/>
     <p:sldId id="325" r:id="rId22"/>
     <p:sldId id="326" r:id="rId23"/>
@@ -35,17 +35,18 @@
     <p:sldId id="297" r:id="rId29"/>
     <p:sldId id="290" r:id="rId30"/>
     <p:sldId id="298" r:id="rId31"/>
-    <p:sldId id="335" r:id="rId32"/>
-    <p:sldId id="336" r:id="rId33"/>
-    <p:sldId id="337" r:id="rId34"/>
-    <p:sldId id="291" r:id="rId35"/>
-    <p:sldId id="299" r:id="rId36"/>
-    <p:sldId id="292" r:id="rId37"/>
-    <p:sldId id="300" r:id="rId38"/>
-    <p:sldId id="306" r:id="rId39"/>
-    <p:sldId id="307" r:id="rId40"/>
-    <p:sldId id="294" r:id="rId41"/>
-    <p:sldId id="302" r:id="rId42"/>
+    <p:sldId id="341" r:id="rId32"/>
+    <p:sldId id="335" r:id="rId33"/>
+    <p:sldId id="336" r:id="rId34"/>
+    <p:sldId id="337" r:id="rId35"/>
+    <p:sldId id="291" r:id="rId36"/>
+    <p:sldId id="299" r:id="rId37"/>
+    <p:sldId id="292" r:id="rId38"/>
+    <p:sldId id="300" r:id="rId39"/>
+    <p:sldId id="306" r:id="rId40"/>
+    <p:sldId id="307" r:id="rId41"/>
+    <p:sldId id="294" r:id="rId42"/>
+    <p:sldId id="302" r:id="rId43"/>
   </p:sldIdLst>
   <p:sldSz cx="12192000" cy="6858000"/>
   <p:notesSz cx="7104063" cy="10234613"/>
@@ -5569,7 +5570,7 @@
             </a:r>
             <a:r>
               <a:rPr lang="ko-KR" altLang="en-US"/>
-              <a:t> 요구사항 수집 및 정의</a:t>
+              <a:t> 기능정의</a:t>
             </a:r>
             <a:endParaRPr lang="ko-KR" altLang="en-US"/>
           </a:p>
@@ -5580,6 +5581,20 @@
             <a:r>
               <a:rPr lang="en-US" altLang="ko-KR"/>
               <a:t>2-3</a:t>
+            </a:r>
+            <a:r>
+              <a:rPr lang="ko-KR" altLang="en-US"/>
+              <a:t> 요구사항 수집 및 정의</a:t>
+            </a:r>
+            <a:endParaRPr lang="ko-KR" altLang="en-US"/>
+          </a:p>
+          <a:p>
+            <a:pPr>
+              <a:defRPr/>
+            </a:pPr>
+            <a:r>
+              <a:rPr lang="en-US" altLang="ko-KR"/>
+              <a:t>2-4</a:t>
             </a:r>
             <a:r>
               <a:rPr lang="ko-KR" altLang="en-US"/>
@@ -7453,157 +7468,6 @@
 </file>
 
 <file path=ppt/slides/slide18.xml><?xml version="1.0" encoding="utf-8"?>
-<p:sld xmlns:r="http://schemas.openxmlformats.org/officeDocument/2006/relationships" xmlns:c="http://schemas.openxmlformats.org/drawingml/2006/chart" xmlns:a="http://schemas.openxmlformats.org/drawingml/2006/main" xmlns:dgm="http://schemas.openxmlformats.org/drawingml/2006/diagram" xmlns:dsp="http://schemas.microsoft.com/office/drawing/2008/diagram" xmlns:p="http://schemas.openxmlformats.org/presentationml/2006/main">
-  <p:cSld>
-    <p:spTree>
-      <p:nvGrpSpPr>
-        <p:cNvPr id="1" name=""/>
-        <p:cNvGrpSpPr/>
-        <p:nvPr/>
-      </p:nvGrpSpPr>
-      <p:grpSpPr>
-        <a:xfrm>
-          <a:off x="0" y="0"/>
-          <a:ext cx="0" cy="0"/>
-          <a:chOff x="0" y="0"/>
-          <a:chExt cx="0" cy="0"/>
-        </a:xfrm>
-      </p:grpSpPr>
-      <p:sp>
-        <p:nvSpPr>
-          <p:cNvPr id="2" name="제목 1"/>
-          <p:cNvSpPr>
-            <a:spLocks noGrp="1"/>
-          </p:cNvSpPr>
-          <p:nvPr>
-            <p:ph type="title" idx="0"/>
-          </p:nvPr>
-        </p:nvSpPr>
-        <p:spPr/>
-        <p:txBody>
-          <a:bodyPr/>
-          <a:lstStyle/>
-          <a:p>
-            <a:pPr>
-              <a:defRPr/>
-            </a:pPr>
-            <a:r>
-              <a:rPr lang="ko-KR" altLang="en-US"/>
-              <a:t/>
-            </a:r>
-            <a:endParaRPr lang="ko-KR" altLang="en-US"/>
-          </a:p>
-        </p:txBody>
-      </p:sp>
-      <p:sp>
-        <p:nvSpPr>
-          <p:cNvPr id="3" name="내용 개체 틀 2"/>
-          <p:cNvSpPr>
-            <a:spLocks noGrp="1"/>
-          </p:cNvSpPr>
-          <p:nvPr>
-            <p:ph idx="1"/>
-          </p:nvPr>
-        </p:nvSpPr>
-        <p:spPr/>
-        <p:txBody>
-          <a:bodyPr/>
-          <a:lstStyle/>
-          <a:p>
-            <a:pPr lvl="0">
-              <a:defRPr/>
-            </a:pPr>
-            <a:r>
-              <a:rPr lang="ko-KR" altLang="en-US"/>
-              <a:t>차량과 어플 블루투스 연결 어떻게 할건지</a:t>
-            </a:r>
-            <a:r>
-              <a:rPr lang="en-US" altLang="ko-KR"/>
-              <a:t>?</a:t>
-            </a:r>
-            <a:endParaRPr lang="en-US" altLang="ko-KR"/>
-          </a:p>
-          <a:p>
-            <a:pPr lvl="0">
-              <a:defRPr/>
-            </a:pPr>
-            <a:r>
-              <a:rPr lang="ko-KR" altLang="en-US"/>
-              <a:t>연결 된다면 어떻게 원하는 정보만 받을지</a:t>
-            </a:r>
-            <a:r>
-              <a:rPr lang="en-US" altLang="ko-KR"/>
-              <a:t>?</a:t>
-            </a:r>
-            <a:endParaRPr lang="en-US" altLang="ko-KR"/>
-          </a:p>
-          <a:p>
-            <a:pPr lvl="0">
-              <a:defRPr/>
-            </a:pPr>
-            <a:r>
-              <a:rPr lang="ko-KR" altLang="en-US"/>
-              <a:t>차량과 어플 블루투스 연결로 받아야 하는 정보 </a:t>
-            </a:r>
-            <a:r>
-              <a:rPr lang="en-US" altLang="ko-KR"/>
-              <a:t>:</a:t>
-            </a:r>
-            <a:r>
-              <a:rPr lang="ko-KR" altLang="en-US"/>
-              <a:t> 주행거리</a:t>
-            </a:r>
-            <a:r>
-              <a:rPr lang="en-US" altLang="ko-KR"/>
-              <a:t>,</a:t>
-            </a:r>
-            <a:r>
-              <a:rPr lang="ko-KR" altLang="en-US"/>
-              <a:t> 주유량</a:t>
-            </a:r>
-            <a:r>
-              <a:rPr lang="en-US" altLang="ko-KR"/>
-              <a:t>,</a:t>
-            </a:r>
-            <a:r>
-              <a:rPr lang="ko-KR" altLang="en-US"/>
-              <a:t> 엔진오일</a:t>
-            </a:r>
-            <a:r>
-              <a:rPr lang="en-US" altLang="ko-KR"/>
-              <a:t>,</a:t>
-            </a:r>
-            <a:r>
-              <a:rPr lang="ko-KR" altLang="en-US"/>
-              <a:t> 냉각수</a:t>
-            </a:r>
-            <a:endParaRPr lang="ko-KR" altLang="en-US"/>
-          </a:p>
-          <a:p>
-            <a:pPr lvl="0">
-              <a:defRPr/>
-            </a:pPr>
-            <a:endParaRPr lang="ko-KR" altLang="en-US"/>
-          </a:p>
-        </p:txBody>
-      </p:sp>
-    </p:spTree>
-  </p:cSld>
-  <p:clrMapOvr>
-    <a:masterClrMapping/>
-  </p:clrMapOvr>
-  <mc:AlternateContent xmlns:mc="http://schemas.openxmlformats.org/markup-compatibility/2006">
-    <mc:Choice xmlns:p14="http://schemas.microsoft.com/office/powerpoint/2010/main" Requires="p14">
-      <p:transition xmlns:mc="http://schemas.openxmlformats.org/markup-compatibility/2006" xmlns:p14="http://schemas.microsoft.com/office/powerpoint/2010/main" mc:Ignorable="p14" p14:dur="500"/>
-    </mc:Choice>
-    <mc:Fallback>
-      <p:transition/>
-    </mc:Fallback>
-  </mc:AlternateContent>
-</p:sld>
-</file>
-
-<file path=ppt/slides/slide19.xml><?xml version="1.0" encoding="utf-8"?>
 <p:sld xmlns:r="http://schemas.openxmlformats.org/officeDocument/2006/relationships" xmlns:c="http://schemas.openxmlformats.org/drawingml/2006/chart" xmlns:a="http://schemas.openxmlformats.org/drawingml/2006/main" xmlns:dgm="http://schemas.openxmlformats.org/drawingml/2006/diagram" xmlns:dsp="http://schemas.microsoft.com/office/drawing/2008/diagram" xmlns:p="http://schemas.openxmlformats.org/presentationml/2006/main">
   <p:cSld>
     <p:spTree>
@@ -8642,6 +8506,167 @@
           </a:p>
         </p:txBody>
       </p:sp>
+    </p:spTree>
+  </p:cSld>
+  <p:clrMapOvr>
+    <a:masterClrMapping/>
+  </p:clrMapOvr>
+  <mc:AlternateContent xmlns:mc="http://schemas.openxmlformats.org/markup-compatibility/2006">
+    <mc:Choice xmlns:p14="http://schemas.microsoft.com/office/powerpoint/2010/main" Requires="p14">
+      <p:transition xmlns:mc="http://schemas.openxmlformats.org/markup-compatibility/2006" xmlns:p14="http://schemas.microsoft.com/office/powerpoint/2010/main" mc:Ignorable="p14" p14:dur="500"/>
+    </mc:Choice>
+    <mc:Fallback>
+      <p:transition/>
+    </mc:Fallback>
+  </mc:AlternateContent>
+</p:sld>
+</file>
+
+<file path=ppt/slides/slide19.xml><?xml version="1.0" encoding="utf-8"?>
+<p:sld xmlns:r="http://schemas.openxmlformats.org/officeDocument/2006/relationships" xmlns:c="http://schemas.openxmlformats.org/drawingml/2006/chart" xmlns:a="http://schemas.openxmlformats.org/drawingml/2006/main" xmlns:dgm="http://schemas.openxmlformats.org/drawingml/2006/diagram" xmlns:dsp="http://schemas.microsoft.com/office/drawing/2008/diagram" xmlns:p="http://schemas.openxmlformats.org/presentationml/2006/main">
+  <p:cSld>
+    <p:spTree>
+      <p:nvGrpSpPr>
+        <p:cNvPr id="1" name=""/>
+        <p:cNvGrpSpPr/>
+        <p:nvPr/>
+      </p:nvGrpSpPr>
+      <p:grpSpPr>
+        <a:xfrm>
+          <a:off x="0" y="0"/>
+          <a:ext cx="0" cy="0"/>
+          <a:chOff x="0" y="0"/>
+          <a:chExt cx="0" cy="0"/>
+        </a:xfrm>
+      </p:grpSpPr>
+      <p:sp>
+        <p:nvSpPr>
+          <p:cNvPr id="4" name="제목 1"/>
+          <p:cNvSpPr>
+            <a:spLocks noGrp="1"/>
+          </p:cNvSpPr>
+          <p:nvPr/>
+        </p:nvSpPr>
+        <p:spPr>
+          <a:xfrm>
+            <a:off x="0" y="0"/>
+            <a:ext cx="12192000" cy="963612"/>
+          </a:xfrm>
+          <a:prstGeom prst="rect">
+            <a:avLst/>
+          </a:prstGeom>
+          <a:solidFill>
+            <a:schemeClr val="accent1"/>
+          </a:solidFill>
+        </p:spPr>
+        <p:txBody>
+          <a:bodyPr vert="horz" wrap="square" lIns="91440" tIns="45720" rIns="91440" bIns="45720" anchor="ctr">
+            <a:normAutofit/>
+          </a:bodyPr>
+          <a:p>
+            <a:pPr marL="0" indent="0" algn="l" defTabSz="914400" rtl="0" eaLnBrk="1" latinLnBrk="1" hangingPunct="1">
+              <a:lnSpc>
+                <a:spcPct val="90000"/>
+              </a:lnSpc>
+              <a:spcBef>
+                <a:spcPts val="0"/>
+              </a:spcBef>
+              <a:spcAft>
+                <a:spcPts val="0"/>
+              </a:spcAft>
+              <a:buNone/>
+              <a:defRPr/>
+            </a:pPr>
+            <a:r>
+              <a:rPr xmlns:mc="http://schemas.openxmlformats.org/markup-compatibility/2006" xmlns:hp="http://schemas.haansoft.com/office/presentation/8.0" kumimoji="0" lang="en-US" altLang="ko-KR" sz="4400" b="0" i="0" u="none" strike="noStrike" kern="1200" cap="none" spc="0" normalizeH="0" baseline="0" mc:Ignorable="hp" hp:hslEmbossed="0">
+                <a:solidFill>
+                  <a:schemeClr val="lt1"/>
+                </a:solidFill>
+                <a:latin typeface="+mj-lt"/>
+                <a:ea typeface="+mj-ea"/>
+                <a:cs typeface="+mj-cs"/>
+              </a:rPr>
+              <a:t>2-1.</a:t>
+            </a:r>
+            <a:r>
+              <a:rPr xmlns:mc="http://schemas.openxmlformats.org/markup-compatibility/2006" xmlns:hp="http://schemas.haansoft.com/office/presentation/8.0" kumimoji="0" lang="ko-KR" altLang="en-US" sz="4400" b="0" i="0" u="none" strike="noStrike" kern="1200" cap="none" spc="0" normalizeH="0" baseline="0" mc:Ignorable="hp" hp:hslEmbossed="0">
+                <a:solidFill>
+                  <a:schemeClr val="lt1"/>
+                </a:solidFill>
+                <a:latin typeface="+mj-lt"/>
+                <a:ea typeface="+mj-ea"/>
+                <a:cs typeface="+mj-cs"/>
+              </a:rPr>
+              <a:t> 경쟁 어플 기능 비교 </a:t>
+            </a:r>
+            <a:r>
+              <a:rPr xmlns:mc="http://schemas.openxmlformats.org/markup-compatibility/2006" xmlns:hp="http://schemas.haansoft.com/office/presentation/8.0" kumimoji="0" lang="en-US" altLang="ko-KR" sz="4400" b="0" i="0" u="none" strike="noStrike" kern="1200" cap="none" spc="0" normalizeH="0" baseline="0" mc:Ignorable="hp" hp:hslEmbossed="0">
+                <a:solidFill>
+                  <a:schemeClr val="lt1"/>
+                </a:solidFill>
+                <a:latin typeface="+mj-lt"/>
+                <a:ea typeface="+mj-ea"/>
+                <a:cs typeface="+mj-cs"/>
+              </a:rPr>
+              <a:t>(</a:t>
+            </a:r>
+            <a:r>
+              <a:rPr xmlns:mc="http://schemas.openxmlformats.org/markup-compatibility/2006" xmlns:hp="http://schemas.haansoft.com/office/presentation/8.0" kumimoji="0" lang="ko-KR" altLang="en-US" sz="4400" b="0" i="0" u="none" strike="noStrike" kern="1200" cap="none" spc="0" normalizeH="0" baseline="0" mc:Ignorable="hp" hp:hslEmbossed="0">
+                <a:solidFill>
+                  <a:schemeClr val="lt1"/>
+                </a:solidFill>
+                <a:latin typeface="+mj-lt"/>
+                <a:ea typeface="+mj-ea"/>
+                <a:cs typeface="+mj-cs"/>
+              </a:rPr>
+              <a:t>마이클</a:t>
+            </a:r>
+            <a:r>
+              <a:rPr xmlns:mc="http://schemas.openxmlformats.org/markup-compatibility/2006" xmlns:hp="http://schemas.haansoft.com/office/presentation/8.0" kumimoji="0" lang="en-US" altLang="ko-KR" sz="4400" b="0" i="0" u="none" strike="noStrike" kern="1200" cap="none" spc="0" normalizeH="0" baseline="0" mc:Ignorable="hp" hp:hslEmbossed="0">
+                <a:solidFill>
+                  <a:schemeClr val="lt1"/>
+                </a:solidFill>
+                <a:latin typeface="+mj-lt"/>
+                <a:ea typeface="+mj-ea"/>
+                <a:cs typeface="+mj-cs"/>
+              </a:rPr>
+              <a:t>)</a:t>
+            </a:r>
+            <a:endParaRPr xmlns:mc="http://schemas.openxmlformats.org/markup-compatibility/2006" xmlns:hp="http://schemas.haansoft.com/office/presentation/8.0" kumimoji="0" lang="en-US" altLang="ko-KR" sz="4400" b="0" i="0" u="none" strike="noStrike" kern="1200" cap="none" spc="0" normalizeH="0" baseline="0" mc:Ignorable="hp" hp:hslEmbossed="0">
+              <a:solidFill>
+                <a:schemeClr val="lt1"/>
+              </a:solidFill>
+              <a:latin typeface="+mj-lt"/>
+              <a:ea typeface="+mj-ea"/>
+              <a:cs typeface="+mj-cs"/>
+            </a:endParaRPr>
+          </a:p>
+        </p:txBody>
+      </p:sp>
+      <p:pic>
+        <p:nvPicPr>
+          <p:cNvPr id="6" name=""/>
+          <p:cNvPicPr>
+            <a:picLocks noChangeAspect="1"/>
+          </p:cNvPicPr>
+          <p:nvPr/>
+        </p:nvPicPr>
+        <p:blipFill rotWithShape="1">
+          <a:blip r:embed="rId2"/>
+          <a:stretch>
+            <a:fillRect/>
+          </a:stretch>
+        </p:blipFill>
+        <p:spPr>
+          <a:xfrm>
+            <a:off x="3801578" y="979383"/>
+            <a:ext cx="4588842" cy="5878617"/>
+          </a:xfrm>
+          <a:prstGeom prst="rect">
+            <a:avLst/>
+          </a:prstGeom>
+        </p:spPr>
+      </p:pic>
     </p:spTree>
   </p:cSld>
   <p:clrMapOvr>
@@ -11087,7 +11112,7 @@
               <a:defRPr/>
             </a:pPr>
             <a:r>
-              <a:rPr lang="ko-KR" altLang="en-US">
+              <a:rPr lang="ko-KR" altLang="en-US" b="1">
                 <a:solidFill>
                   <a:schemeClr val="dk1"/>
                 </a:solidFill>
@@ -11095,14 +11120,14 @@
               <a:t>기능적 요구사항</a:t>
             </a:r>
             <a:r>
-              <a:rPr lang="en-US" altLang="ko-KR">
+              <a:rPr lang="en-US" altLang="ko-KR" b="1">
                 <a:solidFill>
                   <a:schemeClr val="dk1"/>
                 </a:solidFill>
               </a:rPr>
               <a:t>(Functional Requirement)</a:t>
             </a:r>
-            <a:endParaRPr lang="en-US" altLang="ko-KR">
+            <a:endParaRPr lang="en-US" altLang="ko-KR" b="1">
               <a:solidFill>
                 <a:schemeClr val="dk1"/>
               </a:solidFill>
@@ -12578,6 +12603,32 @@
             <a:pPr>
               <a:defRPr/>
             </a:pPr>
+            <a:r>
+              <a:rPr lang="ko-KR" altLang="en-US" sz="2000">
+                <a:solidFill>
+                  <a:schemeClr val="dk1"/>
+                </a:solidFill>
+              </a:rPr>
+              <a:t>  └ 수정 기능을 통해 작성했던 글을 수정 할 수 있어야 한다</a:t>
+            </a:r>
+            <a:r>
+              <a:rPr lang="en-US" altLang="ko-KR" sz="2000">
+                <a:solidFill>
+                  <a:schemeClr val="dk1"/>
+                </a:solidFill>
+              </a:rPr>
+              <a:t>.</a:t>
+            </a:r>
+            <a:endParaRPr lang="ko-KR" altLang="en-US" sz="2000">
+              <a:solidFill>
+                <a:schemeClr val="dk1"/>
+              </a:solidFill>
+            </a:endParaRPr>
+          </a:p>
+          <a:p>
+            <a:pPr>
+              <a:defRPr/>
+            </a:pPr>
             <a:endParaRPr lang="ko-KR" altLang="en-US" sz="2000">
               <a:solidFill>
                 <a:schemeClr val="dk1"/>
@@ -13067,7 +13118,7 @@
               <a:defRPr/>
             </a:pPr>
             <a:r>
-              <a:rPr lang="ko-KR" altLang="en-US" sz="2000">
+              <a:rPr lang="ko-KR" altLang="en-US" sz="2000" b="1">
                 <a:solidFill>
                   <a:schemeClr val="dk1"/>
                 </a:solidFill>
@@ -13075,7 +13126,7 @@
               <a:t>비기능적 요구사항</a:t>
             </a:r>
             <a:r>
-              <a:rPr lang="en-US" altLang="ko-KR" sz="2000">
+              <a:rPr lang="en-US" altLang="ko-KR" sz="2000" b="1">
                 <a:solidFill>
                   <a:schemeClr val="dk1"/>
                 </a:solidFill>
@@ -13364,6 +13415,16 @@
               </a:rPr>
               <a:t>.</a:t>
             </a:r>
+            <a:endParaRPr lang="en-US" altLang="ko-KR" sz="2000">
+              <a:solidFill>
+                <a:schemeClr val="dk1"/>
+              </a:solidFill>
+            </a:endParaRPr>
+          </a:p>
+          <a:p>
+            <a:pPr>
+              <a:defRPr/>
+            </a:pPr>
             <a:endParaRPr lang="ko-KR" altLang="en-US" sz="2000">
               <a:solidFill>
                 <a:schemeClr val="dk1"/>
@@ -13374,6 +13435,114 @@
             <a:pPr>
               <a:defRPr/>
             </a:pPr>
+            <a:r>
+              <a:rPr lang="ko-KR" altLang="en-US" sz="2000" b="1">
+                <a:solidFill>
+                  <a:schemeClr val="dk1"/>
+                </a:solidFill>
+              </a:rPr>
+              <a:t>수익적 요소</a:t>
+            </a:r>
+            <a:endParaRPr lang="ko-KR" altLang="en-US" sz="2000">
+              <a:solidFill>
+                <a:schemeClr val="dk1"/>
+              </a:solidFill>
+            </a:endParaRPr>
+          </a:p>
+          <a:p>
+            <a:pPr>
+              <a:defRPr/>
+            </a:pPr>
+            <a:r>
+              <a:rPr lang="ko-KR" altLang="en-US" sz="2000">
+                <a:solidFill>
+                  <a:schemeClr val="dk1"/>
+                </a:solidFill>
+              </a:rPr>
+              <a:t> </a:t>
+            </a:r>
+            <a:r>
+              <a:rPr lang="en-US" altLang="ko-KR" sz="2000">
+                <a:solidFill>
+                  <a:schemeClr val="dk1"/>
+                </a:solidFill>
+              </a:rPr>
+              <a:t>-</a:t>
+            </a:r>
+            <a:r>
+              <a:rPr lang="ko-KR" altLang="en-US" sz="2000">
+                <a:solidFill>
+                  <a:schemeClr val="dk1"/>
+                </a:solidFill>
+              </a:rPr>
+              <a:t> 어플의 예약기능을 통해 예약한 경우 업체로부터 일정 수수료</a:t>
+            </a:r>
+            <a:endParaRPr lang="ko-KR" altLang="en-US" sz="2000">
+              <a:solidFill>
+                <a:schemeClr val="dk1"/>
+              </a:solidFill>
+            </a:endParaRPr>
+          </a:p>
+          <a:p>
+            <a:pPr>
+              <a:defRPr/>
+            </a:pPr>
+            <a:r>
+              <a:rPr lang="ko-KR" altLang="en-US" sz="2000">
+                <a:solidFill>
+                  <a:schemeClr val="dk1"/>
+                </a:solidFill>
+              </a:rPr>
+              <a:t> </a:t>
+            </a:r>
+            <a:r>
+              <a:rPr lang="en-US" altLang="ko-KR" sz="2000">
+                <a:solidFill>
+                  <a:schemeClr val="dk1"/>
+                </a:solidFill>
+              </a:rPr>
+              <a:t>-</a:t>
+            </a:r>
+            <a:r>
+              <a:rPr lang="ko-KR" altLang="en-US" sz="2000">
+                <a:solidFill>
+                  <a:schemeClr val="dk1"/>
+                </a:solidFill>
+              </a:rPr>
+              <a:t> 어플 내 광고 </a:t>
+            </a:r>
+            <a:r>
+              <a:rPr lang="en-US" altLang="ko-KR" sz="2000">
+                <a:solidFill>
+                  <a:schemeClr val="dk1"/>
+                </a:solidFill>
+              </a:rPr>
+              <a:t>ex)</a:t>
+            </a:r>
+            <a:r>
+              <a:rPr lang="ko-KR" altLang="en-US" sz="2000">
+                <a:solidFill>
+                  <a:schemeClr val="dk1"/>
+                </a:solidFill>
+              </a:rPr>
+              <a:t> </a:t>
+            </a:r>
+            <a:r>
+              <a:rPr lang="en-US" altLang="ko-KR" sz="2000">
+                <a:solidFill>
+                  <a:schemeClr val="dk1"/>
+                </a:solidFill>
+              </a:rPr>
+              <a:t>~~</a:t>
+            </a:r>
+            <a:r>
+              <a:rPr lang="ko-KR" altLang="en-US" sz="2000">
+                <a:solidFill>
+                  <a:schemeClr val="dk1"/>
+                </a:solidFill>
+              </a:rPr>
+              <a:t>제품 할인등에 관한 광고</a:t>
+            </a:r>
             <a:endParaRPr lang="ko-KR" altLang="en-US" sz="2000">
               <a:solidFill>
                 <a:schemeClr val="dk1"/>
@@ -13517,7 +13686,7 @@
             </a:pPr>
             <a:r>
               <a:rPr kumimoji="1" lang="en-US" altLang="ko-KR" sz="4800"/>
-              <a:t>2-3.</a:t>
+              <a:t>2-4.</a:t>
             </a:r>
             <a:r>
               <a:rPr kumimoji="1" lang="ko-KR" altLang="en-US" sz="4800"/>
@@ -13570,7 +13739,7 @@
               <a:defRPr/>
             </a:pPr>
             <a:r>
-              <a:rPr lang="ko-KR" altLang="en-US" sz="2000">
+              <a:rPr lang="ko-KR" altLang="en-US" sz="2000" b="1">
                 <a:solidFill>
                   <a:schemeClr val="dk1"/>
                 </a:solidFill>
@@ -13578,7 +13747,7 @@
               <a:t>개발에 필요한 요구사항 분석 </a:t>
             </a:r>
             <a:r>
-              <a:rPr lang="en-US" altLang="ko-KR" sz="2000">
+              <a:rPr lang="en-US" altLang="ko-KR" sz="2000" b="1">
                 <a:solidFill>
                   <a:schemeClr val="dk1"/>
                 </a:solidFill>
@@ -13586,7 +13755,7 @@
               <a:t>(</a:t>
             </a:r>
             <a:r>
-              <a:rPr lang="ko-KR" altLang="en-US" sz="2000">
+              <a:rPr lang="ko-KR" altLang="en-US" sz="2000" b="1">
                 <a:solidFill>
                   <a:schemeClr val="dk1"/>
                 </a:solidFill>
@@ -13594,14 +13763,14 @@
               <a:t>실현성 확인</a:t>
             </a:r>
             <a:r>
-              <a:rPr lang="en-US" altLang="ko-KR" sz="2000">
+              <a:rPr lang="en-US" altLang="ko-KR" sz="2000" b="1">
                 <a:solidFill>
                   <a:schemeClr val="dk1"/>
                 </a:solidFill>
               </a:rPr>
               <a:t>)</a:t>
             </a:r>
-            <a:endParaRPr lang="en-US" altLang="ko-KR" sz="2000">
+            <a:endParaRPr lang="en-US" altLang="ko-KR" sz="2000" b="1">
               <a:solidFill>
                 <a:schemeClr val="dk1"/>
               </a:solidFill>
@@ -14236,7 +14405,7 @@
             </a:pPr>
             <a:r>
               <a:rPr kumimoji="1" lang="en-US" altLang="ko-KR" sz="4800"/>
-              <a:t>2-3.</a:t>
+              <a:t>2-4.</a:t>
             </a:r>
             <a:r>
               <a:rPr kumimoji="1" lang="ko-KR" altLang="en-US" sz="4800"/>
@@ -14254,8 +14423,8 @@
         </p:nvSpPr>
         <p:spPr>
           <a:xfrm>
-            <a:off x="0" y="1773630"/>
-            <a:ext cx="12192000" cy="5074844"/>
+            <a:off x="0" y="1335480"/>
+            <a:ext cx="12192000" cy="5512994"/>
           </a:xfrm>
           <a:prstGeom prst="rect">
             <a:avLst/>
@@ -14289,7 +14458,7 @@
               <a:defRPr/>
             </a:pPr>
             <a:r>
-              <a:rPr lang="ko-KR" altLang="en-US" sz="2000">
+              <a:rPr lang="ko-KR" altLang="en-US" sz="2000" b="1">
                 <a:solidFill>
                   <a:schemeClr val="dk1"/>
                 </a:solidFill>
@@ -14297,7 +14466,7 @@
               <a:t>개발에 필요한 요구사항 분석 </a:t>
             </a:r>
             <a:r>
-              <a:rPr lang="en-US" altLang="ko-KR" sz="2000">
+              <a:rPr lang="en-US" altLang="ko-KR" sz="2000" b="1">
                 <a:solidFill>
                   <a:schemeClr val="dk1"/>
                 </a:solidFill>
@@ -14305,7 +14474,7 @@
               <a:t>(</a:t>
             </a:r>
             <a:r>
-              <a:rPr lang="ko-KR" altLang="en-US" sz="2000">
+              <a:rPr lang="ko-KR" altLang="en-US" sz="2000" b="1">
                 <a:solidFill>
                   <a:schemeClr val="dk1"/>
                 </a:solidFill>
@@ -14313,13 +14482,23 @@
               <a:t>실현성 확인</a:t>
             </a:r>
             <a:r>
-              <a:rPr lang="en-US" altLang="ko-KR" sz="2000">
+              <a:rPr lang="en-US" altLang="ko-KR" sz="2000" b="1">
                 <a:solidFill>
                   <a:schemeClr val="dk1"/>
                 </a:solidFill>
               </a:rPr>
               <a:t>)</a:t>
             </a:r>
+            <a:endParaRPr lang="en-US" altLang="ko-KR" sz="2000" b="1">
+              <a:solidFill>
+                <a:schemeClr val="dk1"/>
+              </a:solidFill>
+            </a:endParaRPr>
+          </a:p>
+          <a:p>
+            <a:pPr>
+              <a:defRPr/>
+            </a:pPr>
             <a:endParaRPr lang="en-US" altLang="ko-KR" sz="2000">
               <a:solidFill>
                 <a:schemeClr val="dk1"/>
@@ -14330,7 +14509,15 @@
             <a:pPr>
               <a:defRPr/>
             </a:pPr>
-            <a:endParaRPr lang="en-US" altLang="ko-KR" sz="2000">
+            <a:r>
+              <a:rPr lang="ko-KR" altLang="en-US" sz="2000" strike="sngStrike">
+                <a:solidFill>
+                  <a:schemeClr val="dk1"/>
+                </a:solidFill>
+              </a:rPr>
+              <a:t>차량 관련 새소식</a:t>
+            </a:r>
+            <a:endParaRPr lang="ko-KR" altLang="en-US" sz="2000" strike="sngStrike">
               <a:solidFill>
                 <a:schemeClr val="dk1"/>
               </a:solidFill>
@@ -14341,12 +14528,28 @@
               <a:defRPr/>
             </a:pPr>
             <a:r>
-              <a:rPr lang="ko-KR" altLang="en-US" sz="2000" strike="sngStrike">
-                <a:solidFill>
-                  <a:schemeClr val="dk1"/>
-                </a:solidFill>
-              </a:rPr>
-              <a:t>차량 관련 새소식</a:t>
+              <a:rPr lang="ko-KR" altLang="en-US" sz="2000">
+                <a:solidFill>
+                  <a:schemeClr val="dk1"/>
+                </a:solidFill>
+              </a:rPr>
+              <a:t> </a:t>
+            </a:r>
+            <a:r>
+              <a:rPr lang="en-US" altLang="ko-KR" sz="2000">
+                <a:solidFill>
+                  <a:schemeClr val="dk1"/>
+                </a:solidFill>
+              </a:rPr>
+              <a:t>-</a:t>
+            </a:r>
+            <a:r>
+              <a:rPr lang="ko-KR" altLang="en-US" sz="2000">
+                <a:solidFill>
+                  <a:schemeClr val="dk1"/>
+                </a:solidFill>
+              </a:rPr>
+              <a:t> 어플의 취지와 맞지 않는 의견이라 생각됨</a:t>
             </a:r>
             <a:endParaRPr lang="ko-KR" altLang="en-US" sz="2000">
               <a:solidFill>
@@ -14380,7 +14583,7 @@
                   <a:schemeClr val="dk1"/>
                 </a:solidFill>
               </a:rPr>
-              <a:t> 어플의 취지와 맞지 않는 의견이라 생각됨</a:t>
+              <a:t> 삭제 예정</a:t>
             </a:r>
             <a:endParaRPr lang="ko-KR" altLang="en-US" sz="2000">
               <a:solidFill>
@@ -14392,6 +14595,34 @@
             <a:pPr>
               <a:defRPr/>
             </a:pPr>
+            <a:endParaRPr lang="ko-KR" altLang="en-US" sz="2000">
+              <a:solidFill>
+                <a:schemeClr val="dk1"/>
+              </a:solidFill>
+            </a:endParaRPr>
+          </a:p>
+          <a:p>
+            <a:pPr>
+              <a:defRPr/>
+            </a:pPr>
+            <a:r>
+              <a:rPr lang="ko-KR" altLang="en-US" sz="2000" strike="sngStrike">
+                <a:solidFill>
+                  <a:schemeClr val="dk1"/>
+                </a:solidFill>
+              </a:rPr>
+              <a:t>채팅창</a:t>
+            </a:r>
+            <a:endParaRPr lang="ko-KR" altLang="en-US" sz="2000">
+              <a:solidFill>
+                <a:schemeClr val="dk1"/>
+              </a:solidFill>
+            </a:endParaRPr>
+          </a:p>
+          <a:p>
+            <a:pPr>
+              <a:defRPr/>
+            </a:pPr>
             <a:r>
               <a:rPr lang="ko-KR" altLang="en-US" sz="2000">
                 <a:solidFill>
@@ -14414,7 +14645,91 @@
                   <a:schemeClr val="dk1"/>
                 </a:solidFill>
               </a:rPr>
-              <a:t> 삭제 예정</a:t>
+              <a:t> 게시판과 기능 겹치는 부분이 많다고 생각됨</a:t>
+            </a:r>
+            <a:endParaRPr lang="ko-KR" altLang="en-US" sz="2000">
+              <a:solidFill>
+                <a:schemeClr val="dk1"/>
+              </a:solidFill>
+            </a:endParaRPr>
+          </a:p>
+          <a:p>
+            <a:pPr>
+              <a:defRPr/>
+            </a:pPr>
+            <a:r>
+              <a:rPr lang="ko-KR" altLang="en-US" sz="2000">
+                <a:solidFill>
+                  <a:schemeClr val="dk1"/>
+                </a:solidFill>
+              </a:rPr>
+              <a:t> </a:t>
+            </a:r>
+            <a:r>
+              <a:rPr lang="en-US" altLang="ko-KR" sz="2000">
+                <a:solidFill>
+                  <a:schemeClr val="dk1"/>
+                </a:solidFill>
+              </a:rPr>
+              <a:t>-</a:t>
+            </a:r>
+            <a:r>
+              <a:rPr lang="ko-KR" altLang="en-US" sz="2000">
+                <a:solidFill>
+                  <a:schemeClr val="dk1"/>
+                </a:solidFill>
+              </a:rPr>
+              <a:t> 게시판의 댓글을 통해 충분히 소통 가능</a:t>
+            </a:r>
+            <a:endParaRPr lang="ko-KR" altLang="en-US" sz="2000">
+              <a:solidFill>
+                <a:schemeClr val="dk1"/>
+              </a:solidFill>
+            </a:endParaRPr>
+          </a:p>
+          <a:p>
+            <a:pPr>
+              <a:defRPr/>
+            </a:pPr>
+            <a:r>
+              <a:rPr lang="ko-KR" altLang="en-US" sz="2000">
+                <a:solidFill>
+                  <a:schemeClr val="dk1"/>
+                </a:solidFill>
+              </a:rPr>
+              <a:t> </a:t>
+            </a:r>
+            <a:r>
+              <a:rPr lang="en-US" altLang="ko-KR" sz="2000">
+                <a:solidFill>
+                  <a:schemeClr val="dk1"/>
+                </a:solidFill>
+              </a:rPr>
+              <a:t>-</a:t>
+            </a:r>
+            <a:r>
+              <a:rPr lang="ko-KR" altLang="en-US" sz="2000">
+                <a:solidFill>
+                  <a:schemeClr val="dk1"/>
+                </a:solidFill>
+              </a:rPr>
+              <a:t> 채팅창이 아닌 쪽지 기능 </a:t>
+            </a:r>
+            <a:r>
+              <a:rPr lang="en-US" altLang="ko-KR" sz="2000">
+                <a:solidFill>
+                  <a:schemeClr val="dk1"/>
+                </a:solidFill>
+              </a:rPr>
+              <a:t>-</a:t>
+            </a:r>
+            <a:r>
+              <a:rPr lang="ko-KR" altLang="en-US" sz="2000">
+                <a:solidFill>
+                  <a:schemeClr val="dk1"/>
+                </a:solidFill>
+              </a:rPr>
+              <a:t> 고려해 볼 점</a:t>
             </a:r>
             <a:endParaRPr lang="ko-KR" altLang="en-US" sz="2000">
               <a:solidFill>
@@ -14617,7 +14932,7 @@
 </file>
 
 <file path=ppt/slides/slide27.xml><?xml version="1.0" encoding="utf-8"?>
-<p:sld xmlns:a="http://schemas.openxmlformats.org/drawingml/2006/main" xmlns:r="http://schemas.openxmlformats.org/officeDocument/2006/relationships" xmlns:p="http://schemas.openxmlformats.org/presentationml/2006/main">
+<p:sld xmlns:r="http://schemas.openxmlformats.org/officeDocument/2006/relationships" xmlns:c="http://schemas.openxmlformats.org/drawingml/2006/chart" xmlns:a="http://schemas.openxmlformats.org/drawingml/2006/main" xmlns:dgm="http://schemas.openxmlformats.org/drawingml/2006/diagram" xmlns:dsp="http://schemas.microsoft.com/office/drawing/2008/diagram" xmlns:p="http://schemas.openxmlformats.org/presentationml/2006/main">
   <p:cSld>
     <p:spTree>
       <p:nvGrpSpPr>
@@ -14673,20 +14988,20 @@
           </a:fontRef>
         </p:style>
         <p:txBody>
-          <a:bodyPr rtlCol="0" anchor="ctr"/>
+          <a:bodyPr anchor="ctr"/>
           <a:lstStyle/>
           <a:p>
-            <a:pPr algn="ctr"/>
-            <a:endParaRPr kumimoji="1" lang="ko-KR" altLang="en-US" dirty="0"/>
+            <a:pPr algn="ctr">
+              <a:defRPr/>
+            </a:pPr>
+            <a:endParaRPr kumimoji="1" lang="ko-KR" altLang="en-US"/>
           </a:p>
         </p:txBody>
       </p:sp>
       <p:sp>
         <p:nvSpPr>
           <p:cNvPr id="12" name="부제목 2"/>
-          <p:cNvSpPr txBox="1">
-            <a:spLocks/>
-          </p:cNvSpPr>
+          <p:cNvSpPr txBox="1"/>
           <p:nvPr/>
         </p:nvSpPr>
         <p:spPr>
@@ -14699,7 +15014,7 @@
           </a:prstGeom>
         </p:spPr>
         <p:txBody>
-          <a:bodyPr vert="horz" lIns="91440" tIns="45720" rIns="91440" bIns="45720" rtlCol="0" anchor="ctr">
+          <a:bodyPr vert="horz" lIns="91440" tIns="45720" rIns="91440" bIns="45720" anchor="ctr">
             <a:noAutofit/>
           </a:bodyPr>
           <a:lstStyle>
@@ -14867,30 +15182,44 @@
             </a:lvl9pPr>
           </a:lstStyle>
           <a:p>
-            <a:r>
-              <a:rPr lang="ko-KR" altLang="en-US" sz="4800" dirty="0">
+            <a:pPr lvl="0">
+              <a:defRPr/>
+            </a:pPr>
+            <a:r>
+              <a:rPr lang="ko-KR" altLang="en-US" sz="4800">
                 <a:solidFill>
                   <a:schemeClr val="bg1"/>
                 </a:solidFill>
                 <a:latin typeface="+mj-lt"/>
-                <a:ea typeface="맑은 고딕" charset="-127"/>
-                <a:cs typeface="맑은 고딕" charset="-127"/>
+                <a:ea typeface="맑은 고딕"/>
+                <a:cs typeface="맑은 고딕"/>
               </a:rPr>
               <a:t>계획 및 일정 수립</a:t>
             </a:r>
+            <a:endParaRPr lang="ko-KR" altLang="en-US" sz="4800">
+              <a:solidFill>
+                <a:schemeClr val="bg1"/>
+              </a:solidFill>
+              <a:latin typeface="+mj-lt"/>
+              <a:ea typeface="맑은 고딕"/>
+              <a:cs typeface="맑은 고딕"/>
+            </a:endParaRPr>
           </a:p>
         </p:txBody>
       </p:sp>
     </p:spTree>
-    <p:extLst>
-      <p:ext uri="{BB962C8B-B14F-4D97-AF65-F5344CB8AC3E}">
-        <p14:creationId xmlns:p14="http://schemas.microsoft.com/office/powerpoint/2010/main" val="641642769"/>
-      </p:ext>
-    </p:extLst>
   </p:cSld>
   <p:clrMapOvr>
     <a:masterClrMapping/>
   </p:clrMapOvr>
+  <mc:AlternateContent xmlns:mc="http://schemas.openxmlformats.org/markup-compatibility/2006">
+    <mc:Choice xmlns:p14="http://schemas.microsoft.com/office/powerpoint/2010/main" Requires="p14">
+      <p:transition xmlns:mc="http://schemas.openxmlformats.org/markup-compatibility/2006" xmlns:p14="http://schemas.microsoft.com/office/powerpoint/2010/main" mc:Ignorable="p14" p14:dur="500"/>
+    </mc:Choice>
+    <mc:Fallback>
+      <p:transition/>
+    </mc:Fallback>
+  </mc:AlternateContent>
 </p:sld>
 </file>
 
@@ -15322,7 +15651,21 @@
             </a:pPr>
             <a:r>
               <a:rPr lang="en-US" altLang="ko-KR"/>
-              <a:t>4-1. Menu_Tree</a:t>
+              <a:t>4-1.</a:t>
+            </a:r>
+            <a:r>
+              <a:rPr lang="ko-KR" altLang="en-US"/>
+              <a:t> 기능 정의</a:t>
+            </a:r>
+            <a:endParaRPr lang="ko-KR" altLang="en-US"/>
+          </a:p>
+          <a:p>
+            <a:pPr lvl="0">
+              <a:defRPr/>
+            </a:pPr>
+            <a:r>
+              <a:rPr lang="en-US" altLang="ko-KR"/>
+              <a:t>4-2. Menu_Tree</a:t>
             </a:r>
             <a:endParaRPr lang="en-US" altLang="ko-KR"/>
           </a:p>
@@ -15332,7 +15675,7 @@
             </a:pPr>
             <a:r>
               <a:rPr lang="en-US" altLang="ko-KR"/>
-              <a:t>4-2. Flow_Chart</a:t>
+              <a:t>4-3. Flow_Chart</a:t>
             </a:r>
             <a:endParaRPr lang="en-US" altLang="ko-KR"/>
           </a:p>
@@ -15342,25 +15685,7 @@
             </a:pPr>
             <a:r>
               <a:rPr lang="en-US" altLang="ko-KR"/>
-              <a:t>4-3. Sequence</a:t>
-            </a:r>
-            <a:endParaRPr lang="en-US" altLang="ko-KR"/>
-          </a:p>
-          <a:p>
-            <a:pPr lvl="0">
-              <a:defRPr/>
-            </a:pPr>
-            <a:r>
-              <a:rPr lang="en-US" altLang="ko-KR"/>
-              <a:t>4-4.</a:t>
-            </a:r>
-            <a:r>
-              <a:rPr lang="ko-KR" altLang="en-US"/>
-              <a:t> </a:t>
-            </a:r>
-            <a:r>
-              <a:rPr lang="en-US" altLang="ko-KR"/>
-              <a:t>Inner Sequence</a:t>
+              <a:t>4-4. Sequence</a:t>
             </a:r>
             <a:endParaRPr lang="en-US" altLang="ko-KR"/>
           </a:p>
@@ -15661,7 +15986,7 @@
 </file>
 
 <file path=ppt/slides/slide30.xml><?xml version="1.0" encoding="utf-8"?>
-<p:sld xmlns:a="http://schemas.openxmlformats.org/drawingml/2006/main" xmlns:r="http://schemas.openxmlformats.org/officeDocument/2006/relationships" xmlns:p="http://schemas.openxmlformats.org/presentationml/2006/main">
+<p:sld xmlns:r="http://schemas.openxmlformats.org/officeDocument/2006/relationships" xmlns:c="http://schemas.openxmlformats.org/drawingml/2006/chart" xmlns:a="http://schemas.openxmlformats.org/drawingml/2006/main" xmlns:dgm="http://schemas.openxmlformats.org/drawingml/2006/diagram" xmlns:dsp="http://schemas.microsoft.com/office/drawing/2008/diagram" xmlns:p="http://schemas.openxmlformats.org/presentationml/2006/main">
   <p:cSld>
     <p:spTree>
       <p:nvGrpSpPr>
@@ -15679,38 +16004,7 @@
       </p:grpSpPr>
       <p:sp>
         <p:nvSpPr>
-          <p:cNvPr id="2" name="제목 1">
-            <a:extLst>
-              <a:ext uri="{FF2B5EF4-FFF2-40B4-BE49-F238E27FC236}">
-                <a16:creationId xmlns:a16="http://schemas.microsoft.com/office/drawing/2014/main" id="{9A1A2E3C-2FD9-439C-87BD-8AE3B27F8C97}"/>
-              </a:ext>
-            </a:extLst>
-          </p:cNvPr>
-          <p:cNvSpPr>
-            <a:spLocks noGrp="1"/>
-          </p:cNvSpPr>
-          <p:nvPr>
-            <p:ph type="title"/>
-          </p:nvPr>
-        </p:nvSpPr>
-        <p:spPr/>
-        <p:txBody>
-          <a:bodyPr/>
-          <a:lstStyle/>
-          <a:p>
-            <a:endParaRPr lang="ko-KR" altLang="en-US"/>
-          </a:p>
-        </p:txBody>
-      </p:sp>
-      <p:sp>
-        <p:nvSpPr>
-          <p:cNvPr id="3" name="내용 개체 틀 2">
-            <a:extLst>
-              <a:ext uri="{FF2B5EF4-FFF2-40B4-BE49-F238E27FC236}">
-                <a16:creationId xmlns:a16="http://schemas.microsoft.com/office/drawing/2014/main" id="{58DC695E-BF5C-4F1A-860C-8BD272E977AA}"/>
-              </a:ext>
-            </a:extLst>
-          </p:cNvPr>
+          <p:cNvPr id="3" name="내용 개체 틀 2"/>
           <p:cNvSpPr>
             <a:spLocks noGrp="1"/>
           </p:cNvSpPr>
@@ -15723,43 +16017,148 @@
           <a:bodyPr/>
           <a:lstStyle/>
           <a:p>
-            <a:r>
-              <a:rPr lang="ko-KR" altLang="en-US" dirty="0"/>
+            <a:pPr lvl="0">
+              <a:defRPr/>
+            </a:pPr>
+            <a:r>
+              <a:rPr lang="ko-KR" altLang="en-US"/>
               <a:t>기능정의를 한다</a:t>
             </a:r>
-            <a:endParaRPr lang="en-US" altLang="ko-KR" dirty="0"/>
-          </a:p>
-          <a:p>
-            <a:r>
-              <a:rPr lang="ko-KR" altLang="en-US" dirty="0"/>
+            <a:endParaRPr lang="ko-KR" altLang="en-US"/>
+          </a:p>
+          <a:p>
+            <a:pPr lvl="0">
+              <a:defRPr/>
+            </a:pPr>
+            <a:r>
+              <a:rPr lang="ko-KR" altLang="en-US"/>
               <a:t>정의 한 기능에 대해 </a:t>
             </a:r>
             <a:r>
-              <a:rPr lang="en-US" altLang="ko-KR" dirty="0"/>
+              <a:rPr lang="en-US" altLang="ko-KR"/>
               <a:t>Flow</a:t>
             </a:r>
             <a:r>
-              <a:rPr lang="ko-KR" altLang="en-US" dirty="0"/>
+              <a:rPr lang="ko-KR" altLang="en-US"/>
               <a:t>를 작성한다</a:t>
             </a:r>
             <a:r>
-              <a:rPr lang="en-US" altLang="ko-KR" dirty="0"/>
+              <a:rPr lang="en-US" altLang="ko-KR"/>
               <a:t>.</a:t>
             </a:r>
-            <a:endParaRPr lang="ko-KR" altLang="en-US" dirty="0"/>
+            <a:endParaRPr lang="ko-KR" altLang="en-US"/>
+          </a:p>
+        </p:txBody>
+      </p:sp>
+      <p:sp>
+        <p:nvSpPr>
+          <p:cNvPr id="4" name="직사각형 9"/>
+          <p:cNvSpPr/>
+          <p:nvPr/>
+        </p:nvSpPr>
+        <p:spPr>
+          <a:xfrm>
+            <a:off x="-1" y="0"/>
+            <a:ext cx="12192001" cy="1338109"/>
+          </a:xfrm>
+          <a:prstGeom prst="rect">
+            <a:avLst/>
+          </a:prstGeom>
+          <a:solidFill>
+            <a:schemeClr val="accent1">
+              <a:lumMod val="75000"/>
+            </a:schemeClr>
+          </a:solidFill>
+          <a:ln>
+            <a:noFill/>
+          </a:ln>
+        </p:spPr>
+        <p:style>
+          <a:lnRef idx="2">
+            <a:schemeClr val="accent1">
+              <a:shade val="50000"/>
+            </a:schemeClr>
+          </a:lnRef>
+          <a:fillRef idx="1">
+            <a:schemeClr val="accent1"/>
+          </a:fillRef>
+          <a:effectRef idx="0">
+            <a:schemeClr val="accent1"/>
+          </a:effectRef>
+          <a:fontRef idx="minor">
+            <a:schemeClr val="lt1"/>
+          </a:fontRef>
+        </p:style>
+        <p:txBody>
+          <a:bodyPr anchor="ctr"/>
+          <a:lstStyle/>
+          <a:p>
+            <a:pPr algn="ctr">
+              <a:defRPr/>
+            </a:pPr>
+            <a:endParaRPr kumimoji="1" lang="ko-KR" altLang="en-US"/>
+          </a:p>
+        </p:txBody>
+      </p:sp>
+      <p:sp>
+        <p:nvSpPr>
+          <p:cNvPr id="5" name="부제목 2"/>
+          <p:cNvSpPr txBox="1"/>
+          <p:nvPr/>
+        </p:nvSpPr>
+        <p:spPr>
+          <a:xfrm>
+            <a:off x="0" y="0"/>
+            <a:ext cx="12192000" cy="1382964"/>
+          </a:xfrm>
+          <a:prstGeom prst="rect">
+            <a:avLst/>
+          </a:prstGeom>
+        </p:spPr>
+        <p:txBody>
+          <a:bodyPr vert="horz" lIns="91440" tIns="45720" rIns="91440" bIns="45720" anchor="ctr">
+            <a:noAutofit/>
+          </a:bodyPr>
+          <a:lstStyle/>
+          <a:p>
+            <a:pPr lvl="0" algn="ctr">
+              <a:defRPr/>
+            </a:pPr>
+            <a:r>
+              <a:rPr lang="ko-KR" altLang="en-US" sz="4800">
+                <a:solidFill>
+                  <a:schemeClr val="bg1"/>
+                </a:solidFill>
+                <a:latin typeface="+mj-lt"/>
+                <a:ea typeface="맑은 고딕"/>
+                <a:cs typeface="맑은 고딕"/>
+              </a:rPr>
+              <a:t>기능 모듈 설계</a:t>
+            </a:r>
+            <a:endParaRPr lang="ko-KR" altLang="en-US" sz="4800">
+              <a:solidFill>
+                <a:schemeClr val="bg1"/>
+              </a:solidFill>
+              <a:latin typeface="+mj-lt"/>
+              <a:ea typeface="맑은 고딕"/>
+              <a:cs typeface="맑은 고딕"/>
+            </a:endParaRPr>
           </a:p>
         </p:txBody>
       </p:sp>
     </p:spTree>
-    <p:extLst>
-      <p:ext uri="{BB962C8B-B14F-4D97-AF65-F5344CB8AC3E}">
-        <p14:creationId xmlns:p14="http://schemas.microsoft.com/office/powerpoint/2010/main" val="3772914977"/>
-      </p:ext>
-    </p:extLst>
   </p:cSld>
   <p:clrMapOvr>
     <a:masterClrMapping/>
   </p:clrMapOvr>
+  <mc:AlternateContent xmlns:mc="http://schemas.openxmlformats.org/markup-compatibility/2006">
+    <mc:Choice xmlns:p14="http://schemas.microsoft.com/office/powerpoint/2010/main" Requires="p14">
+      <p:transition xmlns:mc="http://schemas.openxmlformats.org/markup-compatibility/2006" xmlns:p14="http://schemas.microsoft.com/office/powerpoint/2010/main" mc:Ignorable="p14" p14:dur="500"/>
+    </mc:Choice>
+    <mc:Fallback>
+      <p:transition/>
+    </mc:Fallback>
+  </mc:AlternateContent>
 </p:sld>
 </file>
 
@@ -15782,7 +16181,654 @@
       </p:grpSpPr>
       <p:sp>
         <p:nvSpPr>
-          <p:cNvPr id="4" name="직사각형 9"/>
+          <p:cNvPr id="5" name=""/>
+          <p:cNvSpPr/>
+          <p:nvPr/>
+        </p:nvSpPr>
+        <p:spPr>
+          <a:xfrm>
+            <a:off x="0" y="1351682"/>
+            <a:ext cx="12192000" cy="5286510"/>
+          </a:xfrm>
+          <a:prstGeom prst="rect">
+            <a:avLst/>
+          </a:prstGeom>
+          <a:noFill/>
+          <a:ln>
+            <a:noFill/>
+          </a:ln>
+        </p:spPr>
+        <p:style>
+          <a:lnRef idx="2">
+            <a:schemeClr val="accent1">
+              <a:shade val="20000"/>
+            </a:schemeClr>
+          </a:lnRef>
+          <a:fillRef idx="1">
+            <a:schemeClr val="accent1"/>
+          </a:fillRef>
+          <a:effectRef idx="0">
+            <a:schemeClr val="accent1"/>
+          </a:effectRef>
+          <a:fontRef idx="minor">
+            <a:schemeClr val="lt1"/>
+          </a:fontRef>
+        </p:style>
+        <p:txBody>
+          <a:bodyPr anchor="ctr"/>
+          <a:p>
+            <a:pPr>
+              <a:defRPr/>
+            </a:pPr>
+            <a:r>
+              <a:rPr lang="ko-KR" altLang="en-US" b="1">
+                <a:solidFill>
+                  <a:schemeClr val="dk1"/>
+                </a:solidFill>
+              </a:rPr>
+              <a:t>메인 화면에서 메뉴 목록을 만들어 이동한다</a:t>
+            </a:r>
+            <a:r>
+              <a:rPr lang="en-US" altLang="ko-KR" b="1">
+                <a:solidFill>
+                  <a:schemeClr val="dk1"/>
+                </a:solidFill>
+              </a:rPr>
+              <a:t>.</a:t>
+            </a:r>
+            <a:endParaRPr lang="en-US" altLang="ko-KR">
+              <a:solidFill>
+                <a:schemeClr val="dk1"/>
+              </a:solidFill>
+            </a:endParaRPr>
+          </a:p>
+          <a:p>
+            <a:pPr>
+              <a:defRPr/>
+            </a:pPr>
+            <a:r>
+              <a:rPr lang="ko-KR" altLang="en-US">
+                <a:solidFill>
+                  <a:schemeClr val="dk1"/>
+                </a:solidFill>
+              </a:rPr>
+              <a:t> </a:t>
+            </a:r>
+            <a:r>
+              <a:rPr lang="en-US" altLang="ko-KR">
+                <a:solidFill>
+                  <a:schemeClr val="dk1"/>
+                </a:solidFill>
+              </a:rPr>
+              <a:t>-</a:t>
+            </a:r>
+            <a:r>
+              <a:rPr lang="ko-KR" altLang="en-US">
+                <a:solidFill>
+                  <a:schemeClr val="dk1"/>
+                </a:solidFill>
+              </a:rPr>
+              <a:t> </a:t>
+            </a:r>
+            <a:r>
+              <a:rPr lang="en-US" altLang="ko-KR">
+                <a:solidFill>
+                  <a:schemeClr val="dk1"/>
+                </a:solidFill>
+              </a:rPr>
+              <a:t>ex) </a:t>
+            </a:r>
+            <a:r>
+              <a:rPr lang="ko-KR" altLang="en-US">
+                <a:solidFill>
+                  <a:schemeClr val="dk1"/>
+                </a:solidFill>
+              </a:rPr>
+              <a:t>메인 </a:t>
+            </a:r>
+            <a:r>
+              <a:rPr lang="en-US" altLang="ko-KR">
+                <a:solidFill>
+                  <a:schemeClr val="dk1"/>
+                </a:solidFill>
+              </a:rPr>
+              <a:t>-&gt;</a:t>
+            </a:r>
+            <a:r>
+              <a:rPr lang="ko-KR" altLang="en-US">
+                <a:solidFill>
+                  <a:schemeClr val="dk1"/>
+                </a:solidFill>
+              </a:rPr>
+              <a:t> 목록 </a:t>
+            </a:r>
+            <a:r>
+              <a:rPr lang="en-US" altLang="ko-KR">
+                <a:solidFill>
+                  <a:schemeClr val="dk1"/>
+                </a:solidFill>
+              </a:rPr>
+              <a:t>-&gt;</a:t>
+            </a:r>
+            <a:r>
+              <a:rPr lang="ko-KR" altLang="en-US">
+                <a:solidFill>
+                  <a:schemeClr val="dk1"/>
+                </a:solidFill>
+              </a:rPr>
+              <a:t> 견적</a:t>
+            </a:r>
+            <a:r>
+              <a:rPr lang="en-US" altLang="ko-KR">
+                <a:solidFill>
+                  <a:schemeClr val="dk1"/>
+                </a:solidFill>
+              </a:rPr>
+              <a:t> or calendar, community</a:t>
+            </a:r>
+            <a:r>
+              <a:rPr lang="ko-KR" altLang="en-US">
+                <a:solidFill>
+                  <a:schemeClr val="dk1"/>
+                </a:solidFill>
+              </a:rPr>
+              <a:t> 등</a:t>
+            </a:r>
+            <a:endParaRPr lang="ko-KR" altLang="en-US">
+              <a:solidFill>
+                <a:schemeClr val="dk1"/>
+              </a:solidFill>
+            </a:endParaRPr>
+          </a:p>
+          <a:p>
+            <a:pPr>
+              <a:defRPr/>
+            </a:pPr>
+            <a:endParaRPr lang="ko-KR" altLang="en-US">
+              <a:solidFill>
+                <a:schemeClr val="dk1"/>
+              </a:solidFill>
+            </a:endParaRPr>
+          </a:p>
+          <a:p>
+            <a:pPr>
+              <a:defRPr/>
+            </a:pPr>
+            <a:r>
+              <a:rPr lang="en-US" altLang="ko-KR" b="1">
+                <a:solidFill>
+                  <a:schemeClr val="dk1"/>
+                </a:solidFill>
+              </a:rPr>
+              <a:t>Check List</a:t>
+            </a:r>
+            <a:endParaRPr lang="en-US" altLang="ko-KR">
+              <a:solidFill>
+                <a:schemeClr val="dk1"/>
+              </a:solidFill>
+            </a:endParaRPr>
+          </a:p>
+          <a:p>
+            <a:pPr>
+              <a:defRPr/>
+            </a:pPr>
+            <a:r>
+              <a:rPr lang="en-US" altLang="ko-KR">
+                <a:solidFill>
+                  <a:schemeClr val="dk1"/>
+                </a:solidFill>
+              </a:rPr>
+              <a:t> - </a:t>
+            </a:r>
+            <a:r>
+              <a:rPr lang="ko-KR" altLang="en-US">
+                <a:solidFill>
+                  <a:schemeClr val="dk1"/>
+                </a:solidFill>
+              </a:rPr>
+              <a:t> 아이콘으로 부품별 남은 수명</a:t>
+            </a:r>
+            <a:r>
+              <a:rPr lang="en-US" altLang="ko-KR">
+                <a:solidFill>
+                  <a:schemeClr val="dk1"/>
+                </a:solidFill>
+              </a:rPr>
+              <a:t>(</a:t>
+            </a:r>
+            <a:r>
+              <a:rPr lang="ko-KR" altLang="en-US">
+                <a:solidFill>
+                  <a:schemeClr val="dk1"/>
+                </a:solidFill>
+              </a:rPr>
+              <a:t>주행 거리</a:t>
+            </a:r>
+            <a:r>
+              <a:rPr lang="en-US" altLang="ko-KR">
+                <a:solidFill>
+                  <a:schemeClr val="dk1"/>
+                </a:solidFill>
+              </a:rPr>
+              <a:t>)</a:t>
+            </a:r>
+            <a:r>
+              <a:rPr lang="ko-KR" altLang="en-US">
+                <a:solidFill>
+                  <a:schemeClr val="dk1"/>
+                </a:solidFill>
+              </a:rPr>
+              <a:t>을 보여준다 </a:t>
+            </a:r>
+            <a:endParaRPr lang="ko-KR" altLang="en-US">
+              <a:solidFill>
+                <a:schemeClr val="dk1"/>
+              </a:solidFill>
+            </a:endParaRPr>
+          </a:p>
+          <a:p>
+            <a:pPr>
+              <a:defRPr/>
+            </a:pPr>
+            <a:r>
+              <a:rPr lang="en-US" altLang="ko-KR">
+                <a:solidFill>
+                  <a:schemeClr val="dk1"/>
+                </a:solidFill>
+              </a:rPr>
+              <a:t> - </a:t>
+            </a:r>
+            <a:r>
+              <a:rPr lang="ko-KR" altLang="en-US">
+                <a:solidFill>
+                  <a:schemeClr val="dk1"/>
+                </a:solidFill>
+              </a:rPr>
+              <a:t> 남은 수명의 </a:t>
+            </a:r>
+            <a:r>
+              <a:rPr lang="en-US" altLang="ko-KR">
+                <a:solidFill>
+                  <a:schemeClr val="dk1"/>
+                </a:solidFill>
+              </a:rPr>
+              <a:t>%</a:t>
+            </a:r>
+            <a:r>
+              <a:rPr lang="ko-KR" altLang="en-US">
+                <a:solidFill>
+                  <a:schemeClr val="dk1"/>
+                </a:solidFill>
+              </a:rPr>
+              <a:t>마다 색이 달라진다 </a:t>
+            </a:r>
+            <a:r>
+              <a:rPr lang="en-US" altLang="ko-KR">
+                <a:solidFill>
+                  <a:schemeClr val="dk1"/>
+                </a:solidFill>
+              </a:rPr>
+              <a:t>(1/2</a:t>
+            </a:r>
+            <a:r>
+              <a:rPr lang="ko-KR" altLang="en-US">
+                <a:solidFill>
+                  <a:schemeClr val="dk1"/>
+                </a:solidFill>
+              </a:rPr>
+              <a:t>까지 초록 </a:t>
+            </a:r>
+            <a:r>
+              <a:rPr lang="en-US" altLang="ko-KR">
+                <a:solidFill>
+                  <a:schemeClr val="dk1"/>
+                </a:solidFill>
+              </a:rPr>
+              <a:t>~3/4</a:t>
+            </a:r>
+            <a:r>
+              <a:rPr lang="ko-KR" altLang="en-US">
+                <a:solidFill>
+                  <a:schemeClr val="dk1"/>
+                </a:solidFill>
+              </a:rPr>
+              <a:t> 노랑 </a:t>
+            </a:r>
+            <a:r>
+              <a:rPr lang="en-US" altLang="ko-KR">
+                <a:solidFill>
+                  <a:schemeClr val="dk1"/>
+                </a:solidFill>
+              </a:rPr>
+              <a:t>~</a:t>
+            </a:r>
+            <a:r>
+              <a:rPr lang="ko-KR" altLang="en-US">
+                <a:solidFill>
+                  <a:schemeClr val="dk1"/>
+                </a:solidFill>
+              </a:rPr>
+              <a:t> 빨강</a:t>
+            </a:r>
+            <a:r>
+              <a:rPr lang="en-US" altLang="ko-KR">
+                <a:solidFill>
+                  <a:schemeClr val="dk1"/>
+                </a:solidFill>
+              </a:rPr>
+              <a:t>)</a:t>
+            </a:r>
+            <a:endParaRPr lang="en-US" altLang="ko-KR">
+              <a:solidFill>
+                <a:schemeClr val="dk1"/>
+              </a:solidFill>
+            </a:endParaRPr>
+          </a:p>
+          <a:p>
+            <a:pPr>
+              <a:defRPr/>
+            </a:pPr>
+            <a:r>
+              <a:rPr lang="en-US" altLang="ko-KR" b="1">
+                <a:solidFill>
+                  <a:schemeClr val="dk1"/>
+                </a:solidFill>
+              </a:rPr>
+              <a:t>Diary</a:t>
+            </a:r>
+            <a:r>
+              <a:rPr lang="ko-KR" altLang="en-US">
+                <a:solidFill>
+                  <a:schemeClr val="dk1"/>
+                </a:solidFill>
+              </a:rPr>
+              <a:t> </a:t>
+            </a:r>
+            <a:endParaRPr lang="ko-KR" altLang="en-US">
+              <a:solidFill>
+                <a:schemeClr val="dk1"/>
+              </a:solidFill>
+            </a:endParaRPr>
+          </a:p>
+          <a:p>
+            <a:pPr>
+              <a:defRPr/>
+            </a:pPr>
+            <a:r>
+              <a:rPr lang="ko-KR" altLang="en-US">
+                <a:solidFill>
+                  <a:schemeClr val="dk1"/>
+                </a:solidFill>
+              </a:rPr>
+              <a:t> </a:t>
+            </a:r>
+            <a:r>
+              <a:rPr lang="en-US" altLang="ko-KR">
+                <a:solidFill>
+                  <a:schemeClr val="dk1"/>
+                </a:solidFill>
+              </a:rPr>
+              <a:t>-</a:t>
+            </a:r>
+            <a:r>
+              <a:rPr lang="ko-KR" altLang="en-US">
+                <a:solidFill>
+                  <a:schemeClr val="dk1"/>
+                </a:solidFill>
+              </a:rPr>
+              <a:t>  달력에 정비 받은 날짜를 표시할 수 있다</a:t>
+            </a:r>
+            <a:r>
+              <a:rPr lang="en-US" altLang="ko-KR">
+                <a:solidFill>
+                  <a:schemeClr val="dk1"/>
+                </a:solidFill>
+              </a:rPr>
+              <a:t>.</a:t>
+            </a:r>
+            <a:endParaRPr lang="en-US" altLang="ko-KR">
+              <a:solidFill>
+                <a:schemeClr val="dk1"/>
+              </a:solidFill>
+            </a:endParaRPr>
+          </a:p>
+          <a:p>
+            <a:pPr>
+              <a:defRPr/>
+            </a:pPr>
+            <a:r>
+              <a:rPr lang="ko-KR" altLang="en-US">
+                <a:solidFill>
+                  <a:schemeClr val="dk1"/>
+                </a:solidFill>
+              </a:rPr>
+              <a:t> </a:t>
+            </a:r>
+            <a:r>
+              <a:rPr lang="en-US" altLang="ko-KR">
+                <a:solidFill>
+                  <a:schemeClr val="dk1"/>
+                </a:solidFill>
+              </a:rPr>
+              <a:t>-</a:t>
+            </a:r>
+            <a:r>
+              <a:rPr lang="ko-KR" altLang="en-US">
+                <a:solidFill>
+                  <a:schemeClr val="dk1"/>
+                </a:solidFill>
+              </a:rPr>
+              <a:t>  날짜 체크와 함께 어떤 것을 정비 받았는지 메모할 수 있다</a:t>
+            </a:r>
+            <a:r>
+              <a:rPr lang="en-US" altLang="ko-KR">
+                <a:solidFill>
+                  <a:schemeClr val="dk1"/>
+                </a:solidFill>
+              </a:rPr>
+              <a:t>.</a:t>
+            </a:r>
+            <a:endParaRPr lang="en-US" altLang="ko-KR">
+              <a:solidFill>
+                <a:schemeClr val="dk1"/>
+              </a:solidFill>
+            </a:endParaRPr>
+          </a:p>
+          <a:p>
+            <a:pPr>
+              <a:defRPr/>
+            </a:pPr>
+            <a:r>
+              <a:rPr lang="en-US" altLang="ko-KR" b="1">
+                <a:solidFill>
+                  <a:schemeClr val="dk1"/>
+                </a:solidFill>
+              </a:rPr>
+              <a:t>Community</a:t>
+            </a:r>
+            <a:endParaRPr lang="en-US" altLang="ko-KR">
+              <a:solidFill>
+                <a:schemeClr val="dk1"/>
+              </a:solidFill>
+            </a:endParaRPr>
+          </a:p>
+          <a:p>
+            <a:pPr>
+              <a:defRPr/>
+            </a:pPr>
+            <a:r>
+              <a:rPr lang="ko-KR" altLang="en-US">
+                <a:solidFill>
+                  <a:schemeClr val="dk1"/>
+                </a:solidFill>
+              </a:rPr>
+              <a:t> </a:t>
+            </a:r>
+            <a:r>
+              <a:rPr lang="en-US" altLang="ko-KR">
+                <a:solidFill>
+                  <a:schemeClr val="dk1"/>
+                </a:solidFill>
+              </a:rPr>
+              <a:t>-</a:t>
+            </a:r>
+            <a:r>
+              <a:rPr lang="ko-KR" altLang="en-US">
+                <a:solidFill>
+                  <a:schemeClr val="dk1"/>
+                </a:solidFill>
+              </a:rPr>
+              <a:t> 게시판</a:t>
+            </a:r>
+            <a:endParaRPr lang="ko-KR" altLang="en-US">
+              <a:solidFill>
+                <a:schemeClr val="dk1"/>
+              </a:solidFill>
+            </a:endParaRPr>
+          </a:p>
+          <a:p>
+            <a:pPr>
+              <a:defRPr/>
+            </a:pPr>
+            <a:r>
+              <a:rPr lang="ko-KR" altLang="en-US">
+                <a:solidFill>
+                  <a:schemeClr val="dk1"/>
+                </a:solidFill>
+              </a:rPr>
+              <a:t>   </a:t>
+            </a:r>
+            <a:r>
+              <a:rPr lang="en-US" altLang="ko-KR">
+                <a:solidFill>
+                  <a:schemeClr val="dk1"/>
+                </a:solidFill>
+              </a:rPr>
+              <a:t>-</a:t>
+            </a:r>
+            <a:r>
+              <a:rPr lang="ko-KR" altLang="en-US">
+                <a:solidFill>
+                  <a:schemeClr val="dk1"/>
+                </a:solidFill>
+              </a:rPr>
+              <a:t> 게시판 창을 통해 유저간의 </a:t>
+            </a:r>
+            <a:r>
+              <a:rPr lang="en-US" altLang="ko-KR">
+                <a:solidFill>
+                  <a:schemeClr val="dk1"/>
+                </a:solidFill>
+              </a:rPr>
+              <a:t>tip</a:t>
+            </a:r>
+            <a:r>
+              <a:rPr lang="ko-KR" altLang="en-US">
+                <a:solidFill>
+                  <a:schemeClr val="dk1"/>
+                </a:solidFill>
+              </a:rPr>
+              <a:t> 또는 업체등에 대한 정보를 얻을 수 있다</a:t>
+            </a:r>
+            <a:r>
+              <a:rPr lang="en-US" altLang="ko-KR">
+                <a:solidFill>
+                  <a:schemeClr val="dk1"/>
+                </a:solidFill>
+              </a:rPr>
+              <a:t>.</a:t>
+            </a:r>
+            <a:endParaRPr lang="en-US" altLang="ko-KR">
+              <a:solidFill>
+                <a:schemeClr val="dk1"/>
+              </a:solidFill>
+            </a:endParaRPr>
+          </a:p>
+          <a:p>
+            <a:pPr>
+              <a:defRPr/>
+            </a:pPr>
+            <a:r>
+              <a:rPr lang="ko-KR" altLang="en-US" b="1">
+                <a:solidFill>
+                  <a:schemeClr val="dk1"/>
+                </a:solidFill>
+              </a:rPr>
+              <a:t>견적</a:t>
+            </a:r>
+            <a:endParaRPr lang="ko-KR" altLang="en-US" b="1">
+              <a:solidFill>
+                <a:schemeClr val="dk1"/>
+              </a:solidFill>
+            </a:endParaRPr>
+          </a:p>
+          <a:p>
+            <a:pPr>
+              <a:defRPr/>
+            </a:pPr>
+            <a:r>
+              <a:rPr lang="ko-KR" altLang="en-US">
+                <a:solidFill>
+                  <a:schemeClr val="dk1"/>
+                </a:solidFill>
+              </a:rPr>
+              <a:t> </a:t>
+            </a:r>
+            <a:r>
+              <a:rPr lang="en-US" altLang="ko-KR">
+                <a:solidFill>
+                  <a:schemeClr val="dk1"/>
+                </a:solidFill>
+              </a:rPr>
+              <a:t>-</a:t>
+            </a:r>
+            <a:r>
+              <a:rPr lang="ko-KR" altLang="en-US">
+                <a:solidFill>
+                  <a:schemeClr val="dk1"/>
+                </a:solidFill>
+              </a:rPr>
+              <a:t> 교체하고자 하는 부분을 선택하여 견적 및 정비 가능한 정비소의 목록을 보여준다</a:t>
+            </a:r>
+            <a:r>
+              <a:rPr lang="en-US" altLang="ko-KR">
+                <a:solidFill>
+                  <a:schemeClr val="dk1"/>
+                </a:solidFill>
+              </a:rPr>
+              <a:t>.</a:t>
+            </a:r>
+            <a:endParaRPr lang="en-US" altLang="ko-KR">
+              <a:solidFill>
+                <a:schemeClr val="dk1"/>
+              </a:solidFill>
+            </a:endParaRPr>
+          </a:p>
+          <a:p>
+            <a:pPr>
+              <a:defRPr/>
+            </a:pPr>
+            <a:endParaRPr lang="ko-KR" altLang="en-US">
+              <a:solidFill>
+                <a:schemeClr val="dk1"/>
+              </a:solidFill>
+            </a:endParaRPr>
+          </a:p>
+          <a:p>
+            <a:pPr>
+              <a:defRPr/>
+            </a:pPr>
+            <a:endParaRPr lang="ko-KR" altLang="en-US">
+              <a:solidFill>
+                <a:schemeClr val="dk1"/>
+              </a:solidFill>
+            </a:endParaRPr>
+          </a:p>
+        </p:txBody>
+      </p:sp>
+      <p:sp>
+        <p:nvSpPr>
+          <p:cNvPr id="9" name="직사각형 9"/>
           <p:cNvSpPr/>
           <p:nvPr/>
         </p:nvSpPr>
@@ -15826,36 +16872,745 @@
             </a:pPr>
             <a:r>
               <a:rPr kumimoji="1" lang="en-US" altLang="ko-KR" sz="4800"/>
-              <a:t>4-1. Menu_Tree</a:t>
-            </a:r>
-            <a:endParaRPr kumimoji="1" lang="en-US" altLang="ko-KR" sz="4800"/>
+              <a:t>4-1.</a:t>
+            </a:r>
+            <a:r>
+              <a:rPr kumimoji="1" lang="ko-KR" altLang="en-US" sz="4800"/>
+              <a:t> 기능정의</a:t>
+            </a:r>
+            <a:endParaRPr kumimoji="1" lang="ko-KR" altLang="en-US" sz="4800"/>
           </a:p>
         </p:txBody>
       </p:sp>
-      <p:pic>
-        <p:nvPicPr>
-          <p:cNvPr id="6" name=""/>
-          <p:cNvPicPr>
-            <a:picLocks noChangeAspect="1"/>
-          </p:cNvPicPr>
+      <p:grpSp>
+        <p:nvGrpSpPr>
+          <p:cNvPr id="35" name=""/>
+          <p:cNvGrpSpPr/>
           <p:nvPr/>
-        </p:nvPicPr>
-        <p:blipFill rotWithShape="1">
-          <a:blip r:embed="rId2"/>
-          <a:stretch>
-            <a:fillRect/>
-          </a:stretch>
-        </p:blipFill>
-        <p:spPr>
-          <a:xfrm>
-            <a:off x="1980879" y="1367790"/>
-            <a:ext cx="8230241" cy="5490210"/>
+        </p:nvGrpSpPr>
+        <p:grpSpPr>
+          <a:xfrm rot="0">
+            <a:off x="6727824" y="1746249"/>
+            <a:ext cx="5464176" cy="4740276"/>
+            <a:chOff x="6727824" y="1746249"/>
+            <a:chExt cx="5464176" cy="4740276"/>
           </a:xfrm>
-          <a:prstGeom prst="rect">
-            <a:avLst/>
-          </a:prstGeom>
-        </p:spPr>
-      </p:pic>
+        </p:grpSpPr>
+        <p:grpSp>
+          <p:nvGrpSpPr>
+            <p:cNvPr id="18" name=""/>
+            <p:cNvGrpSpPr/>
+            <p:nvPr/>
+          </p:nvGrpSpPr>
+          <p:grpSpPr>
+            <a:xfrm rot="0">
+              <a:off x="6727824" y="1746249"/>
+              <a:ext cx="5464176" cy="1476375"/>
+              <a:chOff x="6727824" y="1952624"/>
+              <a:chExt cx="5464176" cy="1476375"/>
+            </a:xfrm>
+          </p:grpSpPr>
+          <p:grpSp>
+            <p:nvGrpSpPr>
+              <p:cNvPr id="16" name=""/>
+              <p:cNvGrpSpPr/>
+              <p:nvPr/>
+            </p:nvGrpSpPr>
+            <p:grpSpPr>
+              <a:xfrm rot="0">
+                <a:off x="6727824" y="1952624"/>
+                <a:ext cx="4606925" cy="1444626"/>
+                <a:chOff x="7585074" y="1635124"/>
+                <a:chExt cx="4606925" cy="1444626"/>
+              </a:xfrm>
+            </p:grpSpPr>
+            <p:sp>
+              <p:nvSpPr>
+                <p:cNvPr id="12" name=""/>
+                <p:cNvSpPr/>
+                <p:nvPr/>
+              </p:nvSpPr>
+              <p:spPr>
+                <a:xfrm>
+                  <a:off x="7585074" y="2683199"/>
+                  <a:ext cx="4098925" cy="28251"/>
+                </a:xfrm>
+                <a:prstGeom prst="flowChartTerminator">
+                  <a:avLst/>
+                </a:prstGeom>
+                <a:solidFill>
+                  <a:srgbClr val="9be5c8"/>
+                </a:solidFill>
+                <a:ln>
+                  <a:noFill/>
+                </a:ln>
+              </p:spPr>
+              <p:style>
+                <a:lnRef idx="2">
+                  <a:schemeClr val="accent1">
+                    <a:shade val="20000"/>
+                  </a:schemeClr>
+                </a:lnRef>
+                <a:fillRef idx="1">
+                  <a:schemeClr val="accent1"/>
+                </a:fillRef>
+                <a:effectRef idx="0">
+                  <a:schemeClr val="accent1"/>
+                </a:effectRef>
+                <a:fontRef idx="minor">
+                  <a:schemeClr val="lt1"/>
+                </a:fontRef>
+              </p:style>
+              <p:txBody>
+                <a:bodyPr anchor="ctr"/>
+                <a:p>
+                  <a:pPr algn="ctr">
+                    <a:defRPr/>
+                  </a:pPr>
+                  <a:endParaRPr lang="ko-KR" altLang="en-US"/>
+                </a:p>
+              </p:txBody>
+            </p:sp>
+            <p:pic>
+              <p:nvPicPr>
+                <p:cNvPr id="11" name=""/>
+                <p:cNvPicPr>
+                  <a:picLocks noChangeAspect="1"/>
+                </p:cNvPicPr>
+                <p:nvPr/>
+              </p:nvPicPr>
+              <p:blipFill rotWithShape="1">
+                <a:blip r:embed="rId2"/>
+                <a:stretch>
+                  <a:fillRect/>
+                </a:stretch>
+              </p:blipFill>
+              <p:spPr>
+                <a:xfrm>
+                  <a:off x="8896978" y="2069302"/>
+                  <a:ext cx="1010448" cy="1010448"/>
+                </a:xfrm>
+                <a:prstGeom prst="rect">
+                  <a:avLst/>
+                </a:prstGeom>
+              </p:spPr>
+            </p:pic>
+            <p:grpSp>
+              <p:nvGrpSpPr>
+                <p:cNvPr id="15" name=""/>
+                <p:cNvGrpSpPr/>
+                <p:nvPr/>
+              </p:nvGrpSpPr>
+              <p:grpSpPr>
+                <a:xfrm rot="0">
+                  <a:off x="11684000" y="1635124"/>
+                  <a:ext cx="508000" cy="1079499"/>
+                  <a:chOff x="10890248" y="1746249"/>
+                  <a:chExt cx="508000" cy="1079499"/>
+                </a:xfrm>
+              </p:grpSpPr>
+              <p:sp>
+                <p:nvSpPr>
+                  <p:cNvPr id="13" name=""/>
+                  <p:cNvSpPr/>
+                  <p:nvPr/>
+                </p:nvSpPr>
+                <p:spPr>
+                  <a:xfrm>
+                    <a:off x="10890248" y="1746249"/>
+                    <a:ext cx="508000" cy="412749"/>
+                  </a:xfrm>
+                  <a:prstGeom prst="wave">
+                    <a:avLst>
+                      <a:gd name="adj1" fmla="val 12500"/>
+                      <a:gd name="adj2" fmla="val 0"/>
+                    </a:avLst>
+                  </a:prstGeom>
+                  <a:solidFill>
+                    <a:schemeClr val="dk1"/>
+                  </a:solidFill>
+                  <a:ln>
+                    <a:solidFill>
+                      <a:schemeClr val="dk1"/>
+                    </a:solidFill>
+                  </a:ln>
+                </p:spPr>
+                <p:style>
+                  <a:lnRef idx="2">
+                    <a:schemeClr val="accent1">
+                      <a:shade val="20000"/>
+                    </a:schemeClr>
+                  </a:lnRef>
+                  <a:fillRef idx="1">
+                    <a:schemeClr val="accent1"/>
+                  </a:fillRef>
+                  <a:effectRef idx="0">
+                    <a:schemeClr val="accent1"/>
+                  </a:effectRef>
+                  <a:fontRef idx="minor">
+                    <a:schemeClr val="lt1"/>
+                  </a:fontRef>
+                </p:style>
+                <p:txBody>
+                  <a:bodyPr anchor="ctr"/>
+                  <a:p>
+                    <a:pPr algn="ctr">
+                      <a:defRPr/>
+                    </a:pPr>
+                    <a:endParaRPr lang="ko-KR" altLang="en-US"/>
+                  </a:p>
+                </p:txBody>
+              </p:sp>
+              <p:cxnSp>
+                <p:nvCxnSpPr>
+                  <p:cNvPr id="14" name=""/>
+                  <p:cNvCxnSpPr>
+                    <a:stCxn id="13" idx="1"/>
+                  </p:cNvCxnSpPr>
+                  <p:nvPr/>
+                </p:nvCxnSpPr>
+                <p:spPr>
+                  <a:xfrm rot="16200000" flipH="1" flipV="1">
+                    <a:off x="10453690" y="2389183"/>
+                    <a:ext cx="873124" cy="7"/>
+                  </a:xfrm>
+                  <a:prstGeom prst="line">
+                    <a:avLst/>
+                  </a:prstGeom>
+                  <a:ln>
+                    <a:solidFill>
+                      <a:schemeClr val="dk1"/>
+                    </a:solidFill>
+                  </a:ln>
+                </p:spPr>
+                <p:style>
+                  <a:lnRef idx="1">
+                    <a:schemeClr val="accent1"/>
+                  </a:lnRef>
+                  <a:fillRef idx="0">
+                    <a:schemeClr val="accent1"/>
+                  </a:fillRef>
+                  <a:effectRef idx="0">
+                    <a:schemeClr val="accent1"/>
+                  </a:effectRef>
+                  <a:fontRef idx="minor">
+                    <a:schemeClr val="tx1"/>
+                  </a:fontRef>
+                </p:style>
+              </p:cxnSp>
+            </p:grpSp>
+          </p:grpSp>
+          <p:sp>
+            <p:nvSpPr>
+              <p:cNvPr id="17" name=""/>
+              <p:cNvSpPr txBox="1"/>
+              <p:nvPr/>
+            </p:nvSpPr>
+            <p:spPr>
+              <a:xfrm>
+                <a:off x="9255124" y="3065779"/>
+                <a:ext cx="2936876" cy="363221"/>
+              </a:xfrm>
+              <a:prstGeom prst="rect">
+                <a:avLst/>
+              </a:prstGeom>
+            </p:spPr>
+            <p:txBody>
+              <a:bodyPr wrap="square">
+                <a:spAutoFit/>
+              </a:bodyPr>
+              <a:p>
+                <a:pPr>
+                  <a:defRPr/>
+                </a:pPr>
+                <a:r>
+                  <a:rPr lang="en-US" altLang="ko-KR"/>
+                  <a:t>2400km/5000km (48%)</a:t>
+                </a:r>
+                <a:endParaRPr lang="en-US" altLang="ko-KR"/>
+              </a:p>
+            </p:txBody>
+          </p:sp>
+        </p:grpSp>
+        <p:grpSp>
+          <p:nvGrpSpPr>
+            <p:cNvPr id="19" name=""/>
+            <p:cNvGrpSpPr/>
+            <p:nvPr/>
+          </p:nvGrpSpPr>
+          <p:grpSpPr>
+            <a:xfrm rot="0">
+              <a:off x="6727824" y="3428999"/>
+              <a:ext cx="5464176" cy="1476376"/>
+              <a:chOff x="6727824" y="1952623"/>
+              <a:chExt cx="5464176" cy="1476376"/>
+            </a:xfrm>
+          </p:grpSpPr>
+          <p:grpSp>
+            <p:nvGrpSpPr>
+              <p:cNvPr id="20" name=""/>
+              <p:cNvGrpSpPr/>
+              <p:nvPr/>
+            </p:nvGrpSpPr>
+            <p:grpSpPr>
+              <a:xfrm rot="0">
+                <a:off x="6727824" y="1952623"/>
+                <a:ext cx="4606925" cy="1425576"/>
+                <a:chOff x="7585074" y="1635124"/>
+                <a:chExt cx="4606925" cy="1425576"/>
+              </a:xfrm>
+            </p:grpSpPr>
+            <p:sp>
+              <p:nvSpPr>
+                <p:cNvPr id="21" name=""/>
+                <p:cNvSpPr/>
+                <p:nvPr/>
+              </p:nvSpPr>
+              <p:spPr>
+                <a:xfrm>
+                  <a:off x="7585074" y="2683199"/>
+                  <a:ext cx="4098925" cy="28251"/>
+                </a:xfrm>
+                <a:prstGeom prst="flowChartTerminator">
+                  <a:avLst/>
+                </a:prstGeom>
+                <a:solidFill>
+                  <a:srgbClr val="ffd700"/>
+                </a:solidFill>
+                <a:ln>
+                  <a:noFill/>
+                </a:ln>
+              </p:spPr>
+              <p:style>
+                <a:lnRef idx="2">
+                  <a:schemeClr val="accent1">
+                    <a:shade val="20000"/>
+                  </a:schemeClr>
+                </a:lnRef>
+                <a:fillRef idx="1">
+                  <a:schemeClr val="accent1"/>
+                </a:fillRef>
+                <a:effectRef idx="0">
+                  <a:schemeClr val="accent1"/>
+                </a:effectRef>
+                <a:fontRef idx="minor">
+                  <a:schemeClr val="lt1"/>
+                </a:fontRef>
+              </p:style>
+              <p:txBody>
+                <a:bodyPr anchor="ctr"/>
+                <a:lstStyle/>
+                <a:p>
+                  <a:pPr algn="ctr">
+                    <a:defRPr/>
+                  </a:pPr>
+                  <a:endParaRPr lang="ko-KR" altLang="en-US"/>
+                </a:p>
+              </p:txBody>
+            </p:sp>
+            <p:pic>
+              <p:nvPicPr>
+                <p:cNvPr id="22" name=""/>
+                <p:cNvPicPr>
+                  <a:picLocks noChangeAspect="1"/>
+                </p:cNvPicPr>
+                <p:nvPr/>
+              </p:nvPicPr>
+              <p:blipFill rotWithShape="1">
+                <a:blip r:embed="rId3"/>
+                <a:stretch>
+                  <a:fillRect/>
+                </a:stretch>
+              </p:blipFill>
+              <p:spPr>
+                <a:xfrm>
+                  <a:off x="9697078" y="2050252"/>
+                  <a:ext cx="1010448" cy="1010448"/>
+                </a:xfrm>
+                <a:prstGeom prst="rect">
+                  <a:avLst/>
+                </a:prstGeom>
+              </p:spPr>
+            </p:pic>
+            <p:grpSp>
+              <p:nvGrpSpPr>
+                <p:cNvPr id="23" name=""/>
+                <p:cNvGrpSpPr/>
+                <p:nvPr/>
+              </p:nvGrpSpPr>
+              <p:grpSpPr>
+                <a:xfrm rot="0">
+                  <a:off x="11684000" y="1635124"/>
+                  <a:ext cx="508000" cy="1079499"/>
+                  <a:chOff x="10890248" y="1746249"/>
+                  <a:chExt cx="508000" cy="1079499"/>
+                </a:xfrm>
+              </p:grpSpPr>
+              <p:sp>
+                <p:nvSpPr>
+                  <p:cNvPr id="24" name=""/>
+                  <p:cNvSpPr/>
+                  <p:nvPr/>
+                </p:nvSpPr>
+                <p:spPr>
+                  <a:xfrm>
+                    <a:off x="10890248" y="1746249"/>
+                    <a:ext cx="508000" cy="412749"/>
+                  </a:xfrm>
+                  <a:prstGeom prst="wave">
+                    <a:avLst>
+                      <a:gd name="adj1" fmla="val 12500"/>
+                      <a:gd name="adj2" fmla="val 0"/>
+                    </a:avLst>
+                  </a:prstGeom>
+                  <a:solidFill>
+                    <a:schemeClr val="dk1"/>
+                  </a:solidFill>
+                  <a:ln>
+                    <a:solidFill>
+                      <a:schemeClr val="dk1"/>
+                    </a:solidFill>
+                  </a:ln>
+                </p:spPr>
+                <p:style>
+                  <a:lnRef idx="2">
+                    <a:schemeClr val="accent1">
+                      <a:shade val="20000"/>
+                    </a:schemeClr>
+                  </a:lnRef>
+                  <a:fillRef idx="1">
+                    <a:schemeClr val="accent1"/>
+                  </a:fillRef>
+                  <a:effectRef idx="0">
+                    <a:schemeClr val="accent1"/>
+                  </a:effectRef>
+                  <a:fontRef idx="minor">
+                    <a:schemeClr val="lt1"/>
+                  </a:fontRef>
+                </p:style>
+                <p:txBody>
+                  <a:bodyPr anchor="ctr"/>
+                  <a:lstStyle/>
+                  <a:p>
+                    <a:pPr algn="ctr">
+                      <a:defRPr/>
+                    </a:pPr>
+                    <a:endParaRPr lang="ko-KR" altLang="en-US"/>
+                  </a:p>
+                </p:txBody>
+              </p:sp>
+              <p:cxnSp>
+                <p:nvCxnSpPr>
+                  <p:cNvPr id="25" name=""/>
+                  <p:cNvCxnSpPr>
+                    <a:stCxn id="24" idx="1"/>
+                  </p:cNvCxnSpPr>
+                  <p:nvPr/>
+                </p:nvCxnSpPr>
+                <p:spPr>
+                  <a:xfrm rot="16200000" flipH="1" flipV="1">
+                    <a:off x="10453690" y="2389183"/>
+                    <a:ext cx="873124" cy="7"/>
+                  </a:xfrm>
+                  <a:prstGeom prst="line">
+                    <a:avLst/>
+                  </a:prstGeom>
+                  <a:ln>
+                    <a:solidFill>
+                      <a:schemeClr val="dk1"/>
+                    </a:solidFill>
+                  </a:ln>
+                </p:spPr>
+                <p:style>
+                  <a:lnRef idx="1">
+                    <a:schemeClr val="accent1"/>
+                  </a:lnRef>
+                  <a:fillRef idx="0">
+                    <a:schemeClr val="accent1"/>
+                  </a:fillRef>
+                  <a:effectRef idx="0">
+                    <a:schemeClr val="accent1"/>
+                  </a:effectRef>
+                  <a:fontRef idx="minor">
+                    <a:schemeClr val="tx1"/>
+                  </a:fontRef>
+                </p:style>
+              </p:cxnSp>
+            </p:grpSp>
+          </p:grpSp>
+          <p:sp>
+            <p:nvSpPr>
+              <p:cNvPr id="26" name=""/>
+              <p:cNvSpPr txBox="1"/>
+              <p:nvPr/>
+            </p:nvSpPr>
+            <p:spPr>
+              <a:xfrm>
+                <a:off x="9255124" y="3065779"/>
+                <a:ext cx="2936876" cy="363221"/>
+              </a:xfrm>
+              <a:prstGeom prst="rect">
+                <a:avLst/>
+              </a:prstGeom>
+            </p:spPr>
+            <p:txBody>
+              <a:bodyPr wrap="square">
+                <a:spAutoFit/>
+              </a:bodyPr>
+              <a:lstStyle/>
+              <a:p>
+                <a:pPr>
+                  <a:defRPr/>
+                </a:pPr>
+                <a:r>
+                  <a:rPr lang="en-US" altLang="ko-KR"/>
+                  <a:t>3500km/5000km (70%)</a:t>
+                </a:r>
+                <a:endParaRPr lang="en-US" altLang="ko-KR"/>
+              </a:p>
+            </p:txBody>
+          </p:sp>
+        </p:grpSp>
+        <p:grpSp>
+          <p:nvGrpSpPr>
+            <p:cNvPr id="27" name=""/>
+            <p:cNvGrpSpPr/>
+            <p:nvPr/>
+          </p:nvGrpSpPr>
+          <p:grpSpPr>
+            <a:xfrm rot="0">
+              <a:off x="6727824" y="5010150"/>
+              <a:ext cx="5464176" cy="1476375"/>
+              <a:chOff x="6727824" y="1952624"/>
+              <a:chExt cx="5464176" cy="1476375"/>
+            </a:xfrm>
+          </p:grpSpPr>
+          <p:grpSp>
+            <p:nvGrpSpPr>
+              <p:cNvPr id="28" name=""/>
+              <p:cNvGrpSpPr/>
+              <p:nvPr/>
+            </p:nvGrpSpPr>
+            <p:grpSpPr>
+              <a:xfrm rot="0">
+                <a:off x="6727824" y="1952624"/>
+                <a:ext cx="4606925" cy="1425576"/>
+                <a:chOff x="7585074" y="1635125"/>
+                <a:chExt cx="4606925" cy="1425576"/>
+              </a:xfrm>
+            </p:grpSpPr>
+            <p:sp>
+              <p:nvSpPr>
+                <p:cNvPr id="29" name=""/>
+                <p:cNvSpPr/>
+                <p:nvPr/>
+              </p:nvSpPr>
+              <p:spPr>
+                <a:xfrm>
+                  <a:off x="7585074" y="2683199"/>
+                  <a:ext cx="4098925" cy="28251"/>
+                </a:xfrm>
+                <a:prstGeom prst="flowChartTerminator">
+                  <a:avLst/>
+                </a:prstGeom>
+                <a:solidFill>
+                  <a:srgbClr val="ff0000"/>
+                </a:solidFill>
+                <a:ln>
+                  <a:noFill/>
+                </a:ln>
+              </p:spPr>
+              <p:style>
+                <a:lnRef idx="2">
+                  <a:schemeClr val="accent1">
+                    <a:shade val="20000"/>
+                  </a:schemeClr>
+                </a:lnRef>
+                <a:fillRef idx="1">
+                  <a:schemeClr val="accent1"/>
+                </a:fillRef>
+                <a:effectRef idx="0">
+                  <a:schemeClr val="accent1"/>
+                </a:effectRef>
+                <a:fontRef idx="minor">
+                  <a:schemeClr val="lt1"/>
+                </a:fontRef>
+              </p:style>
+              <p:txBody>
+                <a:bodyPr anchor="ctr"/>
+                <a:lstStyle/>
+                <a:p>
+                  <a:pPr algn="ctr">
+                    <a:defRPr/>
+                  </a:pPr>
+                  <a:endParaRPr lang="ko-KR" altLang="en-US"/>
+                </a:p>
+              </p:txBody>
+            </p:sp>
+            <p:pic>
+              <p:nvPicPr>
+                <p:cNvPr id="30" name=""/>
+                <p:cNvPicPr>
+                  <a:picLocks noChangeAspect="1"/>
+                </p:cNvPicPr>
+                <p:nvPr/>
+              </p:nvPicPr>
+              <p:blipFill rotWithShape="1">
+                <a:blip r:embed="rId4"/>
+                <a:stretch>
+                  <a:fillRect/>
+                </a:stretch>
+              </p:blipFill>
+              <p:spPr>
+                <a:xfrm>
+                  <a:off x="10478128" y="2050252"/>
+                  <a:ext cx="1010448" cy="1010448"/>
+                </a:xfrm>
+                <a:prstGeom prst="rect">
+                  <a:avLst/>
+                </a:prstGeom>
+              </p:spPr>
+            </p:pic>
+            <p:grpSp>
+              <p:nvGrpSpPr>
+                <p:cNvPr id="31" name=""/>
+                <p:cNvGrpSpPr/>
+                <p:nvPr/>
+              </p:nvGrpSpPr>
+              <p:grpSpPr>
+                <a:xfrm rot="0">
+                  <a:off x="11684000" y="1635125"/>
+                  <a:ext cx="508000" cy="1079499"/>
+                  <a:chOff x="10890248" y="1746249"/>
+                  <a:chExt cx="508000" cy="1079499"/>
+                </a:xfrm>
+              </p:grpSpPr>
+              <p:sp>
+                <p:nvSpPr>
+                  <p:cNvPr id="32" name=""/>
+                  <p:cNvSpPr/>
+                  <p:nvPr/>
+                </p:nvSpPr>
+                <p:spPr>
+                  <a:xfrm>
+                    <a:off x="10890248" y="1746249"/>
+                    <a:ext cx="508000" cy="412749"/>
+                  </a:xfrm>
+                  <a:prstGeom prst="wave">
+                    <a:avLst>
+                      <a:gd name="adj1" fmla="val 12500"/>
+                      <a:gd name="adj2" fmla="val 0"/>
+                    </a:avLst>
+                  </a:prstGeom>
+                  <a:solidFill>
+                    <a:schemeClr val="dk1"/>
+                  </a:solidFill>
+                  <a:ln>
+                    <a:solidFill>
+                      <a:schemeClr val="dk1"/>
+                    </a:solidFill>
+                  </a:ln>
+                </p:spPr>
+                <p:style>
+                  <a:lnRef idx="2">
+                    <a:schemeClr val="accent1">
+                      <a:shade val="20000"/>
+                    </a:schemeClr>
+                  </a:lnRef>
+                  <a:fillRef idx="1">
+                    <a:schemeClr val="accent1"/>
+                  </a:fillRef>
+                  <a:effectRef idx="0">
+                    <a:schemeClr val="accent1"/>
+                  </a:effectRef>
+                  <a:fontRef idx="minor">
+                    <a:schemeClr val="lt1"/>
+                  </a:fontRef>
+                </p:style>
+                <p:txBody>
+                  <a:bodyPr anchor="ctr"/>
+                  <a:lstStyle/>
+                  <a:p>
+                    <a:pPr algn="ctr">
+                      <a:defRPr/>
+                    </a:pPr>
+                    <a:endParaRPr lang="ko-KR" altLang="en-US"/>
+                  </a:p>
+                </p:txBody>
+              </p:sp>
+              <p:cxnSp>
+                <p:nvCxnSpPr>
+                  <p:cNvPr id="33" name=""/>
+                  <p:cNvCxnSpPr>
+                    <a:stCxn id="32" idx="1"/>
+                  </p:cNvCxnSpPr>
+                  <p:nvPr/>
+                </p:nvCxnSpPr>
+                <p:spPr>
+                  <a:xfrm rot="16200000" flipH="1" flipV="1">
+                    <a:off x="10453690" y="2389183"/>
+                    <a:ext cx="873124" cy="7"/>
+                  </a:xfrm>
+                  <a:prstGeom prst="line">
+                    <a:avLst/>
+                  </a:prstGeom>
+                  <a:ln>
+                    <a:solidFill>
+                      <a:schemeClr val="dk1"/>
+                    </a:solidFill>
+                  </a:ln>
+                </p:spPr>
+                <p:style>
+                  <a:lnRef idx="1">
+                    <a:schemeClr val="accent1"/>
+                  </a:lnRef>
+                  <a:fillRef idx="0">
+                    <a:schemeClr val="accent1"/>
+                  </a:fillRef>
+                  <a:effectRef idx="0">
+                    <a:schemeClr val="accent1"/>
+                  </a:effectRef>
+                  <a:fontRef idx="minor">
+                    <a:schemeClr val="tx1"/>
+                  </a:fontRef>
+                </p:style>
+              </p:cxnSp>
+            </p:grpSp>
+          </p:grpSp>
+          <p:sp>
+            <p:nvSpPr>
+              <p:cNvPr id="34" name=""/>
+              <p:cNvSpPr txBox="1"/>
+              <p:nvPr/>
+            </p:nvSpPr>
+            <p:spPr>
+              <a:xfrm>
+                <a:off x="9255124" y="3065779"/>
+                <a:ext cx="2936876" cy="363221"/>
+              </a:xfrm>
+              <a:prstGeom prst="rect">
+                <a:avLst/>
+              </a:prstGeom>
+            </p:spPr>
+            <p:txBody>
+              <a:bodyPr wrap="square">
+                <a:spAutoFit/>
+              </a:bodyPr>
+              <a:lstStyle/>
+              <a:p>
+                <a:pPr>
+                  <a:defRPr/>
+                </a:pPr>
+                <a:r>
+                  <a:rPr lang="en-US" altLang="ko-KR"/>
+                  <a:t>4600km/5000km (92%)</a:t>
+                </a:r>
+                <a:endParaRPr lang="en-US" altLang="ko-KR"/>
+              </a:p>
+            </p:txBody>
+          </p:sp>
+        </p:grpSp>
+      </p:grpSp>
     </p:spTree>
   </p:cSld>
   <p:clrMapOvr>
@@ -15935,7 +17690,7 @@
             </a:pPr>
             <a:r>
               <a:rPr kumimoji="1" lang="en-US" altLang="ko-KR" sz="4800"/>
-              <a:t>4-2. Flow_Chart</a:t>
+              <a:t>4-2. Menu_Tree</a:t>
             </a:r>
             <a:endParaRPr kumimoji="1" lang="en-US" altLang="ko-KR" sz="4800"/>
           </a:p>
@@ -15957,8 +17712,8 @@
         </p:blipFill>
         <p:spPr>
           <a:xfrm>
-            <a:off x="1604495" y="1333914"/>
-            <a:ext cx="8983010" cy="5524086"/>
+            <a:off x="1980879" y="1367790"/>
+            <a:ext cx="8230241" cy="5490210"/>
           </a:xfrm>
           <a:prstGeom prst="rect">
             <a:avLst/>
@@ -16044,6 +17799,115 @@
             </a:pPr>
             <a:r>
               <a:rPr kumimoji="1" lang="en-US" altLang="ko-KR" sz="4800"/>
+              <a:t>4-3. Flow_Chart</a:t>
+            </a:r>
+            <a:endParaRPr kumimoji="1" lang="en-US" altLang="ko-KR" sz="4800"/>
+          </a:p>
+        </p:txBody>
+      </p:sp>
+      <p:pic>
+        <p:nvPicPr>
+          <p:cNvPr id="6" name=""/>
+          <p:cNvPicPr>
+            <a:picLocks noChangeAspect="1"/>
+          </p:cNvPicPr>
+          <p:nvPr/>
+        </p:nvPicPr>
+        <p:blipFill rotWithShape="1">
+          <a:blip r:embed="rId2"/>
+          <a:stretch>
+            <a:fillRect/>
+          </a:stretch>
+        </p:blipFill>
+        <p:spPr>
+          <a:xfrm>
+            <a:off x="1604495" y="1333914"/>
+            <a:ext cx="8983010" cy="5524086"/>
+          </a:xfrm>
+          <a:prstGeom prst="rect">
+            <a:avLst/>
+          </a:prstGeom>
+        </p:spPr>
+      </p:pic>
+    </p:spTree>
+  </p:cSld>
+  <p:clrMapOvr>
+    <a:masterClrMapping/>
+  </p:clrMapOvr>
+  <mc:AlternateContent xmlns:mc="http://schemas.openxmlformats.org/markup-compatibility/2006">
+    <mc:Choice xmlns:p14="http://schemas.microsoft.com/office/powerpoint/2010/main" Requires="p14">
+      <p:transition xmlns:mc="http://schemas.openxmlformats.org/markup-compatibility/2006" xmlns:p14="http://schemas.microsoft.com/office/powerpoint/2010/main" mc:Ignorable="p14" p14:dur="500"/>
+    </mc:Choice>
+    <mc:Fallback>
+      <p:transition/>
+    </mc:Fallback>
+  </mc:AlternateContent>
+</p:sld>
+</file>
+
+<file path=ppt/slides/slide34.xml><?xml version="1.0" encoding="utf-8"?>
+<p:sld xmlns:r="http://schemas.openxmlformats.org/officeDocument/2006/relationships" xmlns:c="http://schemas.openxmlformats.org/drawingml/2006/chart" xmlns:a="http://schemas.openxmlformats.org/drawingml/2006/main" xmlns:dgm="http://schemas.openxmlformats.org/drawingml/2006/diagram" xmlns:dsp="http://schemas.microsoft.com/office/drawing/2008/diagram" xmlns:p="http://schemas.openxmlformats.org/presentationml/2006/main">
+  <p:cSld>
+    <p:spTree>
+      <p:nvGrpSpPr>
+        <p:cNvPr id="1" name=""/>
+        <p:cNvGrpSpPr/>
+        <p:nvPr/>
+      </p:nvGrpSpPr>
+      <p:grpSpPr>
+        <a:xfrm>
+          <a:off x="0" y="0"/>
+          <a:ext cx="0" cy="0"/>
+          <a:chOff x="0" y="0"/>
+          <a:chExt cx="0" cy="0"/>
+        </a:xfrm>
+      </p:grpSpPr>
+      <p:sp>
+        <p:nvSpPr>
+          <p:cNvPr id="4" name="직사각형 9"/>
+          <p:cNvSpPr/>
+          <p:nvPr/>
+        </p:nvSpPr>
+        <p:spPr>
+          <a:xfrm>
+            <a:off x="0" y="0"/>
+            <a:ext cx="12192001" cy="1338109"/>
+          </a:xfrm>
+          <a:prstGeom prst="rect">
+            <a:avLst/>
+          </a:prstGeom>
+          <a:solidFill>
+            <a:schemeClr val="accent1"/>
+          </a:solidFill>
+          <a:ln>
+            <a:noFill/>
+          </a:ln>
+        </p:spPr>
+        <p:style>
+          <a:lnRef idx="2">
+            <a:schemeClr val="accent1">
+              <a:shade val="50000"/>
+            </a:schemeClr>
+          </a:lnRef>
+          <a:fillRef idx="1">
+            <a:schemeClr val="accent1"/>
+          </a:fillRef>
+          <a:effectRef idx="0">
+            <a:schemeClr val="accent1"/>
+          </a:effectRef>
+          <a:fontRef idx="minor">
+            <a:schemeClr val="lt1"/>
+          </a:fontRef>
+        </p:style>
+        <p:txBody>
+          <a:bodyPr anchor="ctr"/>
+          <a:lstStyle/>
+          <a:p>
+            <a:pPr>
+              <a:defRPr/>
+            </a:pPr>
+            <a:r>
+              <a:rPr kumimoji="1" lang="en-US" altLang="ko-KR" sz="4800"/>
               <a:t>4-3. Sequence</a:t>
             </a:r>
             <a:endParaRPr kumimoji="1" lang="en-US" altLang="ko-KR" sz="4800"/>
@@ -16066,7 +17930,7 @@
 </p:sld>
 </file>
 
-<file path=ppt/slides/slide34.xml><?xml version="1.0" encoding="utf-8"?>
+<file path=ppt/slides/slide35.xml><?xml version="1.0" encoding="utf-8"?>
 <p:sld xmlns:a="http://schemas.openxmlformats.org/drawingml/2006/main" xmlns:r="http://schemas.openxmlformats.org/officeDocument/2006/relationships" xmlns:p="http://schemas.openxmlformats.org/presentationml/2006/main">
   <p:cSld>
     <p:spTree>
@@ -16385,7 +18249,7 @@
 </p:sld>
 </file>
 
-<file path=ppt/slides/slide35.xml><?xml version="1.0" encoding="utf-8"?>
+<file path=ppt/slides/slide36.xml><?xml version="1.0" encoding="utf-8"?>
 <p:sld xmlns:r="http://schemas.openxmlformats.org/officeDocument/2006/relationships" xmlns:c="http://schemas.openxmlformats.org/drawingml/2006/chart" xmlns:a="http://schemas.openxmlformats.org/drawingml/2006/main" xmlns:dgm="http://schemas.openxmlformats.org/drawingml/2006/diagram" xmlns:dsp="http://schemas.microsoft.com/office/drawing/2008/diagram" xmlns:p="http://schemas.openxmlformats.org/presentationml/2006/main">
   <p:cSld>
     <p:spTree>
@@ -16596,7 +18460,7 @@
 </p:sld>
 </file>
 
-<file path=ppt/slides/slide36.xml><?xml version="1.0" encoding="utf-8"?>
+<file path=ppt/slides/slide37.xml><?xml version="1.0" encoding="utf-8"?>
 <p:sld xmlns:a="http://schemas.openxmlformats.org/drawingml/2006/main" xmlns:r="http://schemas.openxmlformats.org/officeDocument/2006/relationships" xmlns:p="http://schemas.openxmlformats.org/presentationml/2006/main">
   <p:cSld>
     <p:spTree>
@@ -16874,7 +18738,7 @@
 </p:sld>
 </file>
 
-<file path=ppt/slides/slide37.xml><?xml version="1.0" encoding="utf-8"?>
+<file path=ppt/slides/slide38.xml><?xml version="1.0" encoding="utf-8"?>
 <p:sld xmlns:r="http://schemas.openxmlformats.org/officeDocument/2006/relationships" xmlns:c="http://schemas.openxmlformats.org/drawingml/2006/chart" xmlns:a="http://schemas.openxmlformats.org/drawingml/2006/main" xmlns:dgm="http://schemas.openxmlformats.org/drawingml/2006/diagram" xmlns:dsp="http://schemas.microsoft.com/office/drawing/2008/diagram" xmlns:p="http://schemas.openxmlformats.org/presentationml/2006/main">
   <p:cSld>
     <p:spTree>
@@ -16979,7 +18843,7 @@
 </p:sld>
 </file>
 
-<file path=ppt/slides/slide38.xml><?xml version="1.0" encoding="utf-8"?>
+<file path=ppt/slides/slide39.xml><?xml version="1.0" encoding="utf-8"?>
 <p:sld xmlns:a="http://schemas.openxmlformats.org/drawingml/2006/main" xmlns:r="http://schemas.openxmlformats.org/officeDocument/2006/relationships" xmlns:p="http://schemas.openxmlformats.org/presentationml/2006/main">
   <p:cSld>
     <p:spTree>
@@ -17257,7 +19121,96 @@
 </p:sld>
 </file>
 
-<file path=ppt/slides/slide39.xml><?xml version="1.0" encoding="utf-8"?>
+<file path=ppt/slides/slide4.xml><?xml version="1.0" encoding="utf-8"?>
+<p:sld xmlns:r="http://schemas.openxmlformats.org/officeDocument/2006/relationships" xmlns:c="http://schemas.openxmlformats.org/drawingml/2006/chart" xmlns:a="http://schemas.openxmlformats.org/drawingml/2006/main" xmlns:dgm="http://schemas.openxmlformats.org/drawingml/2006/diagram" xmlns:dsp="http://schemas.microsoft.com/office/drawing/2008/diagram" xmlns:p="http://schemas.openxmlformats.org/presentationml/2006/main">
+  <p:cSld>
+    <p:spTree>
+      <p:nvGrpSpPr>
+        <p:cNvPr id="1" name=""/>
+        <p:cNvGrpSpPr/>
+        <p:nvPr/>
+      </p:nvGrpSpPr>
+      <p:grpSpPr>
+        <a:xfrm>
+          <a:off x="0" y="0"/>
+          <a:ext cx="0" cy="0"/>
+          <a:chOff x="0" y="0"/>
+          <a:chExt cx="0" cy="0"/>
+        </a:xfrm>
+      </p:grpSpPr>
+      <p:sp>
+        <p:nvSpPr>
+          <p:cNvPr id="2" name="제목 1"/>
+          <p:cNvSpPr>
+            <a:spLocks noGrp="1"/>
+          </p:cNvSpPr>
+          <p:nvPr>
+            <p:ph type="title" idx="0"/>
+          </p:nvPr>
+        </p:nvSpPr>
+        <p:spPr/>
+        <p:txBody>
+          <a:bodyPr/>
+          <a:lstStyle/>
+          <a:p>
+            <a:pPr lvl="0">
+              <a:defRPr/>
+            </a:pPr>
+            <a:r>
+              <a:rPr lang="ko-KR" altLang="en-US"/>
+              <a:t>아이디어 노트</a:t>
+            </a:r>
+            <a:endParaRPr lang="ko-KR" altLang="en-US"/>
+          </a:p>
+        </p:txBody>
+      </p:sp>
+      <p:sp>
+        <p:nvSpPr>
+          <p:cNvPr id="5" name="내용 개체 틀 4"/>
+          <p:cNvSpPr>
+            <a:spLocks noGrp="1"/>
+          </p:cNvSpPr>
+          <p:nvPr>
+            <p:ph idx="1"/>
+          </p:nvPr>
+        </p:nvSpPr>
+        <p:spPr/>
+        <p:txBody>
+          <a:bodyPr/>
+          <a:lstStyle/>
+          <a:p>
+            <a:pPr lvl="0">
+              <a:defRPr/>
+            </a:pPr>
+            <a:r>
+              <a:rPr lang="ko-KR" altLang="en-US"/>
+              <a:t>개발하고자 하는 아이디어에 대해 기술한다</a:t>
+            </a:r>
+            <a:r>
+              <a:rPr lang="en-US" altLang="ko-KR"/>
+              <a:t>.</a:t>
+            </a:r>
+            <a:endParaRPr lang="ko-KR" altLang="en-US"/>
+          </a:p>
+        </p:txBody>
+      </p:sp>
+    </p:spTree>
+  </p:cSld>
+  <p:clrMapOvr>
+    <a:masterClrMapping/>
+  </p:clrMapOvr>
+  <mc:AlternateContent xmlns:mc="http://schemas.openxmlformats.org/markup-compatibility/2006">
+    <mc:Choice xmlns:p14="http://schemas.microsoft.com/office/powerpoint/2010/main" Requires="p14">
+      <p:transition xmlns:mc="http://schemas.openxmlformats.org/markup-compatibility/2006" xmlns:p14="http://schemas.microsoft.com/office/powerpoint/2010/main" mc:Ignorable="p14" p14:dur="500"/>
+    </mc:Choice>
+    <mc:Fallback>
+      <p:transition/>
+    </mc:Fallback>
+  </mc:AlternateContent>
+</p:sld>
+</file>
+
+<file path=ppt/slides/slide40.xml><?xml version="1.0" encoding="utf-8"?>
 <p:sld xmlns:a="http://schemas.openxmlformats.org/drawingml/2006/main" xmlns:r="http://schemas.openxmlformats.org/officeDocument/2006/relationships" xmlns:p="http://schemas.openxmlformats.org/presentationml/2006/main">
   <p:cSld>
     <p:spTree>
@@ -17345,96 +19298,7 @@
 </p:sld>
 </file>
 
-<file path=ppt/slides/slide4.xml><?xml version="1.0" encoding="utf-8"?>
-<p:sld xmlns:r="http://schemas.openxmlformats.org/officeDocument/2006/relationships" xmlns:c="http://schemas.openxmlformats.org/drawingml/2006/chart" xmlns:a="http://schemas.openxmlformats.org/drawingml/2006/main" xmlns:dgm="http://schemas.openxmlformats.org/drawingml/2006/diagram" xmlns:dsp="http://schemas.microsoft.com/office/drawing/2008/diagram" xmlns:p="http://schemas.openxmlformats.org/presentationml/2006/main">
-  <p:cSld>
-    <p:spTree>
-      <p:nvGrpSpPr>
-        <p:cNvPr id="1" name=""/>
-        <p:cNvGrpSpPr/>
-        <p:nvPr/>
-      </p:nvGrpSpPr>
-      <p:grpSpPr>
-        <a:xfrm>
-          <a:off x="0" y="0"/>
-          <a:ext cx="0" cy="0"/>
-          <a:chOff x="0" y="0"/>
-          <a:chExt cx="0" cy="0"/>
-        </a:xfrm>
-      </p:grpSpPr>
-      <p:sp>
-        <p:nvSpPr>
-          <p:cNvPr id="2" name="제목 1"/>
-          <p:cNvSpPr>
-            <a:spLocks noGrp="1"/>
-          </p:cNvSpPr>
-          <p:nvPr>
-            <p:ph type="title" idx="0"/>
-          </p:nvPr>
-        </p:nvSpPr>
-        <p:spPr/>
-        <p:txBody>
-          <a:bodyPr/>
-          <a:lstStyle/>
-          <a:p>
-            <a:pPr lvl="0">
-              <a:defRPr/>
-            </a:pPr>
-            <a:r>
-              <a:rPr lang="ko-KR" altLang="en-US"/>
-              <a:t>아이디어 노트</a:t>
-            </a:r>
-            <a:endParaRPr lang="ko-KR" altLang="en-US"/>
-          </a:p>
-        </p:txBody>
-      </p:sp>
-      <p:sp>
-        <p:nvSpPr>
-          <p:cNvPr id="5" name="내용 개체 틀 4"/>
-          <p:cNvSpPr>
-            <a:spLocks noGrp="1"/>
-          </p:cNvSpPr>
-          <p:nvPr>
-            <p:ph idx="1"/>
-          </p:nvPr>
-        </p:nvSpPr>
-        <p:spPr/>
-        <p:txBody>
-          <a:bodyPr/>
-          <a:lstStyle/>
-          <a:p>
-            <a:pPr lvl="0">
-              <a:defRPr/>
-            </a:pPr>
-            <a:r>
-              <a:rPr lang="ko-KR" altLang="en-US"/>
-              <a:t>개발하고자 하는 아이디어에 대해 기술한다</a:t>
-            </a:r>
-            <a:r>
-              <a:rPr lang="en-US" altLang="ko-KR"/>
-              <a:t>.</a:t>
-            </a:r>
-            <a:endParaRPr lang="ko-KR" altLang="en-US"/>
-          </a:p>
-        </p:txBody>
-      </p:sp>
-    </p:spTree>
-  </p:cSld>
-  <p:clrMapOvr>
-    <a:masterClrMapping/>
-  </p:clrMapOvr>
-  <mc:AlternateContent xmlns:mc="http://schemas.openxmlformats.org/markup-compatibility/2006">
-    <mc:Choice xmlns:p14="http://schemas.microsoft.com/office/powerpoint/2010/main" Requires="p14">
-      <p:transition xmlns:mc="http://schemas.openxmlformats.org/markup-compatibility/2006" xmlns:p14="http://schemas.microsoft.com/office/powerpoint/2010/main" mc:Ignorable="p14" p14:dur="500"/>
-    </mc:Choice>
-    <mc:Fallback>
-      <p:transition/>
-    </mc:Fallback>
-  </mc:AlternateContent>
-</p:sld>
-</file>
-
-<file path=ppt/slides/slide40.xml><?xml version="1.0" encoding="utf-8"?>
+<file path=ppt/slides/slide41.xml><?xml version="1.0" encoding="utf-8"?>
 <p:sld xmlns:a="http://schemas.openxmlformats.org/drawingml/2006/main" xmlns:r="http://schemas.openxmlformats.org/officeDocument/2006/relationships" xmlns:p="http://schemas.openxmlformats.org/presentationml/2006/main">
   <p:cSld>
     <p:spTree>
@@ -17731,7 +19595,7 @@
 </p:sld>
 </file>
 
-<file path=ppt/slides/slide41.xml><?xml version="1.0" encoding="utf-8"?>
+<file path=ppt/slides/slide42.xml><?xml version="1.0" encoding="utf-8"?>
 <p:sld xmlns:a="http://schemas.openxmlformats.org/drawingml/2006/main" xmlns:r="http://schemas.openxmlformats.org/officeDocument/2006/relationships" xmlns:p="http://schemas.openxmlformats.org/presentationml/2006/main">
   <p:cSld>
     <p:spTree>

</xml_diff>

<commit_message>
add Menu_Sequence edit Menu_Tree
</commit_message>
<xml_diff>
--- a/2021_Summer/jp.hong/Project_BnC_jph.pptx
+++ b/2021_Summer/jp.hong/Project_BnC_jph.pptx
@@ -2,7 +2,7 @@
 <file path=ppt/presentation.xml><?xml version="1.0" encoding="utf-8"?>
 <p:presentation xmlns:r="http://schemas.openxmlformats.org/officeDocument/2006/relationships" xmlns:c="http://schemas.openxmlformats.org/drawingml/2006/chart" xmlns:a="http://schemas.openxmlformats.org/drawingml/2006/main" xmlns:dgm="http://schemas.openxmlformats.org/drawingml/2006/diagram" xmlns:dsp="http://schemas.microsoft.com/office/drawing/2008/diagram" xmlns:p="http://schemas.openxmlformats.org/presentationml/2006/main">
   <p:sldMasterIdLst>
-    <p:sldMasterId id="2147483670" r:id="rId1"/>
+    <p:sldMasterId id="2147483673" r:id="rId1"/>
   </p:sldMasterIdLst>
   <p:notesMasterIdLst>
     <p:notesMasterId r:id="rId2"/>
@@ -47,14 +47,15 @@
     <p:sldId id="335" r:id="rId39"/>
     <p:sldId id="336" r:id="rId40"/>
     <p:sldId id="337" r:id="rId41"/>
-    <p:sldId id="291" r:id="rId42"/>
-    <p:sldId id="299" r:id="rId43"/>
-    <p:sldId id="292" r:id="rId44"/>
-    <p:sldId id="300" r:id="rId45"/>
-    <p:sldId id="306" r:id="rId46"/>
-    <p:sldId id="307" r:id="rId47"/>
-    <p:sldId id="294" r:id="rId48"/>
-    <p:sldId id="302" r:id="rId49"/>
+    <p:sldId id="347" r:id="rId42"/>
+    <p:sldId id="291" r:id="rId43"/>
+    <p:sldId id="299" r:id="rId44"/>
+    <p:sldId id="292" r:id="rId45"/>
+    <p:sldId id="300" r:id="rId46"/>
+    <p:sldId id="306" r:id="rId47"/>
+    <p:sldId id="307" r:id="rId48"/>
+    <p:sldId id="294" r:id="rId49"/>
+    <p:sldId id="302" r:id="rId50"/>
   </p:sldIdLst>
   <p:sldSz cx="12192000" cy="6858000"/>
   <p:notesSz cx="7104063" cy="10234613"/>
@@ -251,7 +252,7 @@
               <a:pPr lvl="0">
                 <a:defRPr/>
               </a:pPr>
-              <a:t>2021-07-09</a:t>
+              <a:t>2021-07-12</a:t>
             </a:fld>
             <a:endParaRPr lang="ko-KR" altLang="en-US"/>
           </a:p>
@@ -691,7 +692,7 @@
                 <a:buNone/>
                 <a:defRPr/>
               </a:pPr>
-              <a:t>32</a:t>
+              <a:t>33</a:t>
             </a:fld>
             <a:endParaRPr lang="en-US" sz="1200">
               <a:latin typeface="+mn-lt"/>
@@ -19946,7 +19947,7 @@
 </file>
 
 <file path=ppt/slides/slide37.xml><?xml version="1.0" encoding="utf-8"?>
-<p:sld xmlns:a="http://schemas.openxmlformats.org/drawingml/2006/main" xmlns:r="http://schemas.openxmlformats.org/officeDocument/2006/relationships" xmlns:p="http://schemas.openxmlformats.org/presentationml/2006/main">
+<p:sld xmlns:r="http://schemas.openxmlformats.org/officeDocument/2006/relationships" xmlns:c="http://schemas.openxmlformats.org/drawingml/2006/chart" xmlns:a="http://schemas.openxmlformats.org/drawingml/2006/main" xmlns:dgm="http://schemas.openxmlformats.org/drawingml/2006/diagram" xmlns:dsp="http://schemas.microsoft.com/office/drawing/2008/diagram" xmlns:p="http://schemas.openxmlformats.org/presentationml/2006/main">
   <p:cSld>
     <p:spTree>
       <p:nvGrpSpPr>
@@ -20010,12 +20011,13 @@
               <a:rPr kumimoji="1" lang="en-US" altLang="ko-KR" sz="4800"/>
               <a:t>4-2. Menu_Tree</a:t>
             </a:r>
+            <a:endParaRPr kumimoji="1" lang="en-US" altLang="ko-KR" sz="4800"/>
           </a:p>
         </p:txBody>
       </p:sp>
       <p:pic>
         <p:nvPicPr>
-          <p:cNvPr id="6" name="그림 5"/>
+          <p:cNvPr id="8" name=""/>
           <p:cNvPicPr>
             <a:picLocks noChangeAspect="1"/>
           </p:cNvPicPr>
@@ -20029,8 +20031,32 @@
         </p:blipFill>
         <p:spPr>
           <a:xfrm>
-            <a:off x="1980879" y="1367790"/>
-            <a:ext cx="8230241" cy="5490210"/>
+            <a:off x="1098016" y="1336862"/>
+            <a:ext cx="4997983" cy="5521137"/>
+          </a:xfrm>
+          <a:prstGeom prst="rect">
+            <a:avLst/>
+          </a:prstGeom>
+        </p:spPr>
+      </p:pic>
+      <p:pic>
+        <p:nvPicPr>
+          <p:cNvPr id="9" name=""/>
+          <p:cNvPicPr>
+            <a:picLocks noChangeAspect="1"/>
+          </p:cNvPicPr>
+          <p:nvPr/>
+        </p:nvPicPr>
+        <p:blipFill rotWithShape="1">
+          <a:blip r:embed="rId3"/>
+          <a:stretch>
+            <a:fillRect/>
+          </a:stretch>
+        </p:blipFill>
+        <p:spPr>
+          <a:xfrm>
+            <a:off x="6096000" y="1353804"/>
+            <a:ext cx="5164489" cy="5504195"/>
           </a:xfrm>
           <a:prstGeom prst="rect">
             <a:avLst/>
@@ -20042,11 +20068,11 @@
   <p:clrMapOvr>
     <a:masterClrMapping/>
   </p:clrMapOvr>
-  <mc:AlternateContent xmlns:mc="http://schemas.openxmlformats.org/markup-compatibility/2006" xmlns:p14="http://schemas.microsoft.com/office/powerpoint/2010/main">
-    <mc:Choice Requires="p14">
-      <p:transition/>
+  <mc:AlternateContent xmlns:mc="http://schemas.openxmlformats.org/markup-compatibility/2006">
+    <mc:Choice xmlns:p14="http://schemas.microsoft.com/office/powerpoint/2010/main" Requires="p14">
+      <p:transition xmlns:mc="http://schemas.openxmlformats.org/markup-compatibility/2006" xmlns:p14="http://schemas.microsoft.com/office/powerpoint/2010/main" mc:Ignorable="p14" p14:dur="500"/>
     </mc:Choice>
-    <mc:Fallback xmlns:dsp="http://schemas.microsoft.com/office/drawing/2008/diagram" xmlns:dgm="http://schemas.openxmlformats.org/drawingml/2006/diagram" xmlns:c="http://schemas.openxmlformats.org/drawingml/2006/chart" xmlns="">
+    <mc:Fallback>
       <p:transition/>
     </mc:Fallback>
   </mc:AlternateContent>
@@ -20162,7 +20188,7 @@
 </file>
 
 <file path=ppt/slides/slide39.xml><?xml version="1.0" encoding="utf-8"?>
-<p:sld xmlns:a="http://schemas.openxmlformats.org/drawingml/2006/main" xmlns:r="http://schemas.openxmlformats.org/officeDocument/2006/relationships" xmlns:p="http://schemas.openxmlformats.org/presentationml/2006/main">
+<p:sld xmlns:r="http://schemas.openxmlformats.org/officeDocument/2006/relationships" xmlns:c="http://schemas.openxmlformats.org/drawingml/2006/chart" xmlns:a="http://schemas.openxmlformats.org/drawingml/2006/main" xmlns:dgm="http://schemas.openxmlformats.org/drawingml/2006/diagram" xmlns:dsp="http://schemas.microsoft.com/office/drawing/2008/diagram" xmlns:p="http://schemas.openxmlformats.org/presentationml/2006/main">
   <p:cSld>
     <p:spTree>
       <p:nvGrpSpPr>
@@ -20224,8 +20250,1116 @@
             </a:pPr>
             <a:r>
               <a:rPr kumimoji="1" lang="en-US" altLang="ko-KR" sz="4800"/>
-              <a:t>4-3. Sequence</a:t>
-            </a:r>
+              <a:t>4-3. Menu Sequence</a:t>
+            </a:r>
+            <a:endParaRPr kumimoji="1" lang="en-US" altLang="ko-KR" sz="4800"/>
+          </a:p>
+        </p:txBody>
+      </p:sp>
+      <p:grpSp>
+        <p:nvGrpSpPr>
+          <p:cNvPr id="24" name=""/>
+          <p:cNvGrpSpPr/>
+          <p:nvPr/>
+        </p:nvGrpSpPr>
+        <p:grpSpPr>
+          <a:xfrm rot="0">
+            <a:off x="0" y="1311274"/>
+            <a:ext cx="5344583" cy="5546725"/>
+            <a:chOff x="0" y="1311275"/>
+            <a:chExt cx="5344583" cy="5546725"/>
+          </a:xfrm>
+        </p:grpSpPr>
+        <p:grpSp>
+          <p:nvGrpSpPr>
+            <p:cNvPr id="23" name=""/>
+            <p:cNvGrpSpPr/>
+            <p:nvPr/>
+          </p:nvGrpSpPr>
+          <p:grpSpPr>
+            <a:xfrm rot="0">
+              <a:off x="0" y="1311275"/>
+              <a:ext cx="5344583" cy="5546725"/>
+              <a:chOff x="0" y="1311275"/>
+              <a:chExt cx="5344583" cy="5546725"/>
+            </a:xfrm>
+          </p:grpSpPr>
+          <p:grpSp>
+            <p:nvGrpSpPr>
+              <p:cNvPr id="18" name=""/>
+              <p:cNvGrpSpPr/>
+              <p:nvPr/>
+            </p:nvGrpSpPr>
+            <p:grpSpPr>
+              <a:xfrm rot="0">
+                <a:off x="0" y="1311275"/>
+                <a:ext cx="5344583" cy="5546725"/>
+                <a:chOff x="3423708" y="1311275"/>
+                <a:chExt cx="5344583" cy="5546725"/>
+              </a:xfrm>
+            </p:grpSpPr>
+            <p:grpSp>
+              <p:nvGrpSpPr>
+                <p:cNvPr id="15" name=""/>
+                <p:cNvGrpSpPr/>
+                <p:nvPr/>
+              </p:nvGrpSpPr>
+              <p:grpSpPr>
+                <a:xfrm rot="0">
+                  <a:off x="3423708" y="1323974"/>
+                  <a:ext cx="5344583" cy="5534026"/>
+                  <a:chOff x="0" y="1323974"/>
+                  <a:chExt cx="5344583" cy="5534026"/>
+                </a:xfrm>
+              </p:grpSpPr>
+              <p:sp>
+                <p:nvSpPr>
+                  <p:cNvPr id="5" name=""/>
+                  <p:cNvSpPr/>
+                  <p:nvPr/>
+                </p:nvSpPr>
+                <p:spPr>
+                  <a:xfrm>
+                    <a:off x="0" y="1323974"/>
+                    <a:ext cx="5344583" cy="5534024"/>
+                  </a:xfrm>
+                  <a:prstGeom prst="rect">
+                    <a:avLst/>
+                  </a:prstGeom>
+                  <a:solidFill>
+                    <a:srgbClr val="f2f2f2"/>
+                  </a:solidFill>
+                  <a:ln>
+                    <a:noFill/>
+                  </a:ln>
+                </p:spPr>
+                <p:style>
+                  <a:lnRef idx="2">
+                    <a:schemeClr val="accent1">
+                      <a:shade val="20000"/>
+                    </a:schemeClr>
+                  </a:lnRef>
+                  <a:fillRef idx="1">
+                    <a:schemeClr val="accent1"/>
+                  </a:fillRef>
+                  <a:effectRef idx="0">
+                    <a:schemeClr val="accent1"/>
+                  </a:effectRef>
+                  <a:fontRef idx="minor">
+                    <a:schemeClr val="lt1"/>
+                  </a:fontRef>
+                </p:style>
+                <p:txBody>
+                  <a:bodyPr anchor="ctr"/>
+                  <a:p>
+                    <a:pPr algn="ctr">
+                      <a:defRPr/>
+                    </a:pPr>
+                    <a:endParaRPr lang="en-US" altLang="ko-KR"/>
+                  </a:p>
+                </p:txBody>
+              </p:sp>
+              <p:sp>
+                <p:nvSpPr>
+                  <p:cNvPr id="6" name=""/>
+                  <p:cNvSpPr/>
+                  <p:nvPr/>
+                </p:nvSpPr>
+                <p:spPr>
+                  <a:xfrm>
+                    <a:off x="0" y="6200774"/>
+                    <a:ext cx="1066799" cy="657225"/>
+                  </a:xfrm>
+                  <a:prstGeom prst="rect">
+                    <a:avLst/>
+                  </a:prstGeom>
+                  <a:solidFill>
+                    <a:srgbClr val="faf3db"/>
+                  </a:solidFill>
+                </p:spPr>
+                <p:style>
+                  <a:lnRef idx="2">
+                    <a:schemeClr val="accent1">
+                      <a:shade val="20000"/>
+                    </a:schemeClr>
+                  </a:lnRef>
+                  <a:fillRef idx="1">
+                    <a:schemeClr val="accent1"/>
+                  </a:fillRef>
+                  <a:effectRef idx="0">
+                    <a:schemeClr val="accent1"/>
+                  </a:effectRef>
+                  <a:fontRef idx="minor">
+                    <a:schemeClr val="lt1"/>
+                  </a:fontRef>
+                </p:style>
+                <p:txBody>
+                  <a:bodyPr anchor="ctr"/>
+                  <a:p>
+                    <a:pPr algn="ctr">
+                      <a:defRPr/>
+                    </a:pPr>
+                    <a:r>
+                      <a:rPr lang="ko-KR" altLang="en-US">
+                        <a:solidFill>
+                          <a:schemeClr val="dk1"/>
+                        </a:solidFill>
+                      </a:rPr>
+                      <a:t>정비</a:t>
+                    </a:r>
+                    <a:endParaRPr lang="ko-KR" altLang="en-US">
+                      <a:solidFill>
+                        <a:schemeClr val="dk1"/>
+                      </a:solidFill>
+                    </a:endParaRPr>
+                  </a:p>
+                </p:txBody>
+              </p:sp>
+              <p:sp>
+                <p:nvSpPr>
+                  <p:cNvPr id="11" name=""/>
+                  <p:cNvSpPr/>
+                  <p:nvPr/>
+                </p:nvSpPr>
+                <p:spPr>
+                  <a:xfrm>
+                    <a:off x="1066800" y="6200774"/>
+                    <a:ext cx="1066799" cy="657225"/>
+                  </a:xfrm>
+                  <a:prstGeom prst="rect">
+                    <a:avLst/>
+                  </a:prstGeom>
+                  <a:solidFill>
+                    <a:srgbClr val="faf3db"/>
+                  </a:solidFill>
+                </p:spPr>
+                <p:style>
+                  <a:lnRef idx="2">
+                    <a:schemeClr val="accent1">
+                      <a:shade val="20000"/>
+                    </a:schemeClr>
+                  </a:lnRef>
+                  <a:fillRef idx="1">
+                    <a:schemeClr val="accent1"/>
+                  </a:fillRef>
+                  <a:effectRef idx="0">
+                    <a:schemeClr val="accent1"/>
+                  </a:effectRef>
+                  <a:fontRef idx="minor">
+                    <a:schemeClr val="lt1"/>
+                  </a:fontRef>
+                </p:style>
+                <p:txBody>
+                  <a:bodyPr anchor="ctr"/>
+                  <a:lstStyle/>
+                  <a:p>
+                    <a:pPr algn="ctr">
+                      <a:defRPr/>
+                    </a:pPr>
+                    <a:r>
+                      <a:rPr lang="en-US" altLang="ko-KR">
+                        <a:solidFill>
+                          <a:schemeClr val="dk1"/>
+                        </a:solidFill>
+                      </a:rPr>
+                      <a:t>Community</a:t>
+                    </a:r>
+                    <a:endParaRPr lang="en-US" altLang="ko-KR">
+                      <a:solidFill>
+                        <a:schemeClr val="dk1"/>
+                      </a:solidFill>
+                    </a:endParaRPr>
+                  </a:p>
+                </p:txBody>
+              </p:sp>
+              <p:sp>
+                <p:nvSpPr>
+                  <p:cNvPr id="12" name=""/>
+                  <p:cNvSpPr/>
+                  <p:nvPr/>
+                </p:nvSpPr>
+                <p:spPr>
+                  <a:xfrm>
+                    <a:off x="2131483" y="6200774"/>
+                    <a:ext cx="1066799" cy="657225"/>
+                  </a:xfrm>
+                  <a:prstGeom prst="rect">
+                    <a:avLst/>
+                  </a:prstGeom>
+                  <a:solidFill>
+                    <a:srgbClr val="faf3db"/>
+                  </a:solidFill>
+                </p:spPr>
+                <p:style>
+                  <a:lnRef idx="2">
+                    <a:schemeClr val="accent1">
+                      <a:shade val="20000"/>
+                    </a:schemeClr>
+                  </a:lnRef>
+                  <a:fillRef idx="1">
+                    <a:schemeClr val="accent1"/>
+                  </a:fillRef>
+                  <a:effectRef idx="0">
+                    <a:schemeClr val="accent1"/>
+                  </a:effectRef>
+                  <a:fontRef idx="minor">
+                    <a:schemeClr val="lt1"/>
+                  </a:fontRef>
+                </p:style>
+                <p:txBody>
+                  <a:bodyPr anchor="ctr"/>
+                  <a:lstStyle/>
+                  <a:p>
+                    <a:pPr algn="ctr">
+                      <a:defRPr/>
+                    </a:pPr>
+                    <a:r>
+                      <a:rPr lang="en-US" altLang="ko-KR">
+                        <a:solidFill>
+                          <a:schemeClr val="dk1"/>
+                        </a:solidFill>
+                      </a:rPr>
+                      <a:t>Home</a:t>
+                    </a:r>
+                    <a:endParaRPr lang="en-US" altLang="ko-KR">
+                      <a:solidFill>
+                        <a:schemeClr val="dk1"/>
+                      </a:solidFill>
+                    </a:endParaRPr>
+                  </a:p>
+                </p:txBody>
+              </p:sp>
+              <p:sp>
+                <p:nvSpPr>
+                  <p:cNvPr id="13" name=""/>
+                  <p:cNvSpPr/>
+                  <p:nvPr/>
+                </p:nvSpPr>
+                <p:spPr>
+                  <a:xfrm>
+                    <a:off x="3196166" y="6200774"/>
+                    <a:ext cx="1066799" cy="657225"/>
+                  </a:xfrm>
+                  <a:prstGeom prst="rect">
+                    <a:avLst/>
+                  </a:prstGeom>
+                  <a:solidFill>
+                    <a:srgbClr val="faf3db"/>
+                  </a:solidFill>
+                </p:spPr>
+                <p:style>
+                  <a:lnRef idx="2">
+                    <a:schemeClr val="accent1">
+                      <a:shade val="20000"/>
+                    </a:schemeClr>
+                  </a:lnRef>
+                  <a:fillRef idx="1">
+                    <a:schemeClr val="accent1"/>
+                  </a:fillRef>
+                  <a:effectRef idx="0">
+                    <a:schemeClr val="accent1"/>
+                  </a:effectRef>
+                  <a:fontRef idx="minor">
+                    <a:schemeClr val="lt1"/>
+                  </a:fontRef>
+                </p:style>
+                <p:txBody>
+                  <a:bodyPr anchor="ctr"/>
+                  <a:lstStyle/>
+                  <a:p>
+                    <a:pPr algn="ctr">
+                      <a:defRPr/>
+                    </a:pPr>
+                    <a:r>
+                      <a:rPr lang="ko-KR" altLang="en-US">
+                        <a:solidFill>
+                          <a:schemeClr val="dk1"/>
+                        </a:solidFill>
+                      </a:rPr>
+                      <a:t>알림</a:t>
+                    </a:r>
+                    <a:endParaRPr lang="ko-KR" altLang="en-US">
+                      <a:solidFill>
+                        <a:schemeClr val="dk1"/>
+                      </a:solidFill>
+                    </a:endParaRPr>
+                  </a:p>
+                </p:txBody>
+              </p:sp>
+              <p:sp>
+                <p:nvSpPr>
+                  <p:cNvPr id="14" name=""/>
+                  <p:cNvSpPr/>
+                  <p:nvPr/>
+                </p:nvSpPr>
+                <p:spPr>
+                  <a:xfrm>
+                    <a:off x="4269317" y="6200774"/>
+                    <a:ext cx="1066799" cy="657225"/>
+                  </a:xfrm>
+                  <a:prstGeom prst="rect">
+                    <a:avLst/>
+                  </a:prstGeom>
+                  <a:solidFill>
+                    <a:srgbClr val="faf3db"/>
+                  </a:solidFill>
+                </p:spPr>
+                <p:style>
+                  <a:lnRef idx="2">
+                    <a:schemeClr val="accent1">
+                      <a:shade val="20000"/>
+                    </a:schemeClr>
+                  </a:lnRef>
+                  <a:fillRef idx="1">
+                    <a:schemeClr val="accent1"/>
+                  </a:fillRef>
+                  <a:effectRef idx="0">
+                    <a:schemeClr val="accent1"/>
+                  </a:effectRef>
+                  <a:fontRef idx="minor">
+                    <a:schemeClr val="lt1"/>
+                  </a:fontRef>
+                </p:style>
+                <p:txBody>
+                  <a:bodyPr anchor="ctr"/>
+                  <a:lstStyle/>
+                  <a:p>
+                    <a:pPr algn="ctr">
+                      <a:defRPr/>
+                    </a:pPr>
+                    <a:r>
+                      <a:rPr lang="en-US" altLang="ko-KR">
+                        <a:solidFill>
+                          <a:schemeClr val="dk1"/>
+                        </a:solidFill>
+                      </a:rPr>
+                      <a:t>Setting</a:t>
+                    </a:r>
+                    <a:endParaRPr lang="en-US" altLang="ko-KR">
+                      <a:solidFill>
+                        <a:schemeClr val="dk1"/>
+                      </a:solidFill>
+                    </a:endParaRPr>
+                  </a:p>
+                </p:txBody>
+              </p:sp>
+            </p:grpSp>
+            <p:sp>
+              <p:nvSpPr>
+                <p:cNvPr id="16" name=""/>
+                <p:cNvSpPr/>
+                <p:nvPr/>
+              </p:nvSpPr>
+              <p:spPr>
+                <a:xfrm>
+                  <a:off x="3444874" y="1311275"/>
+                  <a:ext cx="1066799" cy="657225"/>
+                </a:xfrm>
+                <a:prstGeom prst="rect">
+                  <a:avLst/>
+                </a:prstGeom>
+                <a:noFill/>
+                <a:ln>
+                  <a:noFill/>
+                </a:ln>
+              </p:spPr>
+              <p:style>
+                <a:lnRef idx="2">
+                  <a:schemeClr val="accent1">
+                    <a:shade val="20000"/>
+                  </a:schemeClr>
+                </a:lnRef>
+                <a:fillRef idx="1">
+                  <a:schemeClr val="accent1"/>
+                </a:fillRef>
+                <a:effectRef idx="0">
+                  <a:schemeClr val="accent1"/>
+                </a:effectRef>
+                <a:fontRef idx="minor">
+                  <a:schemeClr val="lt1"/>
+                </a:fontRef>
+              </p:style>
+              <p:txBody>
+                <a:bodyPr anchor="ctr"/>
+                <a:lstStyle/>
+                <a:p>
+                  <a:pPr algn="ctr">
+                    <a:defRPr/>
+                  </a:pPr>
+                  <a:r>
+                    <a:rPr lang="ko-KR" altLang="en-US">
+                      <a:solidFill>
+                        <a:schemeClr val="dk1"/>
+                      </a:solidFill>
+                    </a:rPr>
+                    <a:t>내 차고</a:t>
+                  </a:r>
+                  <a:endParaRPr lang="ko-KR" altLang="en-US">
+                    <a:solidFill>
+                      <a:schemeClr val="dk1"/>
+                    </a:solidFill>
+                  </a:endParaRPr>
+                </a:p>
+              </p:txBody>
+            </p:sp>
+            <p:sp>
+              <p:nvSpPr>
+                <p:cNvPr id="17" name=""/>
+                <p:cNvSpPr/>
+                <p:nvPr/>
+              </p:nvSpPr>
+              <p:spPr>
+                <a:xfrm>
+                  <a:off x="4502149" y="1320800"/>
+                  <a:ext cx="1831976" cy="657225"/>
+                </a:xfrm>
+                <a:prstGeom prst="rect">
+                  <a:avLst/>
+                </a:prstGeom>
+                <a:noFill/>
+                <a:ln>
+                  <a:noFill/>
+                </a:ln>
+              </p:spPr>
+              <p:style>
+                <a:lnRef idx="2">
+                  <a:schemeClr val="accent1">
+                    <a:shade val="20000"/>
+                  </a:schemeClr>
+                </a:lnRef>
+                <a:fillRef idx="1">
+                  <a:schemeClr val="accent1"/>
+                </a:fillRef>
+                <a:effectRef idx="0">
+                  <a:schemeClr val="accent1"/>
+                </a:effectRef>
+                <a:fontRef idx="minor">
+                  <a:schemeClr val="lt1"/>
+                </a:fontRef>
+              </p:style>
+              <p:txBody>
+                <a:bodyPr anchor="ctr"/>
+                <a:lstStyle/>
+                <a:p>
+                  <a:pPr algn="ctr">
+                    <a:defRPr/>
+                  </a:pPr>
+                  <a:r>
+                    <a:rPr lang="ko-KR" altLang="en-US">
+                      <a:solidFill>
+                        <a:schemeClr val="dk1"/>
+                      </a:solidFill>
+                    </a:rPr>
+                    <a:t>오너들의 차고</a:t>
+                  </a:r>
+                  <a:endParaRPr lang="ko-KR" altLang="en-US">
+                    <a:solidFill>
+                      <a:schemeClr val="dk1"/>
+                    </a:solidFill>
+                  </a:endParaRPr>
+                </a:p>
+              </p:txBody>
+            </p:sp>
+          </p:grpSp>
+          <p:sp>
+            <p:nvSpPr>
+              <p:cNvPr id="19" name=""/>
+              <p:cNvSpPr/>
+              <p:nvPr/>
+            </p:nvSpPr>
+            <p:spPr>
+              <a:xfrm>
+                <a:off x="0" y="2073275"/>
+                <a:ext cx="4606925" cy="2101850"/>
+              </a:xfrm>
+              <a:prstGeom prst="rect">
+                <a:avLst/>
+              </a:prstGeom>
+              <a:solidFill>
+                <a:srgbClr val="faf3db"/>
+              </a:solidFill>
+            </p:spPr>
+            <p:style>
+              <a:lnRef idx="2">
+                <a:schemeClr val="accent1">
+                  <a:shade val="20000"/>
+                </a:schemeClr>
+              </a:lnRef>
+              <a:fillRef idx="1">
+                <a:schemeClr val="accent1"/>
+              </a:fillRef>
+              <a:effectRef idx="0">
+                <a:schemeClr val="accent1"/>
+              </a:effectRef>
+              <a:fontRef idx="minor">
+                <a:schemeClr val="lt1"/>
+              </a:fontRef>
+            </p:style>
+            <p:txBody>
+              <a:bodyPr anchor="ctr"/>
+              <a:lstStyle/>
+              <a:p>
+                <a:pPr>
+                  <a:defRPr/>
+                </a:pPr>
+                <a:r>
+                  <a:rPr lang="ko-KR" altLang="en-US">
+                    <a:solidFill>
+                      <a:schemeClr val="dk1"/>
+                    </a:solidFill>
+                  </a:rPr>
+                  <a:t>차량 정보                  총 주행 거리 </a:t>
+                </a:r>
+                <a:r>
+                  <a:rPr lang="en-US" altLang="ko-KR">
+                    <a:solidFill>
+                      <a:schemeClr val="dk1"/>
+                    </a:solidFill>
+                  </a:rPr>
+                  <a:t>:</a:t>
+                </a:r>
+                <a:r>
+                  <a:rPr lang="ko-KR" altLang="en-US">
+                    <a:solidFill>
+                      <a:schemeClr val="dk1"/>
+                    </a:solidFill>
+                  </a:rPr>
+                  <a:t> </a:t>
+                </a:r>
+                <a:endParaRPr lang="ko-KR" altLang="en-US">
+                  <a:solidFill>
+                    <a:schemeClr val="dk1"/>
+                  </a:solidFill>
+                </a:endParaRPr>
+              </a:p>
+              <a:p>
+                <a:pPr>
+                  <a:defRPr/>
+                </a:pPr>
+                <a:r>
+                  <a:rPr lang="ko-KR" altLang="en-US">
+                    <a:solidFill>
+                      <a:schemeClr val="dk1"/>
+                    </a:solidFill>
+                  </a:rPr>
+                  <a:t>    </a:t>
+                </a:r>
+                <a:r>
+                  <a:rPr lang="en-US" altLang="ko-KR">
+                    <a:solidFill>
+                      <a:schemeClr val="dk1"/>
+                    </a:solidFill>
+                  </a:rPr>
+                  <a:t>K7</a:t>
+                </a:r>
+                <a:r>
+                  <a:rPr lang="ko-KR" altLang="en-US">
+                    <a:solidFill>
+                      <a:schemeClr val="dk1"/>
+                    </a:solidFill>
+                  </a:rPr>
+                  <a:t>                                  연비 </a:t>
+                </a:r>
+                <a:r>
+                  <a:rPr lang="en-US" altLang="ko-KR">
+                    <a:solidFill>
+                      <a:schemeClr val="dk1"/>
+                    </a:solidFill>
+                  </a:rPr>
+                  <a:t>:</a:t>
+                </a:r>
+                <a:r>
+                  <a:rPr lang="ko-KR" altLang="en-US">
+                    <a:solidFill>
+                      <a:schemeClr val="dk1"/>
+                    </a:solidFill>
+                  </a:rPr>
+                  <a:t> </a:t>
+                </a:r>
+                <a:endParaRPr lang="ko-KR" altLang="en-US">
+                  <a:solidFill>
+                    <a:schemeClr val="dk1"/>
+                  </a:solidFill>
+                </a:endParaRPr>
+              </a:p>
+              <a:p>
+                <a:pPr>
+                  <a:defRPr/>
+                </a:pPr>
+                <a:r>
+                  <a:rPr lang="ko-KR" altLang="en-US">
+                    <a:solidFill>
+                      <a:schemeClr val="dk1"/>
+                    </a:solidFill>
+                  </a:rPr>
+                  <a:t>                        일 평균 주행 시간 </a:t>
+                </a:r>
+                <a:r>
+                  <a:rPr lang="en-US" altLang="ko-KR">
+                    <a:solidFill>
+                      <a:schemeClr val="dk1"/>
+                    </a:solidFill>
+                  </a:rPr>
+                  <a:t>:</a:t>
+                </a:r>
+                <a:r>
+                  <a:rPr lang="ko-KR" altLang="en-US">
+                    <a:solidFill>
+                      <a:schemeClr val="dk1"/>
+                    </a:solidFill>
+                  </a:rPr>
+                  <a:t> </a:t>
+                </a:r>
+                <a:endParaRPr lang="ko-KR" altLang="en-US">
+                  <a:solidFill>
+                    <a:schemeClr val="dk1"/>
+                  </a:solidFill>
+                </a:endParaRPr>
+              </a:p>
+              <a:p>
+                <a:pPr>
+                  <a:defRPr/>
+                </a:pPr>
+                <a:endParaRPr lang="ko-KR" altLang="en-US">
+                  <a:solidFill>
+                    <a:schemeClr val="dk1"/>
+                  </a:solidFill>
+                </a:endParaRPr>
+              </a:p>
+              <a:p>
+                <a:pPr>
+                  <a:defRPr/>
+                </a:pPr>
+                <a:endParaRPr lang="ko-KR" altLang="en-US">
+                  <a:solidFill>
+                    <a:schemeClr val="dk1"/>
+                  </a:solidFill>
+                </a:endParaRPr>
+              </a:p>
+              <a:p>
+                <a:pPr>
+                  <a:defRPr/>
+                </a:pPr>
+                <a:endParaRPr lang="ko-KR" altLang="en-US">
+                  <a:solidFill>
+                    <a:schemeClr val="dk1"/>
+                  </a:solidFill>
+                </a:endParaRPr>
+              </a:p>
+              <a:p>
+                <a:pPr>
+                  <a:defRPr/>
+                </a:pPr>
+                <a:r>
+                  <a:rPr lang="ko-KR" altLang="en-US">
+                    <a:solidFill>
+                      <a:schemeClr val="dk1"/>
+                    </a:solidFill>
+                  </a:rPr>
+                  <a:t>				더보기</a:t>
+                </a:r>
+                <a:endParaRPr lang="ko-KR" altLang="en-US">
+                  <a:solidFill>
+                    <a:schemeClr val="dk1"/>
+                  </a:solidFill>
+                </a:endParaRPr>
+              </a:p>
+            </p:txBody>
+          </p:sp>
+          <p:sp>
+            <p:nvSpPr>
+              <p:cNvPr id="20" name=""/>
+              <p:cNvSpPr/>
+              <p:nvPr/>
+            </p:nvSpPr>
+            <p:spPr>
+              <a:xfrm>
+                <a:off x="0" y="4400551"/>
+                <a:ext cx="4606925" cy="1498600"/>
+              </a:xfrm>
+              <a:prstGeom prst="rect">
+                <a:avLst/>
+              </a:prstGeom>
+              <a:solidFill>
+                <a:srgbClr val="faf3db"/>
+              </a:solidFill>
+            </p:spPr>
+            <p:style>
+              <a:lnRef idx="2">
+                <a:schemeClr val="accent1">
+                  <a:shade val="20000"/>
+                </a:schemeClr>
+              </a:lnRef>
+              <a:fillRef idx="1">
+                <a:schemeClr val="accent1"/>
+              </a:fillRef>
+              <a:effectRef idx="0">
+                <a:schemeClr val="accent1"/>
+              </a:effectRef>
+              <a:fontRef idx="minor">
+                <a:schemeClr val="lt1"/>
+              </a:fontRef>
+            </p:style>
+            <p:txBody>
+              <a:bodyPr anchor="ctr"/>
+              <a:lstStyle/>
+              <a:p>
+                <a:pPr>
+                  <a:defRPr/>
+                </a:pPr>
+                <a:r>
+                  <a:rPr lang="ko-KR" altLang="en-US">
+                    <a:solidFill>
+                      <a:schemeClr val="dk1"/>
+                    </a:solidFill>
+                  </a:rPr>
+                  <a:t>내 차 메뉴</a:t>
+                </a:r>
+                <a:endParaRPr lang="ko-KR" altLang="en-US">
+                  <a:solidFill>
+                    <a:schemeClr val="dk1"/>
+                  </a:solidFill>
+                </a:endParaRPr>
+              </a:p>
+              <a:p>
+                <a:pPr>
+                  <a:defRPr/>
+                </a:pPr>
+                <a:endParaRPr lang="ko-KR" altLang="en-US">
+                  <a:solidFill>
+                    <a:schemeClr val="dk1"/>
+                  </a:solidFill>
+                </a:endParaRPr>
+              </a:p>
+              <a:p>
+                <a:pPr>
+                  <a:defRPr/>
+                </a:pPr>
+                <a:endParaRPr lang="ko-KR" altLang="en-US">
+                  <a:solidFill>
+                    <a:schemeClr val="dk1"/>
+                  </a:solidFill>
+                </a:endParaRPr>
+              </a:p>
+              <a:p>
+                <a:pPr>
+                  <a:defRPr/>
+                </a:pPr>
+                <a:endParaRPr lang="ko-KR" altLang="en-US">
+                  <a:solidFill>
+                    <a:schemeClr val="dk1"/>
+                  </a:solidFill>
+                </a:endParaRPr>
+              </a:p>
+              <a:p>
+                <a:pPr>
+                  <a:defRPr/>
+                </a:pPr>
+                <a:endParaRPr lang="ko-KR" altLang="en-US">
+                  <a:solidFill>
+                    <a:schemeClr val="dk1"/>
+                  </a:solidFill>
+                </a:endParaRPr>
+              </a:p>
+            </p:txBody>
+          </p:sp>
+        </p:grpSp>
+        <p:sp>
+          <p:nvSpPr>
+            <p:cNvPr id="22" name=""/>
+            <p:cNvSpPr/>
+            <p:nvPr/>
+          </p:nvSpPr>
+          <p:spPr>
+            <a:xfrm>
+              <a:off x="0" y="2079623"/>
+              <a:ext cx="4597399" cy="2095500"/>
+            </a:xfrm>
+            <a:prstGeom prst="rect">
+              <a:avLst/>
+            </a:prstGeom>
+            <a:noFill/>
+          </p:spPr>
+          <p:style>
+            <a:lnRef idx="2">
+              <a:schemeClr val="accent1">
+                <a:shade val="20000"/>
+              </a:schemeClr>
+            </a:lnRef>
+            <a:fillRef idx="1">
+              <a:schemeClr val="accent1"/>
+            </a:fillRef>
+            <a:effectRef idx="0">
+              <a:schemeClr val="accent1"/>
+            </a:effectRef>
+            <a:fontRef idx="minor">
+              <a:schemeClr val="lt1"/>
+            </a:fontRef>
+          </p:style>
+          <p:txBody>
+            <a:bodyPr anchor="ctr"/>
+            <a:p>
+              <a:pPr algn="ctr">
+                <a:defRPr/>
+              </a:pPr>
+              <a:r>
+                <a:rPr lang="en-US" altLang="ko-KR">
+                  <a:solidFill>
+                    <a:schemeClr val="dk1"/>
+                  </a:solidFill>
+                  <a:effectLst>
+                    <a:glow rad="63500">
+                      <a:schemeClr val="accent1">
+                        <a:satMod val="175000"/>
+                        <a:alpha val="50000"/>
+                      </a:schemeClr>
+                    </a:glow>
+                  </a:effectLst>
+                </a:rPr>
+                <a:t>Car Image</a:t>
+              </a:r>
+              <a:endParaRPr lang="en-US" altLang="ko-KR">
+                <a:solidFill>
+                  <a:schemeClr val="dk1"/>
+                </a:solidFill>
+                <a:effectLst>
+                  <a:glow rad="63500">
+                    <a:schemeClr val="accent1">
+                      <a:satMod val="175000"/>
+                      <a:alpha val="50000"/>
+                    </a:schemeClr>
+                  </a:glow>
+                </a:effectLst>
+              </a:endParaRPr>
+            </a:p>
+          </p:txBody>
+        </p:sp>
+      </p:grpSp>
+      <p:sp>
+        <p:nvSpPr>
+          <p:cNvPr id="25" name=""/>
+          <p:cNvSpPr/>
+          <p:nvPr/>
+        </p:nvSpPr>
+        <p:spPr>
+          <a:xfrm>
+            <a:off x="5327649" y="1349374"/>
+            <a:ext cx="6864350" cy="5508625"/>
+          </a:xfrm>
+          <a:prstGeom prst="rect">
+            <a:avLst/>
+          </a:prstGeom>
+          <a:noFill/>
+          <a:ln>
+            <a:noFill/>
+          </a:ln>
+        </p:spPr>
+        <p:style>
+          <a:lnRef idx="2">
+            <a:schemeClr val="accent1">
+              <a:shade val="20000"/>
+            </a:schemeClr>
+          </a:lnRef>
+          <a:fillRef idx="1">
+            <a:schemeClr val="accent1"/>
+          </a:fillRef>
+          <a:effectRef idx="0">
+            <a:schemeClr val="accent1"/>
+          </a:effectRef>
+          <a:fontRef idx="minor">
+            <a:schemeClr val="lt1"/>
+          </a:fontRef>
+        </p:style>
+        <p:txBody>
+          <a:bodyPr anchor="ctr"/>
+          <a:p>
+            <a:pPr>
+              <a:defRPr/>
+            </a:pPr>
+            <a:r>
+              <a:rPr lang="en-US" altLang="ko-KR">
+                <a:solidFill>
+                  <a:schemeClr val="dk1"/>
+                </a:solidFill>
+              </a:rPr>
+              <a:t>1. </a:t>
+            </a:r>
+            <a:endParaRPr lang="en-US" altLang="ko-KR">
+              <a:solidFill>
+                <a:schemeClr val="dk1"/>
+              </a:solidFill>
+            </a:endParaRPr>
+          </a:p>
+        </p:txBody>
+      </p:sp>
+      <p:sp>
+        <p:nvSpPr>
+          <p:cNvPr id="28" name="타원 55"/>
+          <p:cNvSpPr/>
+          <p:nvPr/>
+        </p:nvSpPr>
+        <p:spPr>
+          <a:xfrm>
+            <a:off x="0" y="1290632"/>
+            <a:ext cx="283718" cy="283718"/>
+          </a:xfrm>
+          <a:prstGeom prst="ellipse">
+            <a:avLst/>
+          </a:prstGeom>
+          <a:solidFill>
+            <a:srgbClr val="ffe7d8"/>
+          </a:solidFill>
+        </p:spPr>
+        <p:style>
+          <a:lnRef idx="2">
+            <a:schemeClr val="accent1">
+              <a:shade val="50000"/>
+            </a:schemeClr>
+          </a:lnRef>
+          <a:fillRef idx="1">
+            <a:schemeClr val="accent1"/>
+          </a:fillRef>
+          <a:effectRef idx="0">
+            <a:schemeClr val="accent1"/>
+          </a:effectRef>
+          <a:fontRef idx="minor">
+            <a:schemeClr val="lt1"/>
+          </a:fontRef>
+        </p:style>
+        <p:txBody>
+          <a:bodyPr anchor="ctr"/>
+          <a:lstStyle/>
+          <a:p>
+            <a:pPr algn="ctr">
+              <a:defRPr/>
+            </a:pPr>
+            <a:r>
+              <a:rPr lang="en-US" altLang="ko-KR">
+                <a:solidFill>
+                  <a:schemeClr val="tx1"/>
+                </a:solidFill>
+              </a:rPr>
+              <a:t>1</a:t>
+            </a:r>
+            <a:endParaRPr lang="en-US" altLang="ko-KR">
+              <a:solidFill>
+                <a:schemeClr val="tx1"/>
+              </a:solidFill>
+            </a:endParaRPr>
+          </a:p>
+        </p:txBody>
+      </p:sp>
+      <p:sp>
+        <p:nvSpPr>
+          <p:cNvPr id="29" name="타원 55"/>
+          <p:cNvSpPr/>
+          <p:nvPr/>
+        </p:nvSpPr>
+        <p:spPr>
+          <a:xfrm>
+            <a:off x="1130102" y="1230018"/>
+            <a:ext cx="283718" cy="283718"/>
+          </a:xfrm>
+          <a:prstGeom prst="ellipse">
+            <a:avLst/>
+          </a:prstGeom>
+          <a:solidFill>
+            <a:srgbClr val="ffe7d8"/>
+          </a:solidFill>
+        </p:spPr>
+        <p:style>
+          <a:lnRef idx="2">
+            <a:schemeClr val="accent1">
+              <a:shade val="50000"/>
+            </a:schemeClr>
+          </a:lnRef>
+          <a:fillRef idx="1">
+            <a:schemeClr val="accent1"/>
+          </a:fillRef>
+          <a:effectRef idx="0">
+            <a:schemeClr val="accent1"/>
+          </a:effectRef>
+          <a:fontRef idx="minor">
+            <a:schemeClr val="lt1"/>
+          </a:fontRef>
+        </p:style>
+        <p:txBody>
+          <a:bodyPr anchor="ctr"/>
+          <a:lstStyle/>
+          <a:p>
+            <a:pPr algn="ctr">
+              <a:defRPr/>
+            </a:pPr>
+            <a:r>
+              <a:rPr lang="en-US" altLang="ko-KR">
+                <a:solidFill>
+                  <a:schemeClr val="tx1"/>
+                </a:solidFill>
+              </a:rPr>
+              <a:t>1</a:t>
+            </a:r>
+            <a:endParaRPr lang="en-US" altLang="ko-KR">
+              <a:solidFill>
+                <a:schemeClr val="tx1"/>
+              </a:solidFill>
+            </a:endParaRPr>
+          </a:p>
+        </p:txBody>
+      </p:sp>
+      <p:sp>
+        <p:nvSpPr>
+          <p:cNvPr id="30" name="타원 55"/>
+          <p:cNvSpPr/>
+          <p:nvPr/>
+        </p:nvSpPr>
+        <p:spPr>
+          <a:xfrm>
+            <a:off x="0" y="1890418"/>
+            <a:ext cx="283718" cy="283718"/>
+          </a:xfrm>
+          <a:prstGeom prst="ellipse">
+            <a:avLst/>
+          </a:prstGeom>
+          <a:solidFill>
+            <a:srgbClr val="ffe7d8"/>
+          </a:solidFill>
+        </p:spPr>
+        <p:style>
+          <a:lnRef idx="2">
+            <a:schemeClr val="accent1">
+              <a:shade val="50000"/>
+            </a:schemeClr>
+          </a:lnRef>
+          <a:fillRef idx="1">
+            <a:schemeClr val="accent1"/>
+          </a:fillRef>
+          <a:effectRef idx="0">
+            <a:schemeClr val="accent1"/>
+          </a:effectRef>
+          <a:fontRef idx="minor">
+            <a:schemeClr val="lt1"/>
+          </a:fontRef>
+        </p:style>
+        <p:txBody>
+          <a:bodyPr anchor="ctr"/>
+          <a:lstStyle/>
+          <a:p>
+            <a:pPr algn="ctr">
+              <a:defRPr/>
+            </a:pPr>
+            <a:r>
+              <a:rPr lang="en-US" altLang="ko-KR">
+                <a:solidFill>
+                  <a:schemeClr val="tx1"/>
+                </a:solidFill>
+              </a:rPr>
+              <a:t>2</a:t>
+            </a:r>
+            <a:endParaRPr lang="en-US" altLang="ko-KR">
+              <a:solidFill>
+                <a:schemeClr val="tx1"/>
+              </a:solidFill>
+            </a:endParaRPr>
           </a:p>
         </p:txBody>
       </p:sp>
@@ -20234,11 +21368,11 @@
   <p:clrMapOvr>
     <a:masterClrMapping/>
   </p:clrMapOvr>
-  <mc:AlternateContent xmlns:mc="http://schemas.openxmlformats.org/markup-compatibility/2006" xmlns:p14="http://schemas.microsoft.com/office/powerpoint/2010/main">
-    <mc:Choice Requires="p14">
-      <p:transition/>
+  <mc:AlternateContent xmlns:mc="http://schemas.openxmlformats.org/markup-compatibility/2006">
+    <mc:Choice xmlns:p14="http://schemas.microsoft.com/office/powerpoint/2010/main" Requires="p14">
+      <p:transition xmlns:mc="http://schemas.openxmlformats.org/markup-compatibility/2006" xmlns:p14="http://schemas.microsoft.com/office/powerpoint/2010/main" mc:Ignorable="p14" p14:dur="500"/>
     </mc:Choice>
-    <mc:Fallback xmlns:dsp="http://schemas.microsoft.com/office/drawing/2008/diagram" xmlns:dgm="http://schemas.openxmlformats.org/drawingml/2006/diagram" xmlns:c="http://schemas.openxmlformats.org/drawingml/2006/chart" xmlns="">
+    <mc:Fallback>
       <p:transition/>
     </mc:Fallback>
   </mc:AlternateContent>
@@ -20334,6 +21468,1224 @@
 </file>
 
 <file path=ppt/slides/slide40.xml><?xml version="1.0" encoding="utf-8"?>
+<p:sld xmlns:r="http://schemas.openxmlformats.org/officeDocument/2006/relationships" xmlns:c="http://schemas.openxmlformats.org/drawingml/2006/chart" xmlns:a="http://schemas.openxmlformats.org/drawingml/2006/main" xmlns:dgm="http://schemas.openxmlformats.org/drawingml/2006/diagram" xmlns:dsp="http://schemas.microsoft.com/office/drawing/2008/diagram" xmlns:p="http://schemas.openxmlformats.org/presentationml/2006/main">
+  <p:cSld>
+    <p:spTree>
+      <p:nvGrpSpPr>
+        <p:cNvPr id="1" name=""/>
+        <p:cNvGrpSpPr/>
+        <p:nvPr/>
+      </p:nvGrpSpPr>
+      <p:grpSpPr>
+        <a:xfrm>
+          <a:off x="0" y="0"/>
+          <a:ext cx="0" cy="0"/>
+          <a:chOff x="0" y="0"/>
+          <a:chExt cx="0" cy="0"/>
+        </a:xfrm>
+      </p:grpSpPr>
+      <p:sp>
+        <p:nvSpPr>
+          <p:cNvPr id="4" name="직사각형 9"/>
+          <p:cNvSpPr/>
+          <p:nvPr/>
+        </p:nvSpPr>
+        <p:spPr>
+          <a:xfrm>
+            <a:off x="0" y="0"/>
+            <a:ext cx="12192001" cy="1338109"/>
+          </a:xfrm>
+          <a:prstGeom prst="rect">
+            <a:avLst/>
+          </a:prstGeom>
+          <a:solidFill>
+            <a:schemeClr val="accent1"/>
+          </a:solidFill>
+          <a:ln>
+            <a:noFill/>
+          </a:ln>
+        </p:spPr>
+        <p:style>
+          <a:lnRef idx="2">
+            <a:schemeClr val="accent1">
+              <a:shade val="50000"/>
+            </a:schemeClr>
+          </a:lnRef>
+          <a:fillRef idx="1">
+            <a:schemeClr val="accent1"/>
+          </a:fillRef>
+          <a:effectRef idx="0">
+            <a:schemeClr val="accent1"/>
+          </a:effectRef>
+          <a:fontRef idx="minor">
+            <a:schemeClr val="lt1"/>
+          </a:fontRef>
+        </p:style>
+        <p:txBody>
+          <a:bodyPr anchor="ctr"/>
+          <a:lstStyle/>
+          <a:p>
+            <a:pPr>
+              <a:defRPr/>
+            </a:pPr>
+            <a:r>
+              <a:rPr kumimoji="1" lang="en-US" altLang="ko-KR" sz="4800"/>
+              <a:t>4-3. Menu Sequence</a:t>
+            </a:r>
+            <a:endParaRPr kumimoji="1" lang="en-US" altLang="ko-KR" sz="4800"/>
+          </a:p>
+        </p:txBody>
+      </p:sp>
+      <p:grpSp>
+        <p:nvGrpSpPr>
+          <p:cNvPr id="24" name=""/>
+          <p:cNvGrpSpPr/>
+          <p:nvPr/>
+        </p:nvGrpSpPr>
+        <p:grpSpPr>
+          <a:xfrm rot="0">
+            <a:off x="0" y="1323974"/>
+            <a:ext cx="5344583" cy="5534026"/>
+            <a:chOff x="0" y="1323974"/>
+            <a:chExt cx="5344583" cy="5534026"/>
+          </a:xfrm>
+        </p:grpSpPr>
+        <p:grpSp>
+          <p:nvGrpSpPr>
+            <p:cNvPr id="23" name=""/>
+            <p:cNvGrpSpPr/>
+            <p:nvPr/>
+          </p:nvGrpSpPr>
+          <p:grpSpPr>
+            <a:xfrm rot="0">
+              <a:off x="0" y="1323974"/>
+              <a:ext cx="5344583" cy="5534026"/>
+              <a:chOff x="0" y="1323974"/>
+              <a:chExt cx="5344583" cy="5534026"/>
+            </a:xfrm>
+          </p:grpSpPr>
+          <p:grpSp>
+            <p:nvGrpSpPr>
+              <p:cNvPr id="15" name=""/>
+              <p:cNvGrpSpPr/>
+              <p:nvPr/>
+            </p:nvGrpSpPr>
+            <p:grpSpPr>
+              <a:xfrm rot="0">
+                <a:off x="0" y="1323974"/>
+                <a:ext cx="5344583" cy="5534026"/>
+                <a:chOff x="0" y="1323974"/>
+                <a:chExt cx="5344583" cy="5534026"/>
+              </a:xfrm>
+            </p:grpSpPr>
+            <p:sp>
+              <p:nvSpPr>
+                <p:cNvPr id="5" name=""/>
+                <p:cNvSpPr/>
+                <p:nvPr/>
+              </p:nvSpPr>
+              <p:spPr>
+                <a:xfrm>
+                  <a:off x="0" y="1323974"/>
+                  <a:ext cx="5344583" cy="5534024"/>
+                </a:xfrm>
+                <a:prstGeom prst="rect">
+                  <a:avLst/>
+                </a:prstGeom>
+                <a:solidFill>
+                  <a:srgbClr val="f2f2f2"/>
+                </a:solidFill>
+                <a:ln>
+                  <a:noFill/>
+                </a:ln>
+              </p:spPr>
+              <p:style>
+                <a:lnRef idx="2">
+                  <a:schemeClr val="accent1">
+                    <a:shade val="20000"/>
+                  </a:schemeClr>
+                </a:lnRef>
+                <a:fillRef idx="1">
+                  <a:schemeClr val="accent1"/>
+                </a:fillRef>
+                <a:effectRef idx="0">
+                  <a:schemeClr val="accent1"/>
+                </a:effectRef>
+                <a:fontRef idx="minor">
+                  <a:schemeClr val="lt1"/>
+                </a:fontRef>
+              </p:style>
+              <p:txBody>
+                <a:bodyPr anchor="ctr"/>
+                <a:p>
+                  <a:pPr algn="ctr">
+                    <a:defRPr/>
+                  </a:pPr>
+                  <a:endParaRPr lang="en-US" altLang="ko-KR"/>
+                </a:p>
+              </p:txBody>
+            </p:sp>
+            <p:sp>
+              <p:nvSpPr>
+                <p:cNvPr id="6" name=""/>
+                <p:cNvSpPr/>
+                <p:nvPr/>
+              </p:nvSpPr>
+              <p:spPr>
+                <a:xfrm>
+                  <a:off x="0" y="6200774"/>
+                  <a:ext cx="1066799" cy="657225"/>
+                </a:xfrm>
+                <a:prstGeom prst="rect">
+                  <a:avLst/>
+                </a:prstGeom>
+                <a:solidFill>
+                  <a:srgbClr val="faf3db"/>
+                </a:solidFill>
+              </p:spPr>
+              <p:style>
+                <a:lnRef idx="2">
+                  <a:schemeClr val="accent1">
+                    <a:shade val="20000"/>
+                  </a:schemeClr>
+                </a:lnRef>
+                <a:fillRef idx="1">
+                  <a:schemeClr val="accent1"/>
+                </a:fillRef>
+                <a:effectRef idx="0">
+                  <a:schemeClr val="accent1"/>
+                </a:effectRef>
+                <a:fontRef idx="minor">
+                  <a:schemeClr val="lt1"/>
+                </a:fontRef>
+              </p:style>
+              <p:txBody>
+                <a:bodyPr anchor="ctr"/>
+                <a:p>
+                  <a:pPr algn="ctr">
+                    <a:defRPr/>
+                  </a:pPr>
+                  <a:r>
+                    <a:rPr lang="ko-KR" altLang="en-US">
+                      <a:solidFill>
+                        <a:schemeClr val="dk1"/>
+                      </a:solidFill>
+                    </a:rPr>
+                    <a:t>정비</a:t>
+                  </a:r>
+                  <a:endParaRPr lang="ko-KR" altLang="en-US">
+                    <a:solidFill>
+                      <a:schemeClr val="dk1"/>
+                    </a:solidFill>
+                  </a:endParaRPr>
+                </a:p>
+              </p:txBody>
+            </p:sp>
+            <p:sp>
+              <p:nvSpPr>
+                <p:cNvPr id="11" name=""/>
+                <p:cNvSpPr/>
+                <p:nvPr/>
+              </p:nvSpPr>
+              <p:spPr>
+                <a:xfrm>
+                  <a:off x="1066800" y="6200774"/>
+                  <a:ext cx="1066799" cy="657225"/>
+                </a:xfrm>
+                <a:prstGeom prst="rect">
+                  <a:avLst/>
+                </a:prstGeom>
+                <a:solidFill>
+                  <a:srgbClr val="faf3db"/>
+                </a:solidFill>
+              </p:spPr>
+              <p:style>
+                <a:lnRef idx="2">
+                  <a:schemeClr val="accent1">
+                    <a:shade val="20000"/>
+                  </a:schemeClr>
+                </a:lnRef>
+                <a:fillRef idx="1">
+                  <a:schemeClr val="accent1"/>
+                </a:fillRef>
+                <a:effectRef idx="0">
+                  <a:schemeClr val="accent1"/>
+                </a:effectRef>
+                <a:fontRef idx="minor">
+                  <a:schemeClr val="lt1"/>
+                </a:fontRef>
+              </p:style>
+              <p:txBody>
+                <a:bodyPr anchor="ctr"/>
+                <a:lstStyle/>
+                <a:p>
+                  <a:pPr algn="ctr">
+                    <a:defRPr/>
+                  </a:pPr>
+                  <a:r>
+                    <a:rPr lang="en-US" altLang="ko-KR">
+                      <a:solidFill>
+                        <a:schemeClr val="dk1"/>
+                      </a:solidFill>
+                    </a:rPr>
+                    <a:t>Community</a:t>
+                  </a:r>
+                  <a:endParaRPr lang="en-US" altLang="ko-KR">
+                    <a:solidFill>
+                      <a:schemeClr val="dk1"/>
+                    </a:solidFill>
+                  </a:endParaRPr>
+                </a:p>
+              </p:txBody>
+            </p:sp>
+            <p:sp>
+              <p:nvSpPr>
+                <p:cNvPr id="12" name=""/>
+                <p:cNvSpPr/>
+                <p:nvPr/>
+              </p:nvSpPr>
+              <p:spPr>
+                <a:xfrm>
+                  <a:off x="2131483" y="6200774"/>
+                  <a:ext cx="1066799" cy="657225"/>
+                </a:xfrm>
+                <a:prstGeom prst="rect">
+                  <a:avLst/>
+                </a:prstGeom>
+                <a:solidFill>
+                  <a:srgbClr val="faf3db"/>
+                </a:solidFill>
+              </p:spPr>
+              <p:style>
+                <a:lnRef idx="2">
+                  <a:schemeClr val="accent1">
+                    <a:shade val="20000"/>
+                  </a:schemeClr>
+                </a:lnRef>
+                <a:fillRef idx="1">
+                  <a:schemeClr val="accent1"/>
+                </a:fillRef>
+                <a:effectRef idx="0">
+                  <a:schemeClr val="accent1"/>
+                </a:effectRef>
+                <a:fontRef idx="minor">
+                  <a:schemeClr val="lt1"/>
+                </a:fontRef>
+              </p:style>
+              <p:txBody>
+                <a:bodyPr anchor="ctr"/>
+                <a:lstStyle/>
+                <a:p>
+                  <a:pPr algn="ctr">
+                    <a:defRPr/>
+                  </a:pPr>
+                  <a:r>
+                    <a:rPr lang="en-US" altLang="ko-KR">
+                      <a:solidFill>
+                        <a:schemeClr val="dk1"/>
+                      </a:solidFill>
+                    </a:rPr>
+                    <a:t>Home</a:t>
+                  </a:r>
+                  <a:endParaRPr lang="en-US" altLang="ko-KR">
+                    <a:solidFill>
+                      <a:schemeClr val="dk1"/>
+                    </a:solidFill>
+                  </a:endParaRPr>
+                </a:p>
+              </p:txBody>
+            </p:sp>
+            <p:sp>
+              <p:nvSpPr>
+                <p:cNvPr id="13" name=""/>
+                <p:cNvSpPr/>
+                <p:nvPr/>
+              </p:nvSpPr>
+              <p:spPr>
+                <a:xfrm>
+                  <a:off x="3196166" y="6200774"/>
+                  <a:ext cx="1066799" cy="657225"/>
+                </a:xfrm>
+                <a:prstGeom prst="rect">
+                  <a:avLst/>
+                </a:prstGeom>
+                <a:solidFill>
+                  <a:srgbClr val="faf3db"/>
+                </a:solidFill>
+              </p:spPr>
+              <p:style>
+                <a:lnRef idx="2">
+                  <a:schemeClr val="accent1">
+                    <a:shade val="20000"/>
+                  </a:schemeClr>
+                </a:lnRef>
+                <a:fillRef idx="1">
+                  <a:schemeClr val="accent1"/>
+                </a:fillRef>
+                <a:effectRef idx="0">
+                  <a:schemeClr val="accent1"/>
+                </a:effectRef>
+                <a:fontRef idx="minor">
+                  <a:schemeClr val="lt1"/>
+                </a:fontRef>
+              </p:style>
+              <p:txBody>
+                <a:bodyPr anchor="ctr"/>
+                <a:lstStyle/>
+                <a:p>
+                  <a:pPr algn="ctr">
+                    <a:defRPr/>
+                  </a:pPr>
+                  <a:r>
+                    <a:rPr lang="ko-KR" altLang="en-US">
+                      <a:solidFill>
+                        <a:schemeClr val="dk1"/>
+                      </a:solidFill>
+                    </a:rPr>
+                    <a:t>알림</a:t>
+                  </a:r>
+                  <a:endParaRPr lang="ko-KR" altLang="en-US">
+                    <a:solidFill>
+                      <a:schemeClr val="dk1"/>
+                    </a:solidFill>
+                  </a:endParaRPr>
+                </a:p>
+              </p:txBody>
+            </p:sp>
+            <p:sp>
+              <p:nvSpPr>
+                <p:cNvPr id="14" name=""/>
+                <p:cNvSpPr/>
+                <p:nvPr/>
+              </p:nvSpPr>
+              <p:spPr>
+                <a:xfrm>
+                  <a:off x="4269317" y="6200774"/>
+                  <a:ext cx="1066799" cy="657225"/>
+                </a:xfrm>
+                <a:prstGeom prst="rect">
+                  <a:avLst/>
+                </a:prstGeom>
+                <a:solidFill>
+                  <a:srgbClr val="faf3db"/>
+                </a:solidFill>
+              </p:spPr>
+              <p:style>
+                <a:lnRef idx="2">
+                  <a:schemeClr val="accent1">
+                    <a:shade val="20000"/>
+                  </a:schemeClr>
+                </a:lnRef>
+                <a:fillRef idx="1">
+                  <a:schemeClr val="accent1"/>
+                </a:fillRef>
+                <a:effectRef idx="0">
+                  <a:schemeClr val="accent1"/>
+                </a:effectRef>
+                <a:fontRef idx="minor">
+                  <a:schemeClr val="lt1"/>
+                </a:fontRef>
+              </p:style>
+              <p:txBody>
+                <a:bodyPr anchor="ctr"/>
+                <a:lstStyle/>
+                <a:p>
+                  <a:pPr algn="ctr">
+                    <a:defRPr/>
+                  </a:pPr>
+                  <a:r>
+                    <a:rPr lang="en-US" altLang="ko-KR">
+                      <a:solidFill>
+                        <a:schemeClr val="dk1"/>
+                      </a:solidFill>
+                    </a:rPr>
+                    <a:t>Setting</a:t>
+                  </a:r>
+                  <a:endParaRPr lang="en-US" altLang="ko-KR">
+                    <a:solidFill>
+                      <a:schemeClr val="dk1"/>
+                    </a:solidFill>
+                  </a:endParaRPr>
+                </a:p>
+              </p:txBody>
+            </p:sp>
+          </p:grpSp>
+          <p:sp>
+            <p:nvSpPr>
+              <p:cNvPr id="19" name=""/>
+              <p:cNvSpPr/>
+              <p:nvPr/>
+            </p:nvSpPr>
+            <p:spPr>
+              <a:xfrm>
+                <a:off x="0" y="2073275"/>
+                <a:ext cx="4606925" cy="2101850"/>
+              </a:xfrm>
+              <a:prstGeom prst="rect">
+                <a:avLst/>
+              </a:prstGeom>
+              <a:solidFill>
+                <a:srgbClr val="faf3db"/>
+              </a:solidFill>
+            </p:spPr>
+            <p:style>
+              <a:lnRef idx="2">
+                <a:schemeClr val="accent1">
+                  <a:shade val="20000"/>
+                </a:schemeClr>
+              </a:lnRef>
+              <a:fillRef idx="1">
+                <a:schemeClr val="accent1"/>
+              </a:fillRef>
+              <a:effectRef idx="0">
+                <a:schemeClr val="accent1"/>
+              </a:effectRef>
+              <a:fontRef idx="minor">
+                <a:schemeClr val="lt1"/>
+              </a:fontRef>
+            </p:style>
+            <p:txBody>
+              <a:bodyPr anchor="ctr"/>
+              <a:lstStyle/>
+              <a:p>
+                <a:pPr>
+                  <a:defRPr/>
+                </a:pPr>
+                <a:r>
+                  <a:rPr lang="ko-KR" altLang="en-US">
+                    <a:solidFill>
+                      <a:schemeClr val="dk1"/>
+                    </a:solidFill>
+                  </a:rPr>
+                  <a:t>차량 기본 정보</a:t>
+                </a:r>
+                <a:endParaRPr lang="ko-KR" altLang="en-US">
+                  <a:solidFill>
+                    <a:schemeClr val="dk1"/>
+                  </a:solidFill>
+                </a:endParaRPr>
+              </a:p>
+              <a:p>
+                <a:pPr>
+                  <a:defRPr/>
+                </a:pPr>
+                <a:r>
+                  <a:rPr lang="ko-KR" altLang="en-US">
+                    <a:solidFill>
+                      <a:schemeClr val="dk1"/>
+                    </a:solidFill>
+                  </a:rPr>
+                  <a:t>                             차 번호 </a:t>
+                </a:r>
+                <a:r>
+                  <a:rPr lang="en-US" altLang="ko-KR">
+                    <a:solidFill>
+                      <a:schemeClr val="dk1"/>
+                    </a:solidFill>
+                  </a:rPr>
+                  <a:t>:</a:t>
+                </a:r>
+                <a:r>
+                  <a:rPr lang="ko-KR" altLang="en-US">
+                    <a:solidFill>
+                      <a:schemeClr val="dk1"/>
+                    </a:solidFill>
+                  </a:rPr>
+                  <a:t> </a:t>
+                </a:r>
+                <a:r>
+                  <a:rPr lang="en-US" altLang="ko-KR">
+                    <a:solidFill>
+                      <a:schemeClr val="dk1"/>
+                    </a:solidFill>
+                  </a:rPr>
+                  <a:t>52</a:t>
+                </a:r>
+                <a:r>
+                  <a:rPr lang="ko-KR" altLang="en-US">
+                    <a:solidFill>
+                      <a:schemeClr val="dk1"/>
+                    </a:solidFill>
+                  </a:rPr>
+                  <a:t>소 </a:t>
+                </a:r>
+                <a:r>
+                  <a:rPr lang="en-US" altLang="ko-KR">
+                    <a:solidFill>
+                      <a:schemeClr val="dk1"/>
+                    </a:solidFill>
+                  </a:rPr>
+                  <a:t>4127</a:t>
+                </a:r>
+                <a:endParaRPr lang="en-US" altLang="ko-KR">
+                  <a:solidFill>
+                    <a:schemeClr val="dk1"/>
+                  </a:solidFill>
+                </a:endParaRPr>
+              </a:p>
+              <a:p>
+                <a:pPr>
+                  <a:defRPr/>
+                </a:pPr>
+                <a:r>
+                  <a:rPr lang="ko-KR" altLang="en-US">
+                    <a:solidFill>
+                      <a:schemeClr val="dk1"/>
+                    </a:solidFill>
+                  </a:rPr>
+                  <a:t>차종 </a:t>
+                </a:r>
+                <a:r>
+                  <a:rPr lang="en-US" altLang="ko-KR">
+                    <a:solidFill>
+                      <a:schemeClr val="dk1"/>
+                    </a:solidFill>
+                  </a:rPr>
+                  <a:t>:</a:t>
+                </a:r>
+                <a:r>
+                  <a:rPr lang="ko-KR" altLang="en-US">
+                    <a:solidFill>
+                      <a:schemeClr val="dk1"/>
+                    </a:solidFill>
+                  </a:rPr>
+                  <a:t> </a:t>
+                </a:r>
+                <a:r>
+                  <a:rPr lang="en-US" altLang="ko-KR">
+                    <a:solidFill>
+                      <a:schemeClr val="dk1"/>
+                    </a:solidFill>
+                  </a:rPr>
+                  <a:t>K7</a:t>
+                </a:r>
+                <a:endParaRPr lang="en-US" altLang="ko-KR">
+                  <a:solidFill>
+                    <a:schemeClr val="dk1"/>
+                  </a:solidFill>
+                </a:endParaRPr>
+              </a:p>
+              <a:p>
+                <a:pPr>
+                  <a:defRPr/>
+                </a:pPr>
+                <a:r>
+                  <a:rPr lang="ko-KR" altLang="en-US">
+                    <a:solidFill>
+                      <a:schemeClr val="dk1"/>
+                    </a:solidFill>
+                  </a:rPr>
+                  <a:t>                                        연식 </a:t>
+                </a:r>
+                <a:r>
+                  <a:rPr lang="en-US" altLang="ko-KR">
+                    <a:solidFill>
+                      <a:schemeClr val="dk1"/>
+                    </a:solidFill>
+                  </a:rPr>
+                  <a:t>:</a:t>
+                </a:r>
+                <a:r>
+                  <a:rPr lang="ko-KR" altLang="en-US">
+                    <a:solidFill>
+                      <a:schemeClr val="dk1"/>
+                    </a:solidFill>
+                  </a:rPr>
+                  <a:t> </a:t>
+                </a:r>
+                <a:r>
+                  <a:rPr lang="en-US" altLang="ko-KR">
+                    <a:solidFill>
+                      <a:schemeClr val="dk1"/>
+                    </a:solidFill>
+                  </a:rPr>
+                  <a:t>2021</a:t>
+                </a:r>
+                <a:endParaRPr lang="en-US" altLang="ko-KR">
+                  <a:solidFill>
+                    <a:schemeClr val="dk1"/>
+                  </a:solidFill>
+                </a:endParaRPr>
+              </a:p>
+              <a:p>
+                <a:pPr>
+                  <a:defRPr/>
+                </a:pPr>
+                <a:endParaRPr lang="ko-KR" altLang="en-US">
+                  <a:solidFill>
+                    <a:schemeClr val="dk1"/>
+                  </a:solidFill>
+                </a:endParaRPr>
+              </a:p>
+              <a:p>
+                <a:pPr>
+                  <a:defRPr/>
+                </a:pPr>
+                <a:endParaRPr lang="ko-KR" altLang="en-US">
+                  <a:solidFill>
+                    <a:schemeClr val="dk1"/>
+                  </a:solidFill>
+                </a:endParaRPr>
+              </a:p>
+              <a:p>
+                <a:pPr>
+                  <a:defRPr/>
+                </a:pPr>
+                <a:r>
+                  <a:rPr lang="ko-KR" altLang="en-US">
+                    <a:solidFill>
+                      <a:schemeClr val="dk1"/>
+                    </a:solidFill>
+                  </a:rPr>
+                  <a:t>				더보기</a:t>
+                </a:r>
+                <a:endParaRPr lang="ko-KR" altLang="en-US">
+                  <a:solidFill>
+                    <a:schemeClr val="dk1"/>
+                  </a:solidFill>
+                </a:endParaRPr>
+              </a:p>
+            </p:txBody>
+          </p:sp>
+          <p:sp>
+            <p:nvSpPr>
+              <p:cNvPr id="20" name=""/>
+              <p:cNvSpPr/>
+              <p:nvPr/>
+            </p:nvSpPr>
+            <p:spPr>
+              <a:xfrm>
+                <a:off x="0" y="4305302"/>
+                <a:ext cx="4606925" cy="855662"/>
+              </a:xfrm>
+              <a:prstGeom prst="rect">
+                <a:avLst/>
+              </a:prstGeom>
+              <a:solidFill>
+                <a:srgbClr val="faf3db"/>
+              </a:solidFill>
+            </p:spPr>
+            <p:style>
+              <a:lnRef idx="2">
+                <a:schemeClr val="accent1">
+                  <a:shade val="20000"/>
+                </a:schemeClr>
+              </a:lnRef>
+              <a:fillRef idx="1">
+                <a:schemeClr val="accent1"/>
+              </a:fillRef>
+              <a:effectRef idx="0">
+                <a:schemeClr val="accent1"/>
+              </a:effectRef>
+              <a:fontRef idx="minor">
+                <a:schemeClr val="lt1"/>
+              </a:fontRef>
+            </p:style>
+            <p:txBody>
+              <a:bodyPr anchor="ctr"/>
+              <a:lstStyle/>
+              <a:p>
+                <a:pPr>
+                  <a:defRPr/>
+                </a:pPr>
+                <a:r>
+                  <a:rPr lang="ko-KR" altLang="en-US">
+                    <a:solidFill>
+                      <a:schemeClr val="dk1"/>
+                    </a:solidFill>
+                  </a:rPr>
+                  <a:t>보험정보                                </a:t>
+                </a:r>
+                <a:r>
+                  <a:rPr lang="en-US" altLang="ko-KR">
+                    <a:solidFill>
+                      <a:schemeClr val="dk1"/>
+                    </a:solidFill>
+                  </a:rPr>
+                  <a:t>N</a:t>
+                </a:r>
+                <a:r>
+                  <a:rPr lang="ko-KR" altLang="en-US">
+                    <a:solidFill>
+                      <a:schemeClr val="dk1"/>
+                    </a:solidFill>
+                  </a:rPr>
+                  <a:t>년차</a:t>
+                </a:r>
+                <a:endParaRPr lang="ko-KR" altLang="en-US">
+                  <a:solidFill>
+                    <a:schemeClr val="dk1"/>
+                  </a:solidFill>
+                </a:endParaRPr>
+              </a:p>
+              <a:p>
+                <a:pPr>
+                  <a:defRPr/>
+                </a:pPr>
+                <a:r>
+                  <a:rPr lang="en-US" altLang="ko-KR">
+                    <a:solidFill>
+                      <a:schemeClr val="dk1"/>
+                    </a:solidFill>
+                  </a:rPr>
+                  <a:t>DB</a:t>
+                </a:r>
+                <a:r>
+                  <a:rPr lang="ko-KR" altLang="en-US">
+                    <a:solidFill>
+                      <a:schemeClr val="dk1"/>
+                    </a:solidFill>
+                  </a:rPr>
+                  <a:t>손해보험</a:t>
+                </a:r>
+                <a:endParaRPr lang="en-US" altLang="ko-KR">
+                  <a:solidFill>
+                    <a:schemeClr val="dk1"/>
+                  </a:solidFill>
+                </a:endParaRPr>
+              </a:p>
+            </p:txBody>
+          </p:sp>
+        </p:grpSp>
+        <p:sp>
+          <p:nvSpPr>
+            <p:cNvPr id="22" name=""/>
+            <p:cNvSpPr/>
+            <p:nvPr/>
+          </p:nvSpPr>
+          <p:spPr>
+            <a:xfrm>
+              <a:off x="0" y="2079623"/>
+              <a:ext cx="4597399" cy="2095500"/>
+            </a:xfrm>
+            <a:prstGeom prst="rect">
+              <a:avLst/>
+            </a:prstGeom>
+            <a:noFill/>
+          </p:spPr>
+          <p:style>
+            <a:lnRef idx="2">
+              <a:schemeClr val="accent1">
+                <a:shade val="20000"/>
+              </a:schemeClr>
+            </a:lnRef>
+            <a:fillRef idx="1">
+              <a:schemeClr val="accent1"/>
+            </a:fillRef>
+            <a:effectRef idx="0">
+              <a:schemeClr val="accent1"/>
+            </a:effectRef>
+            <a:fontRef idx="minor">
+              <a:schemeClr val="lt1"/>
+            </a:fontRef>
+          </p:style>
+          <p:txBody>
+            <a:bodyPr anchor="ctr"/>
+            <a:p>
+              <a:pPr algn="ctr">
+                <a:defRPr/>
+              </a:pPr>
+              <a:r>
+                <a:rPr lang="en-US" altLang="ko-KR">
+                  <a:solidFill>
+                    <a:schemeClr val="dk1"/>
+                  </a:solidFill>
+                  <a:effectLst>
+                    <a:glow rad="63500">
+                      <a:schemeClr val="accent1">
+                        <a:satMod val="175000"/>
+                        <a:alpha val="50000"/>
+                      </a:schemeClr>
+                    </a:glow>
+                  </a:effectLst>
+                </a:rPr>
+                <a:t>Car Image</a:t>
+              </a:r>
+              <a:endParaRPr lang="en-US" altLang="ko-KR">
+                <a:solidFill>
+                  <a:schemeClr val="dk1"/>
+                </a:solidFill>
+                <a:effectLst>
+                  <a:glow rad="63500">
+                    <a:schemeClr val="accent1">
+                      <a:satMod val="175000"/>
+                      <a:alpha val="50000"/>
+                    </a:schemeClr>
+                  </a:glow>
+                </a:effectLst>
+              </a:endParaRPr>
+            </a:p>
+          </p:txBody>
+        </p:sp>
+      </p:grpSp>
+      <p:sp>
+        <p:nvSpPr>
+          <p:cNvPr id="25" name=""/>
+          <p:cNvSpPr/>
+          <p:nvPr/>
+        </p:nvSpPr>
+        <p:spPr>
+          <a:xfrm>
+            <a:off x="5327649" y="1349374"/>
+            <a:ext cx="6864350" cy="5508625"/>
+          </a:xfrm>
+          <a:prstGeom prst="rect">
+            <a:avLst/>
+          </a:prstGeom>
+          <a:noFill/>
+          <a:ln>
+            <a:noFill/>
+          </a:ln>
+        </p:spPr>
+        <p:style>
+          <a:lnRef idx="2">
+            <a:schemeClr val="accent1">
+              <a:shade val="20000"/>
+            </a:schemeClr>
+          </a:lnRef>
+          <a:fillRef idx="1">
+            <a:schemeClr val="accent1"/>
+          </a:fillRef>
+          <a:effectRef idx="0">
+            <a:schemeClr val="accent1"/>
+          </a:effectRef>
+          <a:fontRef idx="minor">
+            <a:schemeClr val="lt1"/>
+          </a:fontRef>
+        </p:style>
+        <p:txBody>
+          <a:bodyPr anchor="ctr"/>
+          <a:p>
+            <a:pPr>
+              <a:defRPr/>
+            </a:pPr>
+            <a:r>
+              <a:rPr lang="en-US" altLang="ko-KR">
+                <a:solidFill>
+                  <a:schemeClr val="dk1"/>
+                </a:solidFill>
+              </a:rPr>
+              <a:t>1. </a:t>
+            </a:r>
+            <a:endParaRPr lang="en-US" altLang="ko-KR">
+              <a:solidFill>
+                <a:schemeClr val="dk1"/>
+              </a:solidFill>
+            </a:endParaRPr>
+          </a:p>
+        </p:txBody>
+      </p:sp>
+      <p:sp>
+        <p:nvSpPr>
+          <p:cNvPr id="28" name="타원 55"/>
+          <p:cNvSpPr/>
+          <p:nvPr/>
+        </p:nvSpPr>
+        <p:spPr>
+          <a:xfrm>
+            <a:off x="251113" y="1230018"/>
+            <a:ext cx="283718" cy="283718"/>
+          </a:xfrm>
+          <a:prstGeom prst="ellipse">
+            <a:avLst/>
+          </a:prstGeom>
+          <a:solidFill>
+            <a:srgbClr val="ffe7d8"/>
+          </a:solidFill>
+        </p:spPr>
+        <p:style>
+          <a:lnRef idx="2">
+            <a:schemeClr val="accent1">
+              <a:shade val="50000"/>
+            </a:schemeClr>
+          </a:lnRef>
+          <a:fillRef idx="1">
+            <a:schemeClr val="accent1"/>
+          </a:fillRef>
+          <a:effectRef idx="0">
+            <a:schemeClr val="accent1"/>
+          </a:effectRef>
+          <a:fontRef idx="minor">
+            <a:schemeClr val="lt1"/>
+          </a:fontRef>
+        </p:style>
+        <p:txBody>
+          <a:bodyPr anchor="ctr"/>
+          <a:lstStyle/>
+          <a:p>
+            <a:pPr algn="ctr">
+              <a:defRPr/>
+            </a:pPr>
+            <a:r>
+              <a:rPr lang="en-US" altLang="ko-KR">
+                <a:solidFill>
+                  <a:schemeClr val="tx1"/>
+                </a:solidFill>
+              </a:rPr>
+              <a:t>1</a:t>
+            </a:r>
+            <a:endParaRPr lang="en-US" altLang="ko-KR">
+              <a:solidFill>
+                <a:schemeClr val="tx1"/>
+              </a:solidFill>
+            </a:endParaRPr>
+          </a:p>
+        </p:txBody>
+      </p:sp>
+      <p:sp>
+        <p:nvSpPr>
+          <p:cNvPr id="30" name="타원 55"/>
+          <p:cNvSpPr/>
+          <p:nvPr/>
+        </p:nvSpPr>
+        <p:spPr>
+          <a:xfrm>
+            <a:off x="0" y="1890418"/>
+            <a:ext cx="283718" cy="283718"/>
+          </a:xfrm>
+          <a:prstGeom prst="ellipse">
+            <a:avLst/>
+          </a:prstGeom>
+          <a:solidFill>
+            <a:srgbClr val="ffe7d8"/>
+          </a:solidFill>
+        </p:spPr>
+        <p:style>
+          <a:lnRef idx="2">
+            <a:schemeClr val="accent1">
+              <a:shade val="50000"/>
+            </a:schemeClr>
+          </a:lnRef>
+          <a:fillRef idx="1">
+            <a:schemeClr val="accent1"/>
+          </a:fillRef>
+          <a:effectRef idx="0">
+            <a:schemeClr val="accent1"/>
+          </a:effectRef>
+          <a:fontRef idx="minor">
+            <a:schemeClr val="lt1"/>
+          </a:fontRef>
+        </p:style>
+        <p:txBody>
+          <a:bodyPr anchor="ctr"/>
+          <a:lstStyle/>
+          <a:p>
+            <a:pPr algn="ctr">
+              <a:defRPr/>
+            </a:pPr>
+            <a:r>
+              <a:rPr lang="en-US" altLang="ko-KR">
+                <a:solidFill>
+                  <a:schemeClr val="tx1"/>
+                </a:solidFill>
+              </a:rPr>
+              <a:t>2</a:t>
+            </a:r>
+            <a:endParaRPr lang="en-US" altLang="ko-KR">
+              <a:solidFill>
+                <a:schemeClr val="tx1"/>
+              </a:solidFill>
+            </a:endParaRPr>
+          </a:p>
+        </p:txBody>
+      </p:sp>
+      <p:sp>
+        <p:nvSpPr>
+          <p:cNvPr id="32" name=""/>
+          <p:cNvSpPr/>
+          <p:nvPr/>
+        </p:nvSpPr>
+        <p:spPr>
+          <a:xfrm>
+            <a:off x="0" y="1428750"/>
+            <a:ext cx="486282" cy="484632"/>
+          </a:xfrm>
+          <a:prstGeom prst="leftArrow">
+            <a:avLst>
+              <a:gd name="adj1" fmla="val 50000"/>
+              <a:gd name="adj2" fmla="val 50000"/>
+            </a:avLst>
+          </a:prstGeom>
+          <a:solidFill>
+            <a:srgbClr val="faf3db"/>
+          </a:solidFill>
+        </p:spPr>
+        <p:style>
+          <a:lnRef idx="2">
+            <a:schemeClr val="accent1">
+              <a:shade val="20000"/>
+            </a:schemeClr>
+          </a:lnRef>
+          <a:fillRef idx="1">
+            <a:schemeClr val="accent1"/>
+          </a:fillRef>
+          <a:effectRef idx="0">
+            <a:schemeClr val="accent1"/>
+          </a:effectRef>
+          <a:fontRef idx="minor">
+            <a:schemeClr val="lt1"/>
+          </a:fontRef>
+        </p:style>
+        <p:txBody>
+          <a:bodyPr anchor="ctr"/>
+          <a:p>
+            <a:pPr algn="ctr">
+              <a:defRPr/>
+            </a:pPr>
+            <a:endParaRPr lang="en-US" altLang="ko-KR"/>
+          </a:p>
+        </p:txBody>
+      </p:sp>
+      <p:sp>
+        <p:nvSpPr>
+          <p:cNvPr id="33" name=""/>
+          <p:cNvSpPr/>
+          <p:nvPr/>
+        </p:nvSpPr>
+        <p:spPr>
+          <a:xfrm>
+            <a:off x="0" y="5233988"/>
+            <a:ext cx="4606925" cy="760412"/>
+          </a:xfrm>
+          <a:prstGeom prst="rect">
+            <a:avLst/>
+          </a:prstGeom>
+          <a:solidFill>
+            <a:srgbClr val="faf3db"/>
+          </a:solidFill>
+        </p:spPr>
+        <p:style>
+          <a:lnRef idx="2">
+            <a:schemeClr val="accent1">
+              <a:shade val="20000"/>
+            </a:schemeClr>
+          </a:lnRef>
+          <a:fillRef idx="1">
+            <a:schemeClr val="accent1"/>
+          </a:fillRef>
+          <a:effectRef idx="0">
+            <a:schemeClr val="accent1"/>
+          </a:effectRef>
+          <a:fontRef idx="minor">
+            <a:schemeClr val="lt1"/>
+          </a:fontRef>
+        </p:style>
+        <p:txBody>
+          <a:bodyPr anchor="ctr"/>
+          <a:lstStyle/>
+          <a:p>
+            <a:pPr>
+              <a:defRPr/>
+            </a:pPr>
+            <a:r>
+              <a:rPr lang="ko-KR" altLang="en-US">
+                <a:solidFill>
+                  <a:schemeClr val="dk1"/>
+                </a:solidFill>
+              </a:rPr>
+              <a:t>방문 정비소 기록</a:t>
+            </a:r>
+            <a:endParaRPr lang="ko-KR" altLang="en-US">
+              <a:solidFill>
+                <a:schemeClr val="dk1"/>
+              </a:solidFill>
+            </a:endParaRPr>
+          </a:p>
+          <a:p>
+            <a:pPr>
+              <a:defRPr/>
+            </a:pPr>
+            <a:r>
+              <a:rPr lang="ko-KR" altLang="en-US">
+                <a:solidFill>
+                  <a:schemeClr val="dk1"/>
+                </a:solidFill>
+              </a:rPr>
+              <a:t>메모</a:t>
+            </a:r>
+            <a:endParaRPr lang="ko-KR" altLang="en-US">
+              <a:solidFill>
+                <a:schemeClr val="dk1"/>
+              </a:solidFill>
+            </a:endParaRPr>
+          </a:p>
+        </p:txBody>
+      </p:sp>
+      <p:sp>
+        <p:nvSpPr>
+          <p:cNvPr id="34" name=""/>
+          <p:cNvSpPr/>
+          <p:nvPr/>
+        </p:nvSpPr>
+        <p:spPr>
+          <a:xfrm>
+            <a:off x="4259791" y="1346993"/>
+            <a:ext cx="1066799" cy="657225"/>
+          </a:xfrm>
+          <a:prstGeom prst="rect">
+            <a:avLst/>
+          </a:prstGeom>
+          <a:noFill/>
+          <a:ln>
+            <a:noFill/>
+          </a:ln>
+        </p:spPr>
+        <p:style>
+          <a:lnRef idx="2">
+            <a:schemeClr val="accent1">
+              <a:shade val="20000"/>
+            </a:schemeClr>
+          </a:lnRef>
+          <a:fillRef idx="1">
+            <a:schemeClr val="accent1"/>
+          </a:fillRef>
+          <a:effectRef idx="0">
+            <a:schemeClr val="accent1"/>
+          </a:effectRef>
+          <a:fontRef idx="minor">
+            <a:schemeClr val="lt1"/>
+          </a:fontRef>
+        </p:style>
+        <p:txBody>
+          <a:bodyPr anchor="ctr"/>
+          <a:lstStyle/>
+          <a:p>
+            <a:pPr algn="ctr">
+              <a:defRPr/>
+            </a:pPr>
+            <a:r>
+              <a:rPr lang="ko-KR" altLang="en-US">
+                <a:solidFill>
+                  <a:schemeClr val="dk1"/>
+                </a:solidFill>
+              </a:rPr>
+              <a:t>내 차고</a:t>
+            </a:r>
+            <a:endParaRPr lang="ko-KR" altLang="en-US">
+              <a:solidFill>
+                <a:schemeClr val="dk1"/>
+              </a:solidFill>
+            </a:endParaRPr>
+          </a:p>
+        </p:txBody>
+      </p:sp>
+    </p:spTree>
+  </p:cSld>
+  <p:clrMapOvr>
+    <a:masterClrMapping/>
+  </p:clrMapOvr>
+  <mc:AlternateContent xmlns:mc="http://schemas.openxmlformats.org/markup-compatibility/2006">
+    <mc:Choice xmlns:p14="http://schemas.microsoft.com/office/powerpoint/2010/main" Requires="p14">
+      <p:transition xmlns:mc="http://schemas.openxmlformats.org/markup-compatibility/2006" xmlns:p14="http://schemas.microsoft.com/office/powerpoint/2010/main" mc:Ignorable="p14" p14:dur="500"/>
+    </mc:Choice>
+    <mc:Fallback>
+      <p:transition/>
+    </mc:Fallback>
+  </mc:AlternateContent>
+</p:sld>
+</file>
+
+<file path=ppt/slides/slide41.xml><?xml version="1.0" encoding="utf-8"?>
 <p:sld xmlns:a="http://schemas.openxmlformats.org/drawingml/2006/main" xmlns:r="http://schemas.openxmlformats.org/officeDocument/2006/relationships" xmlns:p="http://schemas.openxmlformats.org/presentationml/2006/main">
   <p:cSld>
     <p:spTree>
@@ -20652,7 +23004,7 @@
 </p:sld>
 </file>
 
-<file path=ppt/slides/slide41.xml><?xml version="1.0" encoding="utf-8"?>
+<file path=ppt/slides/slide42.xml><?xml version="1.0" encoding="utf-8"?>
 <p:sld xmlns:a="http://schemas.openxmlformats.org/drawingml/2006/main" xmlns:r="http://schemas.openxmlformats.org/officeDocument/2006/relationships" xmlns:p="http://schemas.openxmlformats.org/presentationml/2006/main">
   <p:cSld>
     <p:spTree>
@@ -20858,7 +23210,7 @@
 </p:sld>
 </file>
 
-<file path=ppt/slides/slide42.xml><?xml version="1.0" encoding="utf-8"?>
+<file path=ppt/slides/slide43.xml><?xml version="1.0" encoding="utf-8"?>
 <p:sld xmlns:a="http://schemas.openxmlformats.org/drawingml/2006/main" xmlns:r="http://schemas.openxmlformats.org/officeDocument/2006/relationships" xmlns:p="http://schemas.openxmlformats.org/presentationml/2006/main">
   <p:cSld>
     <p:spTree>
@@ -21136,7 +23488,7 @@
 </p:sld>
 </file>
 
-<file path=ppt/slides/slide43.xml><?xml version="1.0" encoding="utf-8"?>
+<file path=ppt/slides/slide44.xml><?xml version="1.0" encoding="utf-8"?>
 <p:sld xmlns:a="http://schemas.openxmlformats.org/drawingml/2006/main" xmlns:r="http://schemas.openxmlformats.org/officeDocument/2006/relationships" xmlns:p="http://schemas.openxmlformats.org/presentationml/2006/main">
   <p:cSld>
     <p:spTree>
@@ -21236,7 +23588,7 @@
 </p:sld>
 </file>
 
-<file path=ppt/slides/slide44.xml><?xml version="1.0" encoding="utf-8"?>
+<file path=ppt/slides/slide45.xml><?xml version="1.0" encoding="utf-8"?>
 <p:sld xmlns:a="http://schemas.openxmlformats.org/drawingml/2006/main" xmlns:r="http://schemas.openxmlformats.org/officeDocument/2006/relationships" xmlns:p="http://schemas.openxmlformats.org/presentationml/2006/main">
   <p:cSld>
     <p:spTree>
@@ -21514,7 +23866,7 @@
 </p:sld>
 </file>
 
-<file path=ppt/slides/slide45.xml><?xml version="1.0" encoding="utf-8"?>
+<file path=ppt/slides/slide46.xml><?xml version="1.0" encoding="utf-8"?>
 <p:sld xmlns:a="http://schemas.openxmlformats.org/drawingml/2006/main" xmlns:r="http://schemas.openxmlformats.org/officeDocument/2006/relationships" xmlns:p="http://schemas.openxmlformats.org/presentationml/2006/main">
   <p:cSld>
     <p:spTree>
@@ -21602,7 +23954,7 @@
 </p:sld>
 </file>
 
-<file path=ppt/slides/slide46.xml><?xml version="1.0" encoding="utf-8"?>
+<file path=ppt/slides/slide47.xml><?xml version="1.0" encoding="utf-8"?>
 <p:sld xmlns:a="http://schemas.openxmlformats.org/drawingml/2006/main" xmlns:r="http://schemas.openxmlformats.org/officeDocument/2006/relationships" xmlns:p="http://schemas.openxmlformats.org/presentationml/2006/main">
   <p:cSld>
     <p:spTree>
@@ -21899,7 +24251,7 @@
 </p:sld>
 </file>
 
-<file path=ppt/slides/slide47.xml><?xml version="1.0" encoding="utf-8"?>
+<file path=ppt/slides/slide48.xml><?xml version="1.0" encoding="utf-8"?>
 <p:sld xmlns:a="http://schemas.openxmlformats.org/drawingml/2006/main" xmlns:r="http://schemas.openxmlformats.org/officeDocument/2006/relationships" xmlns:p="http://schemas.openxmlformats.org/presentationml/2006/main">
   <p:cSld>
     <p:spTree>

</xml_diff>